<commit_message>
Fix wording on certificate section and drawing.
</commit_message>
<xml_diff>
--- a/labmanual/misc/drawings.pptx
+++ b/labmanual/misc/drawings.pptx
@@ -114,6 +114,10 @@
 </p:presentation>
 </file>
 
+<file path=ppt/revisionInfo.xml><?xml version="1.0" encoding="utf-8"?>
+<p1510:revInfo xmlns:a="http://schemas.openxmlformats.org/drawingml/2006/main" xmlns:r="http://schemas.openxmlformats.org/officeDocument/2006/relationships" xmlns:p1510="http://schemas.microsoft.com/office/powerpoint/2015/10/main"/>
+</file>
+
 <file path=ppt/slideLayouts/slideLayout1.xml><?xml version="1.0" encoding="utf-8"?>
 <p:sldLayout xmlns:a="http://schemas.openxmlformats.org/drawingml/2006/main" xmlns:r="http://schemas.openxmlformats.org/officeDocument/2006/relationships" xmlns:p="http://schemas.openxmlformats.org/presentationml/2006/main" type="title" preserve="1">
   <p:cSld name="Title Slide">
@@ -156,10 +160,9 @@
           </a:lstStyle>
           <a:p>
             <a:r>
-              <a:rPr lang="en-US" smtClean="0"/>
+              <a:rPr lang="en-US"/>
               <a:t>Click to edit Master title style</a:t>
             </a:r>
-            <a:endParaRPr lang="en-US"/>
           </a:p>
         </p:txBody>
       </p:sp>
@@ -221,10 +224,9 @@
           </a:lstStyle>
           <a:p>
             <a:r>
-              <a:rPr lang="en-US" smtClean="0"/>
+              <a:rPr lang="en-US"/>
               <a:t>Click to edit Master subtitle style</a:t>
             </a:r>
-            <a:endParaRPr lang="en-US"/>
           </a:p>
         </p:txBody>
       </p:sp>
@@ -245,7 +247,7 @@
           <a:p>
             <a:fld id="{02CF1C66-B1B6-1643-A1E5-DA5B6E4004A0}" type="datetimeFigureOut">
               <a:rPr lang="en-US" smtClean="0"/>
-              <a:t>6/11/17</a:t>
+              <a:t>6/14/2017</a:t>
             </a:fld>
             <a:endParaRPr lang="en-US"/>
           </a:p>
@@ -339,10 +341,9 @@
           <a:lstStyle/>
           <a:p>
             <a:r>
-              <a:rPr lang="en-US" smtClean="0"/>
+              <a:rPr lang="en-US"/>
               <a:t>Click to edit Master title style</a:t>
             </a:r>
-            <a:endParaRPr lang="en-US"/>
           </a:p>
         </p:txBody>
       </p:sp>
@@ -363,38 +364,37 @@
           <a:p>
             <a:pPr lvl="0"/>
             <a:r>
-              <a:rPr lang="en-US" smtClean="0"/>
+              <a:rPr lang="en-US"/>
               <a:t>Click to edit Master text styles</a:t>
             </a:r>
           </a:p>
           <a:p>
             <a:pPr lvl="1"/>
             <a:r>
-              <a:rPr lang="en-US" smtClean="0"/>
+              <a:rPr lang="en-US"/>
               <a:t>Second level</a:t>
             </a:r>
           </a:p>
           <a:p>
             <a:pPr lvl="2"/>
             <a:r>
-              <a:rPr lang="en-US" smtClean="0"/>
+              <a:rPr lang="en-US"/>
               <a:t>Third level</a:t>
             </a:r>
           </a:p>
           <a:p>
             <a:pPr lvl="3"/>
             <a:r>
-              <a:rPr lang="en-US" smtClean="0"/>
+              <a:rPr lang="en-US"/>
               <a:t>Fourth level</a:t>
             </a:r>
           </a:p>
           <a:p>
             <a:pPr lvl="4"/>
             <a:r>
-              <a:rPr lang="en-US" smtClean="0"/>
+              <a:rPr lang="en-US"/>
               <a:t>Fifth level</a:t>
             </a:r>
-            <a:endParaRPr lang="en-US"/>
           </a:p>
         </p:txBody>
       </p:sp>
@@ -415,7 +415,7 @@
           <a:p>
             <a:fld id="{02CF1C66-B1B6-1643-A1E5-DA5B6E4004A0}" type="datetimeFigureOut">
               <a:rPr lang="en-US" smtClean="0"/>
-              <a:t>6/11/17</a:t>
+              <a:t>6/14/2017</a:t>
             </a:fld>
             <a:endParaRPr lang="en-US"/>
           </a:p>
@@ -514,10 +514,9 @@
           <a:lstStyle/>
           <a:p>
             <a:r>
-              <a:rPr lang="en-US" smtClean="0"/>
+              <a:rPr lang="en-US"/>
               <a:t>Click to edit Master title style</a:t>
             </a:r>
-            <a:endParaRPr lang="en-US"/>
           </a:p>
         </p:txBody>
       </p:sp>
@@ -543,38 +542,37 @@
           <a:p>
             <a:pPr lvl="0"/>
             <a:r>
-              <a:rPr lang="en-US" smtClean="0"/>
+              <a:rPr lang="en-US"/>
               <a:t>Click to edit Master text styles</a:t>
             </a:r>
           </a:p>
           <a:p>
             <a:pPr lvl="1"/>
             <a:r>
-              <a:rPr lang="en-US" smtClean="0"/>
+              <a:rPr lang="en-US"/>
               <a:t>Second level</a:t>
             </a:r>
           </a:p>
           <a:p>
             <a:pPr lvl="2"/>
             <a:r>
-              <a:rPr lang="en-US" smtClean="0"/>
+              <a:rPr lang="en-US"/>
               <a:t>Third level</a:t>
             </a:r>
           </a:p>
           <a:p>
             <a:pPr lvl="3"/>
             <a:r>
-              <a:rPr lang="en-US" smtClean="0"/>
+              <a:rPr lang="en-US"/>
               <a:t>Fourth level</a:t>
             </a:r>
           </a:p>
           <a:p>
             <a:pPr lvl="4"/>
             <a:r>
-              <a:rPr lang="en-US" smtClean="0"/>
+              <a:rPr lang="en-US"/>
               <a:t>Fifth level</a:t>
             </a:r>
-            <a:endParaRPr lang="en-US"/>
           </a:p>
         </p:txBody>
       </p:sp>
@@ -595,7 +593,7 @@
           <a:p>
             <a:fld id="{02CF1C66-B1B6-1643-A1E5-DA5B6E4004A0}" type="datetimeFigureOut">
               <a:rPr lang="en-US" smtClean="0"/>
-              <a:t>6/11/17</a:t>
+              <a:t>6/14/2017</a:t>
             </a:fld>
             <a:endParaRPr lang="en-US"/>
           </a:p>
@@ -689,10 +687,9 @@
           <a:lstStyle/>
           <a:p>
             <a:r>
-              <a:rPr lang="en-US" smtClean="0"/>
+              <a:rPr lang="en-US"/>
               <a:t>Click to edit Master title style</a:t>
             </a:r>
-            <a:endParaRPr lang="en-US"/>
           </a:p>
         </p:txBody>
       </p:sp>
@@ -713,38 +710,37 @@
           <a:p>
             <a:pPr lvl="0"/>
             <a:r>
-              <a:rPr lang="en-US" smtClean="0"/>
+              <a:rPr lang="en-US"/>
               <a:t>Click to edit Master text styles</a:t>
             </a:r>
           </a:p>
           <a:p>
             <a:pPr lvl="1"/>
             <a:r>
-              <a:rPr lang="en-US" smtClean="0"/>
+              <a:rPr lang="en-US"/>
               <a:t>Second level</a:t>
             </a:r>
           </a:p>
           <a:p>
             <a:pPr lvl="2"/>
             <a:r>
-              <a:rPr lang="en-US" smtClean="0"/>
+              <a:rPr lang="en-US"/>
               <a:t>Third level</a:t>
             </a:r>
           </a:p>
           <a:p>
             <a:pPr lvl="3"/>
             <a:r>
-              <a:rPr lang="en-US" smtClean="0"/>
+              <a:rPr lang="en-US"/>
               <a:t>Fourth level</a:t>
             </a:r>
           </a:p>
           <a:p>
             <a:pPr lvl="4"/>
             <a:r>
-              <a:rPr lang="en-US" smtClean="0"/>
+              <a:rPr lang="en-US"/>
               <a:t>Fifth level</a:t>
             </a:r>
-            <a:endParaRPr lang="en-US"/>
           </a:p>
         </p:txBody>
       </p:sp>
@@ -765,7 +761,7 @@
           <a:p>
             <a:fld id="{02CF1C66-B1B6-1643-A1E5-DA5B6E4004A0}" type="datetimeFigureOut">
               <a:rPr lang="en-US" smtClean="0"/>
-              <a:t>6/11/17</a:t>
+              <a:t>6/14/2017</a:t>
             </a:fld>
             <a:endParaRPr lang="en-US"/>
           </a:p>
@@ -868,10 +864,9 @@
           </a:lstStyle>
           <a:p>
             <a:r>
-              <a:rPr lang="en-US" smtClean="0"/>
+              <a:rPr lang="en-US"/>
               <a:t>Click to edit Master title style</a:t>
             </a:r>
-            <a:endParaRPr lang="en-US"/>
           </a:p>
         </p:txBody>
       </p:sp>
@@ -988,7 +983,7 @@
           <a:p>
             <a:pPr lvl="0"/>
             <a:r>
-              <a:rPr lang="en-US" smtClean="0"/>
+              <a:rPr lang="en-US"/>
               <a:t>Click to edit Master text styles</a:t>
             </a:r>
           </a:p>
@@ -1011,7 +1006,7 @@
           <a:p>
             <a:fld id="{02CF1C66-B1B6-1643-A1E5-DA5B6E4004A0}" type="datetimeFigureOut">
               <a:rPr lang="en-US" smtClean="0"/>
-              <a:t>6/11/17</a:t>
+              <a:t>6/14/2017</a:t>
             </a:fld>
             <a:endParaRPr lang="en-US"/>
           </a:p>
@@ -1105,10 +1100,9 @@
           <a:lstStyle/>
           <a:p>
             <a:r>
-              <a:rPr lang="en-US" smtClean="0"/>
+              <a:rPr lang="en-US"/>
               <a:t>Click to edit Master title style</a:t>
             </a:r>
-            <a:endParaRPr lang="en-US"/>
           </a:p>
         </p:txBody>
       </p:sp>
@@ -1134,38 +1128,37 @@
           <a:p>
             <a:pPr lvl="0"/>
             <a:r>
-              <a:rPr lang="en-US" smtClean="0"/>
+              <a:rPr lang="en-US"/>
               <a:t>Click to edit Master text styles</a:t>
             </a:r>
           </a:p>
           <a:p>
             <a:pPr lvl="1"/>
             <a:r>
-              <a:rPr lang="en-US" smtClean="0"/>
+              <a:rPr lang="en-US"/>
               <a:t>Second level</a:t>
             </a:r>
           </a:p>
           <a:p>
             <a:pPr lvl="2"/>
             <a:r>
-              <a:rPr lang="en-US" smtClean="0"/>
+              <a:rPr lang="en-US"/>
               <a:t>Third level</a:t>
             </a:r>
           </a:p>
           <a:p>
             <a:pPr lvl="3"/>
             <a:r>
-              <a:rPr lang="en-US" smtClean="0"/>
+              <a:rPr lang="en-US"/>
               <a:t>Fourth level</a:t>
             </a:r>
           </a:p>
           <a:p>
             <a:pPr lvl="4"/>
             <a:r>
-              <a:rPr lang="en-US" smtClean="0"/>
+              <a:rPr lang="en-US"/>
               <a:t>Fifth level</a:t>
             </a:r>
-            <a:endParaRPr lang="en-US"/>
           </a:p>
         </p:txBody>
       </p:sp>
@@ -1191,38 +1184,37 @@
           <a:p>
             <a:pPr lvl="0"/>
             <a:r>
-              <a:rPr lang="en-US" smtClean="0"/>
+              <a:rPr lang="en-US"/>
               <a:t>Click to edit Master text styles</a:t>
             </a:r>
           </a:p>
           <a:p>
             <a:pPr lvl="1"/>
             <a:r>
-              <a:rPr lang="en-US" smtClean="0"/>
+              <a:rPr lang="en-US"/>
               <a:t>Second level</a:t>
             </a:r>
           </a:p>
           <a:p>
             <a:pPr lvl="2"/>
             <a:r>
-              <a:rPr lang="en-US" smtClean="0"/>
+              <a:rPr lang="en-US"/>
               <a:t>Third level</a:t>
             </a:r>
           </a:p>
           <a:p>
             <a:pPr lvl="3"/>
             <a:r>
-              <a:rPr lang="en-US" smtClean="0"/>
+              <a:rPr lang="en-US"/>
               <a:t>Fourth level</a:t>
             </a:r>
           </a:p>
           <a:p>
             <a:pPr lvl="4"/>
             <a:r>
-              <a:rPr lang="en-US" smtClean="0"/>
+              <a:rPr lang="en-US"/>
               <a:t>Fifth level</a:t>
             </a:r>
-            <a:endParaRPr lang="en-US"/>
           </a:p>
         </p:txBody>
       </p:sp>
@@ -1243,7 +1235,7 @@
           <a:p>
             <a:fld id="{02CF1C66-B1B6-1643-A1E5-DA5B6E4004A0}" type="datetimeFigureOut">
               <a:rPr lang="en-US" smtClean="0"/>
-              <a:t>6/11/17</a:t>
+              <a:t>6/14/2017</a:t>
             </a:fld>
             <a:endParaRPr lang="en-US"/>
           </a:p>
@@ -1342,10 +1334,9 @@
           <a:lstStyle/>
           <a:p>
             <a:r>
-              <a:rPr lang="en-US" smtClean="0"/>
+              <a:rPr lang="en-US"/>
               <a:t>Click to edit Master title style</a:t>
             </a:r>
-            <a:endParaRPr lang="en-US"/>
           </a:p>
         </p:txBody>
       </p:sp>
@@ -1408,7 +1399,7 @@
           <a:p>
             <a:pPr lvl="0"/>
             <a:r>
-              <a:rPr lang="en-US" smtClean="0"/>
+              <a:rPr lang="en-US"/>
               <a:t>Click to edit Master text styles</a:t>
             </a:r>
           </a:p>
@@ -1436,38 +1427,37 @@
           <a:p>
             <a:pPr lvl="0"/>
             <a:r>
-              <a:rPr lang="en-US" smtClean="0"/>
+              <a:rPr lang="en-US"/>
               <a:t>Click to edit Master text styles</a:t>
             </a:r>
           </a:p>
           <a:p>
             <a:pPr lvl="1"/>
             <a:r>
-              <a:rPr lang="en-US" smtClean="0"/>
+              <a:rPr lang="en-US"/>
               <a:t>Second level</a:t>
             </a:r>
           </a:p>
           <a:p>
             <a:pPr lvl="2"/>
             <a:r>
-              <a:rPr lang="en-US" smtClean="0"/>
+              <a:rPr lang="en-US"/>
               <a:t>Third level</a:t>
             </a:r>
           </a:p>
           <a:p>
             <a:pPr lvl="3"/>
             <a:r>
-              <a:rPr lang="en-US" smtClean="0"/>
+              <a:rPr lang="en-US"/>
               <a:t>Fourth level</a:t>
             </a:r>
           </a:p>
           <a:p>
             <a:pPr lvl="4"/>
             <a:r>
-              <a:rPr lang="en-US" smtClean="0"/>
+              <a:rPr lang="en-US"/>
               <a:t>Fifth level</a:t>
             </a:r>
-            <a:endParaRPr lang="en-US"/>
           </a:p>
         </p:txBody>
       </p:sp>
@@ -1530,7 +1520,7 @@
           <a:p>
             <a:pPr lvl="0"/>
             <a:r>
-              <a:rPr lang="en-US" smtClean="0"/>
+              <a:rPr lang="en-US"/>
               <a:t>Click to edit Master text styles</a:t>
             </a:r>
           </a:p>
@@ -1558,38 +1548,37 @@
           <a:p>
             <a:pPr lvl="0"/>
             <a:r>
-              <a:rPr lang="en-US" smtClean="0"/>
+              <a:rPr lang="en-US"/>
               <a:t>Click to edit Master text styles</a:t>
             </a:r>
           </a:p>
           <a:p>
             <a:pPr lvl="1"/>
             <a:r>
-              <a:rPr lang="en-US" smtClean="0"/>
+              <a:rPr lang="en-US"/>
               <a:t>Second level</a:t>
             </a:r>
           </a:p>
           <a:p>
             <a:pPr lvl="2"/>
             <a:r>
-              <a:rPr lang="en-US" smtClean="0"/>
+              <a:rPr lang="en-US"/>
               <a:t>Third level</a:t>
             </a:r>
           </a:p>
           <a:p>
             <a:pPr lvl="3"/>
             <a:r>
-              <a:rPr lang="en-US" smtClean="0"/>
+              <a:rPr lang="en-US"/>
               <a:t>Fourth level</a:t>
             </a:r>
           </a:p>
           <a:p>
             <a:pPr lvl="4"/>
             <a:r>
-              <a:rPr lang="en-US" smtClean="0"/>
+              <a:rPr lang="en-US"/>
               <a:t>Fifth level</a:t>
             </a:r>
-            <a:endParaRPr lang="en-US"/>
           </a:p>
         </p:txBody>
       </p:sp>
@@ -1610,7 +1599,7 @@
           <a:p>
             <a:fld id="{02CF1C66-B1B6-1643-A1E5-DA5B6E4004A0}" type="datetimeFigureOut">
               <a:rPr lang="en-US" smtClean="0"/>
-              <a:t>6/11/17</a:t>
+              <a:t>6/14/2017</a:t>
             </a:fld>
             <a:endParaRPr lang="en-US"/>
           </a:p>
@@ -1704,10 +1693,9 @@
           <a:lstStyle/>
           <a:p>
             <a:r>
-              <a:rPr lang="en-US" smtClean="0"/>
+              <a:rPr lang="en-US"/>
               <a:t>Click to edit Master title style</a:t>
             </a:r>
-            <a:endParaRPr lang="en-US"/>
           </a:p>
         </p:txBody>
       </p:sp>
@@ -1728,7 +1716,7 @@
           <a:p>
             <a:fld id="{02CF1C66-B1B6-1643-A1E5-DA5B6E4004A0}" type="datetimeFigureOut">
               <a:rPr lang="en-US" smtClean="0"/>
-              <a:t>6/11/17</a:t>
+              <a:t>6/14/2017</a:t>
             </a:fld>
             <a:endParaRPr lang="en-US"/>
           </a:p>
@@ -1823,7 +1811,7 @@
           <a:p>
             <a:fld id="{02CF1C66-B1B6-1643-A1E5-DA5B6E4004A0}" type="datetimeFigureOut">
               <a:rPr lang="en-US" smtClean="0"/>
-              <a:t>6/11/17</a:t>
+              <a:t>6/14/2017</a:t>
             </a:fld>
             <a:endParaRPr lang="en-US"/>
           </a:p>
@@ -1926,10 +1914,9 @@
           </a:lstStyle>
           <a:p>
             <a:r>
-              <a:rPr lang="en-US" smtClean="0"/>
+              <a:rPr lang="en-US"/>
               <a:t>Click to edit Master title style</a:t>
             </a:r>
-            <a:endParaRPr lang="en-US"/>
           </a:p>
         </p:txBody>
       </p:sp>
@@ -1983,38 +1970,37 @@
           <a:p>
             <a:pPr lvl="0"/>
             <a:r>
-              <a:rPr lang="en-US" smtClean="0"/>
+              <a:rPr lang="en-US"/>
               <a:t>Click to edit Master text styles</a:t>
             </a:r>
           </a:p>
           <a:p>
             <a:pPr lvl="1"/>
             <a:r>
-              <a:rPr lang="en-US" smtClean="0"/>
+              <a:rPr lang="en-US"/>
               <a:t>Second level</a:t>
             </a:r>
           </a:p>
           <a:p>
             <a:pPr lvl="2"/>
             <a:r>
-              <a:rPr lang="en-US" smtClean="0"/>
+              <a:rPr lang="en-US"/>
               <a:t>Third level</a:t>
             </a:r>
           </a:p>
           <a:p>
             <a:pPr lvl="3"/>
             <a:r>
-              <a:rPr lang="en-US" smtClean="0"/>
+              <a:rPr lang="en-US"/>
               <a:t>Fourth level</a:t>
             </a:r>
           </a:p>
           <a:p>
             <a:pPr lvl="4"/>
             <a:r>
-              <a:rPr lang="en-US" smtClean="0"/>
+              <a:rPr lang="en-US"/>
               <a:t>Fifth level</a:t>
             </a:r>
-            <a:endParaRPr lang="en-US"/>
           </a:p>
         </p:txBody>
       </p:sp>
@@ -2077,7 +2063,7 @@
           <a:p>
             <a:pPr lvl="0"/>
             <a:r>
-              <a:rPr lang="en-US" smtClean="0"/>
+              <a:rPr lang="en-US"/>
               <a:t>Click to edit Master text styles</a:t>
             </a:r>
           </a:p>
@@ -2100,7 +2086,7 @@
           <a:p>
             <a:fld id="{02CF1C66-B1B6-1643-A1E5-DA5B6E4004A0}" type="datetimeFigureOut">
               <a:rPr lang="en-US" smtClean="0"/>
-              <a:t>6/11/17</a:t>
+              <a:t>6/14/2017</a:t>
             </a:fld>
             <a:endParaRPr lang="en-US"/>
           </a:p>
@@ -2203,10 +2189,9 @@
           </a:lstStyle>
           <a:p>
             <a:r>
-              <a:rPr lang="en-US" smtClean="0"/>
+              <a:rPr lang="en-US"/>
               <a:t>Click to edit Master title style</a:t>
             </a:r>
-            <a:endParaRPr lang="en-US"/>
           </a:p>
         </p:txBody>
       </p:sp>
@@ -2330,7 +2315,7 @@
           <a:p>
             <a:pPr lvl="0"/>
             <a:r>
-              <a:rPr lang="en-US" smtClean="0"/>
+              <a:rPr lang="en-US"/>
               <a:t>Click to edit Master text styles</a:t>
             </a:r>
           </a:p>
@@ -2353,7 +2338,7 @@
           <a:p>
             <a:fld id="{02CF1C66-B1B6-1643-A1E5-DA5B6E4004A0}" type="datetimeFigureOut">
               <a:rPr lang="en-US" smtClean="0"/>
-              <a:t>6/11/17</a:t>
+              <a:t>6/14/2017</a:t>
             </a:fld>
             <a:endParaRPr lang="en-US"/>
           </a:p>
@@ -2462,10 +2447,9 @@
           <a:lstStyle/>
           <a:p>
             <a:r>
-              <a:rPr lang="en-US" smtClean="0"/>
+              <a:rPr lang="en-US"/>
               <a:t>Click to edit Master title style</a:t>
             </a:r>
-            <a:endParaRPr lang="en-US"/>
           </a:p>
         </p:txBody>
       </p:sp>
@@ -2496,38 +2480,37 @@
           <a:p>
             <a:pPr lvl="0"/>
             <a:r>
-              <a:rPr lang="en-US" smtClean="0"/>
+              <a:rPr lang="en-US"/>
               <a:t>Click to edit Master text styles</a:t>
             </a:r>
           </a:p>
           <a:p>
             <a:pPr lvl="1"/>
             <a:r>
-              <a:rPr lang="en-US" smtClean="0"/>
+              <a:rPr lang="en-US"/>
               <a:t>Second level</a:t>
             </a:r>
           </a:p>
           <a:p>
             <a:pPr lvl="2"/>
             <a:r>
-              <a:rPr lang="en-US" smtClean="0"/>
+              <a:rPr lang="en-US"/>
               <a:t>Third level</a:t>
             </a:r>
           </a:p>
           <a:p>
             <a:pPr lvl="3"/>
             <a:r>
-              <a:rPr lang="en-US" smtClean="0"/>
+              <a:rPr lang="en-US"/>
               <a:t>Fourth level</a:t>
             </a:r>
           </a:p>
           <a:p>
             <a:pPr lvl="4"/>
             <a:r>
-              <a:rPr lang="en-US" smtClean="0"/>
+              <a:rPr lang="en-US"/>
               <a:t>Fifth level</a:t>
             </a:r>
-            <a:endParaRPr lang="en-US"/>
           </a:p>
         </p:txBody>
       </p:sp>
@@ -2566,7 +2549,7 @@
           <a:p>
             <a:fld id="{02CF1C66-B1B6-1643-A1E5-DA5B6E4004A0}" type="datetimeFigureOut">
               <a:rPr lang="en-US" smtClean="0"/>
-              <a:t>6/11/17</a:t>
+              <a:t>6/14/2017</a:t>
             </a:fld>
             <a:endParaRPr lang="en-US"/>
           </a:p>
@@ -3014,17 +2997,16 @@
             <a:p>
               <a:pPr algn="ctr"/>
               <a:r>
-                <a:rPr lang="en-US" sz="1200" dirty="0" smtClean="0"/>
+                <a:rPr lang="en-US" sz="1200" dirty="0"/>
                 <a:t>Router</a:t>
               </a:r>
             </a:p>
             <a:p>
               <a:pPr algn="ctr"/>
               <a:r>
-                <a:rPr lang="en-US" sz="1200" dirty="0" smtClean="0"/>
+                <a:rPr lang="en-US" sz="1200" dirty="0"/>
                 <a:t>192.168.10.1</a:t>
               </a:r>
-              <a:endParaRPr lang="en-US" sz="1200" dirty="0"/>
             </a:p>
           </p:txBody>
         </p:sp>
@@ -3057,10 +3039,9 @@
             <a:p>
               <a:pPr algn="ctr"/>
               <a:r>
-                <a:rPr lang="en-US" sz="1200" smtClean="0"/>
+                <a:rPr lang="en-US" sz="1200"/>
                 <a:t>Router</a:t>
               </a:r>
-              <a:endParaRPr lang="en-US" sz="1200"/>
             </a:p>
           </p:txBody>
         </p:sp>
@@ -3093,10 +3074,9 @@
             <a:p>
               <a:pPr algn="ctr"/>
               <a:r>
-                <a:rPr lang="en-US" sz="1200" smtClean="0"/>
+                <a:rPr lang="en-US" sz="1200"/>
                 <a:t>Router</a:t>
               </a:r>
-              <a:endParaRPr lang="en-US" sz="1200"/>
             </a:p>
           </p:txBody>
         </p:sp>
@@ -3129,17 +3109,16 @@
             <a:p>
               <a:pPr algn="ctr"/>
               <a:r>
-                <a:rPr lang="en-US" sz="1200" dirty="0" smtClean="0"/>
+                <a:rPr lang="en-US" sz="1200" dirty="0"/>
                 <a:t>Device</a:t>
               </a:r>
             </a:p>
             <a:p>
               <a:pPr algn="ctr"/>
               <a:r>
-                <a:rPr lang="en-US" sz="1200" dirty="0" smtClean="0"/>
+                <a:rPr lang="en-US" sz="1200" dirty="0"/>
                 <a:t>192.168.10.7</a:t>
               </a:r>
-              <a:endParaRPr lang="en-US" sz="1200" dirty="0"/>
             </a:p>
           </p:txBody>
         </p:sp>
@@ -3172,14 +3151,14 @@
             <a:p>
               <a:pPr algn="ctr"/>
               <a:r>
-                <a:rPr lang="en-US" sz="1200" dirty="0" smtClean="0"/>
+                <a:rPr lang="en-US" sz="1200" dirty="0"/>
                 <a:t>Device</a:t>
               </a:r>
             </a:p>
             <a:p>
               <a:pPr algn="ctr"/>
               <a:r>
-                <a:rPr lang="en-US" sz="1200" dirty="0" smtClean="0"/>
+                <a:rPr lang="en-US" sz="1200" dirty="0"/>
                 <a:t>192.168.10.9</a:t>
               </a:r>
             </a:p>
@@ -3214,17 +3193,16 @@
             <a:p>
               <a:pPr algn="ctr"/>
               <a:r>
-                <a:rPr lang="en-US" sz="1200" dirty="0" smtClean="0"/>
+                <a:rPr lang="en-US" sz="1200" dirty="0"/>
                 <a:t>Device</a:t>
               </a:r>
             </a:p>
             <a:p>
               <a:pPr algn="ctr"/>
               <a:r>
-                <a:rPr lang="en-US" sz="1200" dirty="0" smtClean="0"/>
+                <a:rPr lang="en-US" sz="1200" dirty="0"/>
                 <a:t>192.168.10.11</a:t>
               </a:r>
-              <a:endParaRPr lang="en-US" sz="1200" dirty="0"/>
             </a:p>
           </p:txBody>
         </p:sp>
@@ -3257,14 +3235,13 @@
             <a:p>
               <a:pPr algn="ctr"/>
               <a:r>
-                <a:rPr lang="en-US" sz="1200" dirty="0" err="1" smtClean="0"/>
+                <a:rPr lang="en-US" sz="1200" dirty="0" err="1"/>
                 <a:t>WiFi</a:t>
               </a:r>
               <a:r>
-                <a:rPr lang="en-US" sz="1200" dirty="0" smtClean="0"/>
+                <a:rPr lang="en-US" sz="1200" dirty="0"/>
                 <a:t> AP</a:t>
               </a:r>
-              <a:endParaRPr lang="en-US" sz="1200" dirty="0"/>
             </a:p>
           </p:txBody>
         </p:sp>
@@ -3297,24 +3274,23 @@
             <a:p>
               <a:pPr algn="ctr"/>
               <a:r>
-                <a:rPr lang="en-US" sz="1200" dirty="0" smtClean="0"/>
+                <a:rPr lang="en-US" sz="1200" dirty="0"/>
                 <a:t>DHCP</a:t>
               </a:r>
             </a:p>
             <a:p>
               <a:pPr algn="ctr"/>
               <a:r>
-                <a:rPr lang="en-US" sz="1200" dirty="0" smtClean="0"/>
+                <a:rPr lang="en-US" sz="1200" dirty="0"/>
                 <a:t>Server</a:t>
               </a:r>
             </a:p>
             <a:p>
               <a:pPr algn="ctr"/>
               <a:r>
-                <a:rPr lang="en-US" sz="1200" dirty="0" smtClean="0"/>
+                <a:rPr lang="en-US" sz="1200" dirty="0"/>
                 <a:t>192.168.10.12</a:t>
               </a:r>
-              <a:endParaRPr lang="en-US" sz="1200" dirty="0"/>
             </a:p>
           </p:txBody>
         </p:sp>
@@ -3533,10 +3509,9 @@
             <a:p>
               <a:pPr algn="ctr"/>
               <a:r>
-                <a:rPr lang="en-US" sz="1200" smtClean="0"/>
+                <a:rPr lang="en-US" sz="1200"/>
                 <a:t>Router</a:t>
               </a:r>
-              <a:endParaRPr lang="en-US" sz="1200"/>
             </a:p>
           </p:txBody>
         </p:sp>
@@ -3569,7 +3544,7 @@
             <a:p>
               <a:pPr algn="ctr"/>
               <a:r>
-                <a:rPr lang="en-US" sz="1200" smtClean="0"/>
+                <a:rPr lang="en-US" sz="1200"/>
                 <a:t>Network</a:t>
               </a:r>
               <a:endParaRPr lang="en-US" sz="1200" dirty="0"/>
@@ -3605,7 +3580,7 @@
             <a:p>
               <a:pPr algn="ctr"/>
               <a:r>
-                <a:rPr lang="en-US" sz="1200" smtClean="0"/>
+                <a:rPr lang="en-US" sz="1200"/>
                 <a:t>Network</a:t>
               </a:r>
               <a:endParaRPr lang="en-US" sz="1200" dirty="0"/>
@@ -3869,7 +3844,7 @@
             <a:p>
               <a:pPr algn="ctr"/>
               <a:r>
-                <a:rPr lang="en-US" sz="1200" smtClean="0"/>
+                <a:rPr lang="en-US" sz="1200"/>
                 <a:t>Network</a:t>
               </a:r>
               <a:endParaRPr lang="en-US" sz="1200" dirty="0"/>
@@ -3942,7 +3917,7 @@
             <a:p>
               <a:pPr algn="ctr"/>
               <a:r>
-                <a:rPr lang="en-US" sz="1200" smtClean="0"/>
+                <a:rPr lang="en-US" sz="1200"/>
                 <a:t>Network</a:t>
               </a:r>
               <a:endParaRPr lang="en-US" sz="1200" dirty="0"/>
@@ -4016,7 +3991,7 @@
             <a:p>
               <a:pPr algn="ctr"/>
               <a:r>
-                <a:rPr lang="en-US" sz="1200" smtClean="0"/>
+                <a:rPr lang="en-US" sz="1200"/>
                 <a:t>Network</a:t>
               </a:r>
               <a:endParaRPr lang="en-US" sz="1200" dirty="0"/>
@@ -4090,7 +4065,7 @@
             <a:p>
               <a:pPr algn="ctr"/>
               <a:r>
-                <a:rPr lang="en-US" sz="1200" smtClean="0"/>
+                <a:rPr lang="en-US" sz="1200"/>
                 <a:t>Network</a:t>
               </a:r>
               <a:endParaRPr lang="en-US" sz="1200" dirty="0"/>
@@ -4164,10 +4139,9 @@
             <a:p>
               <a:pPr algn="ctr"/>
               <a:r>
-                <a:rPr lang="en-US" sz="1200" dirty="0" smtClean="0"/>
+                <a:rPr lang="en-US" sz="1200" dirty="0"/>
                 <a:t>Network</a:t>
               </a:r>
-              <a:endParaRPr lang="en-US" sz="1200" dirty="0"/>
             </a:p>
           </p:txBody>
         </p:sp>
@@ -4232,18 +4206,17 @@
             <a:p>
               <a:pPr algn="ctr"/>
               <a:r>
-                <a:rPr lang="en-US" sz="1200" b="1" u="sng" dirty="0" smtClean="0"/>
+                <a:rPr lang="en-US" sz="1200" b="1" u="sng" dirty="0"/>
                 <a:t>Network</a:t>
               </a:r>
-              <a:endParaRPr lang="en-US" sz="1200" dirty="0" smtClean="0"/>
+              <a:endParaRPr lang="en-US" sz="1200" dirty="0"/>
             </a:p>
             <a:p>
               <a:pPr algn="ctr"/>
               <a:r>
-                <a:rPr lang="en-US" sz="1200" dirty="0" smtClean="0"/>
+                <a:rPr lang="en-US" sz="1200" dirty="0"/>
                 <a:t>192.168.10.0</a:t>
               </a:r>
-              <a:endParaRPr lang="en-US" sz="1200" dirty="0"/>
             </a:p>
           </p:txBody>
         </p:sp>
@@ -7589,10 +7562,9 @@
             <a:lstStyle/>
             <a:p>
               <a:r>
-                <a:rPr lang="en-US" sz="1200" b="1" u="sng" dirty="0" smtClean="0"/>
+                <a:rPr lang="en-US" sz="1200" b="1" u="sng" dirty="0"/>
                 <a:t>The Cloud</a:t>
               </a:r>
-              <a:endParaRPr lang="en-US" sz="1200" b="1" u="sng" dirty="0"/>
             </a:p>
           </p:txBody>
         </p:sp>
@@ -7618,7 +7590,7 @@
             <a:lstStyle/>
             <a:p>
               <a:r>
-                <a:rPr lang="en-US" sz="1200" b="1" u="sng" smtClean="0"/>
+                <a:rPr lang="en-US" sz="1200" b="1" u="sng"/>
                 <a:t>The Internet</a:t>
               </a:r>
               <a:endParaRPr lang="en-US" sz="1200" dirty="0"/>
@@ -7636,13 +7608,6 @@
   <p:clrMapOvr>
     <a:masterClrMapping/>
   </p:clrMapOvr>
-  <p:timing>
-    <p:tnLst>
-      <p:par>
-        <p:cTn id="1" dur="indefinite" restart="never" nodeType="tmRoot"/>
-      </p:par>
-    </p:tnLst>
-  </p:timing>
 </p:sld>
 </file>
 
@@ -7692,57 +7657,29 @@
           <a:p>
             <a:pPr algn="ctr"/>
             <a:r>
-              <a:rPr lang="en-US" sz="1000" b="1" u="sng" dirty="0" smtClean="0"/>
+              <a:rPr lang="en-US" sz="1000" b="1" u="sng" dirty="0"/>
               <a:t>PORT</a:t>
             </a:r>
           </a:p>
           <a:p>
             <a:pPr algn="ctr"/>
             <a:r>
-              <a:rPr lang="en-US" sz="1000" dirty="0" smtClean="0"/>
+              <a:rPr lang="en-US" sz="1000" dirty="0"/>
               <a:t>0</a:t>
             </a:r>
           </a:p>
           <a:p>
             <a:pPr algn="ctr"/>
             <a:r>
-              <a:rPr lang="en-US" sz="1000" dirty="0" smtClean="0"/>
+              <a:rPr lang="en-US" sz="1000" dirty="0"/>
               <a:t>1</a:t>
             </a:r>
           </a:p>
           <a:p>
             <a:pPr algn="ctr"/>
             <a:r>
-              <a:rPr lang="en-US" sz="1000" dirty="0" smtClean="0"/>
+              <a:rPr lang="en-US" sz="1000" dirty="0"/>
               <a:t>2</a:t>
-            </a:r>
-          </a:p>
-          <a:p>
-            <a:pPr algn="ctr"/>
-            <a:r>
-              <a:rPr lang="en-US" sz="1000" dirty="0" smtClean="0"/>
-              <a:t>.</a:t>
-            </a:r>
-          </a:p>
-          <a:p>
-            <a:pPr algn="ctr"/>
-            <a:r>
-              <a:rPr lang="en-US" sz="1000" dirty="0" smtClean="0"/>
-              <a:t>.</a:t>
-            </a:r>
-          </a:p>
-          <a:p>
-            <a:pPr algn="ctr"/>
-            <a:r>
-              <a:rPr lang="en-US" sz="1000" dirty="0" smtClean="0"/>
-              <a:t>.</a:t>
-            </a:r>
-          </a:p>
-          <a:p>
-            <a:pPr algn="ctr"/>
-            <a:r>
-              <a:rPr lang="en-US" sz="1000" dirty="0" smtClean="0"/>
-              <a:t>27708</a:t>
             </a:r>
           </a:p>
           <a:p>
@@ -7751,21 +7688,6 @@
               <a:rPr lang="en-US" sz="1000" dirty="0"/>
               <a:t>.</a:t>
             </a:r>
-            <a:endParaRPr lang="en-US" sz="1000" dirty="0" smtClean="0"/>
-          </a:p>
-          <a:p>
-            <a:pPr algn="ctr"/>
-            <a:r>
-              <a:rPr lang="en-US" sz="1000" dirty="0" smtClean="0"/>
-              <a:t>.</a:t>
-            </a:r>
-          </a:p>
-          <a:p>
-            <a:pPr algn="ctr"/>
-            <a:r>
-              <a:rPr lang="en-US" sz="1000" dirty="0" smtClean="0"/>
-              <a:t>.</a:t>
-            </a:r>
           </a:p>
           <a:p>
             <a:pPr algn="ctr"/>
@@ -7773,22 +7695,62 @@
               <a:rPr lang="en-US" sz="1000" dirty="0"/>
               <a:t>.</a:t>
             </a:r>
-            <a:endParaRPr lang="en-US" sz="1000" dirty="0" smtClean="0"/>
           </a:p>
           <a:p>
             <a:pPr algn="ctr"/>
             <a:r>
-              <a:rPr lang="en-US" sz="1000" dirty="0" smtClean="0"/>
+              <a:rPr lang="en-US" sz="1000" dirty="0"/>
               <a:t>.</a:t>
             </a:r>
           </a:p>
           <a:p>
             <a:pPr algn="ctr"/>
             <a:r>
-              <a:rPr lang="en-US" sz="1000" dirty="0" smtClean="0"/>
+              <a:rPr lang="en-US" sz="1000" dirty="0"/>
+              <a:t>27708</a:t>
+            </a:r>
+          </a:p>
+          <a:p>
+            <a:pPr algn="ctr"/>
+            <a:r>
+              <a:rPr lang="en-US" sz="1000" dirty="0"/>
+              <a:t>.</a:t>
+            </a:r>
+          </a:p>
+          <a:p>
+            <a:pPr algn="ctr"/>
+            <a:r>
+              <a:rPr lang="en-US" sz="1000" dirty="0"/>
+              <a:t>.</a:t>
+            </a:r>
+          </a:p>
+          <a:p>
+            <a:pPr algn="ctr"/>
+            <a:r>
+              <a:rPr lang="en-US" sz="1000" dirty="0"/>
+              <a:t>.</a:t>
+            </a:r>
+          </a:p>
+          <a:p>
+            <a:pPr algn="ctr"/>
+            <a:r>
+              <a:rPr lang="en-US" sz="1000" dirty="0"/>
+              <a:t>.</a:t>
+            </a:r>
+          </a:p>
+          <a:p>
+            <a:pPr algn="ctr"/>
+            <a:r>
+              <a:rPr lang="en-US" sz="1000" dirty="0"/>
+              <a:t>.</a:t>
+            </a:r>
+          </a:p>
+          <a:p>
+            <a:pPr algn="ctr"/>
+            <a:r>
+              <a:rPr lang="en-US" sz="1000" dirty="0"/>
               <a:t>65535</a:t>
             </a:r>
-            <a:endParaRPr lang="en-US" sz="1000" dirty="0"/>
           </a:p>
         </p:txBody>
       </p:sp>
@@ -7821,57 +7783,29 @@
           <a:p>
             <a:pPr algn="ctr"/>
             <a:r>
-              <a:rPr lang="en-US" sz="1000" b="1" u="sng" dirty="0" smtClean="0"/>
+              <a:rPr lang="en-US" sz="1000" b="1" u="sng" dirty="0"/>
               <a:t>PORT</a:t>
             </a:r>
           </a:p>
           <a:p>
             <a:pPr algn="ctr"/>
             <a:r>
-              <a:rPr lang="en-US" sz="1000" dirty="0" smtClean="0"/>
+              <a:rPr lang="en-US" sz="1000" dirty="0"/>
               <a:t>0</a:t>
             </a:r>
           </a:p>
           <a:p>
             <a:pPr algn="ctr"/>
             <a:r>
-              <a:rPr lang="en-US" sz="1000" dirty="0" smtClean="0"/>
+              <a:rPr lang="en-US" sz="1000" dirty="0"/>
               <a:t>1</a:t>
             </a:r>
           </a:p>
           <a:p>
             <a:pPr algn="ctr"/>
             <a:r>
-              <a:rPr lang="en-US" sz="1000" dirty="0" smtClean="0"/>
+              <a:rPr lang="en-US" sz="1000" dirty="0"/>
               <a:t>2</a:t>
-            </a:r>
-          </a:p>
-          <a:p>
-            <a:pPr algn="ctr"/>
-            <a:r>
-              <a:rPr lang="en-US" sz="1000" dirty="0" smtClean="0"/>
-              <a:t>.</a:t>
-            </a:r>
-          </a:p>
-          <a:p>
-            <a:pPr algn="ctr"/>
-            <a:r>
-              <a:rPr lang="en-US" sz="1000" dirty="0" smtClean="0"/>
-              <a:t>.</a:t>
-            </a:r>
-          </a:p>
-          <a:p>
-            <a:pPr algn="ctr"/>
-            <a:r>
-              <a:rPr lang="en-US" sz="1000" dirty="0" smtClean="0"/>
-              <a:t>.</a:t>
-            </a:r>
-          </a:p>
-          <a:p>
-            <a:pPr algn="ctr"/>
-            <a:r>
-              <a:rPr lang="en-US" sz="1000" dirty="0" smtClean="0"/>
-              <a:t>.</a:t>
             </a:r>
           </a:p>
           <a:p>
@@ -7880,21 +7814,6 @@
               <a:rPr lang="en-US" sz="1000" dirty="0"/>
               <a:t>.</a:t>
             </a:r>
-            <a:endParaRPr lang="en-US" sz="1000" dirty="0" smtClean="0"/>
-          </a:p>
-          <a:p>
-            <a:pPr algn="ctr"/>
-            <a:r>
-              <a:rPr lang="en-US" sz="1000" dirty="0" smtClean="0"/>
-              <a:t>32783</a:t>
-            </a:r>
-          </a:p>
-          <a:p>
-            <a:pPr algn="ctr"/>
-            <a:r>
-              <a:rPr lang="en-US" sz="1000" dirty="0" smtClean="0"/>
-              <a:t>.</a:t>
-            </a:r>
           </a:p>
           <a:p>
             <a:pPr algn="ctr"/>
@@ -7902,22 +7821,62 @@
               <a:rPr lang="en-US" sz="1000" dirty="0"/>
               <a:t>.</a:t>
             </a:r>
-            <a:endParaRPr lang="en-US" sz="1000" dirty="0" smtClean="0"/>
           </a:p>
           <a:p>
             <a:pPr algn="ctr"/>
             <a:r>
-              <a:rPr lang="en-US" sz="1000" dirty="0" smtClean="0"/>
+              <a:rPr lang="en-US" sz="1000" dirty="0"/>
               <a:t>.</a:t>
             </a:r>
           </a:p>
           <a:p>
             <a:pPr algn="ctr"/>
             <a:r>
-              <a:rPr lang="en-US" sz="1000" dirty="0" smtClean="0"/>
+              <a:rPr lang="en-US" sz="1000" dirty="0"/>
+              <a:t>.</a:t>
+            </a:r>
+          </a:p>
+          <a:p>
+            <a:pPr algn="ctr"/>
+            <a:r>
+              <a:rPr lang="en-US" sz="1000" dirty="0"/>
+              <a:t>.</a:t>
+            </a:r>
+          </a:p>
+          <a:p>
+            <a:pPr algn="ctr"/>
+            <a:r>
+              <a:rPr lang="en-US" sz="1000" dirty="0"/>
+              <a:t>32783</a:t>
+            </a:r>
+          </a:p>
+          <a:p>
+            <a:pPr algn="ctr"/>
+            <a:r>
+              <a:rPr lang="en-US" sz="1000" dirty="0"/>
+              <a:t>.</a:t>
+            </a:r>
+          </a:p>
+          <a:p>
+            <a:pPr algn="ctr"/>
+            <a:r>
+              <a:rPr lang="en-US" sz="1000" dirty="0"/>
+              <a:t>.</a:t>
+            </a:r>
+          </a:p>
+          <a:p>
+            <a:pPr algn="ctr"/>
+            <a:r>
+              <a:rPr lang="en-US" sz="1000" dirty="0"/>
+              <a:t>.</a:t>
+            </a:r>
+          </a:p>
+          <a:p>
+            <a:pPr algn="ctr"/>
+            <a:r>
+              <a:rPr lang="en-US" sz="1000" dirty="0"/>
               <a:t>65535</a:t>
             </a:r>
-            <a:endParaRPr lang="en-US" sz="1000" dirty="0"/>
           </a:p>
         </p:txBody>
       </p:sp>
@@ -7950,17 +7909,17 @@
           <a:p>
             <a:pPr algn="ctr"/>
             <a:r>
-              <a:rPr lang="en-US" sz="1400" b="1" u="sng" dirty="0" smtClean="0"/>
+              <a:rPr lang="en-US" sz="1400" b="1" u="sng" dirty="0"/>
               <a:t>Application</a:t>
             </a:r>
-            <a:endParaRPr lang="en-US" sz="1000" b="1" u="sng" dirty="0" smtClean="0"/>
+            <a:endParaRPr lang="en-US" sz="1000" b="1" u="sng" dirty="0"/>
           </a:p>
           <a:p>
             <a:pPr marL="12700" indent="-12700">
               <a:buAutoNum type="arabicPeriod"/>
             </a:pPr>
             <a:r>
-              <a:rPr lang="en-US" sz="1000" dirty="0" smtClean="0"/>
+              <a:rPr lang="en-US" sz="1000" dirty="0"/>
               <a:t> Create Socket</a:t>
             </a:r>
           </a:p>
@@ -7969,7 +7928,7 @@
               <a:buAutoNum type="arabicPeriod"/>
             </a:pPr>
             <a:r>
-              <a:rPr lang="en-US" sz="1000" dirty="0" smtClean="0"/>
+              <a:rPr lang="en-US" sz="1000" dirty="0"/>
               <a:t> Listen(local port #, interface)</a:t>
             </a:r>
           </a:p>
@@ -7978,10 +7937,9 @@
               <a:buAutoNum type="arabicPeriod"/>
             </a:pPr>
             <a:r>
-              <a:rPr lang="en-US" sz="1000" dirty="0" smtClean="0"/>
+              <a:rPr lang="en-US" sz="1000" dirty="0"/>
               <a:t> Accept Connections</a:t>
             </a:r>
-            <a:endParaRPr lang="en-US" sz="1000" dirty="0"/>
           </a:p>
         </p:txBody>
       </p:sp>
@@ -8014,7 +7972,7 @@
           <a:p>
             <a:pPr algn="ctr"/>
             <a:r>
-              <a:rPr lang="en-US" sz="1600" b="1" dirty="0" smtClean="0"/>
+              <a:rPr lang="en-US" sz="1600" b="1" dirty="0"/>
               <a:t>TCP/IP Stack</a:t>
             </a:r>
           </a:p>
@@ -8024,7 +7982,7 @@
           </a:p>
           <a:p>
             <a:pPr algn="ctr"/>
-            <a:endParaRPr lang="en-US" sz="1200" dirty="0" smtClean="0"/>
+            <a:endParaRPr lang="en-US" sz="1200" dirty="0"/>
           </a:p>
           <a:p>
             <a:pPr algn="ctr"/>
@@ -8032,15 +7990,15 @@
           </a:p>
           <a:p>
             <a:pPr algn="ctr"/>
-            <a:endParaRPr lang="en-US" sz="1200" dirty="0" smtClean="0"/>
+            <a:endParaRPr lang="en-US" sz="1200" dirty="0"/>
           </a:p>
           <a:p>
             <a:pPr algn="ctr"/>
             <a:r>
-              <a:rPr lang="en-US" sz="1600" dirty="0" smtClean="0"/>
+              <a:rPr lang="en-US" sz="1600" dirty="0"/>
               <a:t>192.51.100.3</a:t>
             </a:r>
-            <a:endParaRPr lang="en-US" sz="1200" dirty="0" smtClean="0"/>
+            <a:endParaRPr lang="en-US" sz="1200" dirty="0"/>
           </a:p>
         </p:txBody>
       </p:sp>
@@ -8072,10 +8030,9 @@
           <a:lstStyle/>
           <a:p>
             <a:r>
-              <a:rPr lang="en-US" sz="1600" dirty="0" smtClean="0"/>
+              <a:rPr lang="en-US" sz="1600" dirty="0"/>
               <a:t>Socket</a:t>
             </a:r>
-            <a:endParaRPr lang="en-US" sz="1600" dirty="0"/>
           </a:p>
         </p:txBody>
       </p:sp>
@@ -8104,11 +8061,41 @@
                 <a:tableStyleId>{5C22544A-7EE6-4342-B048-85BDC9FD1C3A}</a:tableStyleId>
               </a:tblPr>
               <a:tblGrid>
-                <a:gridCol w="361780"/>
-                <a:gridCol w="361780"/>
-                <a:gridCol w="429406"/>
-                <a:gridCol w="497721"/>
-                <a:gridCol w="1717625"/>
+                <a:gridCol w="361780">
+                  <a:extLst>
+                    <a:ext uri="{9D8B030D-6E8A-4147-A177-3AD203B41FA5}">
+                      <a16:colId xmlns:a16="http://schemas.microsoft.com/office/drawing/2014/main" val="20000"/>
+                    </a:ext>
+                  </a:extLst>
+                </a:gridCol>
+                <a:gridCol w="361780">
+                  <a:extLst>
+                    <a:ext uri="{9D8B030D-6E8A-4147-A177-3AD203B41FA5}">
+                      <a16:colId xmlns:a16="http://schemas.microsoft.com/office/drawing/2014/main" val="20001"/>
+                    </a:ext>
+                  </a:extLst>
+                </a:gridCol>
+                <a:gridCol w="429406">
+                  <a:extLst>
+                    <a:ext uri="{9D8B030D-6E8A-4147-A177-3AD203B41FA5}">
+                      <a16:colId xmlns:a16="http://schemas.microsoft.com/office/drawing/2014/main" val="20002"/>
+                    </a:ext>
+                  </a:extLst>
+                </a:gridCol>
+                <a:gridCol w="497721">
+                  <a:extLst>
+                    <a:ext uri="{9D8B030D-6E8A-4147-A177-3AD203B41FA5}">
+                      <a16:colId xmlns:a16="http://schemas.microsoft.com/office/drawing/2014/main" val="20003"/>
+                    </a:ext>
+                  </a:extLst>
+                </a:gridCol>
+                <a:gridCol w="1717625">
+                  <a:extLst>
+                    <a:ext uri="{9D8B030D-6E8A-4147-A177-3AD203B41FA5}">
+                      <a16:colId xmlns:a16="http://schemas.microsoft.com/office/drawing/2014/main" val="20004"/>
+                    </a:ext>
+                  </a:extLst>
+                </a:gridCol>
               </a:tblGrid>
               <a:tr h="359393">
                 <a:tc gridSpan="5">
@@ -8118,18 +8105,13 @@
                     <a:p>
                       <a:pPr algn="ctr"/>
                       <a:r>
-                        <a:rPr lang="en-US" sz="1400" b="1" dirty="0" smtClean="0">
+                        <a:rPr lang="en-US" sz="1400" b="1" dirty="0">
                           <a:solidFill>
                             <a:schemeClr val="tx1"/>
                           </a:solidFill>
                         </a:rPr>
                         <a:t>Packet Buffers</a:t>
                       </a:r>
-                      <a:endParaRPr lang="en-US" sz="1400" b="1" dirty="0">
-                        <a:solidFill>
-                          <a:schemeClr val="tx1"/>
-                        </a:solidFill>
-                      </a:endParaRPr>
                     </a:p>
                   </a:txBody>
                   <a:tcPr anchor="ctr">
@@ -8341,6 +8323,11 @@
                     <a:noFill/>
                   </a:tcPr>
                 </a:tc>
+                <a:extLst>
+                  <a:ext uri="{0D108BD9-81ED-4DB2-BD59-A6C34878D82A}">
+                    <a16:rowId xmlns:a16="http://schemas.microsoft.com/office/drawing/2014/main" val="10000"/>
+                  </a:ext>
+                </a:extLst>
               </a:tr>
               <a:tr h="687957">
                 <a:tc rowSpan="2">
@@ -8350,18 +8337,13 @@
                     <a:p>
                       <a:pPr algn="ctr"/>
                       <a:r>
-                        <a:rPr lang="en-US" sz="1400" b="1" dirty="0" smtClean="0">
+                        <a:rPr lang="en-US" sz="1400" b="1" dirty="0">
                           <a:solidFill>
                             <a:schemeClr val="tx1"/>
                           </a:solidFill>
                         </a:rPr>
                         <a:t>Type</a:t>
                       </a:r>
-                      <a:endParaRPr lang="en-US" sz="1400" b="1" dirty="0">
-                        <a:solidFill>
-                          <a:schemeClr val="tx1"/>
-                        </a:solidFill>
-                      </a:endParaRPr>
                     </a:p>
                   </a:txBody>
                   <a:tcPr vert="vert270" anchor="ctr">
@@ -8411,18 +8393,13 @@
                     <a:p>
                       <a:pPr algn="ctr"/>
                       <a:r>
-                        <a:rPr lang="en-US" sz="1400" b="1" dirty="0" smtClean="0">
+                        <a:rPr lang="en-US" sz="1400" b="1" dirty="0">
                           <a:solidFill>
                             <a:schemeClr val="tx1"/>
                           </a:solidFill>
                         </a:rPr>
                         <a:t>Ref Count</a:t>
                       </a:r>
-                      <a:endParaRPr lang="en-US" sz="1400" b="1" dirty="0">
-                        <a:solidFill>
-                          <a:schemeClr val="tx1"/>
-                        </a:solidFill>
-                      </a:endParaRPr>
                     </a:p>
                   </a:txBody>
                   <a:tcPr vert="vert270" anchor="ctr">
@@ -8472,7 +8449,7 @@
                     <a:p>
                       <a:pPr algn="ctr"/>
                       <a:r>
-                        <a:rPr lang="en-US" sz="1400" b="1" dirty="0" smtClean="0">
+                        <a:rPr lang="en-US" sz="1400" b="1" dirty="0">
                           <a:solidFill>
                             <a:schemeClr val="tx1"/>
                           </a:solidFill>
@@ -8483,18 +8460,13 @@
                     <a:p>
                       <a:pPr algn="ctr"/>
                       <a:r>
-                        <a:rPr lang="en-US" sz="1400" b="1" dirty="0" smtClean="0">
+                        <a:rPr lang="en-US" sz="1400" b="1" dirty="0">
                           <a:solidFill>
                             <a:schemeClr val="tx1"/>
                           </a:solidFill>
                         </a:rPr>
                         <a:t>Pointer</a:t>
                       </a:r>
-                      <a:endParaRPr lang="en-US" sz="1400" b="1" dirty="0">
-                        <a:solidFill>
-                          <a:schemeClr val="tx1"/>
-                        </a:solidFill>
-                      </a:endParaRPr>
                     </a:p>
                   </a:txBody>
                   <a:tcPr anchor="ctr">
@@ -8597,18 +8569,13 @@
                     <a:p>
                       <a:pPr algn="ctr"/>
                       <a:r>
-                        <a:rPr lang="en-US" sz="1400" b="1" dirty="0" smtClean="0">
+                        <a:rPr lang="en-US" sz="1400" b="1" dirty="0">
                           <a:solidFill>
                             <a:schemeClr val="tx1"/>
                           </a:solidFill>
                         </a:rPr>
                         <a:t>Buffer</a:t>
                       </a:r>
-                      <a:endParaRPr lang="en-US" sz="1400" b="1" dirty="0">
-                        <a:solidFill>
-                          <a:schemeClr val="tx1"/>
-                        </a:solidFill>
-                      </a:endParaRPr>
                     </a:p>
                   </a:txBody>
                   <a:tcPr anchor="ctr">
@@ -8651,6 +8618,11 @@
                     <a:noFill/>
                   </a:tcPr>
                 </a:tc>
+                <a:extLst>
+                  <a:ext uri="{0D108BD9-81ED-4DB2-BD59-A6C34878D82A}">
+                    <a16:rowId xmlns:a16="http://schemas.microsoft.com/office/drawing/2014/main" val="10001"/>
+                  </a:ext>
+                </a:extLst>
               </a:tr>
               <a:tr h="517597">
                 <a:tc vMerge="1">
@@ -8766,18 +8738,13 @@
                     <a:p>
                       <a:pPr algn="ctr"/>
                       <a:r>
-                        <a:rPr lang="en-US" sz="1400" b="1" dirty="0" smtClean="0">
+                        <a:rPr lang="en-US" sz="1400" b="1" dirty="0">
                           <a:solidFill>
                             <a:schemeClr val="tx1"/>
                           </a:solidFill>
                         </a:rPr>
                         <a:t>Start</a:t>
                       </a:r>
-                      <a:endParaRPr lang="en-US" sz="1400" b="1" dirty="0">
-                        <a:solidFill>
-                          <a:schemeClr val="tx1"/>
-                        </a:solidFill>
-                      </a:endParaRPr>
                     </a:p>
                   </a:txBody>
                   <a:tcPr vert="vert270" anchor="ctr">
@@ -8827,18 +8794,13 @@
                     <a:p>
                       <a:pPr algn="ctr"/>
                       <a:r>
-                        <a:rPr lang="en-US" sz="1400" b="1" dirty="0" smtClean="0">
+                        <a:rPr lang="en-US" sz="1400" b="1" dirty="0">
                           <a:solidFill>
                             <a:schemeClr val="tx1"/>
                           </a:solidFill>
                         </a:rPr>
                         <a:t>End</a:t>
                       </a:r>
-                      <a:endParaRPr lang="en-US" sz="1400" b="1" dirty="0">
-                        <a:solidFill>
-                          <a:schemeClr val="tx1"/>
-                        </a:solidFill>
-                      </a:endParaRPr>
                     </a:p>
                   </a:txBody>
                   <a:tcPr vert="vert270" anchor="ctr">
@@ -8934,6 +8896,11 @@
                     <a:noFill/>
                   </a:tcPr>
                 </a:tc>
+                <a:extLst>
+                  <a:ext uri="{0D108BD9-81ED-4DB2-BD59-A6C34878D82A}">
+                    <a16:rowId xmlns:a16="http://schemas.microsoft.com/office/drawing/2014/main" val="10002"/>
+                  </a:ext>
+                </a:extLst>
               </a:tr>
               <a:tr h="335626">
                 <a:tc>
@@ -8943,18 +8910,13 @@
                     <a:p>
                       <a:pPr algn="ctr"/>
                       <a:r>
-                        <a:rPr lang="en-US" sz="1400" dirty="0" smtClean="0">
+                        <a:rPr lang="en-US" sz="1400" dirty="0">
                           <a:solidFill>
                             <a:schemeClr val="tx1"/>
                           </a:solidFill>
                         </a:rPr>
                         <a:t>R</a:t>
                       </a:r>
-                      <a:endParaRPr lang="en-US" sz="1400" dirty="0">
-                        <a:solidFill>
-                          <a:schemeClr val="tx1"/>
-                        </a:solidFill>
-                      </a:endParaRPr>
                     </a:p>
                   </a:txBody>
                   <a:tcPr>
@@ -9004,18 +8966,13 @@
                     <a:p>
                       <a:pPr algn="ctr"/>
                       <a:r>
-                        <a:rPr lang="en-US" sz="1400" dirty="0" smtClean="0">
+                        <a:rPr lang="en-US" sz="1400" dirty="0">
                           <a:solidFill>
                             <a:schemeClr val="tx1"/>
                           </a:solidFill>
                         </a:rPr>
                         <a:t>0</a:t>
                       </a:r>
-                      <a:endParaRPr lang="en-US" sz="1400" dirty="0">
-                        <a:solidFill>
-                          <a:schemeClr val="tx1"/>
-                        </a:solidFill>
-                      </a:endParaRPr>
                     </a:p>
                   </a:txBody>
                   <a:tcPr>
@@ -9064,18 +9021,13 @@
                     <a:lstStyle/>
                     <a:p>
                       <a:r>
-                        <a:rPr lang="en-US" sz="1000" dirty="0" smtClean="0">
+                        <a:rPr lang="en-US" sz="1000" dirty="0">
                           <a:solidFill>
                             <a:schemeClr val="tx1"/>
                           </a:solidFill>
                         </a:rPr>
                         <a:t>null</a:t>
                       </a:r>
-                      <a:endParaRPr lang="en-US" sz="1000" dirty="0">
-                        <a:solidFill>
-                          <a:schemeClr val="tx1"/>
-                        </a:solidFill>
-                      </a:endParaRPr>
                     </a:p>
                   </a:txBody>
                   <a:tcPr>
@@ -9124,18 +9076,13 @@
                     <a:lstStyle/>
                     <a:p>
                       <a:r>
-                        <a:rPr lang="en-US" sz="1000" dirty="0" smtClean="0">
+                        <a:rPr lang="en-US" sz="1000" dirty="0">
                           <a:solidFill>
                             <a:schemeClr val="tx1"/>
                           </a:solidFill>
                         </a:rPr>
                         <a:t>null</a:t>
                       </a:r>
-                      <a:endParaRPr lang="en-US" sz="1000" dirty="0">
-                        <a:solidFill>
-                          <a:schemeClr val="tx1"/>
-                        </a:solidFill>
-                      </a:endParaRPr>
                     </a:p>
                   </a:txBody>
                   <a:tcPr>
@@ -9230,6 +9177,11 @@
                     <a:noFill/>
                   </a:tcPr>
                 </a:tc>
+                <a:extLst>
+                  <a:ext uri="{0D108BD9-81ED-4DB2-BD59-A6C34878D82A}">
+                    <a16:rowId xmlns:a16="http://schemas.microsoft.com/office/drawing/2014/main" val="10003"/>
+                  </a:ext>
+                </a:extLst>
               </a:tr>
               <a:tr h="354842">
                 <a:tc>
@@ -9239,18 +9191,13 @@
                     <a:p>
                       <a:pPr algn="ctr"/>
                       <a:r>
-                        <a:rPr lang="en-US" sz="1400" dirty="0" smtClean="0">
+                        <a:rPr lang="en-US" sz="1400" dirty="0">
                           <a:solidFill>
                             <a:schemeClr val="tx1"/>
                           </a:solidFill>
                         </a:rPr>
                         <a:t>R</a:t>
                       </a:r>
-                      <a:endParaRPr lang="en-US" sz="1400" dirty="0">
-                        <a:solidFill>
-                          <a:schemeClr val="tx1"/>
-                        </a:solidFill>
-                      </a:endParaRPr>
                     </a:p>
                   </a:txBody>
                   <a:tcPr>
@@ -9300,18 +9247,13 @@
                     <a:p>
                       <a:pPr algn="ctr"/>
                       <a:r>
-                        <a:rPr lang="en-US" sz="1400" dirty="0" smtClean="0">
+                        <a:rPr lang="en-US" sz="1400" dirty="0">
                           <a:solidFill>
                             <a:schemeClr val="tx1"/>
                           </a:solidFill>
                         </a:rPr>
                         <a:t>0</a:t>
                       </a:r>
-                      <a:endParaRPr lang="en-US" sz="1400" dirty="0">
-                        <a:solidFill>
-                          <a:schemeClr val="tx1"/>
-                        </a:solidFill>
-                      </a:endParaRPr>
                     </a:p>
                   </a:txBody>
                   <a:tcPr>
@@ -9360,18 +9302,13 @@
                     <a:lstStyle/>
                     <a:p>
                       <a:r>
-                        <a:rPr lang="en-US" sz="1000" dirty="0" smtClean="0">
+                        <a:rPr lang="en-US" sz="1000" dirty="0">
                           <a:solidFill>
                             <a:schemeClr val="tx1"/>
                           </a:solidFill>
                         </a:rPr>
                         <a:t>null</a:t>
                       </a:r>
-                      <a:endParaRPr lang="en-US" sz="1000" dirty="0">
-                        <a:solidFill>
-                          <a:schemeClr val="tx1"/>
-                        </a:solidFill>
-                      </a:endParaRPr>
                     </a:p>
                   </a:txBody>
                   <a:tcPr>
@@ -9420,18 +9357,13 @@
                     <a:lstStyle/>
                     <a:p>
                       <a:r>
-                        <a:rPr lang="en-US" sz="1000" dirty="0" smtClean="0">
+                        <a:rPr lang="en-US" sz="1000" dirty="0">
                           <a:solidFill>
                             <a:schemeClr val="tx1"/>
                           </a:solidFill>
                         </a:rPr>
                         <a:t>null</a:t>
                       </a:r>
-                      <a:endParaRPr lang="en-US" sz="1000" dirty="0">
-                        <a:solidFill>
-                          <a:schemeClr val="tx1"/>
-                        </a:solidFill>
-                      </a:endParaRPr>
                     </a:p>
                   </a:txBody>
                   <a:tcPr>
@@ -9526,6 +9458,11 @@
                     <a:noFill/>
                   </a:tcPr>
                 </a:tc>
+                <a:extLst>
+                  <a:ext uri="{0D108BD9-81ED-4DB2-BD59-A6C34878D82A}">
+                    <a16:rowId xmlns:a16="http://schemas.microsoft.com/office/drawing/2014/main" val="10004"/>
+                  </a:ext>
+                </a:extLst>
               </a:tr>
               <a:tr h="313899">
                 <a:tc>
@@ -9535,18 +9472,13 @@
                     <a:p>
                       <a:pPr algn="ctr"/>
                       <a:r>
-                        <a:rPr lang="en-US" sz="1400" dirty="0" smtClean="0">
+                        <a:rPr lang="en-US" sz="1400" dirty="0">
                           <a:solidFill>
                             <a:schemeClr val="tx1"/>
                           </a:solidFill>
                         </a:rPr>
                         <a:t>T</a:t>
                       </a:r>
-                      <a:endParaRPr lang="en-US" sz="1400" dirty="0">
-                        <a:solidFill>
-                          <a:schemeClr val="tx1"/>
-                        </a:solidFill>
-                      </a:endParaRPr>
                     </a:p>
                   </a:txBody>
                   <a:tcPr>
@@ -9596,18 +9528,13 @@
                     <a:p>
                       <a:pPr algn="ctr"/>
                       <a:r>
-                        <a:rPr lang="en-US" sz="1400" dirty="0" smtClean="0">
+                        <a:rPr lang="en-US" sz="1400" dirty="0">
                           <a:solidFill>
                             <a:schemeClr val="tx1"/>
                           </a:solidFill>
                         </a:rPr>
                         <a:t>0</a:t>
                       </a:r>
-                      <a:endParaRPr lang="en-US" sz="1400" dirty="0">
-                        <a:solidFill>
-                          <a:schemeClr val="tx1"/>
-                        </a:solidFill>
-                      </a:endParaRPr>
                     </a:p>
                   </a:txBody>
                   <a:tcPr>
@@ -9656,18 +9583,13 @@
                     <a:lstStyle/>
                     <a:p>
                       <a:r>
-                        <a:rPr lang="en-US" sz="1000" dirty="0" smtClean="0">
+                        <a:rPr lang="en-US" sz="1000" dirty="0">
                           <a:solidFill>
                             <a:schemeClr val="tx1"/>
                           </a:solidFill>
                         </a:rPr>
                         <a:t>null</a:t>
                       </a:r>
-                      <a:endParaRPr lang="en-US" sz="1000" dirty="0">
-                        <a:solidFill>
-                          <a:schemeClr val="tx1"/>
-                        </a:solidFill>
-                      </a:endParaRPr>
                     </a:p>
                   </a:txBody>
                   <a:tcPr>
@@ -9716,18 +9638,13 @@
                     <a:lstStyle/>
                     <a:p>
                       <a:r>
-                        <a:rPr lang="en-US" sz="1000" dirty="0" smtClean="0">
+                        <a:rPr lang="en-US" sz="1000" dirty="0">
                           <a:solidFill>
                             <a:schemeClr val="tx1"/>
                           </a:solidFill>
                         </a:rPr>
                         <a:t>null</a:t>
                       </a:r>
-                      <a:endParaRPr lang="en-US" sz="1000" dirty="0">
-                        <a:solidFill>
-                          <a:schemeClr val="tx1"/>
-                        </a:solidFill>
-                      </a:endParaRPr>
                     </a:p>
                   </a:txBody>
                   <a:tcPr>
@@ -9822,6 +9739,11 @@
                     <a:noFill/>
                   </a:tcPr>
                 </a:tc>
+                <a:extLst>
+                  <a:ext uri="{0D108BD9-81ED-4DB2-BD59-A6C34878D82A}">
+                    <a16:rowId xmlns:a16="http://schemas.microsoft.com/office/drawing/2014/main" val="10005"/>
+                  </a:ext>
+                </a:extLst>
               </a:tr>
               <a:tr h="272955">
                 <a:tc>
@@ -9831,18 +9753,13 @@
                     <a:p>
                       <a:pPr algn="ctr"/>
                       <a:r>
-                        <a:rPr lang="en-US" sz="1400" dirty="0" smtClean="0">
+                        <a:rPr lang="en-US" sz="1400" dirty="0">
                           <a:solidFill>
                             <a:schemeClr val="tx1"/>
                           </a:solidFill>
                         </a:rPr>
                         <a:t>T</a:t>
                       </a:r>
-                      <a:endParaRPr lang="en-US" sz="1400" dirty="0">
-                        <a:solidFill>
-                          <a:schemeClr val="tx1"/>
-                        </a:solidFill>
-                      </a:endParaRPr>
                     </a:p>
                   </a:txBody>
                   <a:tcPr>
@@ -9892,18 +9809,13 @@
                     <a:p>
                       <a:pPr algn="ctr"/>
                       <a:r>
-                        <a:rPr lang="en-US" sz="1400" dirty="0" smtClean="0">
+                        <a:rPr lang="en-US" sz="1400" dirty="0">
                           <a:solidFill>
                             <a:schemeClr val="tx1"/>
                           </a:solidFill>
                         </a:rPr>
                         <a:t>0</a:t>
                       </a:r>
-                      <a:endParaRPr lang="en-US" sz="1400" dirty="0">
-                        <a:solidFill>
-                          <a:schemeClr val="tx1"/>
-                        </a:solidFill>
-                      </a:endParaRPr>
                     </a:p>
                   </a:txBody>
                   <a:tcPr>
@@ -9952,18 +9864,13 @@
                     <a:lstStyle/>
                     <a:p>
                       <a:r>
-                        <a:rPr lang="en-US" sz="1000" dirty="0" smtClean="0">
+                        <a:rPr lang="en-US" sz="1000" dirty="0">
                           <a:solidFill>
                             <a:schemeClr val="tx1"/>
                           </a:solidFill>
                         </a:rPr>
                         <a:t>null</a:t>
                       </a:r>
-                      <a:endParaRPr lang="en-US" sz="1000" dirty="0">
-                        <a:solidFill>
-                          <a:schemeClr val="tx1"/>
-                        </a:solidFill>
-                      </a:endParaRPr>
                     </a:p>
                   </a:txBody>
                   <a:tcPr>
@@ -10012,18 +9919,13 @@
                     <a:lstStyle/>
                     <a:p>
                       <a:r>
-                        <a:rPr lang="en-US" sz="1000" dirty="0" smtClean="0">
+                        <a:rPr lang="en-US" sz="1000" dirty="0">
                           <a:solidFill>
                             <a:schemeClr val="tx1"/>
                           </a:solidFill>
                         </a:rPr>
                         <a:t>null</a:t>
                       </a:r>
-                      <a:endParaRPr lang="en-US" sz="1000" dirty="0">
-                        <a:solidFill>
-                          <a:schemeClr val="tx1"/>
-                        </a:solidFill>
-                      </a:endParaRPr>
                     </a:p>
                   </a:txBody>
                   <a:tcPr>
@@ -10118,6 +10020,11 @@
                     <a:noFill/>
                   </a:tcPr>
                 </a:tc>
+                <a:extLst>
+                  <a:ext uri="{0D108BD9-81ED-4DB2-BD59-A6C34878D82A}">
+                    <a16:rowId xmlns:a16="http://schemas.microsoft.com/office/drawing/2014/main" val="10006"/>
+                  </a:ext>
+                </a:extLst>
               </a:tr>
             </a:tbl>
           </a:graphicData>
@@ -10166,7 +10073,7 @@
             <a:p>
               <a:pPr algn="ctr"/>
               <a:r>
-                <a:rPr lang="en-US" sz="1600" b="1" dirty="0" smtClean="0"/>
+                <a:rPr lang="en-US" sz="1600" b="1" dirty="0"/>
                 <a:t>TCP/IP Stack</a:t>
               </a:r>
             </a:p>
@@ -10176,7 +10083,7 @@
             </a:p>
             <a:p>
               <a:pPr algn="ctr"/>
-              <a:endParaRPr lang="en-US" sz="1200" dirty="0" smtClean="0"/>
+              <a:endParaRPr lang="en-US" sz="1200" dirty="0"/>
             </a:p>
             <a:p>
               <a:pPr algn="ctr"/>
@@ -10184,15 +10091,15 @@
             </a:p>
             <a:p>
               <a:pPr algn="ctr"/>
-              <a:endParaRPr lang="en-US" sz="1200" dirty="0" smtClean="0"/>
+              <a:endParaRPr lang="en-US" sz="1200" dirty="0"/>
             </a:p>
             <a:p>
               <a:pPr algn="ctr"/>
               <a:r>
-                <a:rPr lang="en-US" sz="1600" dirty="0" smtClean="0"/>
+                <a:rPr lang="en-US" sz="1600" dirty="0"/>
                 <a:t>192.51.100.14</a:t>
               </a:r>
-              <a:endParaRPr lang="en-US" sz="1200" dirty="0" smtClean="0"/>
+              <a:endParaRPr lang="en-US" sz="1200" dirty="0"/>
             </a:p>
           </p:txBody>
         </p:sp>
@@ -10224,10 +10131,9 @@
             <a:lstStyle/>
             <a:p>
               <a:r>
-                <a:rPr lang="en-US" sz="1600" dirty="0" smtClean="0"/>
+                <a:rPr lang="en-US" sz="1600" dirty="0"/>
                 <a:t>Socket</a:t>
               </a:r>
-              <a:endParaRPr lang="en-US" sz="1600" dirty="0"/>
             </a:p>
           </p:txBody>
         </p:sp>
@@ -10261,45 +10167,44 @@
           <a:p>
             <a:pPr algn="ctr"/>
             <a:r>
-              <a:rPr lang="en-US" sz="1400" b="1" u="sng" dirty="0" smtClean="0"/>
+              <a:rPr lang="en-US" sz="1400" b="1" u="sng" dirty="0"/>
               <a:t>Application</a:t>
             </a:r>
-            <a:endParaRPr lang="en-US" sz="1000" b="1" u="sng" dirty="0" smtClean="0"/>
+            <a:endParaRPr lang="en-US" sz="1000" b="1" u="sng" dirty="0"/>
           </a:p>
           <a:p>
             <a:r>
-              <a:rPr lang="en-US" sz="1000" dirty="0" smtClean="0"/>
+              <a:rPr lang="en-US" sz="1000" dirty="0"/>
               <a:t>A. Create Socket</a:t>
             </a:r>
           </a:p>
           <a:p>
             <a:r>
-              <a:rPr lang="en-US" sz="1000" dirty="0" smtClean="0"/>
+              <a:rPr lang="en-US" sz="1000" dirty="0"/>
               <a:t>B. Bind(</a:t>
             </a:r>
             <a:r>
-              <a:rPr lang="en-US" sz="1000" dirty="0" err="1" smtClean="0"/>
+              <a:rPr lang="en-US" sz="1000" dirty="0" err="1"/>
               <a:t>WICED_ANY_PORT,interface</a:t>
             </a:r>
             <a:r>
-              <a:rPr lang="en-US" sz="1000" dirty="0" smtClean="0"/>
+              <a:rPr lang="en-US" sz="1000" dirty="0"/>
               <a:t>)</a:t>
             </a:r>
           </a:p>
           <a:p>
             <a:r>
-              <a:rPr lang="en-US" sz="1000" dirty="0" smtClean="0"/>
+              <a:rPr lang="en-US" sz="1000" dirty="0"/>
               <a:t>C. Connect(Server </a:t>
             </a:r>
             <a:r>
-              <a:rPr lang="en-US" sz="1000" dirty="0" err="1" smtClean="0"/>
+              <a:rPr lang="en-US" sz="1000" dirty="0" err="1"/>
               <a:t>IP,Remote</a:t>
             </a:r>
             <a:r>
-              <a:rPr lang="en-US" sz="1000" dirty="0" smtClean="0"/>
+              <a:rPr lang="en-US" sz="1000" dirty="0"/>
               <a:t> Port)</a:t>
             </a:r>
-            <a:endParaRPr lang="en-US" sz="1000" dirty="0"/>
           </a:p>
         </p:txBody>
       </p:sp>
@@ -10507,11 +10412,41 @@
                 <a:tableStyleId>{5C22544A-7EE6-4342-B048-85BDC9FD1C3A}</a:tableStyleId>
               </a:tblPr>
               <a:tblGrid>
-                <a:gridCol w="361780"/>
-                <a:gridCol w="361780"/>
-                <a:gridCol w="429406"/>
-                <a:gridCol w="497721"/>
-                <a:gridCol w="1717625"/>
+                <a:gridCol w="361780">
+                  <a:extLst>
+                    <a:ext uri="{9D8B030D-6E8A-4147-A177-3AD203B41FA5}">
+                      <a16:colId xmlns:a16="http://schemas.microsoft.com/office/drawing/2014/main" val="20000"/>
+                    </a:ext>
+                  </a:extLst>
+                </a:gridCol>
+                <a:gridCol w="361780">
+                  <a:extLst>
+                    <a:ext uri="{9D8B030D-6E8A-4147-A177-3AD203B41FA5}">
+                      <a16:colId xmlns:a16="http://schemas.microsoft.com/office/drawing/2014/main" val="20001"/>
+                    </a:ext>
+                  </a:extLst>
+                </a:gridCol>
+                <a:gridCol w="429406">
+                  <a:extLst>
+                    <a:ext uri="{9D8B030D-6E8A-4147-A177-3AD203B41FA5}">
+                      <a16:colId xmlns:a16="http://schemas.microsoft.com/office/drawing/2014/main" val="20002"/>
+                    </a:ext>
+                  </a:extLst>
+                </a:gridCol>
+                <a:gridCol w="497721">
+                  <a:extLst>
+                    <a:ext uri="{9D8B030D-6E8A-4147-A177-3AD203B41FA5}">
+                      <a16:colId xmlns:a16="http://schemas.microsoft.com/office/drawing/2014/main" val="20003"/>
+                    </a:ext>
+                  </a:extLst>
+                </a:gridCol>
+                <a:gridCol w="1717625">
+                  <a:extLst>
+                    <a:ext uri="{9D8B030D-6E8A-4147-A177-3AD203B41FA5}">
+                      <a16:colId xmlns:a16="http://schemas.microsoft.com/office/drawing/2014/main" val="20004"/>
+                    </a:ext>
+                  </a:extLst>
+                </a:gridCol>
               </a:tblGrid>
               <a:tr h="359393">
                 <a:tc gridSpan="5">
@@ -10521,18 +10456,13 @@
                     <a:p>
                       <a:pPr algn="ctr"/>
                       <a:r>
-                        <a:rPr lang="en-US" sz="1400" b="1" dirty="0" smtClean="0">
+                        <a:rPr lang="en-US" sz="1400" b="1" dirty="0">
                           <a:solidFill>
                             <a:schemeClr val="tx1"/>
                           </a:solidFill>
                         </a:rPr>
                         <a:t>Packet Buffers</a:t>
                       </a:r>
-                      <a:endParaRPr lang="en-US" sz="1400" b="1" dirty="0">
-                        <a:solidFill>
-                          <a:schemeClr val="tx1"/>
-                        </a:solidFill>
-                      </a:endParaRPr>
                     </a:p>
                   </a:txBody>
                   <a:tcPr anchor="ctr">
@@ -10744,6 +10674,11 @@
                     <a:noFill/>
                   </a:tcPr>
                 </a:tc>
+                <a:extLst>
+                  <a:ext uri="{0D108BD9-81ED-4DB2-BD59-A6C34878D82A}">
+                    <a16:rowId xmlns:a16="http://schemas.microsoft.com/office/drawing/2014/main" val="10000"/>
+                  </a:ext>
+                </a:extLst>
               </a:tr>
               <a:tr h="687957">
                 <a:tc rowSpan="2">
@@ -10753,18 +10688,13 @@
                     <a:p>
                       <a:pPr algn="ctr"/>
                       <a:r>
-                        <a:rPr lang="en-US" sz="1400" b="1" dirty="0" smtClean="0">
+                        <a:rPr lang="en-US" sz="1400" b="1" dirty="0">
                           <a:solidFill>
                             <a:schemeClr val="tx1"/>
                           </a:solidFill>
                         </a:rPr>
                         <a:t>Type</a:t>
                       </a:r>
-                      <a:endParaRPr lang="en-US" sz="1400" b="1" dirty="0">
-                        <a:solidFill>
-                          <a:schemeClr val="tx1"/>
-                        </a:solidFill>
-                      </a:endParaRPr>
                     </a:p>
                   </a:txBody>
                   <a:tcPr vert="vert270" anchor="ctr">
@@ -10814,18 +10744,13 @@
                     <a:p>
                       <a:pPr algn="ctr"/>
                       <a:r>
-                        <a:rPr lang="en-US" sz="1400" b="1" dirty="0" smtClean="0">
+                        <a:rPr lang="en-US" sz="1400" b="1" dirty="0">
                           <a:solidFill>
                             <a:schemeClr val="tx1"/>
                           </a:solidFill>
                         </a:rPr>
                         <a:t>Ref Count</a:t>
                       </a:r>
-                      <a:endParaRPr lang="en-US" sz="1400" b="1" dirty="0">
-                        <a:solidFill>
-                          <a:schemeClr val="tx1"/>
-                        </a:solidFill>
-                      </a:endParaRPr>
                     </a:p>
                   </a:txBody>
                   <a:tcPr vert="vert270" anchor="ctr">
@@ -10875,7 +10800,7 @@
                     <a:p>
                       <a:pPr algn="ctr"/>
                       <a:r>
-                        <a:rPr lang="en-US" sz="1400" b="1" dirty="0" smtClean="0">
+                        <a:rPr lang="en-US" sz="1400" b="1" dirty="0">
                           <a:solidFill>
                             <a:schemeClr val="tx1"/>
                           </a:solidFill>
@@ -10886,18 +10811,13 @@
                     <a:p>
                       <a:pPr algn="ctr"/>
                       <a:r>
-                        <a:rPr lang="en-US" sz="1400" b="1" dirty="0" smtClean="0">
+                        <a:rPr lang="en-US" sz="1400" b="1" dirty="0">
                           <a:solidFill>
                             <a:schemeClr val="tx1"/>
                           </a:solidFill>
                         </a:rPr>
                         <a:t>Pointer</a:t>
                       </a:r>
-                      <a:endParaRPr lang="en-US" sz="1400" b="1" dirty="0">
-                        <a:solidFill>
-                          <a:schemeClr val="tx1"/>
-                        </a:solidFill>
-                      </a:endParaRPr>
                     </a:p>
                   </a:txBody>
                   <a:tcPr anchor="ctr">
@@ -11000,18 +10920,13 @@
                     <a:p>
                       <a:pPr algn="ctr"/>
                       <a:r>
-                        <a:rPr lang="en-US" sz="1400" b="1" dirty="0" smtClean="0">
+                        <a:rPr lang="en-US" sz="1400" b="1" dirty="0">
                           <a:solidFill>
                             <a:schemeClr val="tx1"/>
                           </a:solidFill>
                         </a:rPr>
                         <a:t>Buffer</a:t>
                       </a:r>
-                      <a:endParaRPr lang="en-US" sz="1400" b="1" dirty="0">
-                        <a:solidFill>
-                          <a:schemeClr val="tx1"/>
-                        </a:solidFill>
-                      </a:endParaRPr>
                     </a:p>
                   </a:txBody>
                   <a:tcPr anchor="ctr">
@@ -11054,6 +10969,11 @@
                     <a:noFill/>
                   </a:tcPr>
                 </a:tc>
+                <a:extLst>
+                  <a:ext uri="{0D108BD9-81ED-4DB2-BD59-A6C34878D82A}">
+                    <a16:rowId xmlns:a16="http://schemas.microsoft.com/office/drawing/2014/main" val="10001"/>
+                  </a:ext>
+                </a:extLst>
               </a:tr>
               <a:tr h="517597">
                 <a:tc vMerge="1">
@@ -11169,18 +11089,13 @@
                     <a:p>
                       <a:pPr algn="ctr"/>
                       <a:r>
-                        <a:rPr lang="en-US" sz="1400" b="1" dirty="0" smtClean="0">
+                        <a:rPr lang="en-US" sz="1400" b="1" dirty="0">
                           <a:solidFill>
                             <a:schemeClr val="tx1"/>
                           </a:solidFill>
                         </a:rPr>
                         <a:t>Start</a:t>
                       </a:r>
-                      <a:endParaRPr lang="en-US" sz="1400" b="1" dirty="0">
-                        <a:solidFill>
-                          <a:schemeClr val="tx1"/>
-                        </a:solidFill>
-                      </a:endParaRPr>
                     </a:p>
                   </a:txBody>
                   <a:tcPr vert="vert270" anchor="ctr">
@@ -11230,18 +11145,13 @@
                     <a:p>
                       <a:pPr algn="ctr"/>
                       <a:r>
-                        <a:rPr lang="en-US" sz="1400" b="1" dirty="0" smtClean="0">
+                        <a:rPr lang="en-US" sz="1400" b="1" dirty="0">
                           <a:solidFill>
                             <a:schemeClr val="tx1"/>
                           </a:solidFill>
                         </a:rPr>
                         <a:t>End</a:t>
                       </a:r>
-                      <a:endParaRPr lang="en-US" sz="1400" b="1" dirty="0">
-                        <a:solidFill>
-                          <a:schemeClr val="tx1"/>
-                        </a:solidFill>
-                      </a:endParaRPr>
                     </a:p>
                   </a:txBody>
                   <a:tcPr vert="vert270" anchor="ctr">
@@ -11337,6 +11247,11 @@
                     <a:noFill/>
                   </a:tcPr>
                 </a:tc>
+                <a:extLst>
+                  <a:ext uri="{0D108BD9-81ED-4DB2-BD59-A6C34878D82A}">
+                    <a16:rowId xmlns:a16="http://schemas.microsoft.com/office/drawing/2014/main" val="10002"/>
+                  </a:ext>
+                </a:extLst>
               </a:tr>
               <a:tr h="335626">
                 <a:tc>
@@ -11346,18 +11261,13 @@
                     <a:p>
                       <a:pPr algn="ctr"/>
                       <a:r>
-                        <a:rPr lang="en-US" sz="1400" dirty="0" smtClean="0">
+                        <a:rPr lang="en-US" sz="1400" dirty="0">
                           <a:solidFill>
                             <a:schemeClr val="tx1"/>
                           </a:solidFill>
                         </a:rPr>
                         <a:t>R</a:t>
                       </a:r>
-                      <a:endParaRPr lang="en-US" sz="1400" dirty="0">
-                        <a:solidFill>
-                          <a:schemeClr val="tx1"/>
-                        </a:solidFill>
-                      </a:endParaRPr>
                     </a:p>
                   </a:txBody>
                   <a:tcPr>
@@ -11407,18 +11317,13 @@
                     <a:p>
                       <a:pPr algn="ctr"/>
                       <a:r>
-                        <a:rPr lang="en-US" sz="1400" dirty="0" smtClean="0">
+                        <a:rPr lang="en-US" sz="1400" dirty="0">
                           <a:solidFill>
                             <a:schemeClr val="tx1"/>
                           </a:solidFill>
                         </a:rPr>
                         <a:t>0</a:t>
                       </a:r>
-                      <a:endParaRPr lang="en-US" sz="1400" dirty="0">
-                        <a:solidFill>
-                          <a:schemeClr val="tx1"/>
-                        </a:solidFill>
-                      </a:endParaRPr>
                     </a:p>
                   </a:txBody>
                   <a:tcPr>
@@ -11467,18 +11372,13 @@
                     <a:lstStyle/>
                     <a:p>
                       <a:r>
-                        <a:rPr lang="en-US" sz="1000" dirty="0" smtClean="0">
+                        <a:rPr lang="en-US" sz="1000" dirty="0">
                           <a:solidFill>
                             <a:schemeClr val="tx1"/>
                           </a:solidFill>
                         </a:rPr>
                         <a:t>null</a:t>
                       </a:r>
-                      <a:endParaRPr lang="en-US" sz="1000" dirty="0">
-                        <a:solidFill>
-                          <a:schemeClr val="tx1"/>
-                        </a:solidFill>
-                      </a:endParaRPr>
                     </a:p>
                   </a:txBody>
                   <a:tcPr>
@@ -11527,18 +11427,13 @@
                     <a:lstStyle/>
                     <a:p>
                       <a:r>
-                        <a:rPr lang="en-US" sz="1000" dirty="0" smtClean="0">
+                        <a:rPr lang="en-US" sz="1000" dirty="0">
                           <a:solidFill>
                             <a:schemeClr val="tx1"/>
                           </a:solidFill>
                         </a:rPr>
                         <a:t>null</a:t>
                       </a:r>
-                      <a:endParaRPr lang="en-US" sz="1000" dirty="0">
-                        <a:solidFill>
-                          <a:schemeClr val="tx1"/>
-                        </a:solidFill>
-                      </a:endParaRPr>
                     </a:p>
                   </a:txBody>
                   <a:tcPr>
@@ -11633,6 +11528,11 @@
                     <a:noFill/>
                   </a:tcPr>
                 </a:tc>
+                <a:extLst>
+                  <a:ext uri="{0D108BD9-81ED-4DB2-BD59-A6C34878D82A}">
+                    <a16:rowId xmlns:a16="http://schemas.microsoft.com/office/drawing/2014/main" val="10003"/>
+                  </a:ext>
+                </a:extLst>
               </a:tr>
               <a:tr h="354842">
                 <a:tc>
@@ -11642,18 +11542,13 @@
                     <a:p>
                       <a:pPr algn="ctr"/>
                       <a:r>
-                        <a:rPr lang="en-US" sz="1400" dirty="0" smtClean="0">
+                        <a:rPr lang="en-US" sz="1400" dirty="0">
                           <a:solidFill>
                             <a:schemeClr val="tx1"/>
                           </a:solidFill>
                         </a:rPr>
                         <a:t>R</a:t>
                       </a:r>
-                      <a:endParaRPr lang="en-US" sz="1400" dirty="0">
-                        <a:solidFill>
-                          <a:schemeClr val="tx1"/>
-                        </a:solidFill>
-                      </a:endParaRPr>
                     </a:p>
                   </a:txBody>
                   <a:tcPr>
@@ -11703,18 +11598,13 @@
                     <a:p>
                       <a:pPr algn="ctr"/>
                       <a:r>
-                        <a:rPr lang="en-US" sz="1400" dirty="0" smtClean="0">
+                        <a:rPr lang="en-US" sz="1400" dirty="0">
                           <a:solidFill>
                             <a:schemeClr val="tx1"/>
                           </a:solidFill>
                         </a:rPr>
                         <a:t>0</a:t>
                       </a:r>
-                      <a:endParaRPr lang="en-US" sz="1400" dirty="0">
-                        <a:solidFill>
-                          <a:schemeClr val="tx1"/>
-                        </a:solidFill>
-                      </a:endParaRPr>
                     </a:p>
                   </a:txBody>
                   <a:tcPr>
@@ -11763,18 +11653,13 @@
                     <a:lstStyle/>
                     <a:p>
                       <a:r>
-                        <a:rPr lang="en-US" sz="1000" dirty="0" smtClean="0">
+                        <a:rPr lang="en-US" sz="1000" dirty="0">
                           <a:solidFill>
                             <a:schemeClr val="tx1"/>
                           </a:solidFill>
                         </a:rPr>
                         <a:t>null</a:t>
                       </a:r>
-                      <a:endParaRPr lang="en-US" sz="1000" dirty="0">
-                        <a:solidFill>
-                          <a:schemeClr val="tx1"/>
-                        </a:solidFill>
-                      </a:endParaRPr>
                     </a:p>
                   </a:txBody>
                   <a:tcPr>
@@ -11823,18 +11708,13 @@
                     <a:lstStyle/>
                     <a:p>
                       <a:r>
-                        <a:rPr lang="en-US" sz="1000" dirty="0" smtClean="0">
+                        <a:rPr lang="en-US" sz="1000" dirty="0">
                           <a:solidFill>
                             <a:schemeClr val="tx1"/>
                           </a:solidFill>
                         </a:rPr>
                         <a:t>null</a:t>
                       </a:r>
-                      <a:endParaRPr lang="en-US" sz="1000" dirty="0">
-                        <a:solidFill>
-                          <a:schemeClr val="tx1"/>
-                        </a:solidFill>
-                      </a:endParaRPr>
                     </a:p>
                   </a:txBody>
                   <a:tcPr>
@@ -11929,6 +11809,11 @@
                     <a:noFill/>
                   </a:tcPr>
                 </a:tc>
+                <a:extLst>
+                  <a:ext uri="{0D108BD9-81ED-4DB2-BD59-A6C34878D82A}">
+                    <a16:rowId xmlns:a16="http://schemas.microsoft.com/office/drawing/2014/main" val="10004"/>
+                  </a:ext>
+                </a:extLst>
               </a:tr>
               <a:tr h="313899">
                 <a:tc>
@@ -11938,18 +11823,13 @@
                     <a:p>
                       <a:pPr algn="ctr"/>
                       <a:r>
-                        <a:rPr lang="en-US" sz="1400" dirty="0" smtClean="0">
+                        <a:rPr lang="en-US" sz="1400" dirty="0">
                           <a:solidFill>
                             <a:schemeClr val="tx1"/>
                           </a:solidFill>
                         </a:rPr>
                         <a:t>T</a:t>
                       </a:r>
-                      <a:endParaRPr lang="en-US" sz="1400" dirty="0">
-                        <a:solidFill>
-                          <a:schemeClr val="tx1"/>
-                        </a:solidFill>
-                      </a:endParaRPr>
                     </a:p>
                   </a:txBody>
                   <a:tcPr>
@@ -11999,18 +11879,13 @@
                     <a:p>
                       <a:pPr algn="ctr"/>
                       <a:r>
-                        <a:rPr lang="en-US" sz="1400" dirty="0" smtClean="0">
+                        <a:rPr lang="en-US" sz="1400" dirty="0">
                           <a:solidFill>
                             <a:schemeClr val="tx1"/>
                           </a:solidFill>
                         </a:rPr>
                         <a:t>0</a:t>
                       </a:r>
-                      <a:endParaRPr lang="en-US" sz="1400" dirty="0">
-                        <a:solidFill>
-                          <a:schemeClr val="tx1"/>
-                        </a:solidFill>
-                      </a:endParaRPr>
                     </a:p>
                   </a:txBody>
                   <a:tcPr>
@@ -12059,18 +11934,13 @@
                     <a:lstStyle/>
                     <a:p>
                       <a:r>
-                        <a:rPr lang="en-US" sz="1000" dirty="0" smtClean="0">
+                        <a:rPr lang="en-US" sz="1000" dirty="0">
                           <a:solidFill>
                             <a:schemeClr val="tx1"/>
                           </a:solidFill>
                         </a:rPr>
                         <a:t>null</a:t>
                       </a:r>
-                      <a:endParaRPr lang="en-US" sz="1000" dirty="0">
-                        <a:solidFill>
-                          <a:schemeClr val="tx1"/>
-                        </a:solidFill>
-                      </a:endParaRPr>
                     </a:p>
                   </a:txBody>
                   <a:tcPr>
@@ -12119,18 +11989,13 @@
                     <a:lstStyle/>
                     <a:p>
                       <a:r>
-                        <a:rPr lang="en-US" sz="1000" dirty="0" smtClean="0">
+                        <a:rPr lang="en-US" sz="1000" dirty="0">
                           <a:solidFill>
                             <a:schemeClr val="tx1"/>
                           </a:solidFill>
                         </a:rPr>
                         <a:t>null</a:t>
                       </a:r>
-                      <a:endParaRPr lang="en-US" sz="1000" dirty="0">
-                        <a:solidFill>
-                          <a:schemeClr val="tx1"/>
-                        </a:solidFill>
-                      </a:endParaRPr>
                     </a:p>
                   </a:txBody>
                   <a:tcPr>
@@ -12225,6 +12090,11 @@
                     <a:noFill/>
                   </a:tcPr>
                 </a:tc>
+                <a:extLst>
+                  <a:ext uri="{0D108BD9-81ED-4DB2-BD59-A6C34878D82A}">
+                    <a16:rowId xmlns:a16="http://schemas.microsoft.com/office/drawing/2014/main" val="10005"/>
+                  </a:ext>
+                </a:extLst>
               </a:tr>
               <a:tr h="272955">
                 <a:tc>
@@ -12234,18 +12104,13 @@
                     <a:p>
                       <a:pPr algn="ctr"/>
                       <a:r>
-                        <a:rPr lang="en-US" sz="1400" dirty="0" smtClean="0">
+                        <a:rPr lang="en-US" sz="1400" dirty="0">
                           <a:solidFill>
                             <a:schemeClr val="tx1"/>
                           </a:solidFill>
                         </a:rPr>
                         <a:t>T</a:t>
                       </a:r>
-                      <a:endParaRPr lang="en-US" sz="1400" dirty="0">
-                        <a:solidFill>
-                          <a:schemeClr val="tx1"/>
-                        </a:solidFill>
-                      </a:endParaRPr>
                     </a:p>
                   </a:txBody>
                   <a:tcPr>
@@ -12295,18 +12160,13 @@
                     <a:p>
                       <a:pPr algn="ctr"/>
                       <a:r>
-                        <a:rPr lang="en-US" sz="1400" dirty="0" smtClean="0">
+                        <a:rPr lang="en-US" sz="1400" dirty="0">
                           <a:solidFill>
                             <a:schemeClr val="tx1"/>
                           </a:solidFill>
                         </a:rPr>
                         <a:t>0</a:t>
                       </a:r>
-                      <a:endParaRPr lang="en-US" sz="1400" dirty="0">
-                        <a:solidFill>
-                          <a:schemeClr val="tx1"/>
-                        </a:solidFill>
-                      </a:endParaRPr>
                     </a:p>
                   </a:txBody>
                   <a:tcPr>
@@ -12355,18 +12215,13 @@
                     <a:lstStyle/>
                     <a:p>
                       <a:r>
-                        <a:rPr lang="en-US" sz="1000" dirty="0" smtClean="0">
+                        <a:rPr lang="en-US" sz="1000" dirty="0">
                           <a:solidFill>
                             <a:schemeClr val="tx1"/>
                           </a:solidFill>
                         </a:rPr>
                         <a:t>null</a:t>
                       </a:r>
-                      <a:endParaRPr lang="en-US" sz="1000" dirty="0">
-                        <a:solidFill>
-                          <a:schemeClr val="tx1"/>
-                        </a:solidFill>
-                      </a:endParaRPr>
                     </a:p>
                   </a:txBody>
                   <a:tcPr>
@@ -12415,18 +12270,13 @@
                     <a:lstStyle/>
                     <a:p>
                       <a:r>
-                        <a:rPr lang="en-US" sz="1000" dirty="0" smtClean="0">
+                        <a:rPr lang="en-US" sz="1000" dirty="0">
                           <a:solidFill>
                             <a:schemeClr val="tx1"/>
                           </a:solidFill>
                         </a:rPr>
                         <a:t>null</a:t>
                       </a:r>
-                      <a:endParaRPr lang="en-US" sz="1000" dirty="0">
-                        <a:solidFill>
-                          <a:schemeClr val="tx1"/>
-                        </a:solidFill>
-                      </a:endParaRPr>
                     </a:p>
                   </a:txBody>
                   <a:tcPr>
@@ -12521,6 +12371,11 @@
                     <a:noFill/>
                   </a:tcPr>
                 </a:tc>
+                <a:extLst>
+                  <a:ext uri="{0D108BD9-81ED-4DB2-BD59-A6C34878D82A}">
+                    <a16:rowId xmlns:a16="http://schemas.microsoft.com/office/drawing/2014/main" val="10006"/>
+                  </a:ext>
+                </a:extLst>
               </a:tr>
             </a:tbl>
           </a:graphicData>
@@ -12580,18 +12435,13 @@
           <a:lstStyle/>
           <a:p>
             <a:r>
-              <a:rPr lang="en-US" sz="1000" b="1" dirty="0" smtClean="0">
+              <a:rPr lang="en-US" sz="1000" b="1" dirty="0">
                 <a:solidFill>
                   <a:srgbClr val="FF0000"/>
                 </a:solidFill>
               </a:rPr>
               <a:t>B</a:t>
             </a:r>
-            <a:endParaRPr lang="en-US" sz="1000" b="1" dirty="0">
-              <a:solidFill>
-                <a:srgbClr val="FF0000"/>
-              </a:solidFill>
-            </a:endParaRPr>
           </a:p>
         </p:txBody>
       </p:sp>
@@ -12681,18 +12531,13 @@
           <a:lstStyle/>
           <a:p>
             <a:r>
-              <a:rPr lang="en-US" sz="1000" b="1" dirty="0" smtClean="0">
+              <a:rPr lang="en-US" sz="1000" b="1" dirty="0">
                 <a:solidFill>
                   <a:srgbClr val="FF0000"/>
                 </a:solidFill>
               </a:rPr>
               <a:t>2</a:t>
             </a:r>
-            <a:endParaRPr lang="en-US" sz="1000" b="1" dirty="0">
-              <a:solidFill>
-                <a:srgbClr val="FF0000"/>
-              </a:solidFill>
-            </a:endParaRPr>
           </a:p>
         </p:txBody>
       </p:sp>
@@ -12718,18 +12563,13 @@
           <a:lstStyle/>
           <a:p>
             <a:r>
-              <a:rPr lang="en-US" sz="1000" b="1" dirty="0" smtClean="0">
+              <a:rPr lang="en-US" sz="1000" b="1" dirty="0">
                 <a:solidFill>
                   <a:srgbClr val="FF0000"/>
                 </a:solidFill>
               </a:rPr>
               <a:t>3</a:t>
             </a:r>
-            <a:endParaRPr lang="en-US" sz="1000" b="1" dirty="0">
-              <a:solidFill>
-                <a:srgbClr val="FF0000"/>
-              </a:solidFill>
-            </a:endParaRPr>
           </a:p>
         </p:txBody>
       </p:sp>
@@ -12756,10 +12596,9 @@
           <a:lstStyle/>
           <a:p>
             <a:r>
-              <a:rPr lang="en-US" u="sng" dirty="0" smtClean="0"/>
+              <a:rPr lang="en-US" u="sng" dirty="0"/>
               <a:t>TCP Server</a:t>
             </a:r>
-            <a:endParaRPr lang="en-US" u="sng" dirty="0"/>
           </a:p>
         </p:txBody>
       </p:sp>
@@ -12786,10 +12625,9 @@
           <a:lstStyle/>
           <a:p>
             <a:r>
-              <a:rPr lang="en-US" u="sng" dirty="0" smtClean="0"/>
+              <a:rPr lang="en-US" u="sng" dirty="0"/>
               <a:t>TCP Client</a:t>
             </a:r>
-            <a:endParaRPr lang="en-US" u="sng" dirty="0"/>
           </a:p>
         </p:txBody>
       </p:sp>
@@ -12852,7 +12690,7 @@
           <a:lstStyle/>
           <a:p>
             <a:r>
-              <a:rPr lang="en-US" u="sng" smtClean="0"/>
+              <a:rPr lang="en-US" u="sng"/>
               <a:t>Create Connection</a:t>
             </a:r>
             <a:endParaRPr lang="en-US" u="sng" dirty="0"/>
@@ -12869,13 +12707,6 @@
   <p:clrMapOvr>
     <a:masterClrMapping/>
   </p:clrMapOvr>
-  <p:timing>
-    <p:tnLst>
-      <p:par>
-        <p:cTn id="1" dur="indefinite" restart="never" nodeType="tmRoot"/>
-      </p:par>
-    </p:tnLst>
-  </p:timing>
 </p:sld>
 </file>
 
@@ -12898,18 +12729,72 @@
       </p:grpSpPr>
       <p:grpSp>
         <p:nvGrpSpPr>
-          <p:cNvPr id="3" name="Group 2"/>
+          <p:cNvPr id="25" name="Group 24">
+            <a:extLst>
+              <a:ext uri="{FF2B5EF4-FFF2-40B4-BE49-F238E27FC236}">
+                <a16:creationId xmlns:a16="http://schemas.microsoft.com/office/drawing/2014/main" id="{3B2C51B9-EDD7-4240-B648-DD06A33A337B}"/>
+              </a:ext>
+            </a:extLst>
+          </p:cNvPr>
           <p:cNvGrpSpPr/>
           <p:nvPr/>
         </p:nvGrpSpPr>
         <p:grpSpPr>
           <a:xfrm>
-            <a:off x="1559324" y="296931"/>
-            <a:ext cx="9366239" cy="5784903"/>
-            <a:chOff x="1559324" y="296931"/>
-            <a:chExt cx="9366239" cy="5784903"/>
+            <a:off x="1569778" y="1265923"/>
+            <a:ext cx="9355785" cy="5086642"/>
+            <a:chOff x="1569778" y="1265923"/>
+            <a:chExt cx="9355785" cy="5086642"/>
           </a:xfrm>
         </p:grpSpPr>
+        <p:sp>
+          <p:nvSpPr>
+            <p:cNvPr id="2" name="Rectangle 1"/>
+            <p:cNvSpPr/>
+            <p:nvPr/>
+          </p:nvSpPr>
+          <p:spPr>
+            <a:xfrm>
+              <a:off x="5418442" y="1265923"/>
+              <a:ext cx="1839074" cy="5086642"/>
+            </a:xfrm>
+            <a:prstGeom prst="rect">
+              <a:avLst/>
+            </a:prstGeom>
+            <a:solidFill>
+              <a:schemeClr val="bg2">
+                <a:alpha val="40000"/>
+              </a:schemeClr>
+            </a:solidFill>
+            <a:ln>
+              <a:noFill/>
+            </a:ln>
+          </p:spPr>
+          <p:style>
+            <a:lnRef idx="2">
+              <a:schemeClr val="accent1">
+                <a:shade val="50000"/>
+              </a:schemeClr>
+            </a:lnRef>
+            <a:fillRef idx="1">
+              <a:schemeClr val="accent1"/>
+            </a:fillRef>
+            <a:effectRef idx="0">
+              <a:schemeClr val="accent1"/>
+            </a:effectRef>
+            <a:fontRef idx="minor">
+              <a:schemeClr val="lt1"/>
+            </a:fontRef>
+          </p:style>
+          <p:txBody>
+            <a:bodyPr rtlCol="0" anchor="ctr"/>
+            <a:lstStyle/>
+            <a:p>
+              <a:pPr algn="ctr"/>
+              <a:endParaRPr lang="en-US" u="sng" dirty="0"/>
+            </a:p>
+          </p:txBody>
+        </p:sp>
         <p:sp>
           <p:nvSpPr>
             <p:cNvPr id="4" name="TextBox 3"/>
@@ -12939,17 +12824,16 @@
             <a:p>
               <a:pPr algn="ctr"/>
               <a:r>
-                <a:rPr lang="en-US" dirty="0" smtClean="0"/>
-                <a:t>CA</a:t>
+                <a:rPr lang="en-US" dirty="0"/>
+                <a:t>Root CA</a:t>
               </a:r>
             </a:p>
             <a:p>
               <a:pPr algn="ctr"/>
               <a:r>
-                <a:rPr lang="en-US" dirty="0" smtClean="0"/>
+                <a:rPr lang="en-US" dirty="0"/>
                 <a:t>Public Key</a:t>
               </a:r>
-              <a:endParaRPr lang="en-US" dirty="0"/>
             </a:p>
           </p:txBody>
         </p:sp>
@@ -12982,15 +12866,15 @@
             <a:p>
               <a:pPr algn="ctr"/>
               <a:r>
-                <a:rPr lang="en-US" dirty="0" smtClean="0"/>
+                <a:rPr lang="en-US" dirty="0"/>
                 <a:t>Intermediate</a:t>
               </a:r>
             </a:p>
             <a:p>
               <a:pPr algn="ctr"/>
               <a:r>
-                <a:rPr lang="en-US" dirty="0" smtClean="0"/>
-                <a:t>Public Key</a:t>
+                <a:rPr lang="en-US" dirty="0"/>
+                <a:t>CA Public Key</a:t>
               </a:r>
             </a:p>
           </p:txBody>
@@ -13003,7 +12887,7 @@
           </p:nvSpPr>
           <p:spPr>
             <a:xfrm>
-              <a:off x="9553963" y="1510321"/>
+              <a:off x="7832146" y="4239522"/>
               <a:ext cx="1371600" cy="594360"/>
             </a:xfrm>
             <a:prstGeom prst="rect">
@@ -13029,17 +12913,16 @@
             <a:p>
               <a:pPr algn="ctr"/>
               <a:r>
-                <a:rPr lang="en-US" dirty="0" smtClean="0"/>
-                <a:t>CA</a:t>
+                <a:rPr lang="en-US" dirty="0"/>
+                <a:t>Root CA</a:t>
               </a:r>
             </a:p>
             <a:p>
               <a:pPr algn="ctr"/>
               <a:r>
-                <a:rPr lang="en-US" dirty="0" smtClean="0"/>
+                <a:rPr lang="en-US" dirty="0"/>
                 <a:t>Private Key</a:t>
               </a:r>
-              <a:endParaRPr lang="en-US" dirty="0"/>
             </a:p>
           </p:txBody>
         </p:sp>
@@ -13072,17 +12955,16 @@
             <a:p>
               <a:pPr algn="ctr"/>
               <a:r>
-                <a:rPr lang="en-US" dirty="0" smtClean="0"/>
+                <a:rPr lang="en-US" dirty="0"/>
                 <a:t>Server</a:t>
               </a:r>
             </a:p>
             <a:p>
               <a:pPr algn="ctr"/>
               <a:r>
-                <a:rPr lang="en-US" dirty="0" smtClean="0"/>
+                <a:rPr lang="en-US" dirty="0"/>
                 <a:t>Public Key</a:t>
               </a:r>
-              <a:endParaRPr lang="en-US" dirty="0"/>
             </a:p>
           </p:txBody>
         </p:sp>
@@ -13115,50 +12997,9 @@
             <a:p>
               <a:pPr algn="ctr"/>
               <a:r>
-                <a:rPr lang="en-US" dirty="0" smtClean="0"/>
+                <a:rPr lang="en-US" dirty="0"/>
                 <a:t>Signature</a:t>
               </a:r>
-            </a:p>
-          </p:txBody>
-        </p:sp>
-        <p:sp>
-          <p:nvSpPr>
-            <p:cNvPr id="10" name="TextBox 9"/>
-            <p:cNvSpPr txBox="1"/>
-            <p:nvPr/>
-          </p:nvSpPr>
-          <p:spPr>
-            <a:xfrm>
-              <a:off x="7708695" y="2429117"/>
-              <a:ext cx="1371600" cy="594360"/>
-            </a:xfrm>
-            <a:prstGeom prst="rect">
-              <a:avLst/>
-            </a:prstGeom>
-            <a:solidFill>
-              <a:schemeClr val="accent6">
-                <a:lumMod val="40000"/>
-                <a:lumOff val="60000"/>
-              </a:schemeClr>
-            </a:solidFill>
-            <a:ln>
-              <a:solidFill>
-                <a:schemeClr val="tx1"/>
-              </a:solidFill>
-            </a:ln>
-          </p:spPr>
-          <p:txBody>
-            <a:bodyPr wrap="none" lIns="0" tIns="0" rIns="0" bIns="0" rtlCol="0" anchor="ctr" anchorCtr="1">
-              <a:noAutofit/>
-            </a:bodyPr>
-            <a:lstStyle/>
-            <a:p>
-              <a:pPr algn="ctr"/>
-              <a:r>
-                <a:rPr lang="en-US" dirty="0" smtClean="0"/>
-                <a:t>Hash</a:t>
-              </a:r>
-              <a:endParaRPr lang="en-US" dirty="0"/>
             </a:p>
           </p:txBody>
         </p:sp>
@@ -13196,10 +13037,9 @@
             <a:p>
               <a:pPr algn="ctr"/>
               <a:r>
-                <a:rPr lang="en-US" dirty="0" smtClean="0"/>
-                <a:t>Encrypt</a:t>
+                <a:rPr lang="en-US" dirty="0"/>
+                <a:t>Digest</a:t>
               </a:r>
-              <a:endParaRPr lang="en-US" dirty="0"/>
             </a:p>
           </p:txBody>
         </p:sp>
@@ -13207,51 +13047,16 @@
           <p:nvCxnSpPr>
             <p:cNvPr id="13" name="Straight Arrow Connector 12"/>
             <p:cNvCxnSpPr>
-              <a:stCxn id="10" idx="3"/>
+              <a:cxnSpLocks/>
+              <a:stCxn id="24" idx="1"/>
               <a:endCxn id="11" idx="1"/>
             </p:cNvCxnSpPr>
             <p:nvPr/>
           </p:nvCxnSpPr>
           <p:spPr>
-            <a:xfrm>
-              <a:off x="9080295" y="2726297"/>
-              <a:ext cx="473668" cy="0"/>
-            </a:xfrm>
-            <a:prstGeom prst="straightConnector1">
-              <a:avLst/>
-            </a:prstGeom>
-            <a:ln>
-              <a:tailEnd type="triangle"/>
-            </a:ln>
-          </p:spPr>
-          <p:style>
-            <a:lnRef idx="1">
-              <a:schemeClr val="accent1"/>
-            </a:lnRef>
-            <a:fillRef idx="0">
-              <a:schemeClr val="accent1"/>
-            </a:fillRef>
-            <a:effectRef idx="0">
-              <a:schemeClr val="accent1"/>
-            </a:effectRef>
-            <a:fontRef idx="minor">
-              <a:schemeClr val="tx1"/>
-            </a:fontRef>
-          </p:style>
-        </p:cxnSp>
-        <p:cxnSp>
-          <p:nvCxnSpPr>
-            <p:cNvPr id="14" name="Straight Arrow Connector 13"/>
-            <p:cNvCxnSpPr>
-              <a:stCxn id="7" idx="2"/>
-              <a:endCxn id="11" idx="0"/>
-            </p:cNvCxnSpPr>
-            <p:nvPr/>
-          </p:nvCxnSpPr>
-          <p:spPr>
-            <a:xfrm>
-              <a:off x="10239763" y="2104681"/>
-              <a:ext cx="0" cy="324436"/>
+            <a:xfrm flipV="1">
+              <a:off x="7636485" y="2726297"/>
+              <a:ext cx="1917478" cy="7451"/>
             </a:xfrm>
             <a:prstGeom prst="straightConnector1">
               <a:avLst/>
@@ -13378,7 +13183,7 @@
             <a:p>
               <a:pPr algn="ctr"/>
               <a:r>
-                <a:rPr lang="en-US" dirty="0" smtClean="0"/>
+                <a:rPr lang="en-US" dirty="0"/>
                 <a:t>Signature</a:t>
               </a:r>
             </a:p>
@@ -13392,7 +13197,7 @@
           </p:nvSpPr>
           <p:spPr>
             <a:xfrm>
-              <a:off x="1559324" y="2115544"/>
+              <a:off x="3291510" y="5730909"/>
               <a:ext cx="1371600" cy="594360"/>
             </a:xfrm>
             <a:prstGeom prst="rect">
@@ -13418,58 +13223,16 @@
             <a:p>
               <a:pPr algn="ctr"/>
               <a:r>
-                <a:rPr lang="en-US" dirty="0" smtClean="0"/>
+                <a:rPr lang="en-US" dirty="0"/>
                 <a:t>Intermediate</a:t>
               </a:r>
             </a:p>
             <a:p>
               <a:pPr algn="ctr"/>
               <a:r>
-                <a:rPr lang="en-US" dirty="0" smtClean="0"/>
-                <a:t>Private Key</a:t>
+                <a:rPr lang="en-US" dirty="0"/>
+                <a:t>CA Private Key</a:t>
               </a:r>
-              <a:endParaRPr lang="en-US" dirty="0"/>
-            </a:p>
-          </p:txBody>
-        </p:sp>
-        <p:sp>
-          <p:nvSpPr>
-            <p:cNvPr id="36" name="TextBox 35"/>
-            <p:cNvSpPr txBox="1"/>
-            <p:nvPr/>
-          </p:nvSpPr>
-          <p:spPr>
-            <a:xfrm>
-              <a:off x="3370683" y="3194796"/>
-              <a:ext cx="1371600" cy="594360"/>
-            </a:xfrm>
-            <a:prstGeom prst="rect">
-              <a:avLst/>
-            </a:prstGeom>
-            <a:solidFill>
-              <a:schemeClr val="accent1">
-                <a:lumMod val="40000"/>
-                <a:lumOff val="60000"/>
-              </a:schemeClr>
-            </a:solidFill>
-            <a:ln>
-              <a:solidFill>
-                <a:schemeClr val="tx1"/>
-              </a:solidFill>
-            </a:ln>
-          </p:spPr>
-          <p:txBody>
-            <a:bodyPr wrap="none" lIns="0" tIns="0" rIns="0" bIns="0" rtlCol="0" anchor="ctr" anchorCtr="1">
-              <a:noAutofit/>
-            </a:bodyPr>
-            <a:lstStyle/>
-            <a:p>
-              <a:pPr algn="ctr"/>
-              <a:r>
-                <a:rPr lang="en-US" dirty="0" smtClean="0"/>
-                <a:t>Hash</a:t>
-              </a:r>
-              <a:endParaRPr lang="en-US" dirty="0"/>
             </a:p>
           </p:txBody>
         </p:sp>
@@ -13507,10 +13270,9 @@
             <a:p>
               <a:pPr algn="ctr"/>
               <a:r>
-                <a:rPr lang="en-US" dirty="0" smtClean="0"/>
-                <a:t>Encrypt</a:t>
+                <a:rPr lang="en-US" dirty="0"/>
+                <a:t>Digest</a:t>
               </a:r>
-              <a:endParaRPr lang="en-US" dirty="0"/>
             </a:p>
           </p:txBody>
         </p:sp>
@@ -13518,7 +13280,8 @@
           <p:nvCxnSpPr>
             <p:cNvPr id="38" name="Straight Arrow Connector 37"/>
             <p:cNvCxnSpPr>
-              <a:stCxn id="36" idx="1"/>
+              <a:cxnSpLocks/>
+              <a:stCxn id="40" idx="1"/>
               <a:endCxn id="37" idx="3"/>
             </p:cNvCxnSpPr>
             <p:nvPr/>
@@ -13526,43 +13289,7 @@
           <p:spPr>
             <a:xfrm flipH="1">
               <a:off x="2941378" y="3491976"/>
-              <a:ext cx="429305" cy="0"/>
-            </a:xfrm>
-            <a:prstGeom prst="straightConnector1">
-              <a:avLst/>
-            </a:prstGeom>
-            <a:ln>
-              <a:tailEnd type="triangle"/>
-            </a:ln>
-          </p:spPr>
-          <p:style>
-            <a:lnRef idx="1">
-              <a:schemeClr val="accent1"/>
-            </a:lnRef>
-            <a:fillRef idx="0">
-              <a:schemeClr val="accent1"/>
-            </a:fillRef>
-            <a:effectRef idx="0">
-              <a:schemeClr val="accent1"/>
-            </a:effectRef>
-            <a:fontRef idx="minor">
-              <a:schemeClr val="tx1"/>
-            </a:fontRef>
-          </p:style>
-        </p:cxnSp>
-        <p:cxnSp>
-          <p:nvCxnSpPr>
-            <p:cNvPr id="39" name="Straight Arrow Connector 38"/>
-            <p:cNvCxnSpPr>
-              <a:stCxn id="35" idx="2"/>
-              <a:endCxn id="37" idx="0"/>
-            </p:cNvCxnSpPr>
-            <p:nvPr/>
-          </p:nvCxnSpPr>
-          <p:spPr>
-            <a:xfrm>
-              <a:off x="2245124" y="2709904"/>
-              <a:ext cx="10454" cy="484892"/>
+              <a:ext cx="1803620" cy="0"/>
             </a:xfrm>
             <a:prstGeom prst="straightConnector1">
               <a:avLst/>
@@ -13668,7 +13395,7 @@
           </p:nvSpPr>
           <p:spPr>
             <a:xfrm>
-              <a:off x="5715143" y="323445"/>
+              <a:off x="5715143" y="1292437"/>
               <a:ext cx="1371600" cy="594360"/>
             </a:xfrm>
             <a:prstGeom prst="rect">
@@ -13687,14 +13414,14 @@
             <a:p>
               <a:pPr algn="ctr"/>
               <a:r>
-                <a:rPr lang="en-US" u="sng" dirty="0" smtClean="0"/>
+                <a:rPr lang="en-US" u="sng" dirty="0"/>
                 <a:t>X.509</a:t>
               </a:r>
             </a:p>
             <a:p>
               <a:pPr algn="ctr"/>
               <a:r>
-                <a:rPr lang="en-US" u="sng" dirty="0" smtClean="0"/>
+                <a:rPr lang="en-US" u="sng" dirty="0"/>
                 <a:t>Certificate</a:t>
               </a:r>
             </a:p>
@@ -13708,7 +13435,7 @@
           </p:nvSpPr>
           <p:spPr>
             <a:xfrm>
-              <a:off x="2562123" y="296931"/>
+              <a:off x="2562123" y="1265923"/>
               <a:ext cx="1371600" cy="594360"/>
             </a:xfrm>
             <a:prstGeom prst="rect">
@@ -13734,17 +13461,16 @@
             <a:p>
               <a:pPr algn="ctr"/>
               <a:r>
-                <a:rPr lang="en-US" dirty="0" smtClean="0"/>
+                <a:rPr lang="en-US" dirty="0"/>
                 <a:t>Intermediate</a:t>
               </a:r>
             </a:p>
             <a:p>
               <a:pPr algn="ctr"/>
               <a:r>
-                <a:rPr lang="en-US" dirty="0" smtClean="0"/>
-                <a:t>Server</a:t>
+                <a:rPr lang="en-US" dirty="0"/>
+                <a:t>CA Server</a:t>
               </a:r>
-              <a:endParaRPr lang="en-US" dirty="0"/>
             </a:p>
           </p:txBody>
         </p:sp>
@@ -13756,7 +13482,7 @@
           </p:nvSpPr>
           <p:spPr>
             <a:xfrm>
-              <a:off x="8868172" y="330198"/>
+              <a:off x="8868172" y="1299190"/>
               <a:ext cx="1371600" cy="594360"/>
             </a:xfrm>
             <a:prstGeom prst="rect">
@@ -13782,68 +13508,302 @@
             <a:p>
               <a:pPr algn="ctr"/>
               <a:r>
-                <a:rPr lang="en-US" dirty="0" smtClean="0"/>
+                <a:rPr lang="en-US" dirty="0"/>
                 <a:t>Root CA</a:t>
               </a:r>
             </a:p>
             <a:p>
               <a:pPr algn="ctr"/>
               <a:r>
-                <a:rPr lang="en-US" dirty="0" smtClean="0"/>
+                <a:rPr lang="en-US" dirty="0"/>
                 <a:t>Server</a:t>
               </a:r>
-              <a:endParaRPr lang="en-US" dirty="0"/>
             </a:p>
           </p:txBody>
         </p:sp>
         <p:sp>
           <p:nvSpPr>
-            <p:cNvPr id="2" name="Rectangle 1"/>
+            <p:cNvPr id="19" name="Oval 18">
+              <a:extLst>
+                <a:ext uri="{FF2B5EF4-FFF2-40B4-BE49-F238E27FC236}">
+                  <a16:creationId xmlns:a16="http://schemas.microsoft.com/office/drawing/2014/main" id="{A104E178-9C80-4A33-A1B6-474FD8E9B6A5}"/>
+                </a:ext>
+              </a:extLst>
+            </p:cNvPr>
             <p:cNvSpPr/>
             <p:nvPr/>
           </p:nvSpPr>
           <p:spPr>
             <a:xfrm>
-              <a:off x="5476126" y="307758"/>
-              <a:ext cx="1839074" cy="5774076"/>
+              <a:off x="7944608" y="3360117"/>
+              <a:ext cx="1173973" cy="575044"/>
             </a:xfrm>
-            <a:prstGeom prst="rect">
+            <a:prstGeom prst="ellipse">
               <a:avLst/>
             </a:prstGeom>
             <a:solidFill>
-              <a:schemeClr val="bg2">
-                <a:alpha val="40000"/>
+              <a:schemeClr val="accent6">
+                <a:lumMod val="40000"/>
+                <a:lumOff val="60000"/>
               </a:schemeClr>
             </a:solidFill>
             <a:ln>
-              <a:noFill/>
+              <a:solidFill>
+                <a:schemeClr val="tx1"/>
+              </a:solidFill>
+            </a:ln>
+          </p:spPr>
+          <p:txBody>
+            <a:bodyPr rot="0" spcFirstLastPara="0" vertOverflow="overflow" horzOverflow="overflow" vert="horz" wrap="none" lIns="0" tIns="0" rIns="0" bIns="0" numCol="1" spcCol="0" rtlCol="0" fromWordArt="0" anchor="ctr" anchorCtr="1" forceAA="0" compatLnSpc="1">
+              <a:prstTxWarp prst="textNoShape">
+                <a:avLst/>
+              </a:prstTxWarp>
+              <a:noAutofit/>
+            </a:bodyPr>
+            <a:lstStyle/>
+            <a:p>
+              <a:pPr algn="ctr"/>
+              <a:r>
+                <a:rPr lang="en-US" dirty="0">
+                  <a:solidFill>
+                    <a:schemeClr val="tx1"/>
+                  </a:solidFill>
+                </a:rPr>
+                <a:t>Encrypt</a:t>
+              </a:r>
+            </a:p>
+          </p:txBody>
+        </p:sp>
+        <p:sp>
+          <p:nvSpPr>
+            <p:cNvPr id="41" name="Oval 40">
+              <a:extLst>
+                <a:ext uri="{FF2B5EF4-FFF2-40B4-BE49-F238E27FC236}">
+                  <a16:creationId xmlns:a16="http://schemas.microsoft.com/office/drawing/2014/main" id="{92C24576-AA8C-4365-A2B7-C5B7C9D8A300}"/>
+                </a:ext>
+              </a:extLst>
+            </p:cNvPr>
+            <p:cNvSpPr/>
+            <p:nvPr/>
+          </p:nvSpPr>
+          <p:spPr>
+            <a:xfrm>
+              <a:off x="7938629" y="2441354"/>
+              <a:ext cx="1173973" cy="575044"/>
+            </a:xfrm>
+            <a:prstGeom prst="ellipse">
+              <a:avLst/>
+            </a:prstGeom>
+            <a:solidFill>
+              <a:schemeClr val="accent6">
+                <a:lumMod val="40000"/>
+                <a:lumOff val="60000"/>
+              </a:schemeClr>
+            </a:solidFill>
+            <a:ln>
+              <a:solidFill>
+                <a:schemeClr val="tx1"/>
+              </a:solidFill>
+            </a:ln>
+          </p:spPr>
+          <p:txBody>
+            <a:bodyPr wrap="none" lIns="0" tIns="0" rIns="0" bIns="0" rtlCol="0" anchor="ctr" anchorCtr="1">
+              <a:noAutofit/>
+            </a:bodyPr>
+            <a:lstStyle/>
+            <a:p>
+              <a:pPr algn="ctr"/>
+              <a:r>
+                <a:rPr lang="en-US" dirty="0">
+                  <a:solidFill>
+                    <a:schemeClr val="tx1"/>
+                  </a:solidFill>
+                </a:rPr>
+                <a:t>Hash</a:t>
+              </a:r>
+            </a:p>
+          </p:txBody>
+        </p:sp>
+        <p:cxnSp>
+          <p:nvCxnSpPr>
+            <p:cNvPr id="42" name="Straight Arrow Connector 41">
+              <a:extLst>
+                <a:ext uri="{FF2B5EF4-FFF2-40B4-BE49-F238E27FC236}">
+                  <a16:creationId xmlns:a16="http://schemas.microsoft.com/office/drawing/2014/main" id="{C04B9279-B4F9-47E7-9E13-7A48FB835E60}"/>
+                </a:ext>
+              </a:extLst>
+            </p:cNvPr>
+            <p:cNvCxnSpPr>
+              <a:cxnSpLocks/>
+              <a:stCxn id="7" idx="0"/>
+              <a:endCxn id="19" idx="4"/>
+            </p:cNvCxnSpPr>
+            <p:nvPr/>
+          </p:nvCxnSpPr>
+          <p:spPr>
+            <a:xfrm flipV="1">
+              <a:off x="8517946" y="3935161"/>
+              <a:ext cx="13649" cy="304361"/>
+            </a:xfrm>
+            <a:prstGeom prst="straightConnector1">
+              <a:avLst/>
+            </a:prstGeom>
+            <a:ln>
+              <a:tailEnd type="triangle"/>
             </a:ln>
           </p:spPr>
           <p:style>
-            <a:lnRef idx="2">
-              <a:schemeClr val="accent1">
-                <a:shade val="50000"/>
-              </a:schemeClr>
+            <a:lnRef idx="1">
+              <a:schemeClr val="accent1"/>
             </a:lnRef>
-            <a:fillRef idx="1">
+            <a:fillRef idx="0">
               <a:schemeClr val="accent1"/>
             </a:fillRef>
             <a:effectRef idx="0">
               <a:schemeClr val="accent1"/>
             </a:effectRef>
             <a:fontRef idx="minor">
-              <a:schemeClr val="lt1"/>
+              <a:schemeClr val="tx1"/>
             </a:fontRef>
           </p:style>
+        </p:cxnSp>
+        <p:sp>
+          <p:nvSpPr>
+            <p:cNvPr id="43" name="Oval 42">
+              <a:extLst>
+                <a:ext uri="{FF2B5EF4-FFF2-40B4-BE49-F238E27FC236}">
+                  <a16:creationId xmlns:a16="http://schemas.microsoft.com/office/drawing/2014/main" id="{73949712-EC35-4B62-80BD-DB99766A6DDC}"/>
+                </a:ext>
+              </a:extLst>
+            </p:cNvPr>
+            <p:cNvSpPr/>
+            <p:nvPr/>
+          </p:nvSpPr>
+          <p:spPr>
+            <a:xfrm>
+              <a:off x="3396760" y="3222540"/>
+              <a:ext cx="1173973" cy="575044"/>
+            </a:xfrm>
+            <a:prstGeom prst="ellipse">
+              <a:avLst/>
+            </a:prstGeom>
+            <a:solidFill>
+              <a:schemeClr val="accent1">
+                <a:lumMod val="40000"/>
+                <a:lumOff val="60000"/>
+              </a:schemeClr>
+            </a:solidFill>
+            <a:ln>
+              <a:solidFill>
+                <a:schemeClr val="tx1"/>
+              </a:solidFill>
+            </a:ln>
+          </p:spPr>
           <p:txBody>
-            <a:bodyPr rtlCol="0" anchor="ctr"/>
+            <a:bodyPr rot="0" spcFirstLastPara="0" vertOverflow="overflow" horzOverflow="overflow" vert="horz" wrap="none" lIns="0" tIns="0" rIns="0" bIns="0" numCol="1" spcCol="0" rtlCol="0" fromWordArt="0" anchor="ctr" anchorCtr="1" forceAA="0" compatLnSpc="1">
+              <a:prstTxWarp prst="textNoShape">
+                <a:avLst/>
+              </a:prstTxWarp>
+              <a:noAutofit/>
+            </a:bodyPr>
             <a:lstStyle/>
             <a:p>
               <a:pPr algn="ctr"/>
-              <a:endParaRPr lang="en-US"/>
+              <a:r>
+                <a:rPr lang="en-US" dirty="0"/>
+                <a:t>Hash</a:t>
+              </a:r>
             </a:p>
           </p:txBody>
         </p:sp>
+        <p:sp>
+          <p:nvSpPr>
+            <p:cNvPr id="44" name="Oval 43">
+              <a:extLst>
+                <a:ext uri="{FF2B5EF4-FFF2-40B4-BE49-F238E27FC236}">
+                  <a16:creationId xmlns:a16="http://schemas.microsoft.com/office/drawing/2014/main" id="{ED91E7B2-95CF-446A-882A-D674C9A468AD}"/>
+                </a:ext>
+              </a:extLst>
+            </p:cNvPr>
+            <p:cNvSpPr/>
+            <p:nvPr/>
+          </p:nvSpPr>
+          <p:spPr>
+            <a:xfrm>
+              <a:off x="3396759" y="4862434"/>
+              <a:ext cx="1173973" cy="575044"/>
+            </a:xfrm>
+            <a:prstGeom prst="ellipse">
+              <a:avLst/>
+            </a:prstGeom>
+            <a:solidFill>
+              <a:schemeClr val="accent1">
+                <a:lumMod val="40000"/>
+                <a:lumOff val="60000"/>
+              </a:schemeClr>
+            </a:solidFill>
+            <a:ln>
+              <a:solidFill>
+                <a:schemeClr val="tx1"/>
+              </a:solidFill>
+            </a:ln>
+          </p:spPr>
+          <p:txBody>
+            <a:bodyPr wrap="none" lIns="0" tIns="0" rIns="0" bIns="0" rtlCol="0" anchor="ctr" anchorCtr="1">
+              <a:noAutofit/>
+            </a:bodyPr>
+            <a:lstStyle/>
+            <a:p>
+              <a:pPr algn="ctr"/>
+              <a:r>
+                <a:rPr lang="en-US" dirty="0"/>
+                <a:t>Encrypt</a:t>
+              </a:r>
+            </a:p>
+          </p:txBody>
+        </p:sp>
+        <p:cxnSp>
+          <p:nvCxnSpPr>
+            <p:cNvPr id="45" name="Straight Arrow Connector 44">
+              <a:extLst>
+                <a:ext uri="{FF2B5EF4-FFF2-40B4-BE49-F238E27FC236}">
+                  <a16:creationId xmlns:a16="http://schemas.microsoft.com/office/drawing/2014/main" id="{7B2937D3-658E-461E-B536-44F292EA471D}"/>
+                </a:ext>
+              </a:extLst>
+            </p:cNvPr>
+            <p:cNvCxnSpPr>
+              <a:cxnSpLocks/>
+              <a:stCxn id="35" idx="0"/>
+            </p:cNvCxnSpPr>
+            <p:nvPr/>
+          </p:nvCxnSpPr>
+          <p:spPr>
+            <a:xfrm flipH="1" flipV="1">
+              <a:off x="3974116" y="5410235"/>
+              <a:ext cx="3194" cy="320674"/>
+            </a:xfrm>
+            <a:prstGeom prst="straightConnector1">
+              <a:avLst/>
+            </a:prstGeom>
+            <a:ln>
+              <a:tailEnd type="triangle"/>
+            </a:ln>
+          </p:spPr>
+          <p:style>
+            <a:lnRef idx="1">
+              <a:schemeClr val="accent1"/>
+            </a:lnRef>
+            <a:fillRef idx="0">
+              <a:schemeClr val="accent1"/>
+            </a:fillRef>
+            <a:effectRef idx="0">
+              <a:schemeClr val="accent1"/>
+            </a:effectRef>
+            <a:fontRef idx="minor">
+              <a:schemeClr val="tx1"/>
+            </a:fontRef>
+          </p:style>
+        </p:cxnSp>
       </p:grpSp>
     </p:spTree>
     <p:extLst>
@@ -13855,13 +13815,6 @@
   <p:clrMapOvr>
     <a:masterClrMapping/>
   </p:clrMapOvr>
-  <p:timing>
-    <p:tnLst>
-      <p:par>
-        <p:cTn id="1" dur="indefinite" restart="never" nodeType="tmRoot"/>
-      </p:par>
-    </p:tnLst>
-  </p:timing>
 </p:sld>
 </file>
 

</xml_diff>

<commit_message>
More updates to the TLS Chapter and projects
</commit_message>
<xml_diff>
--- a/labmanual/misc/drawings.pptx
+++ b/labmanual/misc/drawings.pptx
@@ -4,12 +4,17 @@
   <p:sldMasterIdLst>
     <p:sldMasterId id="2147483648" r:id="rId1"/>
   </p:sldMasterIdLst>
+  <p:notesMasterIdLst>
+    <p:notesMasterId r:id="rId9"/>
+  </p:notesMasterIdLst>
   <p:sldIdLst>
     <p:sldId id="256" r:id="rId2"/>
     <p:sldId id="257" r:id="rId3"/>
-    <p:sldId id="258" r:id="rId4"/>
-    <p:sldId id="259" r:id="rId5"/>
-    <p:sldId id="260" r:id="rId6"/>
+    <p:sldId id="261" r:id="rId4"/>
+    <p:sldId id="258" r:id="rId5"/>
+    <p:sldId id="259" r:id="rId6"/>
+    <p:sldId id="260" r:id="rId7"/>
+    <p:sldId id="262" r:id="rId8"/>
   </p:sldIdLst>
   <p:sldSz cx="12192000" cy="6858000"/>
   <p:notesSz cx="6858000" cy="9144000"/>
@@ -118,6 +123,356 @@
 
 <file path=ppt/revisionInfo.xml><?xml version="1.0" encoding="utf-8"?>
 <p1510:revInfo xmlns:a="http://schemas.openxmlformats.org/drawingml/2006/main" xmlns:r="http://schemas.openxmlformats.org/officeDocument/2006/relationships" xmlns:p1510="http://schemas.microsoft.com/office/powerpoint/2015/10/main"/>
+</file>
+
+<file path=ppt/notesMasters/notesMaster1.xml><?xml version="1.0" encoding="utf-8"?>
+<p:notesMaster xmlns:a="http://schemas.openxmlformats.org/drawingml/2006/main" xmlns:r="http://schemas.openxmlformats.org/officeDocument/2006/relationships" xmlns:p="http://schemas.openxmlformats.org/presentationml/2006/main">
+  <p:cSld>
+    <p:bg>
+      <p:bgRef idx="1001">
+        <a:schemeClr val="bg1"/>
+      </p:bgRef>
+    </p:bg>
+    <p:spTree>
+      <p:nvGrpSpPr>
+        <p:cNvPr id="1" name=""/>
+        <p:cNvGrpSpPr/>
+        <p:nvPr/>
+      </p:nvGrpSpPr>
+      <p:grpSpPr>
+        <a:xfrm>
+          <a:off x="0" y="0"/>
+          <a:ext cx="0" cy="0"/>
+          <a:chOff x="0" y="0"/>
+          <a:chExt cx="0" cy="0"/>
+        </a:xfrm>
+      </p:grpSpPr>
+      <p:sp>
+        <p:nvSpPr>
+          <p:cNvPr id="2" name="Header Placeholder 1"/>
+          <p:cNvSpPr>
+            <a:spLocks noGrp="1"/>
+          </p:cNvSpPr>
+          <p:nvPr>
+            <p:ph type="hdr" sz="quarter"/>
+          </p:nvPr>
+        </p:nvSpPr>
+        <p:spPr>
+          <a:xfrm>
+            <a:off x="0" y="0"/>
+            <a:ext cx="2971800" cy="458788"/>
+          </a:xfrm>
+          <a:prstGeom prst="rect">
+            <a:avLst/>
+          </a:prstGeom>
+        </p:spPr>
+        <p:txBody>
+          <a:bodyPr vert="horz" lIns="91440" tIns="45720" rIns="91440" bIns="45720" rtlCol="0"/>
+          <a:lstStyle>
+            <a:lvl1pPr algn="l">
+              <a:defRPr sz="1200"/>
+            </a:lvl1pPr>
+          </a:lstStyle>
+          <a:p>
+            <a:endParaRPr lang="en-US"/>
+          </a:p>
+        </p:txBody>
+      </p:sp>
+      <p:sp>
+        <p:nvSpPr>
+          <p:cNvPr id="3" name="Date Placeholder 2"/>
+          <p:cNvSpPr>
+            <a:spLocks noGrp="1"/>
+          </p:cNvSpPr>
+          <p:nvPr>
+            <p:ph type="dt" idx="1"/>
+          </p:nvPr>
+        </p:nvSpPr>
+        <p:spPr>
+          <a:xfrm>
+            <a:off x="3884613" y="0"/>
+            <a:ext cx="2971800" cy="458788"/>
+          </a:xfrm>
+          <a:prstGeom prst="rect">
+            <a:avLst/>
+          </a:prstGeom>
+        </p:spPr>
+        <p:txBody>
+          <a:bodyPr vert="horz" lIns="91440" tIns="45720" rIns="91440" bIns="45720" rtlCol="0"/>
+          <a:lstStyle>
+            <a:lvl1pPr algn="r">
+              <a:defRPr sz="1200"/>
+            </a:lvl1pPr>
+          </a:lstStyle>
+          <a:p>
+            <a:fld id="{90BA088C-6928-D148-ACA4-D877058B3EC1}" type="datetimeFigureOut">
+              <a:rPr lang="en-US" smtClean="0"/>
+              <a:t>7/18/17</a:t>
+            </a:fld>
+            <a:endParaRPr lang="en-US"/>
+          </a:p>
+        </p:txBody>
+      </p:sp>
+      <p:sp>
+        <p:nvSpPr>
+          <p:cNvPr id="4" name="Slide Image Placeholder 3"/>
+          <p:cNvSpPr>
+            <a:spLocks noGrp="1" noRot="1" noChangeAspect="1"/>
+          </p:cNvSpPr>
+          <p:nvPr>
+            <p:ph type="sldImg" idx="2"/>
+          </p:nvPr>
+        </p:nvSpPr>
+        <p:spPr>
+          <a:xfrm>
+            <a:off x="685800" y="1143000"/>
+            <a:ext cx="5486400" cy="3086100"/>
+          </a:xfrm>
+          <a:prstGeom prst="rect">
+            <a:avLst/>
+          </a:prstGeom>
+          <a:noFill/>
+          <a:ln w="12700">
+            <a:solidFill>
+              <a:prstClr val="black"/>
+            </a:solidFill>
+          </a:ln>
+        </p:spPr>
+        <p:txBody>
+          <a:bodyPr vert="horz" lIns="91440" tIns="45720" rIns="91440" bIns="45720" rtlCol="0" anchor="ctr"/>
+          <a:lstStyle/>
+          <a:p>
+            <a:endParaRPr lang="en-US"/>
+          </a:p>
+        </p:txBody>
+      </p:sp>
+      <p:sp>
+        <p:nvSpPr>
+          <p:cNvPr id="5" name="Notes Placeholder 4"/>
+          <p:cNvSpPr>
+            <a:spLocks noGrp="1"/>
+          </p:cNvSpPr>
+          <p:nvPr>
+            <p:ph type="body" sz="quarter" idx="3"/>
+          </p:nvPr>
+        </p:nvSpPr>
+        <p:spPr>
+          <a:xfrm>
+            <a:off x="685800" y="4400550"/>
+            <a:ext cx="5486400" cy="3600450"/>
+          </a:xfrm>
+          <a:prstGeom prst="rect">
+            <a:avLst/>
+          </a:prstGeom>
+        </p:spPr>
+        <p:txBody>
+          <a:bodyPr vert="horz" lIns="91440" tIns="45720" rIns="91440" bIns="45720" rtlCol="0"/>
+          <a:lstStyle/>
+          <a:p>
+            <a:pPr lvl="0"/>
+            <a:r>
+              <a:rPr lang="en-US" smtClean="0"/>
+              <a:t>Click to edit Master text styles</a:t>
+            </a:r>
+          </a:p>
+          <a:p>
+            <a:pPr lvl="1"/>
+            <a:r>
+              <a:rPr lang="en-US" smtClean="0"/>
+              <a:t>Second level</a:t>
+            </a:r>
+          </a:p>
+          <a:p>
+            <a:pPr lvl="2"/>
+            <a:r>
+              <a:rPr lang="en-US" smtClean="0"/>
+              <a:t>Third level</a:t>
+            </a:r>
+          </a:p>
+          <a:p>
+            <a:pPr lvl="3"/>
+            <a:r>
+              <a:rPr lang="en-US" smtClean="0"/>
+              <a:t>Fourth level</a:t>
+            </a:r>
+          </a:p>
+          <a:p>
+            <a:pPr lvl="4"/>
+            <a:r>
+              <a:rPr lang="en-US" smtClean="0"/>
+              <a:t>Fifth level</a:t>
+            </a:r>
+            <a:endParaRPr lang="en-US"/>
+          </a:p>
+        </p:txBody>
+      </p:sp>
+      <p:sp>
+        <p:nvSpPr>
+          <p:cNvPr id="6" name="Footer Placeholder 5"/>
+          <p:cNvSpPr>
+            <a:spLocks noGrp="1"/>
+          </p:cNvSpPr>
+          <p:nvPr>
+            <p:ph type="ftr" sz="quarter" idx="4"/>
+          </p:nvPr>
+        </p:nvSpPr>
+        <p:spPr>
+          <a:xfrm>
+            <a:off x="0" y="8685213"/>
+            <a:ext cx="2971800" cy="458787"/>
+          </a:xfrm>
+          <a:prstGeom prst="rect">
+            <a:avLst/>
+          </a:prstGeom>
+        </p:spPr>
+        <p:txBody>
+          <a:bodyPr vert="horz" lIns="91440" tIns="45720" rIns="91440" bIns="45720" rtlCol="0" anchor="b"/>
+          <a:lstStyle>
+            <a:lvl1pPr algn="l">
+              <a:defRPr sz="1200"/>
+            </a:lvl1pPr>
+          </a:lstStyle>
+          <a:p>
+            <a:endParaRPr lang="en-US"/>
+          </a:p>
+        </p:txBody>
+      </p:sp>
+      <p:sp>
+        <p:nvSpPr>
+          <p:cNvPr id="7" name="Slide Number Placeholder 6"/>
+          <p:cNvSpPr>
+            <a:spLocks noGrp="1"/>
+          </p:cNvSpPr>
+          <p:nvPr>
+            <p:ph type="sldNum" sz="quarter" idx="5"/>
+          </p:nvPr>
+        </p:nvSpPr>
+        <p:spPr>
+          <a:xfrm>
+            <a:off x="3884613" y="8685213"/>
+            <a:ext cx="2971800" cy="458787"/>
+          </a:xfrm>
+          <a:prstGeom prst="rect">
+            <a:avLst/>
+          </a:prstGeom>
+        </p:spPr>
+        <p:txBody>
+          <a:bodyPr vert="horz" lIns="91440" tIns="45720" rIns="91440" bIns="45720" rtlCol="0" anchor="b"/>
+          <a:lstStyle>
+            <a:lvl1pPr algn="r">
+              <a:defRPr sz="1200"/>
+            </a:lvl1pPr>
+          </a:lstStyle>
+          <a:p>
+            <a:fld id="{587B76DD-93F9-2947-B549-2E82E68E94A9}" type="slidenum">
+              <a:rPr lang="en-US" smtClean="0"/>
+              <a:t>‹#›</a:t>
+            </a:fld>
+            <a:endParaRPr lang="en-US"/>
+          </a:p>
+        </p:txBody>
+      </p:sp>
+    </p:spTree>
+    <p:extLst>
+      <p:ext uri="{BB962C8B-B14F-4D97-AF65-F5344CB8AC3E}">
+        <p14:creationId xmlns:p14="http://schemas.microsoft.com/office/powerpoint/2010/main" val="1514881609"/>
+      </p:ext>
+    </p:extLst>
+  </p:cSld>
+  <p:clrMap bg1="lt1" tx1="dk1" bg2="lt2" tx2="dk2" accent1="accent1" accent2="accent2" accent3="accent3" accent4="accent4" accent5="accent5" accent6="accent6" hlink="hlink" folHlink="folHlink"/>
+  <p:notesStyle>
+    <a:lvl1pPr marL="0" algn="l" defTabSz="914400" rtl="0" eaLnBrk="1" latinLnBrk="0" hangingPunct="1">
+      <a:defRPr sz="1200" kern="1200">
+        <a:solidFill>
+          <a:schemeClr val="tx1"/>
+        </a:solidFill>
+        <a:latin typeface="+mn-lt"/>
+        <a:ea typeface="+mn-ea"/>
+        <a:cs typeface="+mn-cs"/>
+      </a:defRPr>
+    </a:lvl1pPr>
+    <a:lvl2pPr marL="457200" algn="l" defTabSz="914400" rtl="0" eaLnBrk="1" latinLnBrk="0" hangingPunct="1">
+      <a:defRPr sz="1200" kern="1200">
+        <a:solidFill>
+          <a:schemeClr val="tx1"/>
+        </a:solidFill>
+        <a:latin typeface="+mn-lt"/>
+        <a:ea typeface="+mn-ea"/>
+        <a:cs typeface="+mn-cs"/>
+      </a:defRPr>
+    </a:lvl2pPr>
+    <a:lvl3pPr marL="914400" algn="l" defTabSz="914400" rtl="0" eaLnBrk="1" latinLnBrk="0" hangingPunct="1">
+      <a:defRPr sz="1200" kern="1200">
+        <a:solidFill>
+          <a:schemeClr val="tx1"/>
+        </a:solidFill>
+        <a:latin typeface="+mn-lt"/>
+        <a:ea typeface="+mn-ea"/>
+        <a:cs typeface="+mn-cs"/>
+      </a:defRPr>
+    </a:lvl3pPr>
+    <a:lvl4pPr marL="1371600" algn="l" defTabSz="914400" rtl="0" eaLnBrk="1" latinLnBrk="0" hangingPunct="1">
+      <a:defRPr sz="1200" kern="1200">
+        <a:solidFill>
+          <a:schemeClr val="tx1"/>
+        </a:solidFill>
+        <a:latin typeface="+mn-lt"/>
+        <a:ea typeface="+mn-ea"/>
+        <a:cs typeface="+mn-cs"/>
+      </a:defRPr>
+    </a:lvl4pPr>
+    <a:lvl5pPr marL="1828800" algn="l" defTabSz="914400" rtl="0" eaLnBrk="1" latinLnBrk="0" hangingPunct="1">
+      <a:defRPr sz="1200" kern="1200">
+        <a:solidFill>
+          <a:schemeClr val="tx1"/>
+        </a:solidFill>
+        <a:latin typeface="+mn-lt"/>
+        <a:ea typeface="+mn-ea"/>
+        <a:cs typeface="+mn-cs"/>
+      </a:defRPr>
+    </a:lvl5pPr>
+    <a:lvl6pPr marL="2286000" algn="l" defTabSz="914400" rtl="0" eaLnBrk="1" latinLnBrk="0" hangingPunct="1">
+      <a:defRPr sz="1200" kern="1200">
+        <a:solidFill>
+          <a:schemeClr val="tx1"/>
+        </a:solidFill>
+        <a:latin typeface="+mn-lt"/>
+        <a:ea typeface="+mn-ea"/>
+        <a:cs typeface="+mn-cs"/>
+      </a:defRPr>
+    </a:lvl6pPr>
+    <a:lvl7pPr marL="2743200" algn="l" defTabSz="914400" rtl="0" eaLnBrk="1" latinLnBrk="0" hangingPunct="1">
+      <a:defRPr sz="1200" kern="1200">
+        <a:solidFill>
+          <a:schemeClr val="tx1"/>
+        </a:solidFill>
+        <a:latin typeface="+mn-lt"/>
+        <a:ea typeface="+mn-ea"/>
+        <a:cs typeface="+mn-cs"/>
+      </a:defRPr>
+    </a:lvl7pPr>
+    <a:lvl8pPr marL="3200400" algn="l" defTabSz="914400" rtl="0" eaLnBrk="1" latinLnBrk="0" hangingPunct="1">
+      <a:defRPr sz="1200" kern="1200">
+        <a:solidFill>
+          <a:schemeClr val="tx1"/>
+        </a:solidFill>
+        <a:latin typeface="+mn-lt"/>
+        <a:ea typeface="+mn-ea"/>
+        <a:cs typeface="+mn-cs"/>
+      </a:defRPr>
+    </a:lvl8pPr>
+    <a:lvl9pPr marL="3657600" algn="l" defTabSz="914400" rtl="0" eaLnBrk="1" latinLnBrk="0" hangingPunct="1">
+      <a:defRPr sz="1200" kern="1200">
+        <a:solidFill>
+          <a:schemeClr val="tx1"/>
+        </a:solidFill>
+        <a:latin typeface="+mn-lt"/>
+        <a:ea typeface="+mn-ea"/>
+        <a:cs typeface="+mn-cs"/>
+      </a:defRPr>
+    </a:lvl9pPr>
+  </p:notesStyle>
+</p:notesMaster>
 </file>
 
 <file path=ppt/slideLayouts/slideLayout1.xml><?xml version="1.0" encoding="utf-8"?>
@@ -249,7 +604,7 @@
           <a:p>
             <a:fld id="{02CF1C66-B1B6-1643-A1E5-DA5B6E4004A0}" type="datetimeFigureOut">
               <a:rPr lang="en-US" smtClean="0"/>
-              <a:t>7/17/17</a:t>
+              <a:t>7/18/17</a:t>
             </a:fld>
             <a:endParaRPr lang="en-US"/>
           </a:p>
@@ -417,7 +772,7 @@
           <a:p>
             <a:fld id="{02CF1C66-B1B6-1643-A1E5-DA5B6E4004A0}" type="datetimeFigureOut">
               <a:rPr lang="en-US" smtClean="0"/>
-              <a:t>7/17/17</a:t>
+              <a:t>7/18/17</a:t>
             </a:fld>
             <a:endParaRPr lang="en-US"/>
           </a:p>
@@ -595,7 +950,7 @@
           <a:p>
             <a:fld id="{02CF1C66-B1B6-1643-A1E5-DA5B6E4004A0}" type="datetimeFigureOut">
               <a:rPr lang="en-US" smtClean="0"/>
-              <a:t>7/17/17</a:t>
+              <a:t>7/18/17</a:t>
             </a:fld>
             <a:endParaRPr lang="en-US"/>
           </a:p>
@@ -763,7 +1118,7 @@
           <a:p>
             <a:fld id="{02CF1C66-B1B6-1643-A1E5-DA5B6E4004A0}" type="datetimeFigureOut">
               <a:rPr lang="en-US" smtClean="0"/>
-              <a:t>7/17/17</a:t>
+              <a:t>7/18/17</a:t>
             </a:fld>
             <a:endParaRPr lang="en-US"/>
           </a:p>
@@ -1008,7 +1363,7 @@
           <a:p>
             <a:fld id="{02CF1C66-B1B6-1643-A1E5-DA5B6E4004A0}" type="datetimeFigureOut">
               <a:rPr lang="en-US" smtClean="0"/>
-              <a:t>7/17/17</a:t>
+              <a:t>7/18/17</a:t>
             </a:fld>
             <a:endParaRPr lang="en-US"/>
           </a:p>
@@ -1237,7 +1592,7 @@
           <a:p>
             <a:fld id="{02CF1C66-B1B6-1643-A1E5-DA5B6E4004A0}" type="datetimeFigureOut">
               <a:rPr lang="en-US" smtClean="0"/>
-              <a:t>7/17/17</a:t>
+              <a:t>7/18/17</a:t>
             </a:fld>
             <a:endParaRPr lang="en-US"/>
           </a:p>
@@ -1601,7 +1956,7 @@
           <a:p>
             <a:fld id="{02CF1C66-B1B6-1643-A1E5-DA5B6E4004A0}" type="datetimeFigureOut">
               <a:rPr lang="en-US" smtClean="0"/>
-              <a:t>7/17/17</a:t>
+              <a:t>7/18/17</a:t>
             </a:fld>
             <a:endParaRPr lang="en-US"/>
           </a:p>
@@ -1718,7 +2073,7 @@
           <a:p>
             <a:fld id="{02CF1C66-B1B6-1643-A1E5-DA5B6E4004A0}" type="datetimeFigureOut">
               <a:rPr lang="en-US" smtClean="0"/>
-              <a:t>7/17/17</a:t>
+              <a:t>7/18/17</a:t>
             </a:fld>
             <a:endParaRPr lang="en-US"/>
           </a:p>
@@ -1813,7 +2168,7 @@
           <a:p>
             <a:fld id="{02CF1C66-B1B6-1643-A1E5-DA5B6E4004A0}" type="datetimeFigureOut">
               <a:rPr lang="en-US" smtClean="0"/>
-              <a:t>7/17/17</a:t>
+              <a:t>7/18/17</a:t>
             </a:fld>
             <a:endParaRPr lang="en-US"/>
           </a:p>
@@ -2088,7 +2443,7 @@
           <a:p>
             <a:fld id="{02CF1C66-B1B6-1643-A1E5-DA5B6E4004A0}" type="datetimeFigureOut">
               <a:rPr lang="en-US" smtClean="0"/>
-              <a:t>7/17/17</a:t>
+              <a:t>7/18/17</a:t>
             </a:fld>
             <a:endParaRPr lang="en-US"/>
           </a:p>
@@ -2340,7 +2695,7 @@
           <a:p>
             <a:fld id="{02CF1C66-B1B6-1643-A1E5-DA5B6E4004A0}" type="datetimeFigureOut">
               <a:rPr lang="en-US" smtClean="0"/>
-              <a:t>7/17/17</a:t>
+              <a:t>7/18/17</a:t>
             </a:fld>
             <a:endParaRPr lang="en-US"/>
           </a:p>
@@ -2551,7 +2906,7 @@
           <a:p>
             <a:fld id="{02CF1C66-B1B6-1643-A1E5-DA5B6E4004A0}" type="datetimeFigureOut">
               <a:rPr lang="en-US" smtClean="0"/>
-              <a:t>7/17/17</a:t>
+              <a:t>7/18/17</a:t>
             </a:fld>
             <a:endParaRPr lang="en-US"/>
           </a:p>
@@ -8066,35 +8421,35 @@
                 <a:gridCol w="361780">
                   <a:extLst>
                     <a:ext uri="{9D8B030D-6E8A-4147-A177-3AD203B41FA5}">
-                      <a16:colId xmlns:a16="http://schemas.microsoft.com/office/drawing/2014/main" xmlns="" val="20000"/>
+                      <a16:colId xmlns="" xmlns:a16="http://schemas.microsoft.com/office/drawing/2014/main" val="20000"/>
                     </a:ext>
                   </a:extLst>
                 </a:gridCol>
                 <a:gridCol w="361780">
                   <a:extLst>
                     <a:ext uri="{9D8B030D-6E8A-4147-A177-3AD203B41FA5}">
-                      <a16:colId xmlns:a16="http://schemas.microsoft.com/office/drawing/2014/main" xmlns="" val="20001"/>
+                      <a16:colId xmlns="" xmlns:a16="http://schemas.microsoft.com/office/drawing/2014/main" val="20001"/>
                     </a:ext>
                   </a:extLst>
                 </a:gridCol>
                 <a:gridCol w="429406">
                   <a:extLst>
                     <a:ext uri="{9D8B030D-6E8A-4147-A177-3AD203B41FA5}">
-                      <a16:colId xmlns:a16="http://schemas.microsoft.com/office/drawing/2014/main" xmlns="" val="20002"/>
+                      <a16:colId xmlns="" xmlns:a16="http://schemas.microsoft.com/office/drawing/2014/main" val="20002"/>
                     </a:ext>
                   </a:extLst>
                 </a:gridCol>
                 <a:gridCol w="497721">
                   <a:extLst>
                     <a:ext uri="{9D8B030D-6E8A-4147-A177-3AD203B41FA5}">
-                      <a16:colId xmlns:a16="http://schemas.microsoft.com/office/drawing/2014/main" xmlns="" val="20003"/>
+                      <a16:colId xmlns="" xmlns:a16="http://schemas.microsoft.com/office/drawing/2014/main" val="20003"/>
                     </a:ext>
                   </a:extLst>
                 </a:gridCol>
                 <a:gridCol w="1717625">
                   <a:extLst>
                     <a:ext uri="{9D8B030D-6E8A-4147-A177-3AD203B41FA5}">
-                      <a16:colId xmlns:a16="http://schemas.microsoft.com/office/drawing/2014/main" xmlns="" val="20004"/>
+                      <a16:colId xmlns="" xmlns:a16="http://schemas.microsoft.com/office/drawing/2014/main" val="20004"/>
                     </a:ext>
                   </a:extLst>
                 </a:gridCol>
@@ -8327,7 +8682,7 @@
                 </a:tc>
                 <a:extLst>
                   <a:ext uri="{0D108BD9-81ED-4DB2-BD59-A6C34878D82A}">
-                    <a16:rowId xmlns:a16="http://schemas.microsoft.com/office/drawing/2014/main" xmlns="" val="10000"/>
+                    <a16:rowId xmlns="" xmlns:a16="http://schemas.microsoft.com/office/drawing/2014/main" val="10000"/>
                   </a:ext>
                 </a:extLst>
               </a:tr>
@@ -8622,7 +8977,7 @@
                 </a:tc>
                 <a:extLst>
                   <a:ext uri="{0D108BD9-81ED-4DB2-BD59-A6C34878D82A}">
-                    <a16:rowId xmlns:a16="http://schemas.microsoft.com/office/drawing/2014/main" xmlns="" val="10001"/>
+                    <a16:rowId xmlns="" xmlns:a16="http://schemas.microsoft.com/office/drawing/2014/main" val="10001"/>
                   </a:ext>
                 </a:extLst>
               </a:tr>
@@ -8900,7 +9255,7 @@
                 </a:tc>
                 <a:extLst>
                   <a:ext uri="{0D108BD9-81ED-4DB2-BD59-A6C34878D82A}">
-                    <a16:rowId xmlns:a16="http://schemas.microsoft.com/office/drawing/2014/main" xmlns="" val="10002"/>
+                    <a16:rowId xmlns="" xmlns:a16="http://schemas.microsoft.com/office/drawing/2014/main" val="10002"/>
                   </a:ext>
                 </a:extLst>
               </a:tr>
@@ -9181,7 +9536,7 @@
                 </a:tc>
                 <a:extLst>
                   <a:ext uri="{0D108BD9-81ED-4DB2-BD59-A6C34878D82A}">
-                    <a16:rowId xmlns:a16="http://schemas.microsoft.com/office/drawing/2014/main" xmlns="" val="10003"/>
+                    <a16:rowId xmlns="" xmlns:a16="http://schemas.microsoft.com/office/drawing/2014/main" val="10003"/>
                   </a:ext>
                 </a:extLst>
               </a:tr>
@@ -9462,7 +9817,7 @@
                 </a:tc>
                 <a:extLst>
                   <a:ext uri="{0D108BD9-81ED-4DB2-BD59-A6C34878D82A}">
-                    <a16:rowId xmlns:a16="http://schemas.microsoft.com/office/drawing/2014/main" xmlns="" val="10004"/>
+                    <a16:rowId xmlns="" xmlns:a16="http://schemas.microsoft.com/office/drawing/2014/main" val="10004"/>
                   </a:ext>
                 </a:extLst>
               </a:tr>
@@ -9743,7 +10098,7 @@
                 </a:tc>
                 <a:extLst>
                   <a:ext uri="{0D108BD9-81ED-4DB2-BD59-A6C34878D82A}">
-                    <a16:rowId xmlns:a16="http://schemas.microsoft.com/office/drawing/2014/main" xmlns="" val="10005"/>
+                    <a16:rowId xmlns="" xmlns:a16="http://schemas.microsoft.com/office/drawing/2014/main" val="10005"/>
                   </a:ext>
                 </a:extLst>
               </a:tr>
@@ -10024,7 +10379,7 @@
                 </a:tc>
                 <a:extLst>
                   <a:ext uri="{0D108BD9-81ED-4DB2-BD59-A6C34878D82A}">
-                    <a16:rowId xmlns:a16="http://schemas.microsoft.com/office/drawing/2014/main" xmlns="" val="10006"/>
+                    <a16:rowId xmlns="" xmlns:a16="http://schemas.microsoft.com/office/drawing/2014/main" val="10006"/>
                   </a:ext>
                 </a:extLst>
               </a:tr>
@@ -10417,35 +10772,35 @@
                 <a:gridCol w="361780">
                   <a:extLst>
                     <a:ext uri="{9D8B030D-6E8A-4147-A177-3AD203B41FA5}">
-                      <a16:colId xmlns:a16="http://schemas.microsoft.com/office/drawing/2014/main" xmlns="" val="20000"/>
+                      <a16:colId xmlns="" xmlns:a16="http://schemas.microsoft.com/office/drawing/2014/main" val="20000"/>
                     </a:ext>
                   </a:extLst>
                 </a:gridCol>
                 <a:gridCol w="361780">
                   <a:extLst>
                     <a:ext uri="{9D8B030D-6E8A-4147-A177-3AD203B41FA5}">
-                      <a16:colId xmlns:a16="http://schemas.microsoft.com/office/drawing/2014/main" xmlns="" val="20001"/>
+                      <a16:colId xmlns="" xmlns:a16="http://schemas.microsoft.com/office/drawing/2014/main" val="20001"/>
                     </a:ext>
                   </a:extLst>
                 </a:gridCol>
                 <a:gridCol w="429406">
                   <a:extLst>
                     <a:ext uri="{9D8B030D-6E8A-4147-A177-3AD203B41FA5}">
-                      <a16:colId xmlns:a16="http://schemas.microsoft.com/office/drawing/2014/main" xmlns="" val="20002"/>
+                      <a16:colId xmlns="" xmlns:a16="http://schemas.microsoft.com/office/drawing/2014/main" val="20002"/>
                     </a:ext>
                   </a:extLst>
                 </a:gridCol>
                 <a:gridCol w="497721">
                   <a:extLst>
                     <a:ext uri="{9D8B030D-6E8A-4147-A177-3AD203B41FA5}">
-                      <a16:colId xmlns:a16="http://schemas.microsoft.com/office/drawing/2014/main" xmlns="" val="20003"/>
+                      <a16:colId xmlns="" xmlns:a16="http://schemas.microsoft.com/office/drawing/2014/main" val="20003"/>
                     </a:ext>
                   </a:extLst>
                 </a:gridCol>
                 <a:gridCol w="1717625">
                   <a:extLst>
                     <a:ext uri="{9D8B030D-6E8A-4147-A177-3AD203B41FA5}">
-                      <a16:colId xmlns:a16="http://schemas.microsoft.com/office/drawing/2014/main" xmlns="" val="20004"/>
+                      <a16:colId xmlns="" xmlns:a16="http://schemas.microsoft.com/office/drawing/2014/main" val="20004"/>
                     </a:ext>
                   </a:extLst>
                 </a:gridCol>
@@ -10678,7 +11033,7 @@
                 </a:tc>
                 <a:extLst>
                   <a:ext uri="{0D108BD9-81ED-4DB2-BD59-A6C34878D82A}">
-                    <a16:rowId xmlns:a16="http://schemas.microsoft.com/office/drawing/2014/main" xmlns="" val="10000"/>
+                    <a16:rowId xmlns="" xmlns:a16="http://schemas.microsoft.com/office/drawing/2014/main" val="10000"/>
                   </a:ext>
                 </a:extLst>
               </a:tr>
@@ -10973,7 +11328,7 @@
                 </a:tc>
                 <a:extLst>
                   <a:ext uri="{0D108BD9-81ED-4DB2-BD59-A6C34878D82A}">
-                    <a16:rowId xmlns:a16="http://schemas.microsoft.com/office/drawing/2014/main" xmlns="" val="10001"/>
+                    <a16:rowId xmlns="" xmlns:a16="http://schemas.microsoft.com/office/drawing/2014/main" val="10001"/>
                   </a:ext>
                 </a:extLst>
               </a:tr>
@@ -11251,7 +11606,7 @@
                 </a:tc>
                 <a:extLst>
                   <a:ext uri="{0D108BD9-81ED-4DB2-BD59-A6C34878D82A}">
-                    <a16:rowId xmlns:a16="http://schemas.microsoft.com/office/drawing/2014/main" xmlns="" val="10002"/>
+                    <a16:rowId xmlns="" xmlns:a16="http://schemas.microsoft.com/office/drawing/2014/main" val="10002"/>
                   </a:ext>
                 </a:extLst>
               </a:tr>
@@ -11532,7 +11887,7 @@
                 </a:tc>
                 <a:extLst>
                   <a:ext uri="{0D108BD9-81ED-4DB2-BD59-A6C34878D82A}">
-                    <a16:rowId xmlns:a16="http://schemas.microsoft.com/office/drawing/2014/main" xmlns="" val="10003"/>
+                    <a16:rowId xmlns="" xmlns:a16="http://schemas.microsoft.com/office/drawing/2014/main" val="10003"/>
                   </a:ext>
                 </a:extLst>
               </a:tr>
@@ -11813,7 +12168,7 @@
                 </a:tc>
                 <a:extLst>
                   <a:ext uri="{0D108BD9-81ED-4DB2-BD59-A6C34878D82A}">
-                    <a16:rowId xmlns:a16="http://schemas.microsoft.com/office/drawing/2014/main" xmlns="" val="10004"/>
+                    <a16:rowId xmlns="" xmlns:a16="http://schemas.microsoft.com/office/drawing/2014/main" val="10004"/>
                   </a:ext>
                 </a:extLst>
               </a:tr>
@@ -12094,7 +12449,7 @@
                 </a:tc>
                 <a:extLst>
                   <a:ext uri="{0D108BD9-81ED-4DB2-BD59-A6C34878D82A}">
-                    <a16:rowId xmlns:a16="http://schemas.microsoft.com/office/drawing/2014/main" xmlns="" val="10005"/>
+                    <a16:rowId xmlns="" xmlns:a16="http://schemas.microsoft.com/office/drawing/2014/main" val="10005"/>
                   </a:ext>
                 </a:extLst>
               </a:tr>
@@ -12375,7 +12730,7 @@
                 </a:tc>
                 <a:extLst>
                   <a:ext uri="{0D108BD9-81ED-4DB2-BD59-A6C34878D82A}">
-                    <a16:rowId xmlns:a16="http://schemas.microsoft.com/office/drawing/2014/main" xmlns="" val="10006"/>
+                    <a16:rowId xmlns="" xmlns:a16="http://schemas.microsoft.com/office/drawing/2014/main" val="10006"/>
                   </a:ext>
                 </a:extLst>
               </a:tr>
@@ -12731,10 +13086,1136 @@
       </p:grpSpPr>
       <p:grpSp>
         <p:nvGrpSpPr>
+          <p:cNvPr id="8" name="Group 7"/>
+          <p:cNvGrpSpPr/>
+          <p:nvPr/>
+        </p:nvGrpSpPr>
+        <p:grpSpPr>
+          <a:xfrm>
+            <a:off x="357080" y="220063"/>
+            <a:ext cx="11127957" cy="3802801"/>
+            <a:chOff x="357080" y="220063"/>
+            <a:chExt cx="11127957" cy="3802801"/>
+          </a:xfrm>
+        </p:grpSpPr>
+        <p:sp>
+          <p:nvSpPr>
+            <p:cNvPr id="2" name="TextBox 1"/>
+            <p:cNvSpPr txBox="1"/>
+            <p:nvPr/>
+          </p:nvSpPr>
+          <p:spPr>
+            <a:xfrm>
+              <a:off x="4849212" y="1376780"/>
+              <a:ext cx="513281" cy="2246769"/>
+            </a:xfrm>
+            <a:prstGeom prst="rect">
+              <a:avLst/>
+            </a:prstGeom>
+            <a:noFill/>
+            <a:ln>
+              <a:solidFill>
+                <a:schemeClr val="tx1"/>
+              </a:solidFill>
+            </a:ln>
+          </p:spPr>
+          <p:txBody>
+            <a:bodyPr wrap="none" rtlCol="0">
+              <a:spAutoFit/>
+            </a:bodyPr>
+            <a:lstStyle/>
+            <a:p>
+              <a:pPr algn="ctr"/>
+              <a:r>
+                <a:rPr lang="en-US" sz="1000" b="1" u="sng" dirty="0"/>
+                <a:t>PORT</a:t>
+              </a:r>
+            </a:p>
+            <a:p>
+              <a:pPr algn="ctr"/>
+              <a:r>
+                <a:rPr lang="en-US" sz="1000" dirty="0"/>
+                <a:t>0</a:t>
+              </a:r>
+            </a:p>
+            <a:p>
+              <a:pPr algn="ctr"/>
+              <a:r>
+                <a:rPr lang="en-US" sz="1000" dirty="0"/>
+                <a:t>1</a:t>
+              </a:r>
+            </a:p>
+            <a:p>
+              <a:pPr algn="ctr"/>
+              <a:r>
+                <a:rPr lang="en-US" sz="1000" dirty="0"/>
+                <a:t>2</a:t>
+              </a:r>
+            </a:p>
+            <a:p>
+              <a:pPr algn="ctr"/>
+              <a:r>
+                <a:rPr lang="en-US" sz="1000" dirty="0"/>
+                <a:t>.</a:t>
+              </a:r>
+            </a:p>
+            <a:p>
+              <a:pPr algn="ctr"/>
+              <a:r>
+                <a:rPr lang="en-US" sz="1000" dirty="0"/>
+                <a:t>.</a:t>
+              </a:r>
+            </a:p>
+            <a:p>
+              <a:pPr algn="ctr"/>
+              <a:r>
+                <a:rPr lang="en-US" sz="1000" dirty="0"/>
+                <a:t>.</a:t>
+              </a:r>
+            </a:p>
+            <a:p>
+              <a:pPr algn="ctr"/>
+              <a:r>
+                <a:rPr lang="en-US" sz="1000" dirty="0"/>
+                <a:t>27708</a:t>
+              </a:r>
+            </a:p>
+            <a:p>
+              <a:pPr algn="ctr"/>
+              <a:r>
+                <a:rPr lang="en-US" sz="1000" dirty="0"/>
+                <a:t>.</a:t>
+              </a:r>
+            </a:p>
+            <a:p>
+              <a:pPr algn="ctr"/>
+              <a:r>
+                <a:rPr lang="en-US" sz="1000" dirty="0"/>
+                <a:t>.</a:t>
+              </a:r>
+            </a:p>
+            <a:p>
+              <a:pPr algn="ctr"/>
+              <a:r>
+                <a:rPr lang="en-US" sz="1000" dirty="0"/>
+                <a:t>.</a:t>
+              </a:r>
+            </a:p>
+            <a:p>
+              <a:pPr algn="ctr"/>
+              <a:r>
+                <a:rPr lang="en-US" sz="1000" dirty="0"/>
+                <a:t>.</a:t>
+              </a:r>
+            </a:p>
+            <a:p>
+              <a:pPr algn="ctr"/>
+              <a:r>
+                <a:rPr lang="en-US" sz="1000" dirty="0"/>
+                <a:t>.</a:t>
+              </a:r>
+            </a:p>
+            <a:p>
+              <a:pPr algn="ctr"/>
+              <a:r>
+                <a:rPr lang="en-US" sz="1000" dirty="0"/>
+                <a:t>65535</a:t>
+              </a:r>
+            </a:p>
+          </p:txBody>
+        </p:sp>
+        <p:sp>
+          <p:nvSpPr>
+            <p:cNvPr id="3" name="TextBox 2"/>
+            <p:cNvSpPr txBox="1"/>
+            <p:nvPr/>
+          </p:nvSpPr>
+          <p:spPr>
+            <a:xfrm>
+              <a:off x="6260568" y="1376780"/>
+              <a:ext cx="513281" cy="2246769"/>
+            </a:xfrm>
+            <a:prstGeom prst="rect">
+              <a:avLst/>
+            </a:prstGeom>
+            <a:noFill/>
+            <a:ln>
+              <a:solidFill>
+                <a:schemeClr val="tx1"/>
+              </a:solidFill>
+            </a:ln>
+          </p:spPr>
+          <p:txBody>
+            <a:bodyPr wrap="none" rtlCol="0">
+              <a:spAutoFit/>
+            </a:bodyPr>
+            <a:lstStyle/>
+            <a:p>
+              <a:pPr algn="ctr"/>
+              <a:r>
+                <a:rPr lang="en-US" sz="1000" b="1" u="sng" dirty="0"/>
+                <a:t>PORT</a:t>
+              </a:r>
+            </a:p>
+            <a:p>
+              <a:pPr algn="ctr"/>
+              <a:r>
+                <a:rPr lang="en-US" sz="1000" dirty="0"/>
+                <a:t>0</a:t>
+              </a:r>
+            </a:p>
+            <a:p>
+              <a:pPr algn="ctr"/>
+              <a:r>
+                <a:rPr lang="en-US" sz="1000" dirty="0"/>
+                <a:t>1</a:t>
+              </a:r>
+            </a:p>
+            <a:p>
+              <a:pPr algn="ctr"/>
+              <a:r>
+                <a:rPr lang="en-US" sz="1000" dirty="0"/>
+                <a:t>2</a:t>
+              </a:r>
+            </a:p>
+            <a:p>
+              <a:pPr algn="ctr"/>
+              <a:r>
+                <a:rPr lang="en-US" sz="1000" dirty="0"/>
+                <a:t>.</a:t>
+              </a:r>
+            </a:p>
+            <a:p>
+              <a:pPr algn="ctr"/>
+              <a:r>
+                <a:rPr lang="en-US" sz="1000" dirty="0"/>
+                <a:t>.</a:t>
+              </a:r>
+            </a:p>
+            <a:p>
+              <a:pPr algn="ctr"/>
+              <a:r>
+                <a:rPr lang="en-US" sz="1000" dirty="0"/>
+                <a:t>.</a:t>
+              </a:r>
+            </a:p>
+            <a:p>
+              <a:pPr algn="ctr"/>
+              <a:r>
+                <a:rPr lang="en-US" sz="1000" dirty="0"/>
+                <a:t>.</a:t>
+              </a:r>
+            </a:p>
+            <a:p>
+              <a:pPr algn="ctr"/>
+              <a:r>
+                <a:rPr lang="en-US" sz="1000" dirty="0"/>
+                <a:t>.</a:t>
+              </a:r>
+            </a:p>
+            <a:p>
+              <a:pPr algn="ctr"/>
+              <a:r>
+                <a:rPr lang="en-US" sz="1000" dirty="0"/>
+                <a:t>32783</a:t>
+              </a:r>
+            </a:p>
+            <a:p>
+              <a:pPr algn="ctr"/>
+              <a:r>
+                <a:rPr lang="en-US" sz="1000" dirty="0"/>
+                <a:t>.</a:t>
+              </a:r>
+            </a:p>
+            <a:p>
+              <a:pPr algn="ctr"/>
+              <a:r>
+                <a:rPr lang="en-US" sz="1000" dirty="0"/>
+                <a:t>.</a:t>
+              </a:r>
+            </a:p>
+            <a:p>
+              <a:pPr algn="ctr"/>
+              <a:r>
+                <a:rPr lang="en-US" sz="1000" dirty="0"/>
+                <a:t>.</a:t>
+              </a:r>
+            </a:p>
+            <a:p>
+              <a:pPr algn="ctr"/>
+              <a:r>
+                <a:rPr lang="en-US" sz="1000" dirty="0"/>
+                <a:t>65535</a:t>
+              </a:r>
+            </a:p>
+          </p:txBody>
+        </p:sp>
+        <p:sp>
+          <p:nvSpPr>
+            <p:cNvPr id="5" name="TextBox 4"/>
+            <p:cNvSpPr txBox="1"/>
+            <p:nvPr/>
+          </p:nvSpPr>
+          <p:spPr>
+            <a:xfrm>
+              <a:off x="357080" y="1376780"/>
+              <a:ext cx="2115968" cy="769441"/>
+            </a:xfrm>
+            <a:prstGeom prst="rect">
+              <a:avLst/>
+            </a:prstGeom>
+            <a:noFill/>
+            <a:ln>
+              <a:solidFill>
+                <a:schemeClr val="tx1"/>
+              </a:solidFill>
+            </a:ln>
+          </p:spPr>
+          <p:txBody>
+            <a:bodyPr wrap="square" lIns="45720" rIns="0" rtlCol="0">
+              <a:spAutoFit/>
+            </a:bodyPr>
+            <a:lstStyle/>
+            <a:p>
+              <a:pPr algn="ctr"/>
+              <a:r>
+                <a:rPr lang="en-US" sz="1400" b="1" u="sng" dirty="0"/>
+                <a:t>Application</a:t>
+              </a:r>
+              <a:endParaRPr lang="en-US" sz="1000" b="1" u="sng" dirty="0"/>
+            </a:p>
+            <a:p>
+              <a:pPr marL="12700" indent="-12700">
+                <a:buAutoNum type="arabicPeriod"/>
+              </a:pPr>
+              <a:r>
+                <a:rPr lang="en-US" sz="1000" dirty="0"/>
+                <a:t> Create Socket</a:t>
+              </a:r>
+            </a:p>
+            <a:p>
+              <a:pPr marL="12700" indent="-12700">
+                <a:buAutoNum type="arabicPeriod"/>
+              </a:pPr>
+              <a:r>
+                <a:rPr lang="en-US" sz="1000" dirty="0"/>
+                <a:t> Listen(local port #, interface)</a:t>
+              </a:r>
+            </a:p>
+            <a:p>
+              <a:pPr marL="12700" indent="-12700">
+                <a:buAutoNum type="arabicPeriod"/>
+              </a:pPr>
+              <a:r>
+                <a:rPr lang="en-US" sz="1000" dirty="0"/>
+                <a:t> Accept Connections</a:t>
+              </a:r>
+            </a:p>
+          </p:txBody>
+        </p:sp>
+        <p:sp>
+          <p:nvSpPr>
+            <p:cNvPr id="4" name="TextBox 3"/>
+            <p:cNvSpPr txBox="1"/>
+            <p:nvPr/>
+          </p:nvSpPr>
+          <p:spPr>
+            <a:xfrm>
+              <a:off x="2881141" y="1376780"/>
+              <a:ext cx="1478090" cy="1323439"/>
+            </a:xfrm>
+            <a:prstGeom prst="rect">
+              <a:avLst/>
+            </a:prstGeom>
+            <a:noFill/>
+            <a:ln>
+              <a:solidFill>
+                <a:schemeClr val="tx1"/>
+              </a:solidFill>
+            </a:ln>
+          </p:spPr>
+          <p:txBody>
+            <a:bodyPr wrap="square" rtlCol="0">
+              <a:spAutoFit/>
+            </a:bodyPr>
+            <a:lstStyle/>
+            <a:p>
+              <a:pPr algn="ctr"/>
+              <a:r>
+                <a:rPr lang="en-US" sz="1600" b="1" dirty="0"/>
+                <a:t>TCP/IP Stack</a:t>
+              </a:r>
+            </a:p>
+            <a:p>
+              <a:pPr algn="ctr"/>
+              <a:endParaRPr lang="en-US" sz="1200" dirty="0"/>
+            </a:p>
+            <a:p>
+              <a:pPr algn="ctr"/>
+              <a:endParaRPr lang="en-US" sz="1200" dirty="0"/>
+            </a:p>
+            <a:p>
+              <a:pPr algn="ctr"/>
+              <a:endParaRPr lang="en-US" sz="1200" dirty="0"/>
+            </a:p>
+            <a:p>
+              <a:pPr algn="ctr"/>
+              <a:endParaRPr lang="en-US" sz="1200" dirty="0"/>
+            </a:p>
+            <a:p>
+              <a:pPr algn="ctr"/>
+              <a:r>
+                <a:rPr lang="en-US" sz="1600" dirty="0"/>
+                <a:t>192.51.100.3</a:t>
+              </a:r>
+              <a:endParaRPr lang="en-US" sz="1200" dirty="0"/>
+            </a:p>
+          </p:txBody>
+        </p:sp>
+        <p:sp>
+          <p:nvSpPr>
+            <p:cNvPr id="6" name="TextBox 5"/>
+            <p:cNvSpPr txBox="1"/>
+            <p:nvPr/>
+          </p:nvSpPr>
+          <p:spPr>
+            <a:xfrm>
+              <a:off x="3262078" y="1976944"/>
+              <a:ext cx="731739" cy="338554"/>
+            </a:xfrm>
+            <a:prstGeom prst="rect">
+              <a:avLst/>
+            </a:prstGeom>
+            <a:noFill/>
+            <a:ln>
+              <a:solidFill>
+                <a:schemeClr val="tx1"/>
+              </a:solidFill>
+            </a:ln>
+          </p:spPr>
+          <p:txBody>
+            <a:bodyPr wrap="none" rtlCol="0">
+              <a:spAutoFit/>
+            </a:bodyPr>
+            <a:lstStyle/>
+            <a:p>
+              <a:r>
+                <a:rPr lang="en-US" sz="1600" dirty="0"/>
+                <a:t>Socket</a:t>
+              </a:r>
+            </a:p>
+          </p:txBody>
+        </p:sp>
+        <p:grpSp>
+          <p:nvGrpSpPr>
+            <p:cNvPr id="47" name="Group 46"/>
+            <p:cNvGrpSpPr/>
+            <p:nvPr/>
+          </p:nvGrpSpPr>
+          <p:grpSpPr>
+            <a:xfrm>
+              <a:off x="7332585" y="1376780"/>
+              <a:ext cx="1478090" cy="1323439"/>
+              <a:chOff x="7174643" y="861391"/>
+              <a:chExt cx="1478090" cy="1323439"/>
+            </a:xfrm>
+          </p:grpSpPr>
+          <p:sp>
+            <p:nvSpPr>
+              <p:cNvPr id="13" name="TextBox 12"/>
+              <p:cNvSpPr txBox="1"/>
+              <p:nvPr/>
+            </p:nvSpPr>
+            <p:spPr>
+              <a:xfrm>
+                <a:off x="7174643" y="861391"/>
+                <a:ext cx="1478090" cy="1323439"/>
+              </a:xfrm>
+              <a:prstGeom prst="rect">
+                <a:avLst/>
+              </a:prstGeom>
+              <a:noFill/>
+              <a:ln>
+                <a:solidFill>
+                  <a:schemeClr val="tx1"/>
+                </a:solidFill>
+              </a:ln>
+            </p:spPr>
+            <p:txBody>
+              <a:bodyPr wrap="square" rtlCol="0">
+                <a:spAutoFit/>
+              </a:bodyPr>
+              <a:lstStyle/>
+              <a:p>
+                <a:pPr algn="ctr"/>
+                <a:r>
+                  <a:rPr lang="en-US" sz="1600" b="1" dirty="0"/>
+                  <a:t>TCP/IP Stack</a:t>
+                </a:r>
+              </a:p>
+              <a:p>
+                <a:pPr algn="ctr"/>
+                <a:endParaRPr lang="en-US" sz="1200" dirty="0"/>
+              </a:p>
+              <a:p>
+                <a:pPr algn="ctr"/>
+                <a:endParaRPr lang="en-US" sz="1200" dirty="0"/>
+              </a:p>
+              <a:p>
+                <a:pPr algn="ctr"/>
+                <a:endParaRPr lang="en-US" sz="1200" dirty="0"/>
+              </a:p>
+              <a:p>
+                <a:pPr algn="ctr"/>
+                <a:endParaRPr lang="en-US" sz="1200" dirty="0"/>
+              </a:p>
+              <a:p>
+                <a:pPr algn="ctr"/>
+                <a:r>
+                  <a:rPr lang="en-US" sz="1600" dirty="0"/>
+                  <a:t>192.51.100.14</a:t>
+                </a:r>
+                <a:endParaRPr lang="en-US" sz="1200" dirty="0"/>
+              </a:p>
+            </p:txBody>
+          </p:sp>
+          <p:sp>
+            <p:nvSpPr>
+              <p:cNvPr id="14" name="TextBox 13"/>
+              <p:cNvSpPr txBox="1"/>
+              <p:nvPr/>
+            </p:nvSpPr>
+            <p:spPr>
+              <a:xfrm>
+                <a:off x="7555580" y="1461555"/>
+                <a:ext cx="731739" cy="338554"/>
+              </a:xfrm>
+              <a:prstGeom prst="rect">
+                <a:avLst/>
+              </a:prstGeom>
+              <a:noFill/>
+              <a:ln>
+                <a:solidFill>
+                  <a:schemeClr val="tx1"/>
+                </a:solidFill>
+              </a:ln>
+            </p:spPr>
+            <p:txBody>
+              <a:bodyPr wrap="none" rtlCol="0">
+                <a:spAutoFit/>
+              </a:bodyPr>
+              <a:lstStyle/>
+              <a:p>
+                <a:r>
+                  <a:rPr lang="en-US" sz="1600" dirty="0"/>
+                  <a:t>Socket</a:t>
+                </a:r>
+              </a:p>
+            </p:txBody>
+          </p:sp>
+        </p:grpSp>
+        <p:sp>
+          <p:nvSpPr>
+            <p:cNvPr id="15" name="TextBox 14"/>
+            <p:cNvSpPr txBox="1"/>
+            <p:nvPr/>
+          </p:nvSpPr>
+          <p:spPr>
+            <a:xfrm>
+              <a:off x="9369069" y="1376780"/>
+              <a:ext cx="2115968" cy="769441"/>
+            </a:xfrm>
+            <a:prstGeom prst="rect">
+              <a:avLst/>
+            </a:prstGeom>
+            <a:noFill/>
+            <a:ln>
+              <a:solidFill>
+                <a:schemeClr val="tx1"/>
+              </a:solidFill>
+            </a:ln>
+          </p:spPr>
+          <p:txBody>
+            <a:bodyPr wrap="square" rtlCol="0">
+              <a:spAutoFit/>
+            </a:bodyPr>
+            <a:lstStyle/>
+            <a:p>
+              <a:pPr algn="ctr"/>
+              <a:r>
+                <a:rPr lang="en-US" sz="1400" b="1" u="sng" dirty="0"/>
+                <a:t>Application</a:t>
+              </a:r>
+              <a:endParaRPr lang="en-US" sz="1000" b="1" u="sng" dirty="0"/>
+            </a:p>
+            <a:p>
+              <a:r>
+                <a:rPr lang="en-US" sz="1000" dirty="0"/>
+                <a:t>A. Create Socket</a:t>
+              </a:r>
+            </a:p>
+            <a:p>
+              <a:r>
+                <a:rPr lang="en-US" sz="1000" dirty="0"/>
+                <a:t>B. Bind(</a:t>
+              </a:r>
+              <a:r>
+                <a:rPr lang="en-US" sz="1000" dirty="0" err="1"/>
+                <a:t>WICED_ANY_PORT,interface</a:t>
+              </a:r>
+              <a:r>
+                <a:rPr lang="en-US" sz="1000" dirty="0"/>
+                <a:t>)</a:t>
+              </a:r>
+            </a:p>
+            <a:p>
+              <a:r>
+                <a:rPr lang="en-US" sz="1000" dirty="0"/>
+                <a:t>C. Connect(Server </a:t>
+              </a:r>
+              <a:r>
+                <a:rPr lang="en-US" sz="1000" dirty="0" err="1"/>
+                <a:t>IP,Remote</a:t>
+              </a:r>
+              <a:r>
+                <a:rPr lang="en-US" sz="1000" dirty="0"/>
+                <a:t> Port)</a:t>
+              </a:r>
+            </a:p>
+          </p:txBody>
+        </p:sp>
+        <p:cxnSp>
+          <p:nvCxnSpPr>
+            <p:cNvPr id="17" name="Straight Connector 16"/>
+            <p:cNvCxnSpPr/>
+            <p:nvPr/>
+          </p:nvCxnSpPr>
+          <p:spPr>
+            <a:xfrm flipH="1" flipV="1">
+              <a:off x="5362493" y="2577109"/>
+              <a:ext cx="898075" cy="369331"/>
+            </a:xfrm>
+            <a:prstGeom prst="line">
+              <a:avLst/>
+            </a:prstGeom>
+            <a:ln w="12700">
+              <a:solidFill>
+                <a:schemeClr val="tx1"/>
+              </a:solidFill>
+            </a:ln>
+          </p:spPr>
+          <p:style>
+            <a:lnRef idx="1">
+              <a:schemeClr val="accent1"/>
+            </a:lnRef>
+            <a:fillRef idx="0">
+              <a:schemeClr val="accent1"/>
+            </a:fillRef>
+            <a:effectRef idx="0">
+              <a:schemeClr val="accent1"/>
+            </a:effectRef>
+            <a:fontRef idx="minor">
+              <a:schemeClr val="tx1"/>
+            </a:fontRef>
+          </p:style>
+        </p:cxnSp>
+        <p:cxnSp>
+          <p:nvCxnSpPr>
+            <p:cNvPr id="18" name="Straight Connector 17"/>
+            <p:cNvCxnSpPr>
+              <a:stCxn id="2" idx="1"/>
+            </p:cNvCxnSpPr>
+            <p:nvPr/>
+          </p:nvCxnSpPr>
+          <p:spPr>
+            <a:xfrm flipH="1" flipV="1">
+              <a:off x="3993818" y="2146222"/>
+              <a:ext cx="855394" cy="353943"/>
+            </a:xfrm>
+            <a:prstGeom prst="line">
+              <a:avLst/>
+            </a:prstGeom>
+            <a:ln w="12700">
+              <a:solidFill>
+                <a:schemeClr val="tx1"/>
+              </a:solidFill>
+            </a:ln>
+          </p:spPr>
+          <p:style>
+            <a:lnRef idx="1">
+              <a:schemeClr val="accent1"/>
+            </a:lnRef>
+            <a:fillRef idx="0">
+              <a:schemeClr val="accent1"/>
+            </a:fillRef>
+            <a:effectRef idx="0">
+              <a:schemeClr val="accent1"/>
+            </a:effectRef>
+            <a:fontRef idx="minor">
+              <a:schemeClr val="tx1"/>
+            </a:fontRef>
+          </p:style>
+        </p:cxnSp>
+        <p:cxnSp>
+          <p:nvCxnSpPr>
+            <p:cNvPr id="20" name="Straight Connector 19"/>
+            <p:cNvCxnSpPr/>
+            <p:nvPr/>
+          </p:nvCxnSpPr>
+          <p:spPr>
+            <a:xfrm flipH="1" flipV="1">
+              <a:off x="2468967" y="1984639"/>
+              <a:ext cx="793110" cy="161582"/>
+            </a:xfrm>
+            <a:prstGeom prst="line">
+              <a:avLst/>
+            </a:prstGeom>
+            <a:ln w="12700">
+              <a:solidFill>
+                <a:schemeClr val="tx1"/>
+              </a:solidFill>
+            </a:ln>
+          </p:spPr>
+          <p:style>
+            <a:lnRef idx="1">
+              <a:schemeClr val="accent1"/>
+            </a:lnRef>
+            <a:fillRef idx="0">
+              <a:schemeClr val="accent1"/>
+            </a:fillRef>
+            <a:effectRef idx="0">
+              <a:schemeClr val="accent1"/>
+            </a:effectRef>
+            <a:fontRef idx="minor">
+              <a:schemeClr val="tx1"/>
+            </a:fontRef>
+          </p:style>
+        </p:cxnSp>
+        <p:cxnSp>
+          <p:nvCxnSpPr>
+            <p:cNvPr id="22" name="Straight Connector 21"/>
+            <p:cNvCxnSpPr/>
+            <p:nvPr/>
+          </p:nvCxnSpPr>
+          <p:spPr>
+            <a:xfrm flipH="1">
+              <a:off x="6790876" y="2146221"/>
+              <a:ext cx="922646" cy="757900"/>
+            </a:xfrm>
+            <a:prstGeom prst="line">
+              <a:avLst/>
+            </a:prstGeom>
+            <a:ln w="12700">
+              <a:solidFill>
+                <a:schemeClr val="tx1"/>
+              </a:solidFill>
+            </a:ln>
+          </p:spPr>
+          <p:style>
+            <a:lnRef idx="1">
+              <a:schemeClr val="accent1"/>
+            </a:lnRef>
+            <a:fillRef idx="0">
+              <a:schemeClr val="accent1"/>
+            </a:fillRef>
+            <a:effectRef idx="0">
+              <a:schemeClr val="accent1"/>
+            </a:effectRef>
+            <a:fontRef idx="minor">
+              <a:schemeClr val="tx1"/>
+            </a:fontRef>
+          </p:style>
+        </p:cxnSp>
+        <p:cxnSp>
+          <p:nvCxnSpPr>
+            <p:cNvPr id="24" name="Straight Connector 23"/>
+            <p:cNvCxnSpPr>
+              <a:stCxn id="15" idx="1"/>
+            </p:cNvCxnSpPr>
+            <p:nvPr/>
+          </p:nvCxnSpPr>
+          <p:spPr>
+            <a:xfrm flipH="1">
+              <a:off x="8445261" y="1761501"/>
+              <a:ext cx="923808" cy="403601"/>
+            </a:xfrm>
+            <a:prstGeom prst="line">
+              <a:avLst/>
+            </a:prstGeom>
+            <a:ln w="12700">
+              <a:solidFill>
+                <a:schemeClr val="tx1"/>
+              </a:solidFill>
+            </a:ln>
+          </p:spPr>
+          <p:style>
+            <a:lnRef idx="1">
+              <a:schemeClr val="accent1"/>
+            </a:lnRef>
+            <a:fillRef idx="0">
+              <a:schemeClr val="accent1"/>
+            </a:fillRef>
+            <a:effectRef idx="0">
+              <a:schemeClr val="accent1"/>
+            </a:effectRef>
+            <a:fontRef idx="minor">
+              <a:schemeClr val="tx1"/>
+            </a:fontRef>
+          </p:style>
+        </p:cxnSp>
+        <p:sp>
+          <p:nvSpPr>
+            <p:cNvPr id="27" name="Rectangle 26"/>
+            <p:cNvSpPr/>
+            <p:nvPr/>
+          </p:nvSpPr>
+          <p:spPr>
+            <a:xfrm>
+              <a:off x="7642068" y="1774139"/>
+              <a:ext cx="261610" cy="246221"/>
+            </a:xfrm>
+            <a:prstGeom prst="rect">
+              <a:avLst/>
+            </a:prstGeom>
+          </p:spPr>
+          <p:txBody>
+            <a:bodyPr wrap="none">
+              <a:spAutoFit/>
+            </a:bodyPr>
+            <a:lstStyle/>
+            <a:p>
+              <a:r>
+                <a:rPr lang="en-US" sz="1000" b="1" dirty="0">
+                  <a:solidFill>
+                    <a:srgbClr val="FF0000"/>
+                  </a:solidFill>
+                </a:rPr>
+                <a:t>A</a:t>
+              </a:r>
+            </a:p>
+          </p:txBody>
+        </p:sp>
+        <p:sp>
+          <p:nvSpPr>
+            <p:cNvPr id="28" name="Rectangle 27"/>
+            <p:cNvSpPr/>
+            <p:nvPr/>
+          </p:nvSpPr>
+          <p:spPr>
+            <a:xfrm>
+              <a:off x="6999708" y="2363405"/>
+              <a:ext cx="294707" cy="246221"/>
+            </a:xfrm>
+            <a:prstGeom prst="rect">
+              <a:avLst/>
+            </a:prstGeom>
+          </p:spPr>
+          <p:txBody>
+            <a:bodyPr wrap="square">
+              <a:spAutoFit/>
+            </a:bodyPr>
+            <a:lstStyle/>
+            <a:p>
+              <a:r>
+                <a:rPr lang="en-US" sz="1000" b="1" dirty="0">
+                  <a:solidFill>
+                    <a:srgbClr val="FF0000"/>
+                  </a:solidFill>
+                </a:rPr>
+                <a:t>B</a:t>
+              </a:r>
+            </a:p>
+          </p:txBody>
+        </p:sp>
+        <p:sp>
+          <p:nvSpPr>
+            <p:cNvPr id="29" name="Rectangle 28"/>
+            <p:cNvSpPr/>
+            <p:nvPr/>
+          </p:nvSpPr>
+          <p:spPr>
+            <a:xfrm>
+              <a:off x="5851252" y="2582051"/>
+              <a:ext cx="294707" cy="246221"/>
+            </a:xfrm>
+            <a:prstGeom prst="rect">
+              <a:avLst/>
+            </a:prstGeom>
+          </p:spPr>
+          <p:txBody>
+            <a:bodyPr wrap="square">
+              <a:spAutoFit/>
+            </a:bodyPr>
+            <a:lstStyle/>
+            <a:p>
+              <a:r>
+                <a:rPr lang="en-US" sz="1000" b="1" dirty="0">
+                  <a:solidFill>
+                    <a:srgbClr val="FF0000"/>
+                  </a:solidFill>
+                </a:rPr>
+                <a:t>C</a:t>
+              </a:r>
+            </a:p>
+          </p:txBody>
+        </p:sp>
+        <p:sp>
+          <p:nvSpPr>
+            <p:cNvPr id="30" name="Rectangle 29"/>
+            <p:cNvSpPr/>
+            <p:nvPr/>
+          </p:nvSpPr>
+          <p:spPr>
+            <a:xfrm>
+              <a:off x="3187839" y="1773752"/>
+              <a:ext cx="294707" cy="246221"/>
+            </a:xfrm>
+            <a:prstGeom prst="rect">
+              <a:avLst/>
+            </a:prstGeom>
+          </p:spPr>
+          <p:txBody>
+            <a:bodyPr wrap="square">
+              <a:spAutoFit/>
+            </a:bodyPr>
+            <a:lstStyle/>
+            <a:p>
+              <a:r>
+                <a:rPr lang="en-US" sz="1000" b="1" dirty="0">
+                  <a:solidFill>
+                    <a:srgbClr val="FF0000"/>
+                  </a:solidFill>
+                </a:rPr>
+                <a:t>1</a:t>
+              </a:r>
+            </a:p>
+          </p:txBody>
+        </p:sp>
+        <p:sp>
+          <p:nvSpPr>
+            <p:cNvPr id="31" name="Rectangle 30"/>
+            <p:cNvSpPr/>
+            <p:nvPr/>
+          </p:nvSpPr>
+          <p:spPr>
+            <a:xfrm>
+              <a:off x="4495374" y="2154656"/>
+              <a:ext cx="294707" cy="246221"/>
+            </a:xfrm>
+            <a:prstGeom prst="rect">
+              <a:avLst/>
+            </a:prstGeom>
+          </p:spPr>
+          <p:txBody>
+            <a:bodyPr wrap="square">
+              <a:spAutoFit/>
+            </a:bodyPr>
+            <a:lstStyle/>
+            <a:p>
+              <a:r>
+                <a:rPr lang="en-US" sz="1000" b="1" dirty="0">
+                  <a:solidFill>
+                    <a:srgbClr val="FF0000"/>
+                  </a:solidFill>
+                </a:rPr>
+                <a:t>2</a:t>
+              </a:r>
+            </a:p>
+          </p:txBody>
+        </p:sp>
+        <p:sp>
+          <p:nvSpPr>
+            <p:cNvPr id="33" name="Rectangle 32"/>
+            <p:cNvSpPr/>
+            <p:nvPr/>
+          </p:nvSpPr>
+          <p:spPr>
+            <a:xfrm>
+              <a:off x="2525081" y="1806148"/>
+              <a:ext cx="294707" cy="246221"/>
+            </a:xfrm>
+            <a:prstGeom prst="rect">
+              <a:avLst/>
+            </a:prstGeom>
+          </p:spPr>
+          <p:txBody>
+            <a:bodyPr wrap="square">
+              <a:spAutoFit/>
+            </a:bodyPr>
+            <a:lstStyle/>
+            <a:p>
+              <a:r>
+                <a:rPr lang="en-US" sz="1000" b="1" dirty="0">
+                  <a:solidFill>
+                    <a:srgbClr val="FF0000"/>
+                  </a:solidFill>
+                </a:rPr>
+                <a:t>3</a:t>
+              </a:r>
+            </a:p>
+          </p:txBody>
+        </p:sp>
+        <p:sp>
+          <p:nvSpPr>
+            <p:cNvPr id="34" name="TextBox 33"/>
+            <p:cNvSpPr txBox="1"/>
+            <p:nvPr/>
+          </p:nvSpPr>
+          <p:spPr>
+            <a:xfrm>
+              <a:off x="2070723" y="788867"/>
+              <a:ext cx="1221203" cy="369332"/>
+            </a:xfrm>
+            <a:prstGeom prst="rect">
+              <a:avLst/>
+            </a:prstGeom>
+            <a:noFill/>
+          </p:spPr>
+          <p:txBody>
+            <a:bodyPr wrap="square" rtlCol="0">
+              <a:spAutoFit/>
+            </a:bodyPr>
+            <a:lstStyle/>
+            <a:p>
+              <a:r>
+                <a:rPr lang="en-US" u="sng" dirty="0"/>
+                <a:t>TCP Server</a:t>
+              </a:r>
+            </a:p>
+          </p:txBody>
+        </p:sp>
+        <p:sp>
+          <p:nvSpPr>
+            <p:cNvPr id="35" name="TextBox 34"/>
+            <p:cNvSpPr txBox="1"/>
+            <p:nvPr/>
+          </p:nvSpPr>
+          <p:spPr>
+            <a:xfrm>
+              <a:off x="8493882" y="822782"/>
+              <a:ext cx="1182134" cy="369332"/>
+            </a:xfrm>
+            <a:prstGeom prst="rect">
+              <a:avLst/>
+            </a:prstGeom>
+            <a:noFill/>
+          </p:spPr>
+          <p:txBody>
+            <a:bodyPr wrap="square" rtlCol="0">
+              <a:spAutoFit/>
+            </a:bodyPr>
+            <a:lstStyle/>
+            <a:p>
+              <a:r>
+                <a:rPr lang="en-US" u="sng" dirty="0"/>
+                <a:t>TCP Client</a:t>
+              </a:r>
+            </a:p>
+          </p:txBody>
+        </p:sp>
+        <p:cxnSp>
+          <p:nvCxnSpPr>
+            <p:cNvPr id="36" name="Straight Connector 35"/>
+            <p:cNvCxnSpPr/>
+            <p:nvPr/>
+          </p:nvCxnSpPr>
+          <p:spPr>
+            <a:xfrm flipV="1">
+              <a:off x="5787614" y="801994"/>
+              <a:ext cx="17040" cy="3220870"/>
+            </a:xfrm>
+            <a:prstGeom prst="line">
+              <a:avLst/>
+            </a:prstGeom>
+            <a:ln w="25400">
+              <a:solidFill>
+                <a:schemeClr val="tx1"/>
+              </a:solidFill>
+              <a:prstDash val="sysDash"/>
+            </a:ln>
+          </p:spPr>
+          <p:style>
+            <a:lnRef idx="1">
+              <a:schemeClr val="accent1"/>
+            </a:lnRef>
+            <a:fillRef idx="0">
+              <a:schemeClr val="accent1"/>
+            </a:fillRef>
+            <a:effectRef idx="0">
+              <a:schemeClr val="accent1"/>
+            </a:effectRef>
+            <a:fontRef idx="minor">
+              <a:schemeClr val="tx1"/>
+            </a:fontRef>
+          </p:style>
+        </p:cxnSp>
+        <p:sp>
+          <p:nvSpPr>
+            <p:cNvPr id="49" name="TextBox 48"/>
+            <p:cNvSpPr txBox="1"/>
+            <p:nvPr/>
+          </p:nvSpPr>
+          <p:spPr>
+            <a:xfrm>
+              <a:off x="4823728" y="220063"/>
+              <a:ext cx="1927772" cy="369332"/>
+            </a:xfrm>
+            <a:prstGeom prst="rect">
+              <a:avLst/>
+            </a:prstGeom>
+            <a:noFill/>
+          </p:spPr>
+          <p:txBody>
+            <a:bodyPr wrap="none" rtlCol="0">
+              <a:spAutoFit/>
+            </a:bodyPr>
+            <a:lstStyle/>
+            <a:p>
+              <a:r>
+                <a:rPr lang="en-US" u="sng"/>
+                <a:t>Create Connection</a:t>
+              </a:r>
+              <a:endParaRPr lang="en-US" u="sng" dirty="0"/>
+            </a:p>
+          </p:txBody>
+        </p:sp>
+      </p:grpSp>
+    </p:spTree>
+    <p:extLst>
+      <p:ext uri="{BB962C8B-B14F-4D97-AF65-F5344CB8AC3E}">
+        <p14:creationId xmlns:p14="http://schemas.microsoft.com/office/powerpoint/2010/main" val="49083631"/>
+      </p:ext>
+    </p:extLst>
+  </p:cSld>
+  <p:clrMapOvr>
+    <a:masterClrMapping/>
+  </p:clrMapOvr>
+</p:sld>
+</file>
+
+<file path=ppt/slides/slide4.xml><?xml version="1.0" encoding="utf-8"?>
+<p:sld xmlns:a="http://schemas.openxmlformats.org/drawingml/2006/main" xmlns:r="http://schemas.openxmlformats.org/officeDocument/2006/relationships" xmlns:p="http://schemas.openxmlformats.org/presentationml/2006/main">
+  <p:cSld>
+    <p:spTree>
+      <p:nvGrpSpPr>
+        <p:cNvPr id="1" name=""/>
+        <p:cNvGrpSpPr/>
+        <p:nvPr/>
+      </p:nvGrpSpPr>
+      <p:grpSpPr>
+        <a:xfrm>
+          <a:off x="0" y="0"/>
+          <a:ext cx="0" cy="0"/>
+          <a:chOff x="0" y="0"/>
+          <a:chExt cx="0" cy="0"/>
+        </a:xfrm>
+      </p:grpSpPr>
+      <p:grpSp>
+        <p:nvGrpSpPr>
           <p:cNvPr id="25" name="Group 24">
             <a:extLst>
               <a:ext uri="{FF2B5EF4-FFF2-40B4-BE49-F238E27FC236}">
-                <a16:creationId xmlns:a16="http://schemas.microsoft.com/office/drawing/2014/main" xmlns="" id="{3B2C51B9-EDD7-4240-B648-DD06A33A337B}"/>
+                <a16:creationId xmlns="" xmlns:a16="http://schemas.microsoft.com/office/drawing/2014/main" id="{3B2C51B9-EDD7-4240-B648-DD06A33A337B}"/>
               </a:ext>
             </a:extLst>
           </p:cNvPr>
@@ -13528,7 +15009,7 @@
             <p:cNvPr id="19" name="Oval 18">
               <a:extLst>
                 <a:ext uri="{FF2B5EF4-FFF2-40B4-BE49-F238E27FC236}">
-                  <a16:creationId xmlns:a16="http://schemas.microsoft.com/office/drawing/2014/main" xmlns="" id="{A104E178-9C80-4A33-A1B6-474FD8E9B6A5}"/>
+                  <a16:creationId xmlns="" xmlns:a16="http://schemas.microsoft.com/office/drawing/2014/main" id="{A104E178-9C80-4A33-A1B6-474FD8E9B6A5}"/>
                 </a:ext>
               </a:extLst>
             </p:cNvPr>
@@ -13581,7 +15062,7 @@
             <p:cNvPr id="41" name="Oval 40">
               <a:extLst>
                 <a:ext uri="{FF2B5EF4-FFF2-40B4-BE49-F238E27FC236}">
-                  <a16:creationId xmlns:a16="http://schemas.microsoft.com/office/drawing/2014/main" xmlns="" id="{92C24576-AA8C-4365-A2B7-C5B7C9D8A300}"/>
+                  <a16:creationId xmlns="" xmlns:a16="http://schemas.microsoft.com/office/drawing/2014/main" id="{92C24576-AA8C-4365-A2B7-C5B7C9D8A300}"/>
                 </a:ext>
               </a:extLst>
             </p:cNvPr>
@@ -13631,7 +15112,7 @@
             <p:cNvPr id="42" name="Straight Arrow Connector 41">
               <a:extLst>
                 <a:ext uri="{FF2B5EF4-FFF2-40B4-BE49-F238E27FC236}">
-                  <a16:creationId xmlns:a16="http://schemas.microsoft.com/office/drawing/2014/main" xmlns="" id="{C04B9279-B4F9-47E7-9E13-7A48FB835E60}"/>
+                  <a16:creationId xmlns="" xmlns:a16="http://schemas.microsoft.com/office/drawing/2014/main" id="{C04B9279-B4F9-47E7-9E13-7A48FB835E60}"/>
                 </a:ext>
               </a:extLst>
             </p:cNvPr>
@@ -13674,7 +15155,7 @@
             <p:cNvPr id="43" name="Oval 42">
               <a:extLst>
                 <a:ext uri="{FF2B5EF4-FFF2-40B4-BE49-F238E27FC236}">
-                  <a16:creationId xmlns:a16="http://schemas.microsoft.com/office/drawing/2014/main" xmlns="" id="{73949712-EC35-4B62-80BD-DB99766A6DDC}"/>
+                  <a16:creationId xmlns="" xmlns:a16="http://schemas.microsoft.com/office/drawing/2014/main" id="{73949712-EC35-4B62-80BD-DB99766A6DDC}"/>
                 </a:ext>
               </a:extLst>
             </p:cNvPr>
@@ -13723,7 +15204,7 @@
             <p:cNvPr id="44" name="Oval 43">
               <a:extLst>
                 <a:ext uri="{FF2B5EF4-FFF2-40B4-BE49-F238E27FC236}">
-                  <a16:creationId xmlns:a16="http://schemas.microsoft.com/office/drawing/2014/main" xmlns="" id="{ED91E7B2-95CF-446A-882A-D674C9A468AD}"/>
+                  <a16:creationId xmlns="" xmlns:a16="http://schemas.microsoft.com/office/drawing/2014/main" id="{ED91E7B2-95CF-446A-882A-D674C9A468AD}"/>
                 </a:ext>
               </a:extLst>
             </p:cNvPr>
@@ -13769,7 +15250,7 @@
             <p:cNvPr id="45" name="Straight Arrow Connector 44">
               <a:extLst>
                 <a:ext uri="{FF2B5EF4-FFF2-40B4-BE49-F238E27FC236}">
-                  <a16:creationId xmlns:a16="http://schemas.microsoft.com/office/drawing/2014/main" xmlns="" id="{7B2937D3-658E-461E-B536-44F292EA471D}"/>
+                  <a16:creationId xmlns="" xmlns:a16="http://schemas.microsoft.com/office/drawing/2014/main" id="{7B2937D3-658E-461E-B536-44F292EA471D}"/>
                 </a:ext>
               </a:extLst>
             </p:cNvPr>
@@ -13827,7 +15308,7 @@
 </p:sld>
 </file>
 
-<file path=ppt/slides/slide4.xml><?xml version="1.0" encoding="utf-8"?>
+<file path=ppt/slides/slide5.xml><?xml version="1.0" encoding="utf-8"?>
 <p:sld xmlns:a="http://schemas.openxmlformats.org/drawingml/2006/main" xmlns:r="http://schemas.openxmlformats.org/officeDocument/2006/relationships" xmlns:p="http://schemas.openxmlformats.org/presentationml/2006/main">
   <p:cSld>
     <p:spTree>
@@ -14375,7 +15856,7 @@
 </p:sld>
 </file>
 
-<file path=ppt/slides/slide5.xml><?xml version="1.0" encoding="utf-8"?>
+<file path=ppt/slides/slide6.xml><?xml version="1.0" encoding="utf-8"?>
 <p:sld xmlns:a="http://schemas.openxmlformats.org/drawingml/2006/main" xmlns:r="http://schemas.openxmlformats.org/officeDocument/2006/relationships" xmlns:p="http://schemas.openxmlformats.org/presentationml/2006/main">
   <p:cSld>
     <p:spTree>
@@ -14989,6 +16470,702 @@
 </p:sld>
 </file>
 
+<file path=ppt/slides/slide7.xml><?xml version="1.0" encoding="utf-8"?>
+<p:sld xmlns:a="http://schemas.openxmlformats.org/drawingml/2006/main" xmlns:r="http://schemas.openxmlformats.org/officeDocument/2006/relationships" xmlns:p="http://schemas.openxmlformats.org/presentationml/2006/main">
+  <p:cSld>
+    <p:spTree>
+      <p:nvGrpSpPr>
+        <p:cNvPr id="1" name=""/>
+        <p:cNvGrpSpPr/>
+        <p:nvPr/>
+      </p:nvGrpSpPr>
+      <p:grpSpPr>
+        <a:xfrm>
+          <a:off x="0" y="0"/>
+          <a:ext cx="0" cy="0"/>
+          <a:chOff x="0" y="0"/>
+          <a:chExt cx="0" cy="0"/>
+        </a:xfrm>
+      </p:grpSpPr>
+      <p:grpSp>
+        <p:nvGrpSpPr>
+          <p:cNvPr id="34" name="Group 33"/>
+          <p:cNvGrpSpPr/>
+          <p:nvPr/>
+        </p:nvGrpSpPr>
+        <p:grpSpPr>
+          <a:xfrm>
+            <a:off x="1634419" y="953146"/>
+            <a:ext cx="5799275" cy="4572000"/>
+            <a:chOff x="1634419" y="953146"/>
+            <a:chExt cx="5799275" cy="4572000"/>
+          </a:xfrm>
+        </p:grpSpPr>
+        <p:sp>
+          <p:nvSpPr>
+            <p:cNvPr id="3" name="TextBox 2"/>
+            <p:cNvSpPr txBox="1"/>
+            <p:nvPr/>
+          </p:nvSpPr>
+          <p:spPr>
+            <a:xfrm>
+              <a:off x="1639230" y="953146"/>
+              <a:ext cx="2286000" cy="4572000"/>
+            </a:xfrm>
+            <a:prstGeom prst="rect">
+              <a:avLst/>
+            </a:prstGeom>
+            <a:noFill/>
+            <a:ln>
+              <a:solidFill>
+                <a:schemeClr val="tx1"/>
+              </a:solidFill>
+            </a:ln>
+          </p:spPr>
+          <p:txBody>
+            <a:bodyPr wrap="none" rtlCol="0">
+              <a:noAutofit/>
+            </a:bodyPr>
+            <a:lstStyle/>
+            <a:p>
+              <a:pPr algn="ctr"/>
+              <a:r>
+                <a:rPr lang="en-US" u="sng" dirty="0" smtClean="0"/>
+                <a:t>TCP Client</a:t>
+              </a:r>
+              <a:endParaRPr lang="en-US" u="sng" dirty="0"/>
+            </a:p>
+          </p:txBody>
+        </p:sp>
+        <p:sp>
+          <p:nvSpPr>
+            <p:cNvPr id="4" name="TextBox 3"/>
+            <p:cNvSpPr txBox="1"/>
+            <p:nvPr/>
+          </p:nvSpPr>
+          <p:spPr>
+            <a:xfrm>
+              <a:off x="5125153" y="953146"/>
+              <a:ext cx="2286000" cy="4572000"/>
+            </a:xfrm>
+            <a:prstGeom prst="rect">
+              <a:avLst/>
+            </a:prstGeom>
+            <a:noFill/>
+            <a:ln>
+              <a:solidFill>
+                <a:schemeClr val="tx1"/>
+              </a:solidFill>
+            </a:ln>
+          </p:spPr>
+          <p:txBody>
+            <a:bodyPr wrap="none" rtlCol="0">
+              <a:noAutofit/>
+            </a:bodyPr>
+            <a:lstStyle/>
+            <a:p>
+              <a:pPr algn="ctr"/>
+              <a:r>
+                <a:rPr lang="en-US" u="sng" dirty="0" smtClean="0"/>
+                <a:t>TCP Server</a:t>
+              </a:r>
+              <a:endParaRPr lang="en-US" u="sng" dirty="0"/>
+            </a:p>
+          </p:txBody>
+        </p:sp>
+        <p:sp>
+          <p:nvSpPr>
+            <p:cNvPr id="5" name="TextBox 4"/>
+            <p:cNvSpPr txBox="1"/>
+            <p:nvPr/>
+          </p:nvSpPr>
+          <p:spPr>
+            <a:xfrm>
+              <a:off x="1645213" y="1407766"/>
+              <a:ext cx="2274035" cy="323165"/>
+            </a:xfrm>
+            <a:prstGeom prst="rect">
+              <a:avLst/>
+            </a:prstGeom>
+            <a:noFill/>
+            <a:ln>
+              <a:noFill/>
+            </a:ln>
+          </p:spPr>
+          <p:txBody>
+            <a:bodyPr wrap="square" rtlCol="0">
+              <a:spAutoFit/>
+            </a:bodyPr>
+            <a:lstStyle/>
+            <a:p>
+              <a:pPr algn="ctr"/>
+              <a:r>
+                <a:rPr lang="en-US" sz="1500" smtClean="0"/>
+                <a:t>Send Hello</a:t>
+              </a:r>
+              <a:endParaRPr lang="en-US" sz="1500" dirty="0"/>
+            </a:p>
+          </p:txBody>
+        </p:sp>
+        <p:cxnSp>
+          <p:nvCxnSpPr>
+            <p:cNvPr id="6" name="Straight Arrow Connector 5"/>
+            <p:cNvCxnSpPr/>
+            <p:nvPr/>
+          </p:nvCxnSpPr>
+          <p:spPr>
+            <a:xfrm>
+              <a:off x="3918080" y="1592432"/>
+              <a:ext cx="1197451" cy="0"/>
+            </a:xfrm>
+            <a:prstGeom prst="straightConnector1">
+              <a:avLst/>
+            </a:prstGeom>
+            <a:ln w="38100">
+              <a:solidFill>
+                <a:srgbClr val="FF0000"/>
+              </a:solidFill>
+              <a:tailEnd type="triangle"/>
+            </a:ln>
+          </p:spPr>
+          <p:style>
+            <a:lnRef idx="1">
+              <a:schemeClr val="accent1"/>
+            </a:lnRef>
+            <a:fillRef idx="0">
+              <a:schemeClr val="accent1"/>
+            </a:fillRef>
+            <a:effectRef idx="0">
+              <a:schemeClr val="accent1"/>
+            </a:effectRef>
+            <a:fontRef idx="minor">
+              <a:schemeClr val="tx1"/>
+            </a:fontRef>
+          </p:style>
+        </p:cxnSp>
+        <p:cxnSp>
+          <p:nvCxnSpPr>
+            <p:cNvPr id="7" name="Straight Arrow Connector 6"/>
+            <p:cNvCxnSpPr/>
+            <p:nvPr/>
+          </p:nvCxnSpPr>
+          <p:spPr>
+            <a:xfrm>
+              <a:off x="3918079" y="1920129"/>
+              <a:ext cx="1197451" cy="0"/>
+            </a:xfrm>
+            <a:prstGeom prst="straightConnector1">
+              <a:avLst/>
+            </a:prstGeom>
+            <a:ln w="38100">
+              <a:solidFill>
+                <a:srgbClr val="FF0000"/>
+              </a:solidFill>
+              <a:headEnd type="triangle"/>
+              <a:tailEnd type="none"/>
+            </a:ln>
+          </p:spPr>
+          <p:style>
+            <a:lnRef idx="1">
+              <a:schemeClr val="accent1"/>
+            </a:lnRef>
+            <a:fillRef idx="0">
+              <a:schemeClr val="accent1"/>
+            </a:fillRef>
+            <a:effectRef idx="0">
+              <a:schemeClr val="accent1"/>
+            </a:effectRef>
+            <a:fontRef idx="minor">
+              <a:schemeClr val="tx1"/>
+            </a:fontRef>
+          </p:style>
+        </p:cxnSp>
+        <p:sp>
+          <p:nvSpPr>
+            <p:cNvPr id="8" name="TextBox 7"/>
+            <p:cNvSpPr txBox="1"/>
+            <p:nvPr/>
+          </p:nvSpPr>
+          <p:spPr>
+            <a:xfrm>
+              <a:off x="5125153" y="1757460"/>
+              <a:ext cx="2295623" cy="323165"/>
+            </a:xfrm>
+            <a:prstGeom prst="rect">
+              <a:avLst/>
+            </a:prstGeom>
+            <a:noFill/>
+            <a:ln>
+              <a:noFill/>
+            </a:ln>
+          </p:spPr>
+          <p:txBody>
+            <a:bodyPr wrap="square" rtlCol="0">
+              <a:spAutoFit/>
+            </a:bodyPr>
+            <a:lstStyle/>
+            <a:p>
+              <a:pPr algn="ctr"/>
+              <a:r>
+                <a:rPr lang="en-US" sz="1500" dirty="0" smtClean="0"/>
+                <a:t>Send X.509 Server Cert</a:t>
+              </a:r>
+              <a:endParaRPr lang="en-US" sz="1500" dirty="0"/>
+            </a:p>
+          </p:txBody>
+        </p:sp>
+        <p:sp>
+          <p:nvSpPr>
+            <p:cNvPr id="9" name="TextBox 8"/>
+            <p:cNvSpPr txBox="1"/>
+            <p:nvPr/>
+          </p:nvSpPr>
+          <p:spPr>
+            <a:xfrm>
+              <a:off x="1641267" y="3719966"/>
+              <a:ext cx="2281927" cy="323165"/>
+            </a:xfrm>
+            <a:prstGeom prst="rect">
+              <a:avLst/>
+            </a:prstGeom>
+            <a:noFill/>
+            <a:ln>
+              <a:noFill/>
+            </a:ln>
+          </p:spPr>
+          <p:txBody>
+            <a:bodyPr wrap="square" rtlCol="0">
+              <a:spAutoFit/>
+            </a:bodyPr>
+            <a:lstStyle/>
+            <a:p>
+              <a:pPr algn="ctr"/>
+              <a:r>
+                <a:rPr lang="en-US" sz="1500" dirty="0" smtClean="0"/>
+                <a:t>Create Symmetric Key</a:t>
+              </a:r>
+              <a:endParaRPr lang="en-US" sz="1500" dirty="0"/>
+            </a:p>
+          </p:txBody>
+        </p:sp>
+        <p:sp>
+          <p:nvSpPr>
+            <p:cNvPr id="10" name="TextBox 9"/>
+            <p:cNvSpPr txBox="1"/>
+            <p:nvPr/>
+          </p:nvSpPr>
+          <p:spPr>
+            <a:xfrm>
+              <a:off x="1634419" y="4302462"/>
+              <a:ext cx="2295623" cy="323165"/>
+            </a:xfrm>
+            <a:prstGeom prst="rect">
+              <a:avLst/>
+            </a:prstGeom>
+            <a:noFill/>
+            <a:ln>
+              <a:noFill/>
+            </a:ln>
+          </p:spPr>
+          <p:txBody>
+            <a:bodyPr wrap="square" rtlCol="0">
+              <a:spAutoFit/>
+            </a:bodyPr>
+            <a:lstStyle/>
+            <a:p>
+              <a:pPr algn="ctr"/>
+              <a:r>
+                <a:rPr lang="en-US" sz="1500" dirty="0" smtClean="0"/>
+                <a:t>Encrypt w/Server Pub Key</a:t>
+              </a:r>
+              <a:endParaRPr lang="en-US" sz="1500" dirty="0"/>
+            </a:p>
+          </p:txBody>
+        </p:sp>
+        <p:sp>
+          <p:nvSpPr>
+            <p:cNvPr id="11" name="TextBox 10"/>
+            <p:cNvSpPr txBox="1"/>
+            <p:nvPr/>
+          </p:nvSpPr>
+          <p:spPr>
+            <a:xfrm>
+              <a:off x="1642041" y="3181421"/>
+              <a:ext cx="2280378" cy="323165"/>
+            </a:xfrm>
+            <a:prstGeom prst="rect">
+              <a:avLst/>
+            </a:prstGeom>
+            <a:noFill/>
+            <a:ln>
+              <a:noFill/>
+            </a:ln>
+          </p:spPr>
+          <p:txBody>
+            <a:bodyPr wrap="square" rtlCol="0">
+              <a:spAutoFit/>
+            </a:bodyPr>
+            <a:lstStyle/>
+            <a:p>
+              <a:pPr algn="ctr"/>
+              <a:r>
+                <a:rPr lang="en-US" sz="1500" dirty="0" smtClean="0"/>
+                <a:t>Verify </a:t>
+              </a:r>
+              <a:r>
+                <a:rPr lang="en-US" sz="1500" dirty="0" smtClean="0"/>
+                <a:t>Server X.509 </a:t>
+              </a:r>
+              <a:r>
+                <a:rPr lang="en-US" sz="1500" dirty="0" smtClean="0"/>
+                <a:t>Cert</a:t>
+              </a:r>
+              <a:endParaRPr lang="en-US" sz="1500" dirty="0"/>
+            </a:p>
+          </p:txBody>
+        </p:sp>
+        <p:sp>
+          <p:nvSpPr>
+            <p:cNvPr id="12" name="TextBox 11"/>
+            <p:cNvSpPr txBox="1"/>
+            <p:nvPr/>
+          </p:nvSpPr>
+          <p:spPr>
+            <a:xfrm>
+              <a:off x="1738314" y="4842103"/>
+              <a:ext cx="2087832" cy="323165"/>
+            </a:xfrm>
+            <a:prstGeom prst="rect">
+              <a:avLst/>
+            </a:prstGeom>
+            <a:noFill/>
+            <a:ln>
+              <a:noFill/>
+            </a:ln>
+          </p:spPr>
+          <p:txBody>
+            <a:bodyPr wrap="square" rtlCol="0">
+              <a:spAutoFit/>
+            </a:bodyPr>
+            <a:lstStyle/>
+            <a:p>
+              <a:pPr algn="ctr"/>
+              <a:r>
+                <a:rPr lang="en-US" sz="1500" dirty="0" smtClean="0"/>
+                <a:t>Send Encrypted Key</a:t>
+              </a:r>
+              <a:endParaRPr lang="en-US" sz="1500" dirty="0"/>
+            </a:p>
+          </p:txBody>
+        </p:sp>
+        <p:cxnSp>
+          <p:nvCxnSpPr>
+            <p:cNvPr id="13" name="Straight Arrow Connector 12"/>
+            <p:cNvCxnSpPr/>
+            <p:nvPr/>
+          </p:nvCxnSpPr>
+          <p:spPr>
+            <a:xfrm>
+              <a:off x="3947450" y="5003685"/>
+              <a:ext cx="1197451" cy="0"/>
+            </a:xfrm>
+            <a:prstGeom prst="straightConnector1">
+              <a:avLst/>
+            </a:prstGeom>
+            <a:ln w="38100">
+              <a:solidFill>
+                <a:schemeClr val="accent6"/>
+              </a:solidFill>
+              <a:tailEnd type="triangle"/>
+            </a:ln>
+          </p:spPr>
+          <p:style>
+            <a:lnRef idx="1">
+              <a:schemeClr val="accent1"/>
+            </a:lnRef>
+            <a:fillRef idx="0">
+              <a:schemeClr val="accent1"/>
+            </a:fillRef>
+            <a:effectRef idx="0">
+              <a:schemeClr val="accent1"/>
+            </a:effectRef>
+            <a:fontRef idx="minor">
+              <a:schemeClr val="tx1"/>
+            </a:fontRef>
+          </p:style>
+        </p:cxnSp>
+        <p:sp>
+          <p:nvSpPr>
+            <p:cNvPr id="17" name="TextBox 16"/>
+            <p:cNvSpPr txBox="1"/>
+            <p:nvPr/>
+          </p:nvSpPr>
+          <p:spPr>
+            <a:xfrm>
+              <a:off x="5131487" y="4861381"/>
+              <a:ext cx="2286002" cy="323165"/>
+            </a:xfrm>
+            <a:prstGeom prst="rect">
+              <a:avLst/>
+            </a:prstGeom>
+            <a:noFill/>
+            <a:ln>
+              <a:noFill/>
+            </a:ln>
+          </p:spPr>
+          <p:txBody>
+            <a:bodyPr wrap="square" rtlCol="0">
+              <a:spAutoFit/>
+            </a:bodyPr>
+            <a:lstStyle/>
+            <a:p>
+              <a:pPr algn="ctr"/>
+              <a:r>
+                <a:rPr lang="en-US" sz="1500" dirty="0" smtClean="0"/>
+                <a:t>Decrypt w/Server Cert</a:t>
+              </a:r>
+              <a:endParaRPr lang="en-US" sz="1500" dirty="0"/>
+            </a:p>
+          </p:txBody>
+        </p:sp>
+        <p:cxnSp>
+          <p:nvCxnSpPr>
+            <p:cNvPr id="18" name="Straight Arrow Connector 17"/>
+            <p:cNvCxnSpPr/>
+            <p:nvPr/>
+          </p:nvCxnSpPr>
+          <p:spPr>
+            <a:xfrm>
+              <a:off x="3930042" y="5357114"/>
+              <a:ext cx="1197451" cy="0"/>
+            </a:xfrm>
+            <a:prstGeom prst="straightConnector1">
+              <a:avLst/>
+            </a:prstGeom>
+            <a:ln w="38100">
+              <a:solidFill>
+                <a:schemeClr val="accent6"/>
+              </a:solidFill>
+              <a:headEnd type="triangle"/>
+              <a:tailEnd type="triangle"/>
+            </a:ln>
+          </p:spPr>
+          <p:style>
+            <a:lnRef idx="1">
+              <a:schemeClr val="accent1"/>
+            </a:lnRef>
+            <a:fillRef idx="0">
+              <a:schemeClr val="accent1"/>
+            </a:fillRef>
+            <a:effectRef idx="0">
+              <a:schemeClr val="accent1"/>
+            </a:effectRef>
+            <a:fontRef idx="minor">
+              <a:schemeClr val="tx1"/>
+            </a:fontRef>
+          </p:style>
+        </p:cxnSp>
+        <p:cxnSp>
+          <p:nvCxnSpPr>
+            <p:cNvPr id="19" name="Straight Arrow Connector 18"/>
+            <p:cNvCxnSpPr/>
+            <p:nvPr/>
+          </p:nvCxnSpPr>
+          <p:spPr>
+            <a:xfrm>
+              <a:off x="3930997" y="2347253"/>
+              <a:ext cx="1197451" cy="0"/>
+            </a:xfrm>
+            <a:prstGeom prst="straightConnector1">
+              <a:avLst/>
+            </a:prstGeom>
+            <a:ln w="38100">
+              <a:solidFill>
+                <a:srgbClr val="FF0000"/>
+              </a:solidFill>
+              <a:headEnd type="triangle"/>
+              <a:tailEnd type="none"/>
+            </a:ln>
+          </p:spPr>
+          <p:style>
+            <a:lnRef idx="1">
+              <a:schemeClr val="accent1"/>
+            </a:lnRef>
+            <a:fillRef idx="0">
+              <a:schemeClr val="accent1"/>
+            </a:fillRef>
+            <a:effectRef idx="0">
+              <a:schemeClr val="accent1"/>
+            </a:effectRef>
+            <a:fontRef idx="minor">
+              <a:schemeClr val="tx1"/>
+            </a:fontRef>
+          </p:style>
+        </p:cxnSp>
+        <p:sp>
+          <p:nvSpPr>
+            <p:cNvPr id="20" name="TextBox 19"/>
+            <p:cNvSpPr txBox="1"/>
+            <p:nvPr/>
+          </p:nvSpPr>
+          <p:spPr>
+            <a:xfrm>
+              <a:off x="5138071" y="2184584"/>
+              <a:ext cx="2295623" cy="323165"/>
+            </a:xfrm>
+            <a:prstGeom prst="rect">
+              <a:avLst/>
+            </a:prstGeom>
+            <a:noFill/>
+            <a:ln>
+              <a:noFill/>
+            </a:ln>
+          </p:spPr>
+          <p:txBody>
+            <a:bodyPr wrap="square" rtlCol="0">
+              <a:spAutoFit/>
+            </a:bodyPr>
+            <a:lstStyle/>
+            <a:p>
+              <a:pPr algn="ctr"/>
+              <a:r>
+                <a:rPr lang="en-US" sz="1500" dirty="0" smtClean="0"/>
+                <a:t>Request Client X.509 Cert</a:t>
+              </a:r>
+              <a:endParaRPr lang="en-US" sz="1500" dirty="0"/>
+            </a:p>
+          </p:txBody>
+        </p:sp>
+        <p:sp>
+          <p:nvSpPr>
+            <p:cNvPr id="21" name="TextBox 20"/>
+            <p:cNvSpPr txBox="1"/>
+            <p:nvPr/>
+          </p:nvSpPr>
+          <p:spPr>
+            <a:xfrm>
+              <a:off x="1642041" y="2563029"/>
+              <a:ext cx="2280378" cy="323165"/>
+            </a:xfrm>
+            <a:prstGeom prst="rect">
+              <a:avLst/>
+            </a:prstGeom>
+            <a:noFill/>
+            <a:ln>
+              <a:noFill/>
+            </a:ln>
+          </p:spPr>
+          <p:txBody>
+            <a:bodyPr wrap="square" rtlCol="0">
+              <a:spAutoFit/>
+            </a:bodyPr>
+            <a:lstStyle/>
+            <a:p>
+              <a:pPr algn="ctr"/>
+              <a:r>
+                <a:rPr lang="en-US" sz="1500" dirty="0" smtClean="0"/>
+                <a:t>Send </a:t>
+              </a:r>
+              <a:r>
+                <a:rPr lang="en-US" sz="1500" dirty="0" smtClean="0"/>
+                <a:t>Client X.509 Cert</a:t>
+              </a:r>
+              <a:endParaRPr lang="en-US" sz="1500" dirty="0"/>
+            </a:p>
+          </p:txBody>
+        </p:sp>
+        <p:cxnSp>
+          <p:nvCxnSpPr>
+            <p:cNvPr id="22" name="Straight Arrow Connector 21"/>
+            <p:cNvCxnSpPr/>
+            <p:nvPr/>
+          </p:nvCxnSpPr>
+          <p:spPr>
+            <a:xfrm>
+              <a:off x="3938746" y="2728972"/>
+              <a:ext cx="1197451" cy="0"/>
+            </a:xfrm>
+            <a:prstGeom prst="straightConnector1">
+              <a:avLst/>
+            </a:prstGeom>
+            <a:ln w="38100">
+              <a:solidFill>
+                <a:srgbClr val="FF0000"/>
+              </a:solidFill>
+              <a:tailEnd type="triangle"/>
+            </a:ln>
+          </p:spPr>
+          <p:style>
+            <a:lnRef idx="1">
+              <a:schemeClr val="accent1"/>
+            </a:lnRef>
+            <a:fillRef idx="0">
+              <a:schemeClr val="accent1"/>
+            </a:fillRef>
+            <a:effectRef idx="0">
+              <a:schemeClr val="accent1"/>
+            </a:effectRef>
+            <a:fontRef idx="minor">
+              <a:schemeClr val="tx1"/>
+            </a:fontRef>
+          </p:style>
+        </p:cxnSp>
+        <p:sp>
+          <p:nvSpPr>
+            <p:cNvPr id="23" name="TextBox 22"/>
+            <p:cNvSpPr txBox="1"/>
+            <p:nvPr/>
+          </p:nvSpPr>
+          <p:spPr>
+            <a:xfrm>
+              <a:off x="5144901" y="2563029"/>
+              <a:ext cx="2266252" cy="323165"/>
+            </a:xfrm>
+            <a:prstGeom prst="rect">
+              <a:avLst/>
+            </a:prstGeom>
+            <a:noFill/>
+            <a:ln>
+              <a:noFill/>
+            </a:ln>
+          </p:spPr>
+          <p:txBody>
+            <a:bodyPr wrap="square" rtlCol="0">
+              <a:spAutoFit/>
+            </a:bodyPr>
+            <a:lstStyle/>
+            <a:p>
+              <a:pPr algn="ctr"/>
+              <a:r>
+                <a:rPr lang="en-US" sz="1500" dirty="0" smtClean="0"/>
+                <a:t>Verify </a:t>
+              </a:r>
+              <a:r>
+                <a:rPr lang="en-US" sz="1500" smtClean="0"/>
+                <a:t>X.509 </a:t>
+              </a:r>
+              <a:r>
+                <a:rPr lang="en-US" sz="1500" smtClean="0"/>
+                <a:t>Client Cert</a:t>
+              </a:r>
+              <a:endParaRPr lang="en-US" sz="1500" dirty="0"/>
+            </a:p>
+          </p:txBody>
+        </p:sp>
+      </p:grpSp>
+    </p:spTree>
+    <p:extLst>
+      <p:ext uri="{BB962C8B-B14F-4D97-AF65-F5344CB8AC3E}">
+        <p14:creationId xmlns:p14="http://schemas.microsoft.com/office/powerpoint/2010/main" val="679978301"/>
+      </p:ext>
+    </p:extLst>
+  </p:cSld>
+  <p:clrMapOvr>
+    <a:masterClrMapping/>
+  </p:clrMapOvr>
+</p:sld>
+</file>
+
 <file path=ppt/theme/theme1.xml><?xml version="1.0" encoding="utf-8"?>
 <a:theme xmlns:a="http://schemas.openxmlformats.org/drawingml/2006/main" name="Office Theme">
   <a:themeElements>
@@ -15248,4 +17425,265 @@
     </a:ext>
   </a:extLst>
 </a:theme>
+</file>
+
+<file path=ppt/theme/theme2.xml><?xml version="1.0" encoding="utf-8"?>
+<a:theme xmlns:a="http://schemas.openxmlformats.org/drawingml/2006/main" name="Office Theme">
+  <a:themeElements>
+    <a:clrScheme name="Office">
+      <a:dk1>
+        <a:sysClr val="windowText" lastClr="000000"/>
+      </a:dk1>
+      <a:lt1>
+        <a:sysClr val="window" lastClr="FFFFFF"/>
+      </a:lt1>
+      <a:dk2>
+        <a:srgbClr val="44546A"/>
+      </a:dk2>
+      <a:lt2>
+        <a:srgbClr val="E7E6E6"/>
+      </a:lt2>
+      <a:accent1>
+        <a:srgbClr val="4472C4"/>
+      </a:accent1>
+      <a:accent2>
+        <a:srgbClr val="ED7D31"/>
+      </a:accent2>
+      <a:accent3>
+        <a:srgbClr val="A5A5A5"/>
+      </a:accent3>
+      <a:accent4>
+        <a:srgbClr val="FFC000"/>
+      </a:accent4>
+      <a:accent5>
+        <a:srgbClr val="5B9BD5"/>
+      </a:accent5>
+      <a:accent6>
+        <a:srgbClr val="70AD47"/>
+      </a:accent6>
+      <a:hlink>
+        <a:srgbClr val="0563C1"/>
+      </a:hlink>
+      <a:folHlink>
+        <a:srgbClr val="954F72"/>
+      </a:folHlink>
+    </a:clrScheme>
+    <a:fontScheme name="Office">
+      <a:majorFont>
+        <a:latin typeface="Calibri Light" panose="020F0302020204030204"/>
+        <a:ea typeface=""/>
+        <a:cs typeface=""/>
+        <a:font script="Jpan" typeface="Yu Gothic Light"/>
+        <a:font script="Hang" typeface="맑은 고딕"/>
+        <a:font script="Hans" typeface="DengXian Light"/>
+        <a:font script="Hant" typeface="新細明體"/>
+        <a:font script="Arab" typeface="Times New Roman"/>
+        <a:font script="Hebr" typeface="Times New Roman"/>
+        <a:font script="Thai" typeface="Angsana New"/>
+        <a:font script="Ethi" typeface="Nyala"/>
+        <a:font script="Beng" typeface="Vrinda"/>
+        <a:font script="Gujr" typeface="Shruti"/>
+        <a:font script="Khmr" typeface="MoolBoran"/>
+        <a:font script="Knda" typeface="Tunga"/>
+        <a:font script="Guru" typeface="Raavi"/>
+        <a:font script="Cans" typeface="Euphemia"/>
+        <a:font script="Cher" typeface="Plantagenet Cherokee"/>
+        <a:font script="Yiii" typeface="Microsoft Yi Baiti"/>
+        <a:font script="Tibt" typeface="Microsoft Himalaya"/>
+        <a:font script="Thaa" typeface="MV Boli"/>
+        <a:font script="Deva" typeface="Mangal"/>
+        <a:font script="Telu" typeface="Gautami"/>
+        <a:font script="Taml" typeface="Latha"/>
+        <a:font script="Syrc" typeface="Estrangelo Edessa"/>
+        <a:font script="Orya" typeface="Kalinga"/>
+        <a:font script="Mlym" typeface="Kartika"/>
+        <a:font script="Laoo" typeface="DokChampa"/>
+        <a:font script="Sinh" typeface="Iskoola Pota"/>
+        <a:font script="Mong" typeface="Mongolian Baiti"/>
+        <a:font script="Viet" typeface="Times New Roman"/>
+        <a:font script="Uigh" typeface="Microsoft Uighur"/>
+        <a:font script="Geor" typeface="Sylfaen"/>
+      </a:majorFont>
+      <a:minorFont>
+        <a:latin typeface="Calibri" panose="020F0502020204030204"/>
+        <a:ea typeface=""/>
+        <a:cs typeface=""/>
+        <a:font script="Jpan" typeface="Yu Gothic"/>
+        <a:font script="Hang" typeface="맑은 고딕"/>
+        <a:font script="Hans" typeface="DengXian"/>
+        <a:font script="Hant" typeface="新細明體"/>
+        <a:font script="Arab" typeface="Arial"/>
+        <a:font script="Hebr" typeface="Arial"/>
+        <a:font script="Thai" typeface="Cordia New"/>
+        <a:font script="Ethi" typeface="Nyala"/>
+        <a:font script="Beng" typeface="Vrinda"/>
+        <a:font script="Gujr" typeface="Shruti"/>
+        <a:font script="Khmr" typeface="DaunPenh"/>
+        <a:font script="Knda" typeface="Tunga"/>
+        <a:font script="Guru" typeface="Raavi"/>
+        <a:font script="Cans" typeface="Euphemia"/>
+        <a:font script="Cher" typeface="Plantagenet Cherokee"/>
+        <a:font script="Yiii" typeface="Microsoft Yi Baiti"/>
+        <a:font script="Tibt" typeface="Microsoft Himalaya"/>
+        <a:font script="Thaa" typeface="MV Boli"/>
+        <a:font script="Deva" typeface="Mangal"/>
+        <a:font script="Telu" typeface="Gautami"/>
+        <a:font script="Taml" typeface="Latha"/>
+        <a:font script="Syrc" typeface="Estrangelo Edessa"/>
+        <a:font script="Orya" typeface="Kalinga"/>
+        <a:font script="Mlym" typeface="Kartika"/>
+        <a:font script="Laoo" typeface="DokChampa"/>
+        <a:font script="Sinh" typeface="Iskoola Pota"/>
+        <a:font script="Mong" typeface="Mongolian Baiti"/>
+        <a:font script="Viet" typeface="Arial"/>
+        <a:font script="Uigh" typeface="Microsoft Uighur"/>
+        <a:font script="Geor" typeface="Sylfaen"/>
+      </a:minorFont>
+    </a:fontScheme>
+    <a:fmtScheme name="Office">
+      <a:fillStyleLst>
+        <a:solidFill>
+          <a:schemeClr val="phClr"/>
+        </a:solidFill>
+        <a:gradFill rotWithShape="1">
+          <a:gsLst>
+            <a:gs pos="0">
+              <a:schemeClr val="phClr">
+                <a:lumMod val="110000"/>
+                <a:satMod val="105000"/>
+                <a:tint val="67000"/>
+              </a:schemeClr>
+            </a:gs>
+            <a:gs pos="50000">
+              <a:schemeClr val="phClr">
+                <a:lumMod val="105000"/>
+                <a:satMod val="103000"/>
+                <a:tint val="73000"/>
+              </a:schemeClr>
+            </a:gs>
+            <a:gs pos="100000">
+              <a:schemeClr val="phClr">
+                <a:lumMod val="105000"/>
+                <a:satMod val="109000"/>
+                <a:tint val="81000"/>
+              </a:schemeClr>
+            </a:gs>
+          </a:gsLst>
+          <a:lin ang="5400000" scaled="0"/>
+        </a:gradFill>
+        <a:gradFill rotWithShape="1">
+          <a:gsLst>
+            <a:gs pos="0">
+              <a:schemeClr val="phClr">
+                <a:satMod val="103000"/>
+                <a:lumMod val="102000"/>
+                <a:tint val="94000"/>
+              </a:schemeClr>
+            </a:gs>
+            <a:gs pos="50000">
+              <a:schemeClr val="phClr">
+                <a:satMod val="110000"/>
+                <a:lumMod val="100000"/>
+                <a:shade val="100000"/>
+              </a:schemeClr>
+            </a:gs>
+            <a:gs pos="100000">
+              <a:schemeClr val="phClr">
+                <a:lumMod val="99000"/>
+                <a:satMod val="120000"/>
+                <a:shade val="78000"/>
+              </a:schemeClr>
+            </a:gs>
+          </a:gsLst>
+          <a:lin ang="5400000" scaled="0"/>
+        </a:gradFill>
+      </a:fillStyleLst>
+      <a:lnStyleLst>
+        <a:ln w="6350" cap="flat" cmpd="sng" algn="ctr">
+          <a:solidFill>
+            <a:schemeClr val="phClr"/>
+          </a:solidFill>
+          <a:prstDash val="solid"/>
+          <a:miter lim="800000"/>
+        </a:ln>
+        <a:ln w="12700" cap="flat" cmpd="sng" algn="ctr">
+          <a:solidFill>
+            <a:schemeClr val="phClr"/>
+          </a:solidFill>
+          <a:prstDash val="solid"/>
+          <a:miter lim="800000"/>
+        </a:ln>
+        <a:ln w="19050" cap="flat" cmpd="sng" algn="ctr">
+          <a:solidFill>
+            <a:schemeClr val="phClr"/>
+          </a:solidFill>
+          <a:prstDash val="solid"/>
+          <a:miter lim="800000"/>
+        </a:ln>
+      </a:lnStyleLst>
+      <a:effectStyleLst>
+        <a:effectStyle>
+          <a:effectLst/>
+        </a:effectStyle>
+        <a:effectStyle>
+          <a:effectLst/>
+        </a:effectStyle>
+        <a:effectStyle>
+          <a:effectLst>
+            <a:outerShdw blurRad="57150" dist="19050" dir="5400000" algn="ctr" rotWithShape="0">
+              <a:srgbClr val="000000">
+                <a:alpha val="63000"/>
+              </a:srgbClr>
+            </a:outerShdw>
+          </a:effectLst>
+        </a:effectStyle>
+      </a:effectStyleLst>
+      <a:bgFillStyleLst>
+        <a:solidFill>
+          <a:schemeClr val="phClr"/>
+        </a:solidFill>
+        <a:solidFill>
+          <a:schemeClr val="phClr">
+            <a:tint val="95000"/>
+            <a:satMod val="170000"/>
+          </a:schemeClr>
+        </a:solidFill>
+        <a:gradFill rotWithShape="1">
+          <a:gsLst>
+            <a:gs pos="0">
+              <a:schemeClr val="phClr">
+                <a:tint val="93000"/>
+                <a:satMod val="150000"/>
+                <a:shade val="98000"/>
+                <a:lumMod val="102000"/>
+              </a:schemeClr>
+            </a:gs>
+            <a:gs pos="50000">
+              <a:schemeClr val="phClr">
+                <a:tint val="98000"/>
+                <a:satMod val="130000"/>
+                <a:shade val="90000"/>
+                <a:lumMod val="103000"/>
+              </a:schemeClr>
+            </a:gs>
+            <a:gs pos="100000">
+              <a:schemeClr val="phClr">
+                <a:shade val="63000"/>
+                <a:satMod val="120000"/>
+              </a:schemeClr>
+            </a:gs>
+          </a:gsLst>
+          <a:lin ang="5400000" scaled="0"/>
+        </a:gradFill>
+      </a:bgFillStyleLst>
+    </a:fmtScheme>
+  </a:themeElements>
+  <a:objectDefaults/>
+  <a:extraClrSchemeLst/>
+  <a:extLst>
+    <a:ext uri="{05A4C25C-085E-4340-85A3-A5531E510DB2}">
+      <thm15:themeFamily xmlns:thm15="http://schemas.microsoft.com/office/thememl/2012/main" name="Office Theme" id="{62F939B6-93AF-4DB8-9C6B-D6C7DFDC589F}" vid="{4A3C46E8-61CC-4603-A589-7422A47A8E4A}"/>
+    </a:ext>
+  </a:extLst>
+</a:theme>
 </file>
</xml_diff>

<commit_message>
Intermediate updates to labmanual
</commit_message>
<xml_diff>
--- a/labmanual/misc/drawings.pptx
+++ b/labmanual/misc/drawings.pptx
@@ -5,7 +5,7 @@
     <p:sldMasterId id="2147483648" r:id="rId1"/>
   </p:sldMasterIdLst>
   <p:notesMasterIdLst>
-    <p:notesMasterId r:id="rId9"/>
+    <p:notesMasterId r:id="rId10"/>
   </p:notesMasterIdLst>
   <p:sldIdLst>
     <p:sldId id="256" r:id="rId2"/>
@@ -15,6 +15,7 @@
     <p:sldId id="259" r:id="rId6"/>
     <p:sldId id="260" r:id="rId7"/>
     <p:sldId id="262" r:id="rId8"/>
+    <p:sldId id="263" r:id="rId9"/>
   </p:sldIdLst>
   <p:sldSz cx="12192000" cy="6858000"/>
   <p:notesSz cx="6858000" cy="9144000"/>
@@ -207,7 +208,7 @@
           <a:p>
             <a:fld id="{90BA088C-6928-D148-ACA4-D877058B3EC1}" type="datetimeFigureOut">
               <a:rPr lang="en-US" smtClean="0"/>
-              <a:t>7/18/17</a:t>
+              <a:t>7/24/17</a:t>
             </a:fld>
             <a:endParaRPr lang="en-US"/>
           </a:p>
@@ -604,7 +605,7 @@
           <a:p>
             <a:fld id="{02CF1C66-B1B6-1643-A1E5-DA5B6E4004A0}" type="datetimeFigureOut">
               <a:rPr lang="en-US" smtClean="0"/>
-              <a:t>7/18/17</a:t>
+              <a:t>7/24/17</a:t>
             </a:fld>
             <a:endParaRPr lang="en-US"/>
           </a:p>
@@ -772,7 +773,7 @@
           <a:p>
             <a:fld id="{02CF1C66-B1B6-1643-A1E5-DA5B6E4004A0}" type="datetimeFigureOut">
               <a:rPr lang="en-US" smtClean="0"/>
-              <a:t>7/18/17</a:t>
+              <a:t>7/24/17</a:t>
             </a:fld>
             <a:endParaRPr lang="en-US"/>
           </a:p>
@@ -950,7 +951,7 @@
           <a:p>
             <a:fld id="{02CF1C66-B1B6-1643-A1E5-DA5B6E4004A0}" type="datetimeFigureOut">
               <a:rPr lang="en-US" smtClean="0"/>
-              <a:t>7/18/17</a:t>
+              <a:t>7/24/17</a:t>
             </a:fld>
             <a:endParaRPr lang="en-US"/>
           </a:p>
@@ -1118,7 +1119,7 @@
           <a:p>
             <a:fld id="{02CF1C66-B1B6-1643-A1E5-DA5B6E4004A0}" type="datetimeFigureOut">
               <a:rPr lang="en-US" smtClean="0"/>
-              <a:t>7/18/17</a:t>
+              <a:t>7/24/17</a:t>
             </a:fld>
             <a:endParaRPr lang="en-US"/>
           </a:p>
@@ -1363,7 +1364,7 @@
           <a:p>
             <a:fld id="{02CF1C66-B1B6-1643-A1E5-DA5B6E4004A0}" type="datetimeFigureOut">
               <a:rPr lang="en-US" smtClean="0"/>
-              <a:t>7/18/17</a:t>
+              <a:t>7/24/17</a:t>
             </a:fld>
             <a:endParaRPr lang="en-US"/>
           </a:p>
@@ -1592,7 +1593,7 @@
           <a:p>
             <a:fld id="{02CF1C66-B1B6-1643-A1E5-DA5B6E4004A0}" type="datetimeFigureOut">
               <a:rPr lang="en-US" smtClean="0"/>
-              <a:t>7/18/17</a:t>
+              <a:t>7/24/17</a:t>
             </a:fld>
             <a:endParaRPr lang="en-US"/>
           </a:p>
@@ -1956,7 +1957,7 @@
           <a:p>
             <a:fld id="{02CF1C66-B1B6-1643-A1E5-DA5B6E4004A0}" type="datetimeFigureOut">
               <a:rPr lang="en-US" smtClean="0"/>
-              <a:t>7/18/17</a:t>
+              <a:t>7/24/17</a:t>
             </a:fld>
             <a:endParaRPr lang="en-US"/>
           </a:p>
@@ -2073,7 +2074,7 @@
           <a:p>
             <a:fld id="{02CF1C66-B1B6-1643-A1E5-DA5B6E4004A0}" type="datetimeFigureOut">
               <a:rPr lang="en-US" smtClean="0"/>
-              <a:t>7/18/17</a:t>
+              <a:t>7/24/17</a:t>
             </a:fld>
             <a:endParaRPr lang="en-US"/>
           </a:p>
@@ -2168,7 +2169,7 @@
           <a:p>
             <a:fld id="{02CF1C66-B1B6-1643-A1E5-DA5B6E4004A0}" type="datetimeFigureOut">
               <a:rPr lang="en-US" smtClean="0"/>
-              <a:t>7/18/17</a:t>
+              <a:t>7/24/17</a:t>
             </a:fld>
             <a:endParaRPr lang="en-US"/>
           </a:p>
@@ -2443,7 +2444,7 @@
           <a:p>
             <a:fld id="{02CF1C66-B1B6-1643-A1E5-DA5B6E4004A0}" type="datetimeFigureOut">
               <a:rPr lang="en-US" smtClean="0"/>
-              <a:t>7/18/17</a:t>
+              <a:t>7/24/17</a:t>
             </a:fld>
             <a:endParaRPr lang="en-US"/>
           </a:p>
@@ -2695,7 +2696,7 @@
           <a:p>
             <a:fld id="{02CF1C66-B1B6-1643-A1E5-DA5B6E4004A0}" type="datetimeFigureOut">
               <a:rPr lang="en-US" smtClean="0"/>
-              <a:t>7/18/17</a:t>
+              <a:t>7/24/17</a:t>
             </a:fld>
             <a:endParaRPr lang="en-US"/>
           </a:p>
@@ -2906,7 +2907,7 @@
           <a:p>
             <a:fld id="{02CF1C66-B1B6-1643-A1E5-DA5B6E4004A0}" type="datetimeFigureOut">
               <a:rPr lang="en-US" smtClean="0"/>
-              <a:t>7/18/17</a:t>
+              <a:t>7/24/17</a:t>
             </a:fld>
             <a:endParaRPr lang="en-US"/>
           </a:p>
@@ -8421,35 +8422,35 @@
                 <a:gridCol w="361780">
                   <a:extLst>
                     <a:ext uri="{9D8B030D-6E8A-4147-A177-3AD203B41FA5}">
-                      <a16:colId xmlns="" xmlns:a16="http://schemas.microsoft.com/office/drawing/2014/main" val="20000"/>
+                      <a16:colId xmlns:a16="http://schemas.microsoft.com/office/drawing/2014/main" xmlns="" val="20000"/>
                     </a:ext>
                   </a:extLst>
                 </a:gridCol>
                 <a:gridCol w="361780">
                   <a:extLst>
                     <a:ext uri="{9D8B030D-6E8A-4147-A177-3AD203B41FA5}">
-                      <a16:colId xmlns="" xmlns:a16="http://schemas.microsoft.com/office/drawing/2014/main" val="20001"/>
+                      <a16:colId xmlns:a16="http://schemas.microsoft.com/office/drawing/2014/main" xmlns="" val="20001"/>
                     </a:ext>
                   </a:extLst>
                 </a:gridCol>
                 <a:gridCol w="429406">
                   <a:extLst>
                     <a:ext uri="{9D8B030D-6E8A-4147-A177-3AD203B41FA5}">
-                      <a16:colId xmlns="" xmlns:a16="http://schemas.microsoft.com/office/drawing/2014/main" val="20002"/>
+                      <a16:colId xmlns:a16="http://schemas.microsoft.com/office/drawing/2014/main" xmlns="" val="20002"/>
                     </a:ext>
                   </a:extLst>
                 </a:gridCol>
                 <a:gridCol w="497721">
                   <a:extLst>
                     <a:ext uri="{9D8B030D-6E8A-4147-A177-3AD203B41FA5}">
-                      <a16:colId xmlns="" xmlns:a16="http://schemas.microsoft.com/office/drawing/2014/main" val="20003"/>
+                      <a16:colId xmlns:a16="http://schemas.microsoft.com/office/drawing/2014/main" xmlns="" val="20003"/>
                     </a:ext>
                   </a:extLst>
                 </a:gridCol>
                 <a:gridCol w="1717625">
                   <a:extLst>
                     <a:ext uri="{9D8B030D-6E8A-4147-A177-3AD203B41FA5}">
-                      <a16:colId xmlns="" xmlns:a16="http://schemas.microsoft.com/office/drawing/2014/main" val="20004"/>
+                      <a16:colId xmlns:a16="http://schemas.microsoft.com/office/drawing/2014/main" xmlns="" val="20004"/>
                     </a:ext>
                   </a:extLst>
                 </a:gridCol>
@@ -8682,7 +8683,7 @@
                 </a:tc>
                 <a:extLst>
                   <a:ext uri="{0D108BD9-81ED-4DB2-BD59-A6C34878D82A}">
-                    <a16:rowId xmlns="" xmlns:a16="http://schemas.microsoft.com/office/drawing/2014/main" val="10000"/>
+                    <a16:rowId xmlns:a16="http://schemas.microsoft.com/office/drawing/2014/main" xmlns="" val="10000"/>
                   </a:ext>
                 </a:extLst>
               </a:tr>
@@ -8977,7 +8978,7 @@
                 </a:tc>
                 <a:extLst>
                   <a:ext uri="{0D108BD9-81ED-4DB2-BD59-A6C34878D82A}">
-                    <a16:rowId xmlns="" xmlns:a16="http://schemas.microsoft.com/office/drawing/2014/main" val="10001"/>
+                    <a16:rowId xmlns:a16="http://schemas.microsoft.com/office/drawing/2014/main" xmlns="" val="10001"/>
                   </a:ext>
                 </a:extLst>
               </a:tr>
@@ -9255,7 +9256,7 @@
                 </a:tc>
                 <a:extLst>
                   <a:ext uri="{0D108BD9-81ED-4DB2-BD59-A6C34878D82A}">
-                    <a16:rowId xmlns="" xmlns:a16="http://schemas.microsoft.com/office/drawing/2014/main" val="10002"/>
+                    <a16:rowId xmlns:a16="http://schemas.microsoft.com/office/drawing/2014/main" xmlns="" val="10002"/>
                   </a:ext>
                 </a:extLst>
               </a:tr>
@@ -9536,7 +9537,7 @@
                 </a:tc>
                 <a:extLst>
                   <a:ext uri="{0D108BD9-81ED-4DB2-BD59-A6C34878D82A}">
-                    <a16:rowId xmlns="" xmlns:a16="http://schemas.microsoft.com/office/drawing/2014/main" val="10003"/>
+                    <a16:rowId xmlns:a16="http://schemas.microsoft.com/office/drawing/2014/main" xmlns="" val="10003"/>
                   </a:ext>
                 </a:extLst>
               </a:tr>
@@ -9817,7 +9818,7 @@
                 </a:tc>
                 <a:extLst>
                   <a:ext uri="{0D108BD9-81ED-4DB2-BD59-A6C34878D82A}">
-                    <a16:rowId xmlns="" xmlns:a16="http://schemas.microsoft.com/office/drawing/2014/main" val="10004"/>
+                    <a16:rowId xmlns:a16="http://schemas.microsoft.com/office/drawing/2014/main" xmlns="" val="10004"/>
                   </a:ext>
                 </a:extLst>
               </a:tr>
@@ -10098,7 +10099,7 @@
                 </a:tc>
                 <a:extLst>
                   <a:ext uri="{0D108BD9-81ED-4DB2-BD59-A6C34878D82A}">
-                    <a16:rowId xmlns="" xmlns:a16="http://schemas.microsoft.com/office/drawing/2014/main" val="10005"/>
+                    <a16:rowId xmlns:a16="http://schemas.microsoft.com/office/drawing/2014/main" xmlns="" val="10005"/>
                   </a:ext>
                 </a:extLst>
               </a:tr>
@@ -10379,7 +10380,7 @@
                 </a:tc>
                 <a:extLst>
                   <a:ext uri="{0D108BD9-81ED-4DB2-BD59-A6C34878D82A}">
-                    <a16:rowId xmlns="" xmlns:a16="http://schemas.microsoft.com/office/drawing/2014/main" val="10006"/>
+                    <a16:rowId xmlns:a16="http://schemas.microsoft.com/office/drawing/2014/main" xmlns="" val="10006"/>
                   </a:ext>
                 </a:extLst>
               </a:tr>
@@ -10772,35 +10773,35 @@
                 <a:gridCol w="361780">
                   <a:extLst>
                     <a:ext uri="{9D8B030D-6E8A-4147-A177-3AD203B41FA5}">
-                      <a16:colId xmlns="" xmlns:a16="http://schemas.microsoft.com/office/drawing/2014/main" val="20000"/>
+                      <a16:colId xmlns:a16="http://schemas.microsoft.com/office/drawing/2014/main" xmlns="" val="20000"/>
                     </a:ext>
                   </a:extLst>
                 </a:gridCol>
                 <a:gridCol w="361780">
                   <a:extLst>
                     <a:ext uri="{9D8B030D-6E8A-4147-A177-3AD203B41FA5}">
-                      <a16:colId xmlns="" xmlns:a16="http://schemas.microsoft.com/office/drawing/2014/main" val="20001"/>
+                      <a16:colId xmlns:a16="http://schemas.microsoft.com/office/drawing/2014/main" xmlns="" val="20001"/>
                     </a:ext>
                   </a:extLst>
                 </a:gridCol>
                 <a:gridCol w="429406">
                   <a:extLst>
                     <a:ext uri="{9D8B030D-6E8A-4147-A177-3AD203B41FA5}">
-                      <a16:colId xmlns="" xmlns:a16="http://schemas.microsoft.com/office/drawing/2014/main" val="20002"/>
+                      <a16:colId xmlns:a16="http://schemas.microsoft.com/office/drawing/2014/main" xmlns="" val="20002"/>
                     </a:ext>
                   </a:extLst>
                 </a:gridCol>
                 <a:gridCol w="497721">
                   <a:extLst>
                     <a:ext uri="{9D8B030D-6E8A-4147-A177-3AD203B41FA5}">
-                      <a16:colId xmlns="" xmlns:a16="http://schemas.microsoft.com/office/drawing/2014/main" val="20003"/>
+                      <a16:colId xmlns:a16="http://schemas.microsoft.com/office/drawing/2014/main" xmlns="" val="20003"/>
                     </a:ext>
                   </a:extLst>
                 </a:gridCol>
                 <a:gridCol w="1717625">
                   <a:extLst>
                     <a:ext uri="{9D8B030D-6E8A-4147-A177-3AD203B41FA5}">
-                      <a16:colId xmlns="" xmlns:a16="http://schemas.microsoft.com/office/drawing/2014/main" val="20004"/>
+                      <a16:colId xmlns:a16="http://schemas.microsoft.com/office/drawing/2014/main" xmlns="" val="20004"/>
                     </a:ext>
                   </a:extLst>
                 </a:gridCol>
@@ -11033,7 +11034,7 @@
                 </a:tc>
                 <a:extLst>
                   <a:ext uri="{0D108BD9-81ED-4DB2-BD59-A6C34878D82A}">
-                    <a16:rowId xmlns="" xmlns:a16="http://schemas.microsoft.com/office/drawing/2014/main" val="10000"/>
+                    <a16:rowId xmlns:a16="http://schemas.microsoft.com/office/drawing/2014/main" xmlns="" val="10000"/>
                   </a:ext>
                 </a:extLst>
               </a:tr>
@@ -11328,7 +11329,7 @@
                 </a:tc>
                 <a:extLst>
                   <a:ext uri="{0D108BD9-81ED-4DB2-BD59-A6C34878D82A}">
-                    <a16:rowId xmlns="" xmlns:a16="http://schemas.microsoft.com/office/drawing/2014/main" val="10001"/>
+                    <a16:rowId xmlns:a16="http://schemas.microsoft.com/office/drawing/2014/main" xmlns="" val="10001"/>
                   </a:ext>
                 </a:extLst>
               </a:tr>
@@ -11606,7 +11607,7 @@
                 </a:tc>
                 <a:extLst>
                   <a:ext uri="{0D108BD9-81ED-4DB2-BD59-A6C34878D82A}">
-                    <a16:rowId xmlns="" xmlns:a16="http://schemas.microsoft.com/office/drawing/2014/main" val="10002"/>
+                    <a16:rowId xmlns:a16="http://schemas.microsoft.com/office/drawing/2014/main" xmlns="" val="10002"/>
                   </a:ext>
                 </a:extLst>
               </a:tr>
@@ -11887,7 +11888,7 @@
                 </a:tc>
                 <a:extLst>
                   <a:ext uri="{0D108BD9-81ED-4DB2-BD59-A6C34878D82A}">
-                    <a16:rowId xmlns="" xmlns:a16="http://schemas.microsoft.com/office/drawing/2014/main" val="10003"/>
+                    <a16:rowId xmlns:a16="http://schemas.microsoft.com/office/drawing/2014/main" xmlns="" val="10003"/>
                   </a:ext>
                 </a:extLst>
               </a:tr>
@@ -12168,7 +12169,7 @@
                 </a:tc>
                 <a:extLst>
                   <a:ext uri="{0D108BD9-81ED-4DB2-BD59-A6C34878D82A}">
-                    <a16:rowId xmlns="" xmlns:a16="http://schemas.microsoft.com/office/drawing/2014/main" val="10004"/>
+                    <a16:rowId xmlns:a16="http://schemas.microsoft.com/office/drawing/2014/main" xmlns="" val="10004"/>
                   </a:ext>
                 </a:extLst>
               </a:tr>
@@ -12449,7 +12450,7 @@
                 </a:tc>
                 <a:extLst>
                   <a:ext uri="{0D108BD9-81ED-4DB2-BD59-A6C34878D82A}">
-                    <a16:rowId xmlns="" xmlns:a16="http://schemas.microsoft.com/office/drawing/2014/main" val="10005"/>
+                    <a16:rowId xmlns:a16="http://schemas.microsoft.com/office/drawing/2014/main" xmlns="" val="10005"/>
                   </a:ext>
                 </a:extLst>
               </a:tr>
@@ -12730,7 +12731,7 @@
                 </a:tc>
                 <a:extLst>
                   <a:ext uri="{0D108BD9-81ED-4DB2-BD59-A6C34878D82A}">
-                    <a16:rowId xmlns="" xmlns:a16="http://schemas.microsoft.com/office/drawing/2014/main" val="10006"/>
+                    <a16:rowId xmlns:a16="http://schemas.microsoft.com/office/drawing/2014/main" xmlns="" val="10006"/>
                   </a:ext>
                 </a:extLst>
               </a:tr>
@@ -14215,7 +14216,7 @@
           <p:cNvPr id="25" name="Group 24">
             <a:extLst>
               <a:ext uri="{FF2B5EF4-FFF2-40B4-BE49-F238E27FC236}">
-                <a16:creationId xmlns="" xmlns:a16="http://schemas.microsoft.com/office/drawing/2014/main" id="{3B2C51B9-EDD7-4240-B648-DD06A33A337B}"/>
+                <a16:creationId xmlns:a16="http://schemas.microsoft.com/office/drawing/2014/main" xmlns="" id="{3B2C51B9-EDD7-4240-B648-DD06A33A337B}"/>
               </a:ext>
             </a:extLst>
           </p:cNvPr>
@@ -15009,7 +15010,7 @@
             <p:cNvPr id="19" name="Oval 18">
               <a:extLst>
                 <a:ext uri="{FF2B5EF4-FFF2-40B4-BE49-F238E27FC236}">
-                  <a16:creationId xmlns="" xmlns:a16="http://schemas.microsoft.com/office/drawing/2014/main" id="{A104E178-9C80-4A33-A1B6-474FD8E9B6A5}"/>
+                  <a16:creationId xmlns:a16="http://schemas.microsoft.com/office/drawing/2014/main" xmlns="" id="{A104E178-9C80-4A33-A1B6-474FD8E9B6A5}"/>
                 </a:ext>
               </a:extLst>
             </p:cNvPr>
@@ -15062,7 +15063,7 @@
             <p:cNvPr id="41" name="Oval 40">
               <a:extLst>
                 <a:ext uri="{FF2B5EF4-FFF2-40B4-BE49-F238E27FC236}">
-                  <a16:creationId xmlns="" xmlns:a16="http://schemas.microsoft.com/office/drawing/2014/main" id="{92C24576-AA8C-4365-A2B7-C5B7C9D8A300}"/>
+                  <a16:creationId xmlns:a16="http://schemas.microsoft.com/office/drawing/2014/main" xmlns="" id="{92C24576-AA8C-4365-A2B7-C5B7C9D8A300}"/>
                 </a:ext>
               </a:extLst>
             </p:cNvPr>
@@ -15112,7 +15113,7 @@
             <p:cNvPr id="42" name="Straight Arrow Connector 41">
               <a:extLst>
                 <a:ext uri="{FF2B5EF4-FFF2-40B4-BE49-F238E27FC236}">
-                  <a16:creationId xmlns="" xmlns:a16="http://schemas.microsoft.com/office/drawing/2014/main" id="{C04B9279-B4F9-47E7-9E13-7A48FB835E60}"/>
+                  <a16:creationId xmlns:a16="http://schemas.microsoft.com/office/drawing/2014/main" xmlns="" id="{C04B9279-B4F9-47E7-9E13-7A48FB835E60}"/>
                 </a:ext>
               </a:extLst>
             </p:cNvPr>
@@ -15155,7 +15156,7 @@
             <p:cNvPr id="43" name="Oval 42">
               <a:extLst>
                 <a:ext uri="{FF2B5EF4-FFF2-40B4-BE49-F238E27FC236}">
-                  <a16:creationId xmlns="" xmlns:a16="http://schemas.microsoft.com/office/drawing/2014/main" id="{73949712-EC35-4B62-80BD-DB99766A6DDC}"/>
+                  <a16:creationId xmlns:a16="http://schemas.microsoft.com/office/drawing/2014/main" xmlns="" id="{73949712-EC35-4B62-80BD-DB99766A6DDC}"/>
                 </a:ext>
               </a:extLst>
             </p:cNvPr>
@@ -15204,7 +15205,7 @@
             <p:cNvPr id="44" name="Oval 43">
               <a:extLst>
                 <a:ext uri="{FF2B5EF4-FFF2-40B4-BE49-F238E27FC236}">
-                  <a16:creationId xmlns="" xmlns:a16="http://schemas.microsoft.com/office/drawing/2014/main" id="{ED91E7B2-95CF-446A-882A-D674C9A468AD}"/>
+                  <a16:creationId xmlns:a16="http://schemas.microsoft.com/office/drawing/2014/main" xmlns="" id="{ED91E7B2-95CF-446A-882A-D674C9A468AD}"/>
                 </a:ext>
               </a:extLst>
             </p:cNvPr>
@@ -15250,7 +15251,7 @@
             <p:cNvPr id="45" name="Straight Arrow Connector 44">
               <a:extLst>
                 <a:ext uri="{FF2B5EF4-FFF2-40B4-BE49-F238E27FC236}">
-                  <a16:creationId xmlns="" xmlns:a16="http://schemas.microsoft.com/office/drawing/2014/main" id="{7B2937D3-658E-461E-B536-44F292EA471D}"/>
+                  <a16:creationId xmlns:a16="http://schemas.microsoft.com/office/drawing/2014/main" xmlns="" id="{7B2937D3-658E-461E-B536-44F292EA471D}"/>
                 </a:ext>
               </a:extLst>
             </p:cNvPr>
@@ -16810,15 +16811,7 @@
               <a:pPr algn="ctr"/>
               <a:r>
                 <a:rPr lang="en-US" sz="1500" dirty="0" smtClean="0"/>
-                <a:t>Verify </a:t>
-              </a:r>
-              <a:r>
-                <a:rPr lang="en-US" sz="1500" dirty="0" smtClean="0"/>
-                <a:t>Server X.509 </a:t>
-              </a:r>
-              <a:r>
-                <a:rPr lang="en-US" sz="1500" dirty="0" smtClean="0"/>
-                <a:t>Cert</a:t>
+                <a:t>Verify Server X.509 Cert</a:t>
               </a:r>
               <a:endParaRPr lang="en-US" sz="1500" dirty="0"/>
             </a:p>
@@ -17064,11 +17057,7 @@
               <a:pPr algn="ctr"/>
               <a:r>
                 <a:rPr lang="en-US" sz="1500" dirty="0" smtClean="0"/>
-                <a:t>Send </a:t>
-              </a:r>
-              <a:r>
-                <a:rPr lang="en-US" sz="1500" dirty="0" smtClean="0"/>
-                <a:t>Client X.509 Cert</a:t>
+                <a:t>Send Client X.509 Cert</a:t>
               </a:r>
               <a:endParaRPr lang="en-US" sz="1500" dirty="0"/>
             </a:p>
@@ -17142,11 +17131,7 @@
               </a:r>
               <a:r>
                 <a:rPr lang="en-US" sz="1500" smtClean="0"/>
-                <a:t>X.509 </a:t>
-              </a:r>
-              <a:r>
-                <a:rPr lang="en-US" sz="1500" smtClean="0"/>
-                <a:t>Client Cert</a:t>
+                <a:t>X.509 Client Cert</a:t>
               </a:r>
               <a:endParaRPr lang="en-US" sz="1500" dirty="0"/>
             </a:p>
@@ -17163,6 +17148,2310 @@
   <p:clrMapOvr>
     <a:masterClrMapping/>
   </p:clrMapOvr>
+  <p:timing>
+    <p:tnLst>
+      <p:par>
+        <p:cTn id="1" dur="indefinite" restart="never" nodeType="tmRoot"/>
+      </p:par>
+    </p:tnLst>
+  </p:timing>
+</p:sld>
+</file>
+
+<file path=ppt/slides/slide8.xml><?xml version="1.0" encoding="utf-8"?>
+<p:sld xmlns:a="http://schemas.openxmlformats.org/drawingml/2006/main" xmlns:r="http://schemas.openxmlformats.org/officeDocument/2006/relationships" xmlns:p="http://schemas.openxmlformats.org/presentationml/2006/main">
+  <p:cSld>
+    <p:spTree>
+      <p:nvGrpSpPr>
+        <p:cNvPr id="1" name=""/>
+        <p:cNvGrpSpPr/>
+        <p:nvPr/>
+      </p:nvGrpSpPr>
+      <p:grpSpPr>
+        <a:xfrm>
+          <a:off x="0" y="0"/>
+          <a:ext cx="0" cy="0"/>
+          <a:chOff x="0" y="0"/>
+          <a:chExt cx="0" cy="0"/>
+        </a:xfrm>
+      </p:grpSpPr>
+      <p:graphicFrame>
+        <p:nvGraphicFramePr>
+          <p:cNvPr id="2" name="Table 1"/>
+          <p:cNvGraphicFramePr>
+            <a:graphicFrameLocks noGrp="1"/>
+          </p:cNvGraphicFramePr>
+          <p:nvPr>
+            <p:extLst>
+              <p:ext uri="{D42A27DB-BD31-4B8C-83A1-F6EECF244321}">
+                <p14:modId xmlns:p14="http://schemas.microsoft.com/office/powerpoint/2010/main" val="506729540"/>
+              </p:ext>
+            </p:extLst>
+          </p:nvPr>
+        </p:nvGraphicFramePr>
+        <p:xfrm>
+          <a:off x="728420" y="596687"/>
+          <a:ext cx="9431580" cy="4677969"/>
+        </p:xfrm>
+        <a:graphic>
+          <a:graphicData uri="http://schemas.openxmlformats.org/drawingml/2006/table">
+            <a:tbl>
+              <a:tblPr firstRow="1" bandRow="1">
+                <a:tableStyleId>{5C22544A-7EE6-4342-B048-85BDC9FD1C3A}</a:tableStyleId>
+              </a:tblPr>
+              <a:tblGrid>
+                <a:gridCol w="1724460"/>
+                <a:gridCol w="2991330"/>
+                <a:gridCol w="2614909"/>
+                <a:gridCol w="2100881"/>
+              </a:tblGrid>
+              <a:tr h="389124">
+                <a:tc>
+                  <a:txBody>
+                    <a:bodyPr/>
+                    <a:lstStyle/>
+                    <a:p>
+                      <a:endParaRPr lang="en-US" sz="1200" dirty="0">
+                        <a:solidFill>
+                          <a:schemeClr val="tx1"/>
+                        </a:solidFill>
+                      </a:endParaRPr>
+                    </a:p>
+                  </a:txBody>
+                  <a:tcPr>
+                    <a:lnL w="12700" cap="flat" cmpd="sng" algn="ctr">
+                      <a:solidFill>
+                        <a:schemeClr val="tx1"/>
+                      </a:solidFill>
+                      <a:prstDash val="solid"/>
+                      <a:round/>
+                      <a:headEnd type="none" w="med" len="med"/>
+                      <a:tailEnd type="none" w="med" len="med"/>
+                    </a:lnL>
+                    <a:lnR w="12700" cap="flat" cmpd="sng" algn="ctr">
+                      <a:solidFill>
+                        <a:schemeClr val="tx1"/>
+                      </a:solidFill>
+                      <a:prstDash val="solid"/>
+                      <a:round/>
+                      <a:headEnd type="none" w="med" len="med"/>
+                      <a:tailEnd type="none" w="med" len="med"/>
+                    </a:lnR>
+                    <a:lnT w="12700" cap="flat" cmpd="sng" algn="ctr">
+                      <a:solidFill>
+                        <a:schemeClr val="tx1"/>
+                      </a:solidFill>
+                      <a:prstDash val="solid"/>
+                      <a:round/>
+                      <a:headEnd type="none" w="med" len="med"/>
+                      <a:tailEnd type="none" w="med" len="med"/>
+                    </a:lnT>
+                    <a:lnB w="12700" cap="flat" cmpd="sng" algn="ctr">
+                      <a:solidFill>
+                        <a:schemeClr val="tx1"/>
+                      </a:solidFill>
+                      <a:prstDash val="solid"/>
+                      <a:round/>
+                      <a:headEnd type="none" w="med" len="med"/>
+                      <a:tailEnd type="none" w="med" len="med"/>
+                    </a:lnB>
+                    <a:noFill/>
+                  </a:tcPr>
+                </a:tc>
+                <a:tc>
+                  <a:txBody>
+                    <a:bodyPr/>
+                    <a:lstStyle/>
+                    <a:p>
+                      <a:r>
+                        <a:rPr lang="en-US" sz="1200" dirty="0" smtClean="0">
+                          <a:solidFill>
+                            <a:schemeClr val="tx1"/>
+                          </a:solidFill>
+                        </a:rPr>
+                        <a:t>HTTP 1.1</a:t>
+                      </a:r>
+                      <a:endParaRPr lang="en-US" sz="1200" dirty="0">
+                        <a:solidFill>
+                          <a:schemeClr val="tx1"/>
+                        </a:solidFill>
+                      </a:endParaRPr>
+                    </a:p>
+                  </a:txBody>
+                  <a:tcPr>
+                    <a:lnL w="12700" cap="flat" cmpd="sng" algn="ctr">
+                      <a:solidFill>
+                        <a:schemeClr val="tx1"/>
+                      </a:solidFill>
+                      <a:prstDash val="solid"/>
+                      <a:round/>
+                      <a:headEnd type="none" w="med" len="med"/>
+                      <a:tailEnd type="none" w="med" len="med"/>
+                    </a:lnL>
+                    <a:lnR w="12700" cap="flat" cmpd="sng" algn="ctr">
+                      <a:solidFill>
+                        <a:schemeClr val="tx1"/>
+                      </a:solidFill>
+                      <a:prstDash val="solid"/>
+                      <a:round/>
+                      <a:headEnd type="none" w="med" len="med"/>
+                      <a:tailEnd type="none" w="med" len="med"/>
+                    </a:lnR>
+                    <a:lnT w="12700" cap="flat" cmpd="sng" algn="ctr">
+                      <a:solidFill>
+                        <a:schemeClr val="tx1"/>
+                      </a:solidFill>
+                      <a:prstDash val="solid"/>
+                      <a:round/>
+                      <a:headEnd type="none" w="med" len="med"/>
+                      <a:tailEnd type="none" w="med" len="med"/>
+                    </a:lnT>
+                    <a:lnB w="12700" cap="flat" cmpd="sng" algn="ctr">
+                      <a:solidFill>
+                        <a:schemeClr val="tx1"/>
+                      </a:solidFill>
+                      <a:prstDash val="solid"/>
+                      <a:round/>
+                      <a:headEnd type="none" w="med" len="med"/>
+                      <a:tailEnd type="none" w="med" len="med"/>
+                    </a:lnB>
+                    <a:noFill/>
+                  </a:tcPr>
+                </a:tc>
+                <a:tc>
+                  <a:txBody>
+                    <a:bodyPr/>
+                    <a:lstStyle/>
+                    <a:p>
+                      <a:r>
+                        <a:rPr lang="en-US" sz="1200" dirty="0" smtClean="0">
+                          <a:solidFill>
+                            <a:schemeClr val="tx1"/>
+                          </a:solidFill>
+                        </a:rPr>
+                        <a:t>Example</a:t>
+                      </a:r>
+                      <a:endParaRPr lang="en-US" sz="1200" dirty="0">
+                        <a:solidFill>
+                          <a:schemeClr val="tx1"/>
+                        </a:solidFill>
+                      </a:endParaRPr>
+                    </a:p>
+                  </a:txBody>
+                  <a:tcPr>
+                    <a:lnL w="12700" cap="flat" cmpd="sng" algn="ctr">
+                      <a:solidFill>
+                        <a:schemeClr val="tx1"/>
+                      </a:solidFill>
+                      <a:prstDash val="solid"/>
+                      <a:round/>
+                      <a:headEnd type="none" w="med" len="med"/>
+                      <a:tailEnd type="none" w="med" len="med"/>
+                    </a:lnL>
+                    <a:lnR w="12700" cap="flat" cmpd="sng" algn="ctr">
+                      <a:solidFill>
+                        <a:schemeClr val="tx1"/>
+                      </a:solidFill>
+                      <a:prstDash val="solid"/>
+                      <a:round/>
+                      <a:headEnd type="none" w="med" len="med"/>
+                      <a:tailEnd type="none" w="med" len="med"/>
+                    </a:lnR>
+                    <a:lnT w="12700" cap="flat" cmpd="sng" algn="ctr">
+                      <a:solidFill>
+                        <a:schemeClr val="tx1"/>
+                      </a:solidFill>
+                      <a:prstDash val="solid"/>
+                      <a:round/>
+                      <a:headEnd type="none" w="med" len="med"/>
+                      <a:tailEnd type="none" w="med" len="med"/>
+                    </a:lnT>
+                    <a:lnB w="12700" cap="flat" cmpd="sng" algn="ctr">
+                      <a:solidFill>
+                        <a:schemeClr val="tx1"/>
+                      </a:solidFill>
+                      <a:prstDash val="solid"/>
+                      <a:round/>
+                      <a:headEnd type="none" w="med" len="med"/>
+                      <a:tailEnd type="none" w="med" len="med"/>
+                    </a:lnB>
+                    <a:noFill/>
+                  </a:tcPr>
+                </a:tc>
+                <a:tc>
+                  <a:txBody>
+                    <a:bodyPr/>
+                    <a:lstStyle/>
+                    <a:p>
+                      <a:endParaRPr lang="en-US" sz="1200">
+                        <a:solidFill>
+                          <a:schemeClr val="tx1"/>
+                        </a:solidFill>
+                      </a:endParaRPr>
+                    </a:p>
+                  </a:txBody>
+                  <a:tcPr>
+                    <a:lnL w="12700" cap="flat" cmpd="sng" algn="ctr">
+                      <a:solidFill>
+                        <a:schemeClr val="tx1"/>
+                      </a:solidFill>
+                      <a:prstDash val="solid"/>
+                      <a:round/>
+                      <a:headEnd type="none" w="med" len="med"/>
+                      <a:tailEnd type="none" w="med" len="med"/>
+                    </a:lnL>
+                    <a:lnR w="12700" cap="flat" cmpd="sng" algn="ctr">
+                      <a:solidFill>
+                        <a:schemeClr val="tx1"/>
+                      </a:solidFill>
+                      <a:prstDash val="solid"/>
+                      <a:round/>
+                      <a:headEnd type="none" w="med" len="med"/>
+                      <a:tailEnd type="none" w="med" len="med"/>
+                    </a:lnR>
+                    <a:lnT w="12700" cap="flat" cmpd="sng" algn="ctr">
+                      <a:solidFill>
+                        <a:schemeClr val="tx1"/>
+                      </a:solidFill>
+                      <a:prstDash val="solid"/>
+                      <a:round/>
+                      <a:headEnd type="none" w="med" len="med"/>
+                      <a:tailEnd type="none" w="med" len="med"/>
+                    </a:lnT>
+                    <a:lnB w="12700" cap="flat" cmpd="sng" algn="ctr">
+                      <a:solidFill>
+                        <a:schemeClr val="tx1"/>
+                      </a:solidFill>
+                      <a:prstDash val="solid"/>
+                      <a:round/>
+                      <a:headEnd type="none" w="med" len="med"/>
+                      <a:tailEnd type="none" w="med" len="med"/>
+                    </a:lnB>
+                    <a:noFill/>
+                  </a:tcPr>
+                </a:tc>
+              </a:tr>
+              <a:tr h="389124">
+                <a:tc>
+                  <a:txBody>
+                    <a:bodyPr/>
+                    <a:lstStyle/>
+                    <a:p>
+                      <a:endParaRPr lang="en-US" sz="1200" dirty="0">
+                        <a:solidFill>
+                          <a:schemeClr val="tx1"/>
+                        </a:solidFill>
+                      </a:endParaRPr>
+                    </a:p>
+                  </a:txBody>
+                  <a:tcPr>
+                    <a:lnL w="12700" cap="flat" cmpd="sng" algn="ctr">
+                      <a:solidFill>
+                        <a:schemeClr val="tx1"/>
+                      </a:solidFill>
+                      <a:prstDash val="solid"/>
+                      <a:round/>
+                      <a:headEnd type="none" w="med" len="med"/>
+                      <a:tailEnd type="none" w="med" len="med"/>
+                    </a:lnL>
+                    <a:lnR w="12700" cap="flat" cmpd="sng" algn="ctr">
+                      <a:solidFill>
+                        <a:schemeClr val="tx1"/>
+                      </a:solidFill>
+                      <a:prstDash val="solid"/>
+                      <a:round/>
+                      <a:headEnd type="none" w="med" len="med"/>
+                      <a:tailEnd type="none" w="med" len="med"/>
+                    </a:lnR>
+                    <a:lnT w="12700" cap="flat" cmpd="sng" algn="ctr">
+                      <a:solidFill>
+                        <a:schemeClr val="tx1"/>
+                      </a:solidFill>
+                      <a:prstDash val="solid"/>
+                      <a:round/>
+                      <a:headEnd type="none" w="med" len="med"/>
+                      <a:tailEnd type="none" w="med" len="med"/>
+                    </a:lnT>
+                    <a:lnB w="12700" cap="flat" cmpd="sng" algn="ctr">
+                      <a:solidFill>
+                        <a:schemeClr val="tx1"/>
+                      </a:solidFill>
+                      <a:prstDash val="solid"/>
+                      <a:round/>
+                      <a:headEnd type="none" w="med" len="med"/>
+                      <a:tailEnd type="none" w="med" len="med"/>
+                    </a:lnB>
+                    <a:noFill/>
+                  </a:tcPr>
+                </a:tc>
+                <a:tc>
+                  <a:txBody>
+                    <a:bodyPr/>
+                    <a:lstStyle/>
+                    <a:p>
+                      <a:endParaRPr lang="en-US" sz="1200" dirty="0">
+                        <a:solidFill>
+                          <a:schemeClr val="tx1"/>
+                        </a:solidFill>
+                      </a:endParaRPr>
+                    </a:p>
+                  </a:txBody>
+                  <a:tcPr>
+                    <a:lnL w="12700" cap="flat" cmpd="sng" algn="ctr">
+                      <a:solidFill>
+                        <a:schemeClr val="tx1"/>
+                      </a:solidFill>
+                      <a:prstDash val="solid"/>
+                      <a:round/>
+                      <a:headEnd type="none" w="med" len="med"/>
+                      <a:tailEnd type="none" w="med" len="med"/>
+                    </a:lnL>
+                    <a:lnR w="12700" cap="flat" cmpd="sng" algn="ctr">
+                      <a:solidFill>
+                        <a:schemeClr val="tx1"/>
+                      </a:solidFill>
+                      <a:prstDash val="solid"/>
+                      <a:round/>
+                      <a:headEnd type="none" w="med" len="med"/>
+                      <a:tailEnd type="none" w="med" len="med"/>
+                    </a:lnR>
+                    <a:lnT w="12700" cap="flat" cmpd="sng" algn="ctr">
+                      <a:solidFill>
+                        <a:schemeClr val="tx1"/>
+                      </a:solidFill>
+                      <a:prstDash val="solid"/>
+                      <a:round/>
+                      <a:headEnd type="none" w="med" len="med"/>
+                      <a:tailEnd type="none" w="med" len="med"/>
+                    </a:lnT>
+                    <a:lnB w="12700" cap="flat" cmpd="sng" algn="ctr">
+                      <a:solidFill>
+                        <a:schemeClr val="tx1"/>
+                      </a:solidFill>
+                      <a:prstDash val="solid"/>
+                      <a:round/>
+                      <a:headEnd type="none" w="med" len="med"/>
+                      <a:tailEnd type="none" w="med" len="med"/>
+                    </a:lnB>
+                    <a:noFill/>
+                  </a:tcPr>
+                </a:tc>
+                <a:tc>
+                  <a:txBody>
+                    <a:bodyPr/>
+                    <a:lstStyle/>
+                    <a:p>
+                      <a:pPr marL="0" marR="0" indent="0" algn="l" defTabSz="914400" rtl="0" eaLnBrk="1" fontAlgn="auto" latinLnBrk="0" hangingPunct="1">
+                        <a:lnSpc>
+                          <a:spcPct val="100000"/>
+                        </a:lnSpc>
+                        <a:spcBef>
+                          <a:spcPts val="0"/>
+                        </a:spcBef>
+                        <a:spcAft>
+                          <a:spcPts val="0"/>
+                        </a:spcAft>
+                        <a:buClrTx/>
+                        <a:buSzTx/>
+                        <a:buFontTx/>
+                        <a:buNone/>
+                        <a:tabLst/>
+                        <a:defRPr/>
+                      </a:pPr>
+                      <a:endParaRPr lang="en-US" sz="1200" dirty="0" smtClean="0">
+                        <a:solidFill>
+                          <a:schemeClr val="tx1"/>
+                        </a:solidFill>
+                      </a:endParaRPr>
+                    </a:p>
+                  </a:txBody>
+                  <a:tcPr>
+                    <a:lnL w="12700" cap="flat" cmpd="sng" algn="ctr">
+                      <a:solidFill>
+                        <a:schemeClr val="tx1"/>
+                      </a:solidFill>
+                      <a:prstDash val="solid"/>
+                      <a:round/>
+                      <a:headEnd type="none" w="med" len="med"/>
+                      <a:tailEnd type="none" w="med" len="med"/>
+                    </a:lnL>
+                    <a:lnR w="12700" cap="flat" cmpd="sng" algn="ctr">
+                      <a:solidFill>
+                        <a:schemeClr val="tx1"/>
+                      </a:solidFill>
+                      <a:prstDash val="solid"/>
+                      <a:round/>
+                      <a:headEnd type="none" w="med" len="med"/>
+                      <a:tailEnd type="none" w="med" len="med"/>
+                    </a:lnR>
+                    <a:lnT w="12700" cap="flat" cmpd="sng" algn="ctr">
+                      <a:solidFill>
+                        <a:schemeClr val="tx1"/>
+                      </a:solidFill>
+                      <a:prstDash val="solid"/>
+                      <a:round/>
+                      <a:headEnd type="none" w="med" len="med"/>
+                      <a:tailEnd type="none" w="med" len="med"/>
+                    </a:lnT>
+                    <a:lnB w="12700" cap="flat" cmpd="sng" algn="ctr">
+                      <a:solidFill>
+                        <a:schemeClr val="tx1"/>
+                      </a:solidFill>
+                      <a:prstDash val="solid"/>
+                      <a:round/>
+                      <a:headEnd type="none" w="med" len="med"/>
+                      <a:tailEnd type="none" w="med" len="med"/>
+                    </a:lnB>
+                    <a:noFill/>
+                  </a:tcPr>
+                </a:tc>
+                <a:tc>
+                  <a:txBody>
+                    <a:bodyPr/>
+                    <a:lstStyle/>
+                    <a:p>
+                      <a:endParaRPr lang="en-US" sz="1200" dirty="0">
+                        <a:solidFill>
+                          <a:schemeClr val="tx1"/>
+                        </a:solidFill>
+                      </a:endParaRPr>
+                    </a:p>
+                  </a:txBody>
+                  <a:tcPr>
+                    <a:lnL w="12700" cap="flat" cmpd="sng" algn="ctr">
+                      <a:solidFill>
+                        <a:schemeClr val="tx1"/>
+                      </a:solidFill>
+                      <a:prstDash val="solid"/>
+                      <a:round/>
+                      <a:headEnd type="none" w="med" len="med"/>
+                      <a:tailEnd type="none" w="med" len="med"/>
+                    </a:lnL>
+                    <a:lnR w="12700" cap="flat" cmpd="sng" algn="ctr">
+                      <a:solidFill>
+                        <a:schemeClr val="tx1"/>
+                      </a:solidFill>
+                      <a:prstDash val="solid"/>
+                      <a:round/>
+                      <a:headEnd type="none" w="med" len="med"/>
+                      <a:tailEnd type="none" w="med" len="med"/>
+                    </a:lnR>
+                    <a:lnT w="12700" cap="flat" cmpd="sng" algn="ctr">
+                      <a:solidFill>
+                        <a:schemeClr val="tx1"/>
+                      </a:solidFill>
+                      <a:prstDash val="solid"/>
+                      <a:round/>
+                      <a:headEnd type="none" w="med" len="med"/>
+                      <a:tailEnd type="none" w="med" len="med"/>
+                    </a:lnT>
+                    <a:lnB w="12700" cap="flat" cmpd="sng" algn="ctr">
+                      <a:solidFill>
+                        <a:schemeClr val="tx1"/>
+                      </a:solidFill>
+                      <a:prstDash val="solid"/>
+                      <a:round/>
+                      <a:headEnd type="none" w="med" len="med"/>
+                      <a:tailEnd type="none" w="med" len="med"/>
+                    </a:lnB>
+                    <a:noFill/>
+                  </a:tcPr>
+                </a:tc>
+              </a:tr>
+              <a:tr h="399621">
+                <a:tc>
+                  <a:txBody>
+                    <a:bodyPr/>
+                    <a:lstStyle/>
+                    <a:p>
+                      <a:endParaRPr lang="en-US" sz="1200" dirty="0">
+                        <a:solidFill>
+                          <a:schemeClr val="tx1"/>
+                        </a:solidFill>
+                      </a:endParaRPr>
+                    </a:p>
+                  </a:txBody>
+                  <a:tcPr>
+                    <a:lnL w="12700" cap="flat" cmpd="sng" algn="ctr">
+                      <a:solidFill>
+                        <a:schemeClr val="tx1"/>
+                      </a:solidFill>
+                      <a:prstDash val="solid"/>
+                      <a:round/>
+                      <a:headEnd type="none" w="med" len="med"/>
+                      <a:tailEnd type="none" w="med" len="med"/>
+                    </a:lnL>
+                    <a:lnR w="12700" cap="flat" cmpd="sng" algn="ctr">
+                      <a:solidFill>
+                        <a:schemeClr val="tx1"/>
+                      </a:solidFill>
+                      <a:prstDash val="solid"/>
+                      <a:round/>
+                      <a:headEnd type="none" w="med" len="med"/>
+                      <a:tailEnd type="none" w="med" len="med"/>
+                    </a:lnR>
+                    <a:lnT w="12700" cap="flat" cmpd="sng" algn="ctr">
+                      <a:solidFill>
+                        <a:schemeClr val="tx1"/>
+                      </a:solidFill>
+                      <a:prstDash val="solid"/>
+                      <a:round/>
+                      <a:headEnd type="none" w="med" len="med"/>
+                      <a:tailEnd type="none" w="med" len="med"/>
+                    </a:lnT>
+                    <a:lnB w="12700" cap="flat" cmpd="sng" algn="ctr">
+                      <a:solidFill>
+                        <a:schemeClr val="tx1"/>
+                      </a:solidFill>
+                      <a:prstDash val="solid"/>
+                      <a:round/>
+                      <a:headEnd type="none" w="med" len="med"/>
+                      <a:tailEnd type="none" w="med" len="med"/>
+                    </a:lnB>
+                    <a:noFill/>
+                  </a:tcPr>
+                </a:tc>
+                <a:tc>
+                  <a:txBody>
+                    <a:bodyPr/>
+                    <a:lstStyle/>
+                    <a:p>
+                      <a:r>
+                        <a:rPr lang="en-US" sz="1200" dirty="0" smtClean="0">
+                          <a:solidFill>
+                            <a:schemeClr val="tx1"/>
+                          </a:solidFill>
+                        </a:rPr>
+                        <a:t>method path protocol\r\n</a:t>
+                      </a:r>
+                      <a:endParaRPr lang="en-US" sz="1200" dirty="0">
+                        <a:solidFill>
+                          <a:schemeClr val="tx1"/>
+                        </a:solidFill>
+                      </a:endParaRPr>
+                    </a:p>
+                  </a:txBody>
+                  <a:tcPr>
+                    <a:lnL w="12700" cap="flat" cmpd="sng" algn="ctr">
+                      <a:solidFill>
+                        <a:schemeClr val="tx1"/>
+                      </a:solidFill>
+                      <a:prstDash val="solid"/>
+                      <a:round/>
+                      <a:headEnd type="none" w="med" len="med"/>
+                      <a:tailEnd type="none" w="med" len="med"/>
+                    </a:lnL>
+                    <a:lnR w="12700" cap="flat" cmpd="sng" algn="ctr">
+                      <a:solidFill>
+                        <a:schemeClr val="tx1"/>
+                      </a:solidFill>
+                      <a:prstDash val="solid"/>
+                      <a:round/>
+                      <a:headEnd type="none" w="med" len="med"/>
+                      <a:tailEnd type="none" w="med" len="med"/>
+                    </a:lnR>
+                    <a:lnT w="12700" cap="flat" cmpd="sng" algn="ctr">
+                      <a:solidFill>
+                        <a:schemeClr val="tx1"/>
+                      </a:solidFill>
+                      <a:prstDash val="solid"/>
+                      <a:round/>
+                      <a:headEnd type="none" w="med" len="med"/>
+                      <a:tailEnd type="none" w="med" len="med"/>
+                    </a:lnT>
+                    <a:lnB w="12700" cap="flat" cmpd="sng" algn="ctr">
+                      <a:solidFill>
+                        <a:schemeClr val="tx1"/>
+                      </a:solidFill>
+                      <a:prstDash val="solid"/>
+                      <a:round/>
+                      <a:headEnd type="none" w="med" len="med"/>
+                      <a:tailEnd type="none" w="med" len="med"/>
+                    </a:lnB>
+                    <a:noFill/>
+                  </a:tcPr>
+                </a:tc>
+                <a:tc>
+                  <a:txBody>
+                    <a:bodyPr/>
+                    <a:lstStyle/>
+                    <a:p>
+                      <a:pPr marL="0" marR="0" indent="0" algn="l" defTabSz="914400" rtl="0" eaLnBrk="1" fontAlgn="auto" latinLnBrk="0" hangingPunct="1">
+                        <a:lnSpc>
+                          <a:spcPct val="100000"/>
+                        </a:lnSpc>
+                        <a:spcBef>
+                          <a:spcPts val="0"/>
+                        </a:spcBef>
+                        <a:spcAft>
+                          <a:spcPts val="0"/>
+                        </a:spcAft>
+                        <a:buClrTx/>
+                        <a:buSzTx/>
+                        <a:buFontTx/>
+                        <a:buNone/>
+                        <a:tabLst/>
+                        <a:defRPr/>
+                      </a:pPr>
+                      <a:r>
+                        <a:rPr lang="en-US" sz="1200" dirty="0" smtClean="0">
+                          <a:solidFill>
+                            <a:schemeClr val="tx1"/>
+                          </a:solidFill>
+                        </a:rPr>
+                        <a:t>PUT /put</a:t>
+                      </a:r>
+                      <a:r>
+                        <a:rPr lang="en-US" sz="1200" baseline="0" dirty="0" smtClean="0">
+                          <a:solidFill>
+                            <a:schemeClr val="tx1"/>
+                          </a:solidFill>
+                        </a:rPr>
+                        <a:t> http/1.1\r\n</a:t>
+                      </a:r>
+                      <a:endParaRPr lang="en-US" sz="1200" dirty="0" smtClean="0">
+                        <a:solidFill>
+                          <a:schemeClr val="tx1"/>
+                        </a:solidFill>
+                      </a:endParaRPr>
+                    </a:p>
+                  </a:txBody>
+                  <a:tcPr>
+                    <a:lnL w="12700" cap="flat" cmpd="sng" algn="ctr">
+                      <a:solidFill>
+                        <a:schemeClr val="tx1"/>
+                      </a:solidFill>
+                      <a:prstDash val="solid"/>
+                      <a:round/>
+                      <a:headEnd type="none" w="med" len="med"/>
+                      <a:tailEnd type="none" w="med" len="med"/>
+                    </a:lnL>
+                    <a:lnR w="12700" cap="flat" cmpd="sng" algn="ctr">
+                      <a:solidFill>
+                        <a:schemeClr val="tx1"/>
+                      </a:solidFill>
+                      <a:prstDash val="solid"/>
+                      <a:round/>
+                      <a:headEnd type="none" w="med" len="med"/>
+                      <a:tailEnd type="none" w="med" len="med"/>
+                    </a:lnR>
+                    <a:lnT w="12700" cap="flat" cmpd="sng" algn="ctr">
+                      <a:solidFill>
+                        <a:schemeClr val="tx1"/>
+                      </a:solidFill>
+                      <a:prstDash val="solid"/>
+                      <a:round/>
+                      <a:headEnd type="none" w="med" len="med"/>
+                      <a:tailEnd type="none" w="med" len="med"/>
+                    </a:lnT>
+                    <a:lnB w="12700" cap="flat" cmpd="sng" algn="ctr">
+                      <a:solidFill>
+                        <a:schemeClr val="tx1"/>
+                      </a:solidFill>
+                      <a:prstDash val="solid"/>
+                      <a:round/>
+                      <a:headEnd type="none" w="med" len="med"/>
+                      <a:tailEnd type="none" w="med" len="med"/>
+                    </a:lnB>
+                    <a:noFill/>
+                  </a:tcPr>
+                </a:tc>
+                <a:tc>
+                  <a:txBody>
+                    <a:bodyPr/>
+                    <a:lstStyle/>
+                    <a:p>
+                      <a:endParaRPr lang="en-US" sz="1200" dirty="0">
+                        <a:solidFill>
+                          <a:schemeClr val="tx1"/>
+                        </a:solidFill>
+                      </a:endParaRPr>
+                    </a:p>
+                  </a:txBody>
+                  <a:tcPr>
+                    <a:lnL w="12700" cap="flat" cmpd="sng" algn="ctr">
+                      <a:solidFill>
+                        <a:schemeClr val="tx1"/>
+                      </a:solidFill>
+                      <a:prstDash val="solid"/>
+                      <a:round/>
+                      <a:headEnd type="none" w="med" len="med"/>
+                      <a:tailEnd type="none" w="med" len="med"/>
+                    </a:lnL>
+                    <a:lnR w="12700" cap="flat" cmpd="sng" algn="ctr">
+                      <a:solidFill>
+                        <a:schemeClr val="tx1"/>
+                      </a:solidFill>
+                      <a:prstDash val="solid"/>
+                      <a:round/>
+                      <a:headEnd type="none" w="med" len="med"/>
+                      <a:tailEnd type="none" w="med" len="med"/>
+                    </a:lnR>
+                    <a:lnT w="12700" cap="flat" cmpd="sng" algn="ctr">
+                      <a:solidFill>
+                        <a:schemeClr val="tx1"/>
+                      </a:solidFill>
+                      <a:prstDash val="solid"/>
+                      <a:round/>
+                      <a:headEnd type="none" w="med" len="med"/>
+                      <a:tailEnd type="none" w="med" len="med"/>
+                    </a:lnT>
+                    <a:lnB w="12700" cap="flat" cmpd="sng" algn="ctr">
+                      <a:solidFill>
+                        <a:schemeClr val="tx1"/>
+                      </a:solidFill>
+                      <a:prstDash val="solid"/>
+                      <a:round/>
+                      <a:headEnd type="none" w="med" len="med"/>
+                      <a:tailEnd type="none" w="med" len="med"/>
+                    </a:lnB>
+                    <a:noFill/>
+                  </a:tcPr>
+                </a:tc>
+              </a:tr>
+              <a:tr h="389124">
+                <a:tc>
+                  <a:txBody>
+                    <a:bodyPr/>
+                    <a:lstStyle/>
+                    <a:p>
+                      <a:r>
+                        <a:rPr lang="en-US" sz="1200" dirty="0" smtClean="0">
+                          <a:solidFill>
+                            <a:schemeClr val="tx1"/>
+                          </a:solidFill>
+                        </a:rPr>
+                        <a:t>Required Headers</a:t>
+                      </a:r>
+                      <a:endParaRPr lang="en-US" sz="1200" dirty="0">
+                        <a:solidFill>
+                          <a:schemeClr val="tx1"/>
+                        </a:solidFill>
+                      </a:endParaRPr>
+                    </a:p>
+                  </a:txBody>
+                  <a:tcPr>
+                    <a:lnL w="12700" cap="flat" cmpd="sng" algn="ctr">
+                      <a:solidFill>
+                        <a:schemeClr val="tx1"/>
+                      </a:solidFill>
+                      <a:prstDash val="solid"/>
+                      <a:round/>
+                      <a:headEnd type="none" w="med" len="med"/>
+                      <a:tailEnd type="none" w="med" len="med"/>
+                    </a:lnL>
+                    <a:lnR w="12700" cap="flat" cmpd="sng" algn="ctr">
+                      <a:solidFill>
+                        <a:schemeClr val="tx1"/>
+                      </a:solidFill>
+                      <a:prstDash val="solid"/>
+                      <a:round/>
+                      <a:headEnd type="none" w="med" len="med"/>
+                      <a:tailEnd type="none" w="med" len="med"/>
+                    </a:lnR>
+                    <a:lnT w="12700" cap="flat" cmpd="sng" algn="ctr">
+                      <a:solidFill>
+                        <a:schemeClr val="tx1"/>
+                      </a:solidFill>
+                      <a:prstDash val="solid"/>
+                      <a:round/>
+                      <a:headEnd type="none" w="med" len="med"/>
+                      <a:tailEnd type="none" w="med" len="med"/>
+                    </a:lnT>
+                    <a:lnB w="12700" cap="flat" cmpd="sng" algn="ctr">
+                      <a:solidFill>
+                        <a:schemeClr val="tx1"/>
+                      </a:solidFill>
+                      <a:prstDash val="solid"/>
+                      <a:round/>
+                      <a:headEnd type="none" w="med" len="med"/>
+                      <a:tailEnd type="none" w="med" len="med"/>
+                    </a:lnB>
+                    <a:noFill/>
+                  </a:tcPr>
+                </a:tc>
+                <a:tc>
+                  <a:txBody>
+                    <a:bodyPr/>
+                    <a:lstStyle/>
+                    <a:p>
+                      <a:r>
+                        <a:rPr lang="en-US" sz="1200" dirty="0" err="1" smtClean="0">
+                          <a:solidFill>
+                            <a:schemeClr val="tx1"/>
+                          </a:solidFill>
+                          <a:hlinkClick r:id="rId2"/>
+                        </a:rPr>
+                        <a:t>Iana</a:t>
+                      </a:r>
+                      <a:r>
+                        <a:rPr lang="en-US" sz="1200" dirty="0" smtClean="0">
+                          <a:solidFill>
+                            <a:schemeClr val="tx1"/>
+                          </a:solidFill>
+                          <a:hlinkClick r:id="rId2"/>
+                        </a:rPr>
+                        <a:t>-message-header</a:t>
+                      </a:r>
+                      <a:r>
+                        <a:rPr lang="en-US" sz="1200" dirty="0" smtClean="0">
+                          <a:solidFill>
+                            <a:schemeClr val="tx1"/>
+                          </a:solidFill>
+                        </a:rPr>
+                        <a:t>:</a:t>
+                      </a:r>
+                      <a:r>
+                        <a:rPr lang="en-US" sz="1200" baseline="0" dirty="0" smtClean="0">
+                          <a:solidFill>
+                            <a:schemeClr val="tx1"/>
+                          </a:solidFill>
+                        </a:rPr>
+                        <a:t> </a:t>
+                      </a:r>
+                      <a:r>
+                        <a:rPr lang="en-US" sz="1200" baseline="0" dirty="0" smtClean="0">
+                          <a:solidFill>
+                            <a:schemeClr val="tx1"/>
+                          </a:solidFill>
+                          <a:hlinkClick r:id="rId3"/>
+                        </a:rPr>
+                        <a:t>mime-type</a:t>
+                      </a:r>
+                      <a:endParaRPr lang="en-US" sz="1200" dirty="0">
+                        <a:solidFill>
+                          <a:schemeClr val="tx1"/>
+                        </a:solidFill>
+                      </a:endParaRPr>
+                    </a:p>
+                  </a:txBody>
+                  <a:tcPr>
+                    <a:lnL w="12700" cap="flat" cmpd="sng" algn="ctr">
+                      <a:solidFill>
+                        <a:schemeClr val="tx1"/>
+                      </a:solidFill>
+                      <a:prstDash val="solid"/>
+                      <a:round/>
+                      <a:headEnd type="none" w="med" len="med"/>
+                      <a:tailEnd type="none" w="med" len="med"/>
+                    </a:lnL>
+                    <a:lnR w="12700" cap="flat" cmpd="sng" algn="ctr">
+                      <a:solidFill>
+                        <a:schemeClr val="tx1"/>
+                      </a:solidFill>
+                      <a:prstDash val="solid"/>
+                      <a:round/>
+                      <a:headEnd type="none" w="med" len="med"/>
+                      <a:tailEnd type="none" w="med" len="med"/>
+                    </a:lnR>
+                    <a:lnT w="12700" cap="flat" cmpd="sng" algn="ctr">
+                      <a:solidFill>
+                        <a:schemeClr val="tx1"/>
+                      </a:solidFill>
+                      <a:prstDash val="solid"/>
+                      <a:round/>
+                      <a:headEnd type="none" w="med" len="med"/>
+                      <a:tailEnd type="none" w="med" len="med"/>
+                    </a:lnT>
+                    <a:lnB w="12700" cap="flat" cmpd="sng" algn="ctr">
+                      <a:solidFill>
+                        <a:schemeClr val="tx1"/>
+                      </a:solidFill>
+                      <a:prstDash val="solid"/>
+                      <a:round/>
+                      <a:headEnd type="none" w="med" len="med"/>
+                      <a:tailEnd type="none" w="med" len="med"/>
+                    </a:lnB>
+                    <a:noFill/>
+                  </a:tcPr>
+                </a:tc>
+                <a:tc>
+                  <a:txBody>
+                    <a:bodyPr/>
+                    <a:lstStyle/>
+                    <a:p>
+                      <a:r>
+                        <a:rPr lang="en-US" sz="1200" dirty="0" smtClean="0">
+                          <a:solidFill>
+                            <a:schemeClr val="tx1"/>
+                          </a:solidFill>
+                        </a:rPr>
+                        <a:t>Host: </a:t>
+                      </a:r>
+                      <a:r>
+                        <a:rPr lang="en-US" sz="1200" dirty="0" err="1" smtClean="0">
+                          <a:solidFill>
+                            <a:schemeClr val="tx1"/>
+                          </a:solidFill>
+                        </a:rPr>
+                        <a:t>httpbin.org</a:t>
+                      </a:r>
+                      <a:r>
+                        <a:rPr lang="en-US" sz="1200" dirty="0" smtClean="0">
+                          <a:solidFill>
+                            <a:schemeClr val="tx1"/>
+                          </a:solidFill>
+                        </a:rPr>
+                        <a:t>\r\n</a:t>
+                      </a:r>
+                      <a:endParaRPr lang="en-US" sz="1200" dirty="0">
+                        <a:solidFill>
+                          <a:schemeClr val="tx1"/>
+                        </a:solidFill>
+                      </a:endParaRPr>
+                    </a:p>
+                  </a:txBody>
+                  <a:tcPr>
+                    <a:lnL w="12700" cap="flat" cmpd="sng" algn="ctr">
+                      <a:solidFill>
+                        <a:schemeClr val="tx1"/>
+                      </a:solidFill>
+                      <a:prstDash val="solid"/>
+                      <a:round/>
+                      <a:headEnd type="none" w="med" len="med"/>
+                      <a:tailEnd type="none" w="med" len="med"/>
+                    </a:lnL>
+                    <a:lnR w="12700" cap="flat" cmpd="sng" algn="ctr">
+                      <a:solidFill>
+                        <a:schemeClr val="tx1"/>
+                      </a:solidFill>
+                      <a:prstDash val="solid"/>
+                      <a:round/>
+                      <a:headEnd type="none" w="med" len="med"/>
+                      <a:tailEnd type="none" w="med" len="med"/>
+                    </a:lnR>
+                    <a:lnT w="12700" cap="flat" cmpd="sng" algn="ctr">
+                      <a:solidFill>
+                        <a:schemeClr val="tx1"/>
+                      </a:solidFill>
+                      <a:prstDash val="solid"/>
+                      <a:round/>
+                      <a:headEnd type="none" w="med" len="med"/>
+                      <a:tailEnd type="none" w="med" len="med"/>
+                    </a:lnT>
+                    <a:lnB w="12700" cap="flat" cmpd="sng" algn="ctr">
+                      <a:solidFill>
+                        <a:schemeClr val="tx1"/>
+                      </a:solidFill>
+                      <a:prstDash val="solid"/>
+                      <a:round/>
+                      <a:headEnd type="none" w="med" len="med"/>
+                      <a:tailEnd type="none" w="med" len="med"/>
+                    </a:lnB>
+                    <a:noFill/>
+                  </a:tcPr>
+                </a:tc>
+                <a:tc>
+                  <a:txBody>
+                    <a:bodyPr/>
+                    <a:lstStyle/>
+                    <a:p>
+                      <a:endParaRPr lang="en-US" sz="1200">
+                        <a:solidFill>
+                          <a:schemeClr val="tx1"/>
+                        </a:solidFill>
+                      </a:endParaRPr>
+                    </a:p>
+                  </a:txBody>
+                  <a:tcPr>
+                    <a:lnL w="12700" cap="flat" cmpd="sng" algn="ctr">
+                      <a:solidFill>
+                        <a:schemeClr val="tx1"/>
+                      </a:solidFill>
+                      <a:prstDash val="solid"/>
+                      <a:round/>
+                      <a:headEnd type="none" w="med" len="med"/>
+                      <a:tailEnd type="none" w="med" len="med"/>
+                    </a:lnL>
+                    <a:lnR w="12700" cap="flat" cmpd="sng" algn="ctr">
+                      <a:solidFill>
+                        <a:schemeClr val="tx1"/>
+                      </a:solidFill>
+                      <a:prstDash val="solid"/>
+                      <a:round/>
+                      <a:headEnd type="none" w="med" len="med"/>
+                      <a:tailEnd type="none" w="med" len="med"/>
+                    </a:lnR>
+                    <a:lnT w="12700" cap="flat" cmpd="sng" algn="ctr">
+                      <a:solidFill>
+                        <a:schemeClr val="tx1"/>
+                      </a:solidFill>
+                      <a:prstDash val="solid"/>
+                      <a:round/>
+                      <a:headEnd type="none" w="med" len="med"/>
+                      <a:tailEnd type="none" w="med" len="med"/>
+                    </a:lnT>
+                    <a:lnB w="12700" cap="flat" cmpd="sng" algn="ctr">
+                      <a:solidFill>
+                        <a:schemeClr val="tx1"/>
+                      </a:solidFill>
+                      <a:prstDash val="solid"/>
+                      <a:round/>
+                      <a:headEnd type="none" w="med" len="med"/>
+                      <a:tailEnd type="none" w="med" len="med"/>
+                    </a:lnB>
+                    <a:noFill/>
+                  </a:tcPr>
+                </a:tc>
+              </a:tr>
+              <a:tr h="389124">
+                <a:tc>
+                  <a:txBody>
+                    <a:bodyPr/>
+                    <a:lstStyle/>
+                    <a:p>
+                      <a:endParaRPr lang="en-US" sz="1200" dirty="0">
+                        <a:solidFill>
+                          <a:schemeClr val="tx1"/>
+                        </a:solidFill>
+                      </a:endParaRPr>
+                    </a:p>
+                  </a:txBody>
+                  <a:tcPr>
+                    <a:lnL w="12700" cap="flat" cmpd="sng" algn="ctr">
+                      <a:solidFill>
+                        <a:schemeClr val="tx1"/>
+                      </a:solidFill>
+                      <a:prstDash val="solid"/>
+                      <a:round/>
+                      <a:headEnd type="none" w="med" len="med"/>
+                      <a:tailEnd type="none" w="med" len="med"/>
+                    </a:lnL>
+                    <a:lnR w="12700" cap="flat" cmpd="sng" algn="ctr">
+                      <a:solidFill>
+                        <a:schemeClr val="tx1"/>
+                      </a:solidFill>
+                      <a:prstDash val="solid"/>
+                      <a:round/>
+                      <a:headEnd type="none" w="med" len="med"/>
+                      <a:tailEnd type="none" w="med" len="med"/>
+                    </a:lnR>
+                    <a:lnT w="12700" cap="flat" cmpd="sng" algn="ctr">
+                      <a:solidFill>
+                        <a:schemeClr val="tx1"/>
+                      </a:solidFill>
+                      <a:prstDash val="solid"/>
+                      <a:round/>
+                      <a:headEnd type="none" w="med" len="med"/>
+                      <a:tailEnd type="none" w="med" len="med"/>
+                    </a:lnT>
+                    <a:lnB w="12700" cap="flat" cmpd="sng" algn="ctr">
+                      <a:solidFill>
+                        <a:schemeClr val="tx1"/>
+                      </a:solidFill>
+                      <a:prstDash val="solid"/>
+                      <a:round/>
+                      <a:headEnd type="none" w="med" len="med"/>
+                      <a:tailEnd type="none" w="med" len="med"/>
+                    </a:lnB>
+                    <a:noFill/>
+                  </a:tcPr>
+                </a:tc>
+                <a:tc>
+                  <a:txBody>
+                    <a:bodyPr/>
+                    <a:lstStyle/>
+                    <a:p>
+                      <a:endParaRPr lang="en-US" sz="1200" dirty="0">
+                        <a:solidFill>
+                          <a:schemeClr val="tx1"/>
+                        </a:solidFill>
+                      </a:endParaRPr>
+                    </a:p>
+                  </a:txBody>
+                  <a:tcPr>
+                    <a:lnL w="12700" cap="flat" cmpd="sng" algn="ctr">
+                      <a:solidFill>
+                        <a:schemeClr val="tx1"/>
+                      </a:solidFill>
+                      <a:prstDash val="solid"/>
+                      <a:round/>
+                      <a:headEnd type="none" w="med" len="med"/>
+                      <a:tailEnd type="none" w="med" len="med"/>
+                    </a:lnL>
+                    <a:lnR w="12700" cap="flat" cmpd="sng" algn="ctr">
+                      <a:solidFill>
+                        <a:schemeClr val="tx1"/>
+                      </a:solidFill>
+                      <a:prstDash val="solid"/>
+                      <a:round/>
+                      <a:headEnd type="none" w="med" len="med"/>
+                      <a:tailEnd type="none" w="med" len="med"/>
+                    </a:lnR>
+                    <a:lnT w="12700" cap="flat" cmpd="sng" algn="ctr">
+                      <a:solidFill>
+                        <a:schemeClr val="tx1"/>
+                      </a:solidFill>
+                      <a:prstDash val="solid"/>
+                      <a:round/>
+                      <a:headEnd type="none" w="med" len="med"/>
+                      <a:tailEnd type="none" w="med" len="med"/>
+                    </a:lnT>
+                    <a:lnB w="12700" cap="flat" cmpd="sng" algn="ctr">
+                      <a:solidFill>
+                        <a:schemeClr val="tx1"/>
+                      </a:solidFill>
+                      <a:prstDash val="solid"/>
+                      <a:round/>
+                      <a:headEnd type="none" w="med" len="med"/>
+                      <a:tailEnd type="none" w="med" len="med"/>
+                    </a:lnB>
+                    <a:noFill/>
+                  </a:tcPr>
+                </a:tc>
+                <a:tc>
+                  <a:txBody>
+                    <a:bodyPr/>
+                    <a:lstStyle/>
+                    <a:p>
+                      <a:r>
+                        <a:rPr lang="en-US" sz="1200" dirty="0" smtClean="0">
+                          <a:solidFill>
+                            <a:schemeClr val="tx1"/>
+                          </a:solidFill>
+                        </a:rPr>
+                        <a:t>Content-type: application/</a:t>
+                      </a:r>
+                      <a:r>
+                        <a:rPr lang="en-US" sz="1200" dirty="0" err="1" smtClean="0">
+                          <a:solidFill>
+                            <a:schemeClr val="tx1"/>
+                          </a:solidFill>
+                        </a:rPr>
+                        <a:t>json</a:t>
+                      </a:r>
+                      <a:r>
+                        <a:rPr lang="en-US" sz="1200" dirty="0" smtClean="0">
+                          <a:solidFill>
+                            <a:schemeClr val="tx1"/>
+                          </a:solidFill>
+                        </a:rPr>
+                        <a:t>\r\n</a:t>
+                      </a:r>
+                      <a:endParaRPr lang="en-US" sz="1200" dirty="0">
+                        <a:solidFill>
+                          <a:schemeClr val="tx1"/>
+                        </a:solidFill>
+                      </a:endParaRPr>
+                    </a:p>
+                  </a:txBody>
+                  <a:tcPr>
+                    <a:lnL w="12700" cap="flat" cmpd="sng" algn="ctr">
+                      <a:solidFill>
+                        <a:schemeClr val="tx1"/>
+                      </a:solidFill>
+                      <a:prstDash val="solid"/>
+                      <a:round/>
+                      <a:headEnd type="none" w="med" len="med"/>
+                      <a:tailEnd type="none" w="med" len="med"/>
+                    </a:lnL>
+                    <a:lnR w="12700" cap="flat" cmpd="sng" algn="ctr">
+                      <a:solidFill>
+                        <a:schemeClr val="tx1"/>
+                      </a:solidFill>
+                      <a:prstDash val="solid"/>
+                      <a:round/>
+                      <a:headEnd type="none" w="med" len="med"/>
+                      <a:tailEnd type="none" w="med" len="med"/>
+                    </a:lnR>
+                    <a:lnT w="12700" cap="flat" cmpd="sng" algn="ctr">
+                      <a:solidFill>
+                        <a:schemeClr val="tx1"/>
+                      </a:solidFill>
+                      <a:prstDash val="solid"/>
+                      <a:round/>
+                      <a:headEnd type="none" w="med" len="med"/>
+                      <a:tailEnd type="none" w="med" len="med"/>
+                    </a:lnT>
+                    <a:lnB w="12700" cap="flat" cmpd="sng" algn="ctr">
+                      <a:solidFill>
+                        <a:schemeClr val="tx1"/>
+                      </a:solidFill>
+                      <a:prstDash val="solid"/>
+                      <a:round/>
+                      <a:headEnd type="none" w="med" len="med"/>
+                      <a:tailEnd type="none" w="med" len="med"/>
+                    </a:lnB>
+                    <a:noFill/>
+                  </a:tcPr>
+                </a:tc>
+                <a:tc>
+                  <a:txBody>
+                    <a:bodyPr/>
+                    <a:lstStyle/>
+                    <a:p>
+                      <a:endParaRPr lang="en-US" sz="1200" dirty="0">
+                        <a:solidFill>
+                          <a:schemeClr val="tx1"/>
+                        </a:solidFill>
+                      </a:endParaRPr>
+                    </a:p>
+                  </a:txBody>
+                  <a:tcPr>
+                    <a:lnL w="12700" cap="flat" cmpd="sng" algn="ctr">
+                      <a:solidFill>
+                        <a:schemeClr val="tx1"/>
+                      </a:solidFill>
+                      <a:prstDash val="solid"/>
+                      <a:round/>
+                      <a:headEnd type="none" w="med" len="med"/>
+                      <a:tailEnd type="none" w="med" len="med"/>
+                    </a:lnL>
+                    <a:lnR w="12700" cap="flat" cmpd="sng" algn="ctr">
+                      <a:solidFill>
+                        <a:schemeClr val="tx1"/>
+                      </a:solidFill>
+                      <a:prstDash val="solid"/>
+                      <a:round/>
+                      <a:headEnd type="none" w="med" len="med"/>
+                      <a:tailEnd type="none" w="med" len="med"/>
+                    </a:lnR>
+                    <a:lnT w="12700" cap="flat" cmpd="sng" algn="ctr">
+                      <a:solidFill>
+                        <a:schemeClr val="tx1"/>
+                      </a:solidFill>
+                      <a:prstDash val="solid"/>
+                      <a:round/>
+                      <a:headEnd type="none" w="med" len="med"/>
+                      <a:tailEnd type="none" w="med" len="med"/>
+                    </a:lnT>
+                    <a:lnB w="12700" cap="flat" cmpd="sng" algn="ctr">
+                      <a:solidFill>
+                        <a:schemeClr val="tx1"/>
+                      </a:solidFill>
+                      <a:prstDash val="solid"/>
+                      <a:round/>
+                      <a:headEnd type="none" w="med" len="med"/>
+                      <a:tailEnd type="none" w="med" len="med"/>
+                    </a:lnB>
+                    <a:noFill/>
+                  </a:tcPr>
+                </a:tc>
+              </a:tr>
+              <a:tr h="389124">
+                <a:tc>
+                  <a:txBody>
+                    <a:bodyPr/>
+                    <a:lstStyle/>
+                    <a:p>
+                      <a:endParaRPr lang="en-US" sz="1200" dirty="0">
+                        <a:solidFill>
+                          <a:schemeClr val="tx1"/>
+                        </a:solidFill>
+                      </a:endParaRPr>
+                    </a:p>
+                  </a:txBody>
+                  <a:tcPr>
+                    <a:lnL w="12700" cap="flat" cmpd="sng" algn="ctr">
+                      <a:solidFill>
+                        <a:schemeClr val="tx1"/>
+                      </a:solidFill>
+                      <a:prstDash val="solid"/>
+                      <a:round/>
+                      <a:headEnd type="none" w="med" len="med"/>
+                      <a:tailEnd type="none" w="med" len="med"/>
+                    </a:lnL>
+                    <a:lnR w="12700" cap="flat" cmpd="sng" algn="ctr">
+                      <a:solidFill>
+                        <a:schemeClr val="tx1"/>
+                      </a:solidFill>
+                      <a:prstDash val="solid"/>
+                      <a:round/>
+                      <a:headEnd type="none" w="med" len="med"/>
+                      <a:tailEnd type="none" w="med" len="med"/>
+                    </a:lnR>
+                    <a:lnT w="12700" cap="flat" cmpd="sng" algn="ctr">
+                      <a:solidFill>
+                        <a:schemeClr val="tx1"/>
+                      </a:solidFill>
+                      <a:prstDash val="solid"/>
+                      <a:round/>
+                      <a:headEnd type="none" w="med" len="med"/>
+                      <a:tailEnd type="none" w="med" len="med"/>
+                    </a:lnT>
+                    <a:lnB w="12700" cap="flat" cmpd="sng" algn="ctr">
+                      <a:solidFill>
+                        <a:schemeClr val="tx1"/>
+                      </a:solidFill>
+                      <a:prstDash val="solid"/>
+                      <a:round/>
+                      <a:headEnd type="none" w="med" len="med"/>
+                      <a:tailEnd type="none" w="med" len="med"/>
+                    </a:lnB>
+                    <a:noFill/>
+                  </a:tcPr>
+                </a:tc>
+                <a:tc>
+                  <a:txBody>
+                    <a:bodyPr/>
+                    <a:lstStyle/>
+                    <a:p>
+                      <a:endParaRPr lang="en-US" sz="1200" dirty="0">
+                        <a:solidFill>
+                          <a:schemeClr val="tx1"/>
+                        </a:solidFill>
+                      </a:endParaRPr>
+                    </a:p>
+                  </a:txBody>
+                  <a:tcPr>
+                    <a:lnL w="12700" cap="flat" cmpd="sng" algn="ctr">
+                      <a:solidFill>
+                        <a:schemeClr val="tx1"/>
+                      </a:solidFill>
+                      <a:prstDash val="solid"/>
+                      <a:round/>
+                      <a:headEnd type="none" w="med" len="med"/>
+                      <a:tailEnd type="none" w="med" len="med"/>
+                    </a:lnL>
+                    <a:lnR w="12700" cap="flat" cmpd="sng" algn="ctr">
+                      <a:solidFill>
+                        <a:schemeClr val="tx1"/>
+                      </a:solidFill>
+                      <a:prstDash val="solid"/>
+                      <a:round/>
+                      <a:headEnd type="none" w="med" len="med"/>
+                      <a:tailEnd type="none" w="med" len="med"/>
+                    </a:lnR>
+                    <a:lnT w="12700" cap="flat" cmpd="sng" algn="ctr">
+                      <a:solidFill>
+                        <a:schemeClr val="tx1"/>
+                      </a:solidFill>
+                      <a:prstDash val="solid"/>
+                      <a:round/>
+                      <a:headEnd type="none" w="med" len="med"/>
+                      <a:tailEnd type="none" w="med" len="med"/>
+                    </a:lnT>
+                    <a:lnB w="12700" cap="flat" cmpd="sng" algn="ctr">
+                      <a:solidFill>
+                        <a:schemeClr val="tx1"/>
+                      </a:solidFill>
+                      <a:prstDash val="solid"/>
+                      <a:round/>
+                      <a:headEnd type="none" w="med" len="med"/>
+                      <a:tailEnd type="none" w="med" len="med"/>
+                    </a:lnB>
+                    <a:noFill/>
+                  </a:tcPr>
+                </a:tc>
+                <a:tc>
+                  <a:txBody>
+                    <a:bodyPr/>
+                    <a:lstStyle/>
+                    <a:p>
+                      <a:r>
+                        <a:rPr lang="en-US" sz="1200" dirty="0" smtClean="0">
+                          <a:solidFill>
+                            <a:schemeClr val="tx1"/>
+                          </a:solidFill>
+                        </a:rPr>
+                        <a:t>Content-length: 10\r\n</a:t>
+                      </a:r>
+                      <a:endParaRPr lang="en-US" sz="1200" dirty="0">
+                        <a:solidFill>
+                          <a:schemeClr val="tx1"/>
+                        </a:solidFill>
+                      </a:endParaRPr>
+                    </a:p>
+                  </a:txBody>
+                  <a:tcPr>
+                    <a:lnL w="12700" cap="flat" cmpd="sng" algn="ctr">
+                      <a:solidFill>
+                        <a:schemeClr val="tx1"/>
+                      </a:solidFill>
+                      <a:prstDash val="solid"/>
+                      <a:round/>
+                      <a:headEnd type="none" w="med" len="med"/>
+                      <a:tailEnd type="none" w="med" len="med"/>
+                    </a:lnL>
+                    <a:lnR w="12700" cap="flat" cmpd="sng" algn="ctr">
+                      <a:solidFill>
+                        <a:schemeClr val="tx1"/>
+                      </a:solidFill>
+                      <a:prstDash val="solid"/>
+                      <a:round/>
+                      <a:headEnd type="none" w="med" len="med"/>
+                      <a:tailEnd type="none" w="med" len="med"/>
+                    </a:lnR>
+                    <a:lnT w="12700" cap="flat" cmpd="sng" algn="ctr">
+                      <a:solidFill>
+                        <a:schemeClr val="tx1"/>
+                      </a:solidFill>
+                      <a:prstDash val="solid"/>
+                      <a:round/>
+                      <a:headEnd type="none" w="med" len="med"/>
+                      <a:tailEnd type="none" w="med" len="med"/>
+                    </a:lnT>
+                    <a:lnB w="12700" cap="flat" cmpd="sng" algn="ctr">
+                      <a:solidFill>
+                        <a:schemeClr val="tx1"/>
+                      </a:solidFill>
+                      <a:prstDash val="solid"/>
+                      <a:round/>
+                      <a:headEnd type="none" w="med" len="med"/>
+                      <a:tailEnd type="none" w="med" len="med"/>
+                    </a:lnB>
+                    <a:noFill/>
+                  </a:tcPr>
+                </a:tc>
+                <a:tc>
+                  <a:txBody>
+                    <a:bodyPr/>
+                    <a:lstStyle/>
+                    <a:p>
+                      <a:endParaRPr lang="en-US" sz="1200" dirty="0">
+                        <a:solidFill>
+                          <a:schemeClr val="tx1"/>
+                        </a:solidFill>
+                      </a:endParaRPr>
+                    </a:p>
+                  </a:txBody>
+                  <a:tcPr>
+                    <a:lnL w="12700" cap="flat" cmpd="sng" algn="ctr">
+                      <a:solidFill>
+                        <a:schemeClr val="tx1"/>
+                      </a:solidFill>
+                      <a:prstDash val="solid"/>
+                      <a:round/>
+                      <a:headEnd type="none" w="med" len="med"/>
+                      <a:tailEnd type="none" w="med" len="med"/>
+                    </a:lnL>
+                    <a:lnR w="12700" cap="flat" cmpd="sng" algn="ctr">
+                      <a:solidFill>
+                        <a:schemeClr val="tx1"/>
+                      </a:solidFill>
+                      <a:prstDash val="solid"/>
+                      <a:round/>
+                      <a:headEnd type="none" w="med" len="med"/>
+                      <a:tailEnd type="none" w="med" len="med"/>
+                    </a:lnR>
+                    <a:lnT w="12700" cap="flat" cmpd="sng" algn="ctr">
+                      <a:solidFill>
+                        <a:schemeClr val="tx1"/>
+                      </a:solidFill>
+                      <a:prstDash val="solid"/>
+                      <a:round/>
+                      <a:headEnd type="none" w="med" len="med"/>
+                      <a:tailEnd type="none" w="med" len="med"/>
+                    </a:lnT>
+                    <a:lnB w="12700" cap="flat" cmpd="sng" algn="ctr">
+                      <a:solidFill>
+                        <a:schemeClr val="tx1"/>
+                      </a:solidFill>
+                      <a:prstDash val="solid"/>
+                      <a:round/>
+                      <a:headEnd type="none" w="med" len="med"/>
+                      <a:tailEnd type="none" w="med" len="med"/>
+                    </a:lnB>
+                    <a:noFill/>
+                  </a:tcPr>
+                </a:tc>
+              </a:tr>
+              <a:tr h="389124">
+                <a:tc>
+                  <a:txBody>
+                    <a:bodyPr/>
+                    <a:lstStyle/>
+                    <a:p>
+                      <a:endParaRPr lang="en-US" sz="1200" dirty="0">
+                        <a:solidFill>
+                          <a:schemeClr val="tx1"/>
+                        </a:solidFill>
+                      </a:endParaRPr>
+                    </a:p>
+                  </a:txBody>
+                  <a:tcPr>
+                    <a:lnL w="12700" cap="flat" cmpd="sng" algn="ctr">
+                      <a:solidFill>
+                        <a:schemeClr val="tx1"/>
+                      </a:solidFill>
+                      <a:prstDash val="solid"/>
+                      <a:round/>
+                      <a:headEnd type="none" w="med" len="med"/>
+                      <a:tailEnd type="none" w="med" len="med"/>
+                    </a:lnL>
+                    <a:lnR w="12700" cap="flat" cmpd="sng" algn="ctr">
+                      <a:solidFill>
+                        <a:schemeClr val="tx1"/>
+                      </a:solidFill>
+                      <a:prstDash val="solid"/>
+                      <a:round/>
+                      <a:headEnd type="none" w="med" len="med"/>
+                      <a:tailEnd type="none" w="med" len="med"/>
+                    </a:lnR>
+                    <a:lnT w="12700" cap="flat" cmpd="sng" algn="ctr">
+                      <a:solidFill>
+                        <a:schemeClr val="tx1"/>
+                      </a:solidFill>
+                      <a:prstDash val="solid"/>
+                      <a:round/>
+                      <a:headEnd type="none" w="med" len="med"/>
+                      <a:tailEnd type="none" w="med" len="med"/>
+                    </a:lnT>
+                    <a:lnB w="12700" cap="flat" cmpd="sng" algn="ctr">
+                      <a:solidFill>
+                        <a:schemeClr val="tx1"/>
+                      </a:solidFill>
+                      <a:prstDash val="solid"/>
+                      <a:round/>
+                      <a:headEnd type="none" w="med" len="med"/>
+                      <a:tailEnd type="none" w="med" len="med"/>
+                    </a:lnB>
+                    <a:noFill/>
+                  </a:tcPr>
+                </a:tc>
+                <a:tc>
+                  <a:txBody>
+                    <a:bodyPr/>
+                    <a:lstStyle/>
+                    <a:p>
+                      <a:r>
+                        <a:rPr lang="en-US" sz="1200" dirty="0" smtClean="0">
+                          <a:solidFill>
+                            <a:schemeClr val="tx1"/>
+                          </a:solidFill>
+                        </a:rPr>
+                        <a:t>Optional header</a:t>
+                      </a:r>
+                      <a:endParaRPr lang="en-US" sz="1200" dirty="0">
+                        <a:solidFill>
+                          <a:schemeClr val="tx1"/>
+                        </a:solidFill>
+                      </a:endParaRPr>
+                    </a:p>
+                  </a:txBody>
+                  <a:tcPr>
+                    <a:lnL w="12700" cap="flat" cmpd="sng" algn="ctr">
+                      <a:solidFill>
+                        <a:schemeClr val="tx1"/>
+                      </a:solidFill>
+                      <a:prstDash val="solid"/>
+                      <a:round/>
+                      <a:headEnd type="none" w="med" len="med"/>
+                      <a:tailEnd type="none" w="med" len="med"/>
+                    </a:lnL>
+                    <a:lnR w="12700" cap="flat" cmpd="sng" algn="ctr">
+                      <a:solidFill>
+                        <a:schemeClr val="tx1"/>
+                      </a:solidFill>
+                      <a:prstDash val="solid"/>
+                      <a:round/>
+                      <a:headEnd type="none" w="med" len="med"/>
+                      <a:tailEnd type="none" w="med" len="med"/>
+                    </a:lnR>
+                    <a:lnT w="12700" cap="flat" cmpd="sng" algn="ctr">
+                      <a:solidFill>
+                        <a:schemeClr val="tx1"/>
+                      </a:solidFill>
+                      <a:prstDash val="solid"/>
+                      <a:round/>
+                      <a:headEnd type="none" w="med" len="med"/>
+                      <a:tailEnd type="none" w="med" len="med"/>
+                    </a:lnT>
+                    <a:lnB w="12700" cap="flat" cmpd="sng" algn="ctr">
+                      <a:solidFill>
+                        <a:schemeClr val="tx1"/>
+                      </a:solidFill>
+                      <a:prstDash val="solid"/>
+                      <a:round/>
+                      <a:headEnd type="none" w="med" len="med"/>
+                      <a:tailEnd type="none" w="med" len="med"/>
+                    </a:lnB>
+                    <a:noFill/>
+                  </a:tcPr>
+                </a:tc>
+                <a:tc>
+                  <a:txBody>
+                    <a:bodyPr/>
+                    <a:lstStyle/>
+                    <a:p>
+                      <a:r>
+                        <a:rPr lang="en-US" sz="1200" dirty="0" smtClean="0">
+                          <a:solidFill>
+                            <a:schemeClr val="tx1"/>
+                          </a:solidFill>
+                        </a:rPr>
+                        <a:t>X-silly: something silly\r\n</a:t>
+                      </a:r>
+                      <a:endParaRPr lang="en-US" sz="1200" dirty="0">
+                        <a:solidFill>
+                          <a:schemeClr val="tx1"/>
+                        </a:solidFill>
+                      </a:endParaRPr>
+                    </a:p>
+                  </a:txBody>
+                  <a:tcPr>
+                    <a:lnL w="12700" cap="flat" cmpd="sng" algn="ctr">
+                      <a:solidFill>
+                        <a:schemeClr val="tx1"/>
+                      </a:solidFill>
+                      <a:prstDash val="solid"/>
+                      <a:round/>
+                      <a:headEnd type="none" w="med" len="med"/>
+                      <a:tailEnd type="none" w="med" len="med"/>
+                    </a:lnL>
+                    <a:lnR w="12700" cap="flat" cmpd="sng" algn="ctr">
+                      <a:solidFill>
+                        <a:schemeClr val="tx1"/>
+                      </a:solidFill>
+                      <a:prstDash val="solid"/>
+                      <a:round/>
+                      <a:headEnd type="none" w="med" len="med"/>
+                      <a:tailEnd type="none" w="med" len="med"/>
+                    </a:lnR>
+                    <a:lnT w="12700" cap="flat" cmpd="sng" algn="ctr">
+                      <a:solidFill>
+                        <a:schemeClr val="tx1"/>
+                      </a:solidFill>
+                      <a:prstDash val="solid"/>
+                      <a:round/>
+                      <a:headEnd type="none" w="med" len="med"/>
+                      <a:tailEnd type="none" w="med" len="med"/>
+                    </a:lnT>
+                    <a:lnB w="12700" cap="flat" cmpd="sng" algn="ctr">
+                      <a:solidFill>
+                        <a:schemeClr val="tx1"/>
+                      </a:solidFill>
+                      <a:prstDash val="solid"/>
+                      <a:round/>
+                      <a:headEnd type="none" w="med" len="med"/>
+                      <a:tailEnd type="none" w="med" len="med"/>
+                    </a:lnB>
+                    <a:noFill/>
+                  </a:tcPr>
+                </a:tc>
+                <a:tc>
+                  <a:txBody>
+                    <a:bodyPr/>
+                    <a:lstStyle/>
+                    <a:p>
+                      <a:endParaRPr lang="en-US" sz="1200" dirty="0">
+                        <a:solidFill>
+                          <a:schemeClr val="tx1"/>
+                        </a:solidFill>
+                      </a:endParaRPr>
+                    </a:p>
+                  </a:txBody>
+                  <a:tcPr>
+                    <a:lnL w="12700" cap="flat" cmpd="sng" algn="ctr">
+                      <a:solidFill>
+                        <a:schemeClr val="tx1"/>
+                      </a:solidFill>
+                      <a:prstDash val="solid"/>
+                      <a:round/>
+                      <a:headEnd type="none" w="med" len="med"/>
+                      <a:tailEnd type="none" w="med" len="med"/>
+                    </a:lnL>
+                    <a:lnR w="12700" cap="flat" cmpd="sng" algn="ctr">
+                      <a:solidFill>
+                        <a:schemeClr val="tx1"/>
+                      </a:solidFill>
+                      <a:prstDash val="solid"/>
+                      <a:round/>
+                      <a:headEnd type="none" w="med" len="med"/>
+                      <a:tailEnd type="none" w="med" len="med"/>
+                    </a:lnR>
+                    <a:lnT w="12700" cap="flat" cmpd="sng" algn="ctr">
+                      <a:solidFill>
+                        <a:schemeClr val="tx1"/>
+                      </a:solidFill>
+                      <a:prstDash val="solid"/>
+                      <a:round/>
+                      <a:headEnd type="none" w="med" len="med"/>
+                      <a:tailEnd type="none" w="med" len="med"/>
+                    </a:lnT>
+                    <a:lnB w="12700" cap="flat" cmpd="sng" algn="ctr">
+                      <a:solidFill>
+                        <a:schemeClr val="tx1"/>
+                      </a:solidFill>
+                      <a:prstDash val="solid"/>
+                      <a:round/>
+                      <a:headEnd type="none" w="med" len="med"/>
+                      <a:tailEnd type="none" w="med" len="med"/>
+                    </a:lnB>
+                    <a:noFill/>
+                  </a:tcPr>
+                </a:tc>
+              </a:tr>
+              <a:tr h="389124">
+                <a:tc>
+                  <a:txBody>
+                    <a:bodyPr/>
+                    <a:lstStyle/>
+                    <a:p>
+                      <a:r>
+                        <a:rPr lang="en-US" sz="1200" dirty="0" smtClean="0">
+                          <a:solidFill>
+                            <a:schemeClr val="tx1"/>
+                          </a:solidFill>
+                        </a:rPr>
+                        <a:t>Blank Line</a:t>
+                      </a:r>
+                      <a:endParaRPr lang="en-US" sz="1200" dirty="0">
+                        <a:solidFill>
+                          <a:schemeClr val="tx1"/>
+                        </a:solidFill>
+                      </a:endParaRPr>
+                    </a:p>
+                  </a:txBody>
+                  <a:tcPr>
+                    <a:lnL w="12700" cap="flat" cmpd="sng" algn="ctr">
+                      <a:solidFill>
+                        <a:schemeClr val="tx1"/>
+                      </a:solidFill>
+                      <a:prstDash val="solid"/>
+                      <a:round/>
+                      <a:headEnd type="none" w="med" len="med"/>
+                      <a:tailEnd type="none" w="med" len="med"/>
+                    </a:lnL>
+                    <a:lnR w="12700" cap="flat" cmpd="sng" algn="ctr">
+                      <a:solidFill>
+                        <a:schemeClr val="tx1"/>
+                      </a:solidFill>
+                      <a:prstDash val="solid"/>
+                      <a:round/>
+                      <a:headEnd type="none" w="med" len="med"/>
+                      <a:tailEnd type="none" w="med" len="med"/>
+                    </a:lnR>
+                    <a:lnT w="12700" cap="flat" cmpd="sng" algn="ctr">
+                      <a:solidFill>
+                        <a:schemeClr val="tx1"/>
+                      </a:solidFill>
+                      <a:prstDash val="solid"/>
+                      <a:round/>
+                      <a:headEnd type="none" w="med" len="med"/>
+                      <a:tailEnd type="none" w="med" len="med"/>
+                    </a:lnT>
+                    <a:lnB w="12700" cap="flat" cmpd="sng" algn="ctr">
+                      <a:solidFill>
+                        <a:schemeClr val="tx1"/>
+                      </a:solidFill>
+                      <a:prstDash val="solid"/>
+                      <a:round/>
+                      <a:headEnd type="none" w="med" len="med"/>
+                      <a:tailEnd type="none" w="med" len="med"/>
+                    </a:lnB>
+                    <a:noFill/>
+                  </a:tcPr>
+                </a:tc>
+                <a:tc>
+                  <a:txBody>
+                    <a:bodyPr/>
+                    <a:lstStyle/>
+                    <a:p>
+                      <a:r>
+                        <a:rPr lang="en-US" sz="1200" dirty="0" smtClean="0">
+                          <a:solidFill>
+                            <a:schemeClr val="tx1"/>
+                          </a:solidFill>
+                        </a:rPr>
+                        <a:t>Required blank line</a:t>
+                      </a:r>
+                      <a:endParaRPr lang="en-US" sz="1200" dirty="0">
+                        <a:solidFill>
+                          <a:schemeClr val="tx1"/>
+                        </a:solidFill>
+                      </a:endParaRPr>
+                    </a:p>
+                  </a:txBody>
+                  <a:tcPr>
+                    <a:lnL w="12700" cap="flat" cmpd="sng" algn="ctr">
+                      <a:solidFill>
+                        <a:schemeClr val="tx1"/>
+                      </a:solidFill>
+                      <a:prstDash val="solid"/>
+                      <a:round/>
+                      <a:headEnd type="none" w="med" len="med"/>
+                      <a:tailEnd type="none" w="med" len="med"/>
+                    </a:lnL>
+                    <a:lnR w="12700" cap="flat" cmpd="sng" algn="ctr">
+                      <a:solidFill>
+                        <a:schemeClr val="tx1"/>
+                      </a:solidFill>
+                      <a:prstDash val="solid"/>
+                      <a:round/>
+                      <a:headEnd type="none" w="med" len="med"/>
+                      <a:tailEnd type="none" w="med" len="med"/>
+                    </a:lnR>
+                    <a:lnT w="12700" cap="flat" cmpd="sng" algn="ctr">
+                      <a:solidFill>
+                        <a:schemeClr val="tx1"/>
+                      </a:solidFill>
+                      <a:prstDash val="solid"/>
+                      <a:round/>
+                      <a:headEnd type="none" w="med" len="med"/>
+                      <a:tailEnd type="none" w="med" len="med"/>
+                    </a:lnT>
+                    <a:lnB w="12700" cap="flat" cmpd="sng" algn="ctr">
+                      <a:solidFill>
+                        <a:schemeClr val="tx1"/>
+                      </a:solidFill>
+                      <a:prstDash val="solid"/>
+                      <a:round/>
+                      <a:headEnd type="none" w="med" len="med"/>
+                      <a:tailEnd type="none" w="med" len="med"/>
+                    </a:lnB>
+                    <a:noFill/>
+                  </a:tcPr>
+                </a:tc>
+                <a:tc>
+                  <a:txBody>
+                    <a:bodyPr/>
+                    <a:lstStyle/>
+                    <a:p>
+                      <a:r>
+                        <a:rPr lang="en-US" sz="1200" dirty="0" smtClean="0">
+                          <a:solidFill>
+                            <a:schemeClr val="tx1"/>
+                          </a:solidFill>
+                        </a:rPr>
+                        <a:t>\r\n</a:t>
+                      </a:r>
+                      <a:endParaRPr lang="en-US" sz="1200" dirty="0">
+                        <a:solidFill>
+                          <a:schemeClr val="tx1"/>
+                        </a:solidFill>
+                      </a:endParaRPr>
+                    </a:p>
+                  </a:txBody>
+                  <a:tcPr>
+                    <a:lnL w="12700" cap="flat" cmpd="sng" algn="ctr">
+                      <a:solidFill>
+                        <a:schemeClr val="tx1"/>
+                      </a:solidFill>
+                      <a:prstDash val="solid"/>
+                      <a:round/>
+                      <a:headEnd type="none" w="med" len="med"/>
+                      <a:tailEnd type="none" w="med" len="med"/>
+                    </a:lnL>
+                    <a:lnR w="12700" cap="flat" cmpd="sng" algn="ctr">
+                      <a:solidFill>
+                        <a:schemeClr val="tx1"/>
+                      </a:solidFill>
+                      <a:prstDash val="solid"/>
+                      <a:round/>
+                      <a:headEnd type="none" w="med" len="med"/>
+                      <a:tailEnd type="none" w="med" len="med"/>
+                    </a:lnR>
+                    <a:lnT w="12700" cap="flat" cmpd="sng" algn="ctr">
+                      <a:solidFill>
+                        <a:schemeClr val="tx1"/>
+                      </a:solidFill>
+                      <a:prstDash val="solid"/>
+                      <a:round/>
+                      <a:headEnd type="none" w="med" len="med"/>
+                      <a:tailEnd type="none" w="med" len="med"/>
+                    </a:lnT>
+                    <a:lnB w="12700" cap="flat" cmpd="sng" algn="ctr">
+                      <a:solidFill>
+                        <a:schemeClr val="tx1"/>
+                      </a:solidFill>
+                      <a:prstDash val="solid"/>
+                      <a:round/>
+                      <a:headEnd type="none" w="med" len="med"/>
+                      <a:tailEnd type="none" w="med" len="med"/>
+                    </a:lnB>
+                    <a:noFill/>
+                  </a:tcPr>
+                </a:tc>
+                <a:tc>
+                  <a:txBody>
+                    <a:bodyPr/>
+                    <a:lstStyle/>
+                    <a:p>
+                      <a:endParaRPr lang="en-US" sz="1200" dirty="0">
+                        <a:solidFill>
+                          <a:schemeClr val="tx1"/>
+                        </a:solidFill>
+                      </a:endParaRPr>
+                    </a:p>
+                  </a:txBody>
+                  <a:tcPr>
+                    <a:lnL w="12700" cap="flat" cmpd="sng" algn="ctr">
+                      <a:solidFill>
+                        <a:schemeClr val="tx1"/>
+                      </a:solidFill>
+                      <a:prstDash val="solid"/>
+                      <a:round/>
+                      <a:headEnd type="none" w="med" len="med"/>
+                      <a:tailEnd type="none" w="med" len="med"/>
+                    </a:lnL>
+                    <a:lnR w="12700" cap="flat" cmpd="sng" algn="ctr">
+                      <a:solidFill>
+                        <a:schemeClr val="tx1"/>
+                      </a:solidFill>
+                      <a:prstDash val="solid"/>
+                      <a:round/>
+                      <a:headEnd type="none" w="med" len="med"/>
+                      <a:tailEnd type="none" w="med" len="med"/>
+                    </a:lnR>
+                    <a:lnT w="12700" cap="flat" cmpd="sng" algn="ctr">
+                      <a:solidFill>
+                        <a:schemeClr val="tx1"/>
+                      </a:solidFill>
+                      <a:prstDash val="solid"/>
+                      <a:round/>
+                      <a:headEnd type="none" w="med" len="med"/>
+                      <a:tailEnd type="none" w="med" len="med"/>
+                    </a:lnT>
+                    <a:lnB w="12700" cap="flat" cmpd="sng" algn="ctr">
+                      <a:solidFill>
+                        <a:schemeClr val="tx1"/>
+                      </a:solidFill>
+                      <a:prstDash val="solid"/>
+                      <a:round/>
+                      <a:headEnd type="none" w="med" len="med"/>
+                      <a:tailEnd type="none" w="med" len="med"/>
+                    </a:lnB>
+                    <a:noFill/>
+                  </a:tcPr>
+                </a:tc>
+              </a:tr>
+              <a:tr h="389124">
+                <a:tc>
+                  <a:txBody>
+                    <a:bodyPr/>
+                    <a:lstStyle/>
+                    <a:p>
+                      <a:r>
+                        <a:rPr lang="en-US" sz="1200" dirty="0" smtClean="0">
+                          <a:solidFill>
+                            <a:schemeClr val="tx1"/>
+                          </a:solidFill>
+                        </a:rPr>
+                        <a:t>Optional Content</a:t>
+                      </a:r>
+                      <a:endParaRPr lang="en-US" sz="1200" dirty="0">
+                        <a:solidFill>
+                          <a:schemeClr val="tx1"/>
+                        </a:solidFill>
+                      </a:endParaRPr>
+                    </a:p>
+                  </a:txBody>
+                  <a:tcPr>
+                    <a:lnL w="12700" cap="flat" cmpd="sng" algn="ctr">
+                      <a:solidFill>
+                        <a:schemeClr val="tx1"/>
+                      </a:solidFill>
+                      <a:prstDash val="solid"/>
+                      <a:round/>
+                      <a:headEnd type="none" w="med" len="med"/>
+                      <a:tailEnd type="none" w="med" len="med"/>
+                    </a:lnL>
+                    <a:lnR w="12700" cap="flat" cmpd="sng" algn="ctr">
+                      <a:solidFill>
+                        <a:schemeClr val="tx1"/>
+                      </a:solidFill>
+                      <a:prstDash val="solid"/>
+                      <a:round/>
+                      <a:headEnd type="none" w="med" len="med"/>
+                      <a:tailEnd type="none" w="med" len="med"/>
+                    </a:lnR>
+                    <a:lnT w="12700" cap="flat" cmpd="sng" algn="ctr">
+                      <a:solidFill>
+                        <a:schemeClr val="tx1"/>
+                      </a:solidFill>
+                      <a:prstDash val="solid"/>
+                      <a:round/>
+                      <a:headEnd type="none" w="med" len="med"/>
+                      <a:tailEnd type="none" w="med" len="med"/>
+                    </a:lnT>
+                    <a:lnB w="12700" cap="flat" cmpd="sng" algn="ctr">
+                      <a:solidFill>
+                        <a:schemeClr val="tx1"/>
+                      </a:solidFill>
+                      <a:prstDash val="solid"/>
+                      <a:round/>
+                      <a:headEnd type="none" w="med" len="med"/>
+                      <a:tailEnd type="none" w="med" len="med"/>
+                    </a:lnB>
+                    <a:noFill/>
+                  </a:tcPr>
+                </a:tc>
+                <a:tc>
+                  <a:txBody>
+                    <a:bodyPr/>
+                    <a:lstStyle/>
+                    <a:p>
+                      <a:endParaRPr lang="en-US" sz="1200" dirty="0">
+                        <a:solidFill>
+                          <a:schemeClr val="tx1"/>
+                        </a:solidFill>
+                      </a:endParaRPr>
+                    </a:p>
+                  </a:txBody>
+                  <a:tcPr>
+                    <a:lnL w="12700" cap="flat" cmpd="sng" algn="ctr">
+                      <a:solidFill>
+                        <a:schemeClr val="tx1"/>
+                      </a:solidFill>
+                      <a:prstDash val="solid"/>
+                      <a:round/>
+                      <a:headEnd type="none" w="med" len="med"/>
+                      <a:tailEnd type="none" w="med" len="med"/>
+                    </a:lnL>
+                    <a:lnR w="12700" cap="flat" cmpd="sng" algn="ctr">
+                      <a:solidFill>
+                        <a:schemeClr val="tx1"/>
+                      </a:solidFill>
+                      <a:prstDash val="solid"/>
+                      <a:round/>
+                      <a:headEnd type="none" w="med" len="med"/>
+                      <a:tailEnd type="none" w="med" len="med"/>
+                    </a:lnR>
+                    <a:lnT w="12700" cap="flat" cmpd="sng" algn="ctr">
+                      <a:solidFill>
+                        <a:schemeClr val="tx1"/>
+                      </a:solidFill>
+                      <a:prstDash val="solid"/>
+                      <a:round/>
+                      <a:headEnd type="none" w="med" len="med"/>
+                      <a:tailEnd type="none" w="med" len="med"/>
+                    </a:lnT>
+                    <a:lnB w="12700" cap="flat" cmpd="sng" algn="ctr">
+                      <a:solidFill>
+                        <a:schemeClr val="tx1"/>
+                      </a:solidFill>
+                      <a:prstDash val="solid"/>
+                      <a:round/>
+                      <a:headEnd type="none" w="med" len="med"/>
+                      <a:tailEnd type="none" w="med" len="med"/>
+                    </a:lnB>
+                    <a:noFill/>
+                  </a:tcPr>
+                </a:tc>
+                <a:tc>
+                  <a:txBody>
+                    <a:bodyPr/>
+                    <a:lstStyle/>
+                    <a:p>
+                      <a:r>
+                        <a:rPr lang="en-US" sz="1200" dirty="0" smtClean="0">
+                          <a:solidFill>
+                            <a:schemeClr val="tx1"/>
+                          </a:solidFill>
+                        </a:rPr>
+                        <a:t>{arh:1234}</a:t>
+                      </a:r>
+                      <a:endParaRPr lang="en-US" sz="1200" dirty="0">
+                        <a:solidFill>
+                          <a:schemeClr val="tx1"/>
+                        </a:solidFill>
+                      </a:endParaRPr>
+                    </a:p>
+                  </a:txBody>
+                  <a:tcPr>
+                    <a:lnL w="12700" cap="flat" cmpd="sng" algn="ctr">
+                      <a:solidFill>
+                        <a:schemeClr val="tx1"/>
+                      </a:solidFill>
+                      <a:prstDash val="solid"/>
+                      <a:round/>
+                      <a:headEnd type="none" w="med" len="med"/>
+                      <a:tailEnd type="none" w="med" len="med"/>
+                    </a:lnL>
+                    <a:lnR w="12700" cap="flat" cmpd="sng" algn="ctr">
+                      <a:solidFill>
+                        <a:schemeClr val="tx1"/>
+                      </a:solidFill>
+                      <a:prstDash val="solid"/>
+                      <a:round/>
+                      <a:headEnd type="none" w="med" len="med"/>
+                      <a:tailEnd type="none" w="med" len="med"/>
+                    </a:lnR>
+                    <a:lnT w="12700" cap="flat" cmpd="sng" algn="ctr">
+                      <a:solidFill>
+                        <a:schemeClr val="tx1"/>
+                      </a:solidFill>
+                      <a:prstDash val="solid"/>
+                      <a:round/>
+                      <a:headEnd type="none" w="med" len="med"/>
+                      <a:tailEnd type="none" w="med" len="med"/>
+                    </a:lnT>
+                    <a:lnB w="12700" cap="flat" cmpd="sng" algn="ctr">
+                      <a:solidFill>
+                        <a:schemeClr val="tx1"/>
+                      </a:solidFill>
+                      <a:prstDash val="solid"/>
+                      <a:round/>
+                      <a:headEnd type="none" w="med" len="med"/>
+                      <a:tailEnd type="none" w="med" len="med"/>
+                    </a:lnB>
+                    <a:noFill/>
+                  </a:tcPr>
+                </a:tc>
+                <a:tc>
+                  <a:txBody>
+                    <a:bodyPr/>
+                    <a:lstStyle/>
+                    <a:p>
+                      <a:pPr marL="0" marR="0" indent="0" algn="l" defTabSz="914400" rtl="0" eaLnBrk="1" fontAlgn="auto" latinLnBrk="0" hangingPunct="1">
+                        <a:lnSpc>
+                          <a:spcPct val="100000"/>
+                        </a:lnSpc>
+                        <a:spcBef>
+                          <a:spcPts val="0"/>
+                        </a:spcBef>
+                        <a:spcAft>
+                          <a:spcPts val="0"/>
+                        </a:spcAft>
+                        <a:buClrTx/>
+                        <a:buSzTx/>
+                        <a:buFontTx/>
+                        <a:buNone/>
+                        <a:tabLst/>
+                        <a:defRPr/>
+                      </a:pPr>
+                      <a:r>
+                        <a:rPr lang="en-US" sz="1200" dirty="0" smtClean="0">
+                          <a:solidFill>
+                            <a:schemeClr val="tx1"/>
+                          </a:solidFill>
+                        </a:rPr>
+                        <a:t>This is your data, it should be encode in the format that you </a:t>
+                      </a:r>
+                      <a:r>
+                        <a:rPr lang="en-US" sz="1200" dirty="0" err="1" smtClean="0">
+                          <a:solidFill>
+                            <a:schemeClr val="tx1"/>
+                          </a:solidFill>
+                        </a:rPr>
+                        <a:t>specificed</a:t>
+                      </a:r>
+                      <a:r>
+                        <a:rPr lang="en-US" sz="1200" dirty="0" smtClean="0">
+                          <a:solidFill>
+                            <a:schemeClr val="tx1"/>
+                          </a:solidFill>
+                        </a:rPr>
+                        <a:t> with the header Content-type.</a:t>
+                      </a:r>
+                    </a:p>
+                    <a:p>
+                      <a:pPr marL="0" marR="0" indent="0" algn="l" defTabSz="914400" rtl="0" eaLnBrk="1" fontAlgn="auto" latinLnBrk="0" hangingPunct="1">
+                        <a:lnSpc>
+                          <a:spcPct val="100000"/>
+                        </a:lnSpc>
+                        <a:spcBef>
+                          <a:spcPts val="0"/>
+                        </a:spcBef>
+                        <a:spcAft>
+                          <a:spcPts val="0"/>
+                        </a:spcAft>
+                        <a:buClrTx/>
+                        <a:buSzTx/>
+                        <a:buFontTx/>
+                        <a:buNone/>
+                        <a:tabLst/>
+                        <a:defRPr/>
+                      </a:pPr>
+                      <a:r>
+                        <a:rPr lang="en-US" sz="1200" dirty="0" smtClean="0">
+                          <a:solidFill>
+                            <a:schemeClr val="tx1"/>
+                          </a:solidFill>
+                        </a:rPr>
+                        <a:t>If there is no content</a:t>
+                      </a:r>
+                      <a:r>
+                        <a:rPr lang="en-US" sz="1200" baseline="0" dirty="0" smtClean="0">
+                          <a:solidFill>
+                            <a:schemeClr val="tx1"/>
+                          </a:solidFill>
+                        </a:rPr>
+                        <a:t> then you don</a:t>
+                      </a:r>
+                      <a:r>
+                        <a:rPr lang="mr-IN" sz="1200" baseline="0" dirty="0" smtClean="0">
+                          <a:solidFill>
+                            <a:schemeClr val="tx1"/>
+                          </a:solidFill>
+                        </a:rPr>
+                        <a:t>’</a:t>
+                      </a:r>
+                      <a:r>
+                        <a:rPr lang="en-US" sz="1200" baseline="0" dirty="0" smtClean="0">
+                          <a:solidFill>
+                            <a:schemeClr val="tx1"/>
+                          </a:solidFill>
+                        </a:rPr>
+                        <a:t>t need Content-type and Content-length headers</a:t>
+                      </a:r>
+                      <a:endParaRPr lang="en-US" sz="1200" dirty="0" smtClean="0">
+                        <a:solidFill>
+                          <a:schemeClr val="tx1"/>
+                        </a:solidFill>
+                      </a:endParaRPr>
+                    </a:p>
+                    <a:p>
+                      <a:endParaRPr lang="en-US" sz="1200" dirty="0">
+                        <a:solidFill>
+                          <a:schemeClr val="tx1"/>
+                        </a:solidFill>
+                      </a:endParaRPr>
+                    </a:p>
+                  </a:txBody>
+                  <a:tcPr>
+                    <a:lnL w="12700" cap="flat" cmpd="sng" algn="ctr">
+                      <a:solidFill>
+                        <a:schemeClr val="tx1"/>
+                      </a:solidFill>
+                      <a:prstDash val="solid"/>
+                      <a:round/>
+                      <a:headEnd type="none" w="med" len="med"/>
+                      <a:tailEnd type="none" w="med" len="med"/>
+                    </a:lnL>
+                    <a:lnR w="12700" cap="flat" cmpd="sng" algn="ctr">
+                      <a:solidFill>
+                        <a:schemeClr val="tx1"/>
+                      </a:solidFill>
+                      <a:prstDash val="solid"/>
+                      <a:round/>
+                      <a:headEnd type="none" w="med" len="med"/>
+                      <a:tailEnd type="none" w="med" len="med"/>
+                    </a:lnR>
+                    <a:lnT w="12700" cap="flat" cmpd="sng" algn="ctr">
+                      <a:solidFill>
+                        <a:schemeClr val="tx1"/>
+                      </a:solidFill>
+                      <a:prstDash val="solid"/>
+                      <a:round/>
+                      <a:headEnd type="none" w="med" len="med"/>
+                      <a:tailEnd type="none" w="med" len="med"/>
+                    </a:lnT>
+                    <a:lnB w="12700" cap="flat" cmpd="sng" algn="ctr">
+                      <a:solidFill>
+                        <a:schemeClr val="tx1"/>
+                      </a:solidFill>
+                      <a:prstDash val="solid"/>
+                      <a:round/>
+                      <a:headEnd type="none" w="med" len="med"/>
+                      <a:tailEnd type="none" w="med" len="med"/>
+                    </a:lnB>
+                    <a:noFill/>
+                  </a:tcPr>
+                </a:tc>
+              </a:tr>
+            </a:tbl>
+          </a:graphicData>
+        </a:graphic>
+      </p:graphicFrame>
+    </p:spTree>
+    <p:extLst>
+      <p:ext uri="{BB962C8B-B14F-4D97-AF65-F5344CB8AC3E}">
+        <p14:creationId xmlns:p14="http://schemas.microsoft.com/office/powerpoint/2010/main" val="1533853515"/>
+      </p:ext>
+    </p:extLst>
+  </p:cSld>
+  <p:clrMapOvr>
+    <a:masterClrMapping/>
+  </p:clrMapOvr>
+  <p:timing>
+    <p:tnLst>
+      <p:par>
+        <p:cTn id="1" dur="indefinite" restart="never" nodeType="tmRoot"/>
+      </p:par>
+    </p:tnLst>
+  </p:timing>
 </p:sld>
 </file>
 

</xml_diff>

<commit_message>
Updates to material after Ukraine. Change shield LED and button names to match base board.
</commit_message>
<xml_diff>
--- a/labmanual/misc/drawings.pptx
+++ b/labmanual/misc/drawings.pptx
@@ -207,7 +207,7 @@
           <a:p>
             <a:fld id="{90BA088C-6928-D148-ACA4-D877058B3EC1}" type="datetimeFigureOut">
               <a:rPr lang="en-US" smtClean="0"/>
-              <a:t>7/18/17</a:t>
+              <a:t>8/29/2017</a:t>
             </a:fld>
             <a:endParaRPr lang="en-US"/>
           </a:p>
@@ -271,38 +271,37 @@
           <a:p>
             <a:pPr lvl="0"/>
             <a:r>
-              <a:rPr lang="en-US" smtClean="0"/>
+              <a:rPr lang="en-US"/>
               <a:t>Click to edit Master text styles</a:t>
             </a:r>
           </a:p>
           <a:p>
             <a:pPr lvl="1"/>
             <a:r>
-              <a:rPr lang="en-US" smtClean="0"/>
+              <a:rPr lang="en-US"/>
               <a:t>Second level</a:t>
             </a:r>
           </a:p>
           <a:p>
             <a:pPr lvl="2"/>
             <a:r>
-              <a:rPr lang="en-US" smtClean="0"/>
+              <a:rPr lang="en-US"/>
               <a:t>Third level</a:t>
             </a:r>
           </a:p>
           <a:p>
             <a:pPr lvl="3"/>
             <a:r>
-              <a:rPr lang="en-US" smtClean="0"/>
+              <a:rPr lang="en-US"/>
               <a:t>Fourth level</a:t>
             </a:r>
           </a:p>
           <a:p>
             <a:pPr lvl="4"/>
             <a:r>
-              <a:rPr lang="en-US" smtClean="0"/>
+              <a:rPr lang="en-US"/>
               <a:t>Fifth level</a:t>
             </a:r>
-            <a:endParaRPr lang="en-US"/>
           </a:p>
         </p:txBody>
       </p:sp>
@@ -604,7 +603,7 @@
           <a:p>
             <a:fld id="{02CF1C66-B1B6-1643-A1E5-DA5B6E4004A0}" type="datetimeFigureOut">
               <a:rPr lang="en-US" smtClean="0"/>
-              <a:t>7/18/17</a:t>
+              <a:t>8/29/2017</a:t>
             </a:fld>
             <a:endParaRPr lang="en-US"/>
           </a:p>
@@ -772,7 +771,7 @@
           <a:p>
             <a:fld id="{02CF1C66-B1B6-1643-A1E5-DA5B6E4004A0}" type="datetimeFigureOut">
               <a:rPr lang="en-US" smtClean="0"/>
-              <a:t>7/18/17</a:t>
+              <a:t>8/29/2017</a:t>
             </a:fld>
             <a:endParaRPr lang="en-US"/>
           </a:p>
@@ -950,7 +949,7 @@
           <a:p>
             <a:fld id="{02CF1C66-B1B6-1643-A1E5-DA5B6E4004A0}" type="datetimeFigureOut">
               <a:rPr lang="en-US" smtClean="0"/>
-              <a:t>7/18/17</a:t>
+              <a:t>8/29/2017</a:t>
             </a:fld>
             <a:endParaRPr lang="en-US"/>
           </a:p>
@@ -1118,7 +1117,7 @@
           <a:p>
             <a:fld id="{02CF1C66-B1B6-1643-A1E5-DA5B6E4004A0}" type="datetimeFigureOut">
               <a:rPr lang="en-US" smtClean="0"/>
-              <a:t>7/18/17</a:t>
+              <a:t>8/29/2017</a:t>
             </a:fld>
             <a:endParaRPr lang="en-US"/>
           </a:p>
@@ -1363,7 +1362,7 @@
           <a:p>
             <a:fld id="{02CF1C66-B1B6-1643-A1E5-DA5B6E4004A0}" type="datetimeFigureOut">
               <a:rPr lang="en-US" smtClean="0"/>
-              <a:t>7/18/17</a:t>
+              <a:t>8/29/2017</a:t>
             </a:fld>
             <a:endParaRPr lang="en-US"/>
           </a:p>
@@ -1592,7 +1591,7 @@
           <a:p>
             <a:fld id="{02CF1C66-B1B6-1643-A1E5-DA5B6E4004A0}" type="datetimeFigureOut">
               <a:rPr lang="en-US" smtClean="0"/>
-              <a:t>7/18/17</a:t>
+              <a:t>8/29/2017</a:t>
             </a:fld>
             <a:endParaRPr lang="en-US"/>
           </a:p>
@@ -1956,7 +1955,7 @@
           <a:p>
             <a:fld id="{02CF1C66-B1B6-1643-A1E5-DA5B6E4004A0}" type="datetimeFigureOut">
               <a:rPr lang="en-US" smtClean="0"/>
-              <a:t>7/18/17</a:t>
+              <a:t>8/29/2017</a:t>
             </a:fld>
             <a:endParaRPr lang="en-US"/>
           </a:p>
@@ -2073,7 +2072,7 @@
           <a:p>
             <a:fld id="{02CF1C66-B1B6-1643-A1E5-DA5B6E4004A0}" type="datetimeFigureOut">
               <a:rPr lang="en-US" smtClean="0"/>
-              <a:t>7/18/17</a:t>
+              <a:t>8/29/2017</a:t>
             </a:fld>
             <a:endParaRPr lang="en-US"/>
           </a:p>
@@ -2168,7 +2167,7 @@
           <a:p>
             <a:fld id="{02CF1C66-B1B6-1643-A1E5-DA5B6E4004A0}" type="datetimeFigureOut">
               <a:rPr lang="en-US" smtClean="0"/>
-              <a:t>7/18/17</a:t>
+              <a:t>8/29/2017</a:t>
             </a:fld>
             <a:endParaRPr lang="en-US"/>
           </a:p>
@@ -2443,7 +2442,7 @@
           <a:p>
             <a:fld id="{02CF1C66-B1B6-1643-A1E5-DA5B6E4004A0}" type="datetimeFigureOut">
               <a:rPr lang="en-US" smtClean="0"/>
-              <a:t>7/18/17</a:t>
+              <a:t>8/29/2017</a:t>
             </a:fld>
             <a:endParaRPr lang="en-US"/>
           </a:p>
@@ -2695,7 +2694,7 @@
           <a:p>
             <a:fld id="{02CF1C66-B1B6-1643-A1E5-DA5B6E4004A0}" type="datetimeFigureOut">
               <a:rPr lang="en-US" smtClean="0"/>
-              <a:t>7/18/17</a:t>
+              <a:t>8/29/2017</a:t>
             </a:fld>
             <a:endParaRPr lang="en-US"/>
           </a:p>
@@ -2906,7 +2905,7 @@
           <a:p>
             <a:fld id="{02CF1C66-B1B6-1643-A1E5-DA5B6E4004A0}" type="datetimeFigureOut">
               <a:rPr lang="en-US" smtClean="0"/>
-              <a:t>7/18/17</a:t>
+              <a:t>8/29/2017</a:t>
             </a:fld>
             <a:endParaRPr lang="en-US"/>
           </a:p>
@@ -8421,35 +8420,35 @@
                 <a:gridCol w="361780">
                   <a:extLst>
                     <a:ext uri="{9D8B030D-6E8A-4147-A177-3AD203B41FA5}">
-                      <a16:colId xmlns="" xmlns:a16="http://schemas.microsoft.com/office/drawing/2014/main" val="20000"/>
+                      <a16:colId xmlns:a16="http://schemas.microsoft.com/office/drawing/2014/main" val="20000"/>
                     </a:ext>
                   </a:extLst>
                 </a:gridCol>
                 <a:gridCol w="361780">
                   <a:extLst>
                     <a:ext uri="{9D8B030D-6E8A-4147-A177-3AD203B41FA5}">
-                      <a16:colId xmlns="" xmlns:a16="http://schemas.microsoft.com/office/drawing/2014/main" val="20001"/>
+                      <a16:colId xmlns:a16="http://schemas.microsoft.com/office/drawing/2014/main" val="20001"/>
                     </a:ext>
                   </a:extLst>
                 </a:gridCol>
                 <a:gridCol w="429406">
                   <a:extLst>
                     <a:ext uri="{9D8B030D-6E8A-4147-A177-3AD203B41FA5}">
-                      <a16:colId xmlns="" xmlns:a16="http://schemas.microsoft.com/office/drawing/2014/main" val="20002"/>
+                      <a16:colId xmlns:a16="http://schemas.microsoft.com/office/drawing/2014/main" val="20002"/>
                     </a:ext>
                   </a:extLst>
                 </a:gridCol>
                 <a:gridCol w="497721">
                   <a:extLst>
                     <a:ext uri="{9D8B030D-6E8A-4147-A177-3AD203B41FA5}">
-                      <a16:colId xmlns="" xmlns:a16="http://schemas.microsoft.com/office/drawing/2014/main" val="20003"/>
+                      <a16:colId xmlns:a16="http://schemas.microsoft.com/office/drawing/2014/main" val="20003"/>
                     </a:ext>
                   </a:extLst>
                 </a:gridCol>
                 <a:gridCol w="1717625">
                   <a:extLst>
                     <a:ext uri="{9D8B030D-6E8A-4147-A177-3AD203B41FA5}">
-                      <a16:colId xmlns="" xmlns:a16="http://schemas.microsoft.com/office/drawing/2014/main" val="20004"/>
+                      <a16:colId xmlns:a16="http://schemas.microsoft.com/office/drawing/2014/main" val="20004"/>
                     </a:ext>
                   </a:extLst>
                 </a:gridCol>
@@ -8682,7 +8681,7 @@
                 </a:tc>
                 <a:extLst>
                   <a:ext uri="{0D108BD9-81ED-4DB2-BD59-A6C34878D82A}">
-                    <a16:rowId xmlns="" xmlns:a16="http://schemas.microsoft.com/office/drawing/2014/main" val="10000"/>
+                    <a16:rowId xmlns:a16="http://schemas.microsoft.com/office/drawing/2014/main" val="10000"/>
                   </a:ext>
                 </a:extLst>
               </a:tr>
@@ -8977,7 +8976,7 @@
                 </a:tc>
                 <a:extLst>
                   <a:ext uri="{0D108BD9-81ED-4DB2-BD59-A6C34878D82A}">
-                    <a16:rowId xmlns="" xmlns:a16="http://schemas.microsoft.com/office/drawing/2014/main" val="10001"/>
+                    <a16:rowId xmlns:a16="http://schemas.microsoft.com/office/drawing/2014/main" val="10001"/>
                   </a:ext>
                 </a:extLst>
               </a:tr>
@@ -9255,7 +9254,7 @@
                 </a:tc>
                 <a:extLst>
                   <a:ext uri="{0D108BD9-81ED-4DB2-BD59-A6C34878D82A}">
-                    <a16:rowId xmlns="" xmlns:a16="http://schemas.microsoft.com/office/drawing/2014/main" val="10002"/>
+                    <a16:rowId xmlns:a16="http://schemas.microsoft.com/office/drawing/2014/main" val="10002"/>
                   </a:ext>
                 </a:extLst>
               </a:tr>
@@ -9536,7 +9535,7 @@
                 </a:tc>
                 <a:extLst>
                   <a:ext uri="{0D108BD9-81ED-4DB2-BD59-A6C34878D82A}">
-                    <a16:rowId xmlns="" xmlns:a16="http://schemas.microsoft.com/office/drawing/2014/main" val="10003"/>
+                    <a16:rowId xmlns:a16="http://schemas.microsoft.com/office/drawing/2014/main" val="10003"/>
                   </a:ext>
                 </a:extLst>
               </a:tr>
@@ -9817,7 +9816,7 @@
                 </a:tc>
                 <a:extLst>
                   <a:ext uri="{0D108BD9-81ED-4DB2-BD59-A6C34878D82A}">
-                    <a16:rowId xmlns="" xmlns:a16="http://schemas.microsoft.com/office/drawing/2014/main" val="10004"/>
+                    <a16:rowId xmlns:a16="http://schemas.microsoft.com/office/drawing/2014/main" val="10004"/>
                   </a:ext>
                 </a:extLst>
               </a:tr>
@@ -10098,7 +10097,7 @@
                 </a:tc>
                 <a:extLst>
                   <a:ext uri="{0D108BD9-81ED-4DB2-BD59-A6C34878D82A}">
-                    <a16:rowId xmlns="" xmlns:a16="http://schemas.microsoft.com/office/drawing/2014/main" val="10005"/>
+                    <a16:rowId xmlns:a16="http://schemas.microsoft.com/office/drawing/2014/main" val="10005"/>
                   </a:ext>
                 </a:extLst>
               </a:tr>
@@ -10379,7 +10378,7 @@
                 </a:tc>
                 <a:extLst>
                   <a:ext uri="{0D108BD9-81ED-4DB2-BD59-A6C34878D82A}">
-                    <a16:rowId xmlns="" xmlns:a16="http://schemas.microsoft.com/office/drawing/2014/main" val="10006"/>
+                    <a16:rowId xmlns:a16="http://schemas.microsoft.com/office/drawing/2014/main" val="10006"/>
                   </a:ext>
                 </a:extLst>
               </a:tr>
@@ -10772,35 +10771,35 @@
                 <a:gridCol w="361780">
                   <a:extLst>
                     <a:ext uri="{9D8B030D-6E8A-4147-A177-3AD203B41FA5}">
-                      <a16:colId xmlns="" xmlns:a16="http://schemas.microsoft.com/office/drawing/2014/main" val="20000"/>
+                      <a16:colId xmlns:a16="http://schemas.microsoft.com/office/drawing/2014/main" val="20000"/>
                     </a:ext>
                   </a:extLst>
                 </a:gridCol>
                 <a:gridCol w="361780">
                   <a:extLst>
                     <a:ext uri="{9D8B030D-6E8A-4147-A177-3AD203B41FA5}">
-                      <a16:colId xmlns="" xmlns:a16="http://schemas.microsoft.com/office/drawing/2014/main" val="20001"/>
+                      <a16:colId xmlns:a16="http://schemas.microsoft.com/office/drawing/2014/main" val="20001"/>
                     </a:ext>
                   </a:extLst>
                 </a:gridCol>
                 <a:gridCol w="429406">
                   <a:extLst>
                     <a:ext uri="{9D8B030D-6E8A-4147-A177-3AD203B41FA5}">
-                      <a16:colId xmlns="" xmlns:a16="http://schemas.microsoft.com/office/drawing/2014/main" val="20002"/>
+                      <a16:colId xmlns:a16="http://schemas.microsoft.com/office/drawing/2014/main" val="20002"/>
                     </a:ext>
                   </a:extLst>
                 </a:gridCol>
                 <a:gridCol w="497721">
                   <a:extLst>
                     <a:ext uri="{9D8B030D-6E8A-4147-A177-3AD203B41FA5}">
-                      <a16:colId xmlns="" xmlns:a16="http://schemas.microsoft.com/office/drawing/2014/main" val="20003"/>
+                      <a16:colId xmlns:a16="http://schemas.microsoft.com/office/drawing/2014/main" val="20003"/>
                     </a:ext>
                   </a:extLst>
                 </a:gridCol>
                 <a:gridCol w="1717625">
                   <a:extLst>
                     <a:ext uri="{9D8B030D-6E8A-4147-A177-3AD203B41FA5}">
-                      <a16:colId xmlns="" xmlns:a16="http://schemas.microsoft.com/office/drawing/2014/main" val="20004"/>
+                      <a16:colId xmlns:a16="http://schemas.microsoft.com/office/drawing/2014/main" val="20004"/>
                     </a:ext>
                   </a:extLst>
                 </a:gridCol>
@@ -11033,7 +11032,7 @@
                 </a:tc>
                 <a:extLst>
                   <a:ext uri="{0D108BD9-81ED-4DB2-BD59-A6C34878D82A}">
-                    <a16:rowId xmlns="" xmlns:a16="http://schemas.microsoft.com/office/drawing/2014/main" val="10000"/>
+                    <a16:rowId xmlns:a16="http://schemas.microsoft.com/office/drawing/2014/main" val="10000"/>
                   </a:ext>
                 </a:extLst>
               </a:tr>
@@ -11328,7 +11327,7 @@
                 </a:tc>
                 <a:extLst>
                   <a:ext uri="{0D108BD9-81ED-4DB2-BD59-A6C34878D82A}">
-                    <a16:rowId xmlns="" xmlns:a16="http://schemas.microsoft.com/office/drawing/2014/main" val="10001"/>
+                    <a16:rowId xmlns:a16="http://schemas.microsoft.com/office/drawing/2014/main" val="10001"/>
                   </a:ext>
                 </a:extLst>
               </a:tr>
@@ -11606,7 +11605,7 @@
                 </a:tc>
                 <a:extLst>
                   <a:ext uri="{0D108BD9-81ED-4DB2-BD59-A6C34878D82A}">
-                    <a16:rowId xmlns="" xmlns:a16="http://schemas.microsoft.com/office/drawing/2014/main" val="10002"/>
+                    <a16:rowId xmlns:a16="http://schemas.microsoft.com/office/drawing/2014/main" val="10002"/>
                   </a:ext>
                 </a:extLst>
               </a:tr>
@@ -11887,7 +11886,7 @@
                 </a:tc>
                 <a:extLst>
                   <a:ext uri="{0D108BD9-81ED-4DB2-BD59-A6C34878D82A}">
-                    <a16:rowId xmlns="" xmlns:a16="http://schemas.microsoft.com/office/drawing/2014/main" val="10003"/>
+                    <a16:rowId xmlns:a16="http://schemas.microsoft.com/office/drawing/2014/main" val="10003"/>
                   </a:ext>
                 </a:extLst>
               </a:tr>
@@ -12168,7 +12167,7 @@
                 </a:tc>
                 <a:extLst>
                   <a:ext uri="{0D108BD9-81ED-4DB2-BD59-A6C34878D82A}">
-                    <a16:rowId xmlns="" xmlns:a16="http://schemas.microsoft.com/office/drawing/2014/main" val="10004"/>
+                    <a16:rowId xmlns:a16="http://schemas.microsoft.com/office/drawing/2014/main" val="10004"/>
                   </a:ext>
                 </a:extLst>
               </a:tr>
@@ -12449,7 +12448,7 @@
                 </a:tc>
                 <a:extLst>
                   <a:ext uri="{0D108BD9-81ED-4DB2-BD59-A6C34878D82A}">
-                    <a16:rowId xmlns="" xmlns:a16="http://schemas.microsoft.com/office/drawing/2014/main" val="10005"/>
+                    <a16:rowId xmlns:a16="http://schemas.microsoft.com/office/drawing/2014/main" val="10005"/>
                   </a:ext>
                 </a:extLst>
               </a:tr>
@@ -12730,7 +12729,7 @@
                 </a:tc>
                 <a:extLst>
                   <a:ext uri="{0D108BD9-81ED-4DB2-BD59-A6C34878D82A}">
-                    <a16:rowId xmlns="" xmlns:a16="http://schemas.microsoft.com/office/drawing/2014/main" val="10006"/>
+                    <a16:rowId xmlns:a16="http://schemas.microsoft.com/office/drawing/2014/main" val="10006"/>
                   </a:ext>
                 </a:extLst>
               </a:tr>
@@ -14215,7 +14214,7 @@
           <p:cNvPr id="25" name="Group 24">
             <a:extLst>
               <a:ext uri="{FF2B5EF4-FFF2-40B4-BE49-F238E27FC236}">
-                <a16:creationId xmlns="" xmlns:a16="http://schemas.microsoft.com/office/drawing/2014/main" id="{3B2C51B9-EDD7-4240-B648-DD06A33A337B}"/>
+                <a16:creationId xmlns:a16="http://schemas.microsoft.com/office/drawing/2014/main" id="{3B2C51B9-EDD7-4240-B648-DD06A33A337B}"/>
               </a:ext>
             </a:extLst>
           </p:cNvPr>
@@ -15009,7 +15008,7 @@
             <p:cNvPr id="19" name="Oval 18">
               <a:extLst>
                 <a:ext uri="{FF2B5EF4-FFF2-40B4-BE49-F238E27FC236}">
-                  <a16:creationId xmlns="" xmlns:a16="http://schemas.microsoft.com/office/drawing/2014/main" id="{A104E178-9C80-4A33-A1B6-474FD8E9B6A5}"/>
+                  <a16:creationId xmlns:a16="http://schemas.microsoft.com/office/drawing/2014/main" id="{A104E178-9C80-4A33-A1B6-474FD8E9B6A5}"/>
                 </a:ext>
               </a:extLst>
             </p:cNvPr>
@@ -15062,7 +15061,7 @@
             <p:cNvPr id="41" name="Oval 40">
               <a:extLst>
                 <a:ext uri="{FF2B5EF4-FFF2-40B4-BE49-F238E27FC236}">
-                  <a16:creationId xmlns="" xmlns:a16="http://schemas.microsoft.com/office/drawing/2014/main" id="{92C24576-AA8C-4365-A2B7-C5B7C9D8A300}"/>
+                  <a16:creationId xmlns:a16="http://schemas.microsoft.com/office/drawing/2014/main" id="{92C24576-AA8C-4365-A2B7-C5B7C9D8A300}"/>
                 </a:ext>
               </a:extLst>
             </p:cNvPr>
@@ -15112,7 +15111,7 @@
             <p:cNvPr id="42" name="Straight Arrow Connector 41">
               <a:extLst>
                 <a:ext uri="{FF2B5EF4-FFF2-40B4-BE49-F238E27FC236}">
-                  <a16:creationId xmlns="" xmlns:a16="http://schemas.microsoft.com/office/drawing/2014/main" id="{C04B9279-B4F9-47E7-9E13-7A48FB835E60}"/>
+                  <a16:creationId xmlns:a16="http://schemas.microsoft.com/office/drawing/2014/main" id="{C04B9279-B4F9-47E7-9E13-7A48FB835E60}"/>
                 </a:ext>
               </a:extLst>
             </p:cNvPr>
@@ -15155,7 +15154,7 @@
             <p:cNvPr id="43" name="Oval 42">
               <a:extLst>
                 <a:ext uri="{FF2B5EF4-FFF2-40B4-BE49-F238E27FC236}">
-                  <a16:creationId xmlns="" xmlns:a16="http://schemas.microsoft.com/office/drawing/2014/main" id="{73949712-EC35-4B62-80BD-DB99766A6DDC}"/>
+                  <a16:creationId xmlns:a16="http://schemas.microsoft.com/office/drawing/2014/main" id="{73949712-EC35-4B62-80BD-DB99766A6DDC}"/>
                 </a:ext>
               </a:extLst>
             </p:cNvPr>
@@ -15204,7 +15203,7 @@
             <p:cNvPr id="44" name="Oval 43">
               <a:extLst>
                 <a:ext uri="{FF2B5EF4-FFF2-40B4-BE49-F238E27FC236}">
-                  <a16:creationId xmlns="" xmlns:a16="http://schemas.microsoft.com/office/drawing/2014/main" id="{ED91E7B2-95CF-446A-882A-D674C9A468AD}"/>
+                  <a16:creationId xmlns:a16="http://schemas.microsoft.com/office/drawing/2014/main" id="{ED91E7B2-95CF-446A-882A-D674C9A468AD}"/>
                 </a:ext>
               </a:extLst>
             </p:cNvPr>
@@ -15250,7 +15249,7 @@
             <p:cNvPr id="45" name="Straight Arrow Connector 44">
               <a:extLst>
                 <a:ext uri="{FF2B5EF4-FFF2-40B4-BE49-F238E27FC236}">
-                  <a16:creationId xmlns="" xmlns:a16="http://schemas.microsoft.com/office/drawing/2014/main" id="{7B2937D3-658E-461E-B536-44F292EA471D}"/>
+                  <a16:creationId xmlns:a16="http://schemas.microsoft.com/office/drawing/2014/main" id="{7B2937D3-658E-461E-B536-44F292EA471D}"/>
                 </a:ext>
               </a:extLst>
             </p:cNvPr>
@@ -15298,13 +15297,6 @@
   <p:clrMapOvr>
     <a:masterClrMapping/>
   </p:clrMapOvr>
-  <p:timing>
-    <p:tnLst>
-      <p:par>
-        <p:cTn id="1" dur="indefinite" restart="never" nodeType="tmRoot"/>
-      </p:par>
-    </p:tnLst>
-  </p:timing>
 </p:sld>
 </file>
 
@@ -15327,100 +15319,544 @@
       </p:grpSpPr>
       <p:grpSp>
         <p:nvGrpSpPr>
-          <p:cNvPr id="31" name="Group 30"/>
+          <p:cNvPr id="2" name="Group 1">
+            <a:extLst>
+              <a:ext uri="{FF2B5EF4-FFF2-40B4-BE49-F238E27FC236}">
+                <a16:creationId xmlns:a16="http://schemas.microsoft.com/office/drawing/2014/main" id="{1673A84B-0663-4F3A-B55F-412321873102}"/>
+              </a:ext>
+            </a:extLst>
+          </p:cNvPr>
           <p:cNvGrpSpPr/>
           <p:nvPr/>
         </p:nvGrpSpPr>
         <p:grpSpPr>
           <a:xfrm>
             <a:off x="1634419" y="953146"/>
-            <a:ext cx="5786357" cy="4572000"/>
+            <a:ext cx="6246046" cy="4572000"/>
             <a:chOff x="1634419" y="953146"/>
-            <a:chExt cx="5786357" cy="4572000"/>
+            <a:chExt cx="6246046" cy="4572000"/>
           </a:xfrm>
         </p:grpSpPr>
+        <p:grpSp>
+          <p:nvGrpSpPr>
+            <p:cNvPr id="31" name="Group 30"/>
+            <p:cNvGrpSpPr/>
+            <p:nvPr/>
+          </p:nvGrpSpPr>
+          <p:grpSpPr>
+            <a:xfrm>
+              <a:off x="1634419" y="953146"/>
+              <a:ext cx="6246046" cy="4572000"/>
+              <a:chOff x="1634419" y="953146"/>
+              <a:chExt cx="5786357" cy="4572000"/>
+            </a:xfrm>
+          </p:grpSpPr>
+          <p:sp>
+            <p:nvSpPr>
+              <p:cNvPr id="3" name="TextBox 2"/>
+              <p:cNvSpPr txBox="1"/>
+              <p:nvPr/>
+            </p:nvSpPr>
+            <p:spPr>
+              <a:xfrm>
+                <a:off x="1634421" y="953146"/>
+                <a:ext cx="2286000" cy="4572000"/>
+              </a:xfrm>
+              <a:prstGeom prst="rect">
+                <a:avLst/>
+              </a:prstGeom>
+              <a:noFill/>
+              <a:ln>
+                <a:solidFill>
+                  <a:schemeClr val="tx1"/>
+                </a:solidFill>
+              </a:ln>
+            </p:spPr>
+            <p:txBody>
+              <a:bodyPr wrap="none" rtlCol="0">
+                <a:noAutofit/>
+              </a:bodyPr>
+              <a:lstStyle/>
+              <a:p>
+                <a:pPr algn="ctr"/>
+                <a:r>
+                  <a:rPr lang="en-US" u="sng" dirty="0"/>
+                  <a:t>TCP Client</a:t>
+                </a:r>
+              </a:p>
+            </p:txBody>
+          </p:sp>
+          <p:sp>
+            <p:nvSpPr>
+              <p:cNvPr id="5" name="TextBox 4"/>
+              <p:cNvSpPr txBox="1"/>
+              <p:nvPr/>
+            </p:nvSpPr>
+            <p:spPr>
+              <a:xfrm>
+                <a:off x="5125153" y="953146"/>
+                <a:ext cx="2286000" cy="4572000"/>
+              </a:xfrm>
+              <a:prstGeom prst="rect">
+                <a:avLst/>
+              </a:prstGeom>
+              <a:noFill/>
+              <a:ln>
+                <a:solidFill>
+                  <a:schemeClr val="tx1"/>
+                </a:solidFill>
+              </a:ln>
+            </p:spPr>
+            <p:txBody>
+              <a:bodyPr wrap="none" rtlCol="0">
+                <a:noAutofit/>
+              </a:bodyPr>
+              <a:lstStyle/>
+              <a:p>
+                <a:pPr algn="ctr"/>
+                <a:r>
+                  <a:rPr lang="en-US" u="sng" dirty="0"/>
+                  <a:t>TCP Server</a:t>
+                </a:r>
+              </a:p>
+            </p:txBody>
+          </p:sp>
+          <p:sp>
+            <p:nvSpPr>
+              <p:cNvPr id="7" name="TextBox 6"/>
+              <p:cNvSpPr txBox="1"/>
+              <p:nvPr/>
+            </p:nvSpPr>
+            <p:spPr>
+              <a:xfrm>
+                <a:off x="1634421" y="1632489"/>
+                <a:ext cx="2274035" cy="323165"/>
+              </a:xfrm>
+              <a:prstGeom prst="rect">
+                <a:avLst/>
+              </a:prstGeom>
+              <a:noFill/>
+              <a:ln>
+                <a:noFill/>
+              </a:ln>
+            </p:spPr>
+            <p:txBody>
+              <a:bodyPr wrap="square" rtlCol="0">
+                <a:spAutoFit/>
+              </a:bodyPr>
+              <a:lstStyle/>
+              <a:p>
+                <a:pPr algn="ctr"/>
+                <a:r>
+                  <a:rPr lang="en-US" sz="1500"/>
+                  <a:t>Send Hello</a:t>
+                </a:r>
+                <a:endParaRPr lang="en-US" sz="1500" dirty="0"/>
+              </a:p>
+            </p:txBody>
+          </p:sp>
+          <p:cxnSp>
+            <p:nvCxnSpPr>
+              <p:cNvPr id="9" name="Straight Arrow Connector 8"/>
+              <p:cNvCxnSpPr/>
+              <p:nvPr/>
+            </p:nvCxnSpPr>
+            <p:spPr>
+              <a:xfrm>
+                <a:off x="3918080" y="1817155"/>
+                <a:ext cx="1197451" cy="0"/>
+              </a:xfrm>
+              <a:prstGeom prst="straightConnector1">
+                <a:avLst/>
+              </a:prstGeom>
+              <a:ln w="38100">
+                <a:solidFill>
+                  <a:srgbClr val="FF0000"/>
+                </a:solidFill>
+                <a:tailEnd type="triangle"/>
+              </a:ln>
+            </p:spPr>
+            <p:style>
+              <a:lnRef idx="1">
+                <a:schemeClr val="accent1"/>
+              </a:lnRef>
+              <a:fillRef idx="0">
+                <a:schemeClr val="accent1"/>
+              </a:fillRef>
+              <a:effectRef idx="0">
+                <a:schemeClr val="accent1"/>
+              </a:effectRef>
+              <a:fontRef idx="minor">
+                <a:schemeClr val="tx1"/>
+              </a:fontRef>
+            </p:style>
+          </p:cxnSp>
+          <p:cxnSp>
+            <p:nvCxnSpPr>
+              <p:cNvPr id="12" name="Straight Arrow Connector 11"/>
+              <p:cNvCxnSpPr/>
+              <p:nvPr/>
+            </p:nvCxnSpPr>
+            <p:spPr>
+              <a:xfrm>
+                <a:off x="3918079" y="2431568"/>
+                <a:ext cx="1197451" cy="0"/>
+              </a:xfrm>
+              <a:prstGeom prst="straightConnector1">
+                <a:avLst/>
+              </a:prstGeom>
+              <a:ln w="38100">
+                <a:solidFill>
+                  <a:srgbClr val="FF0000"/>
+                </a:solidFill>
+                <a:headEnd type="triangle"/>
+                <a:tailEnd type="none"/>
+              </a:ln>
+            </p:spPr>
+            <p:style>
+              <a:lnRef idx="1">
+                <a:schemeClr val="accent1"/>
+              </a:lnRef>
+              <a:fillRef idx="0">
+                <a:schemeClr val="accent1"/>
+              </a:fillRef>
+              <a:effectRef idx="0">
+                <a:schemeClr val="accent1"/>
+              </a:effectRef>
+              <a:fontRef idx="minor">
+                <a:schemeClr val="tx1"/>
+              </a:fontRef>
+            </p:style>
+          </p:cxnSp>
+          <p:sp>
+            <p:nvSpPr>
+              <p:cNvPr id="13" name="TextBox 12"/>
+              <p:cNvSpPr txBox="1"/>
+              <p:nvPr/>
+            </p:nvSpPr>
+            <p:spPr>
+              <a:xfrm>
+                <a:off x="5125153" y="2268899"/>
+                <a:ext cx="2295623" cy="323165"/>
+              </a:xfrm>
+              <a:prstGeom prst="rect">
+                <a:avLst/>
+              </a:prstGeom>
+              <a:noFill/>
+              <a:ln>
+                <a:noFill/>
+              </a:ln>
+            </p:spPr>
+            <p:txBody>
+              <a:bodyPr wrap="square" rtlCol="0">
+                <a:spAutoFit/>
+              </a:bodyPr>
+              <a:lstStyle/>
+              <a:p>
+                <a:pPr algn="ctr"/>
+                <a:r>
+                  <a:rPr lang="en-US" sz="1500" dirty="0"/>
+                  <a:t>Send Public Key</a:t>
+                </a:r>
+              </a:p>
+            </p:txBody>
+          </p:sp>
+          <p:sp>
+            <p:nvSpPr>
+              <p:cNvPr id="14" name="TextBox 13"/>
+              <p:cNvSpPr txBox="1"/>
+              <p:nvPr/>
+            </p:nvSpPr>
+            <p:spPr>
+              <a:xfrm>
+                <a:off x="1636151" y="2688754"/>
+                <a:ext cx="2281927" cy="323165"/>
+              </a:xfrm>
+              <a:prstGeom prst="rect">
+                <a:avLst/>
+              </a:prstGeom>
+              <a:noFill/>
+              <a:ln>
+                <a:noFill/>
+              </a:ln>
+            </p:spPr>
+            <p:txBody>
+              <a:bodyPr wrap="square" rtlCol="0">
+                <a:spAutoFit/>
+              </a:bodyPr>
+              <a:lstStyle/>
+              <a:p>
+                <a:pPr algn="ctr"/>
+                <a:r>
+                  <a:rPr lang="en-US" sz="1500" dirty="0"/>
+                  <a:t>Create Symmetric Key</a:t>
+                </a:r>
+              </a:p>
+            </p:txBody>
+          </p:sp>
+          <p:sp>
+            <p:nvSpPr>
+              <p:cNvPr id="15" name="TextBox 14"/>
+              <p:cNvSpPr txBox="1"/>
+              <p:nvPr/>
+            </p:nvSpPr>
+            <p:spPr>
+              <a:xfrm>
+                <a:off x="1634419" y="3473381"/>
+                <a:ext cx="2295623" cy="323165"/>
+              </a:xfrm>
+              <a:prstGeom prst="rect">
+                <a:avLst/>
+              </a:prstGeom>
+              <a:noFill/>
+              <a:ln>
+                <a:noFill/>
+              </a:ln>
+            </p:spPr>
+            <p:txBody>
+              <a:bodyPr wrap="square" rtlCol="0">
+                <a:spAutoFit/>
+              </a:bodyPr>
+              <a:lstStyle/>
+              <a:p>
+                <a:pPr algn="ctr"/>
+                <a:r>
+                  <a:rPr lang="en-US" sz="1500" dirty="0"/>
+                  <a:t>Encrypt w/Server Pub Key</a:t>
+                </a:r>
+              </a:p>
+            </p:txBody>
+          </p:sp>
+          <p:sp>
+            <p:nvSpPr>
+              <p:cNvPr id="17" name="TextBox 16"/>
+              <p:cNvSpPr txBox="1"/>
+              <p:nvPr/>
+            </p:nvSpPr>
+            <p:spPr>
+              <a:xfrm>
+                <a:off x="1698744" y="4224775"/>
+                <a:ext cx="2087832" cy="323165"/>
+              </a:xfrm>
+              <a:prstGeom prst="rect">
+                <a:avLst/>
+              </a:prstGeom>
+              <a:noFill/>
+              <a:ln>
+                <a:noFill/>
+              </a:ln>
+            </p:spPr>
+            <p:txBody>
+              <a:bodyPr wrap="square" rtlCol="0">
+                <a:spAutoFit/>
+              </a:bodyPr>
+              <a:lstStyle/>
+              <a:p>
+                <a:pPr algn="ctr"/>
+                <a:r>
+                  <a:rPr lang="en-US" sz="1500" dirty="0"/>
+                  <a:t>Send Encrypted Key</a:t>
+                </a:r>
+              </a:p>
+            </p:txBody>
+          </p:sp>
+          <p:cxnSp>
+            <p:nvCxnSpPr>
+              <p:cNvPr id="18" name="Straight Arrow Connector 17"/>
+              <p:cNvCxnSpPr/>
+              <p:nvPr/>
+            </p:nvCxnSpPr>
+            <p:spPr>
+              <a:xfrm>
+                <a:off x="3918078" y="4405820"/>
+                <a:ext cx="1197451" cy="0"/>
+              </a:xfrm>
+              <a:prstGeom prst="straightConnector1">
+                <a:avLst/>
+              </a:prstGeom>
+              <a:ln w="38100">
+                <a:solidFill>
+                  <a:schemeClr val="accent6"/>
+                </a:solidFill>
+                <a:tailEnd type="triangle"/>
+              </a:ln>
+            </p:spPr>
+            <p:style>
+              <a:lnRef idx="1">
+                <a:schemeClr val="accent1"/>
+              </a:lnRef>
+              <a:fillRef idx="0">
+                <a:schemeClr val="accent1"/>
+              </a:fillRef>
+              <a:effectRef idx="0">
+                <a:schemeClr val="accent1"/>
+              </a:effectRef>
+              <a:fontRef idx="minor">
+                <a:schemeClr val="tx1"/>
+              </a:fontRef>
+            </p:style>
+          </p:cxnSp>
+          <p:cxnSp>
+            <p:nvCxnSpPr>
+              <p:cNvPr id="22" name="Straight Arrow Connector 21"/>
+              <p:cNvCxnSpPr/>
+              <p:nvPr/>
+            </p:nvCxnSpPr>
+            <p:spPr>
+              <a:xfrm flipH="1" flipV="1">
+                <a:off x="2765023" y="3031196"/>
+                <a:ext cx="865" cy="377849"/>
+              </a:xfrm>
+              <a:prstGeom prst="straightConnector1">
+                <a:avLst/>
+              </a:prstGeom>
+              <a:ln w="38100">
+                <a:solidFill>
+                  <a:schemeClr val="tx2"/>
+                </a:solidFill>
+                <a:headEnd type="triangle"/>
+                <a:tailEnd type="none"/>
+              </a:ln>
+            </p:spPr>
+            <p:style>
+              <a:lnRef idx="1">
+                <a:schemeClr val="accent1"/>
+              </a:lnRef>
+              <a:fillRef idx="0">
+                <a:schemeClr val="accent1"/>
+              </a:fillRef>
+              <a:effectRef idx="0">
+                <a:schemeClr val="accent1"/>
+              </a:effectRef>
+              <a:fontRef idx="minor">
+                <a:schemeClr val="tx1"/>
+              </a:fontRef>
+            </p:style>
+          </p:cxnSp>
+          <p:cxnSp>
+            <p:nvCxnSpPr>
+              <p:cNvPr id="23" name="Straight Arrow Connector 22"/>
+              <p:cNvCxnSpPr/>
+              <p:nvPr/>
+            </p:nvCxnSpPr>
+            <p:spPr>
+              <a:xfrm flipH="1" flipV="1">
+                <a:off x="2741795" y="3864299"/>
+                <a:ext cx="865" cy="377849"/>
+              </a:xfrm>
+              <a:prstGeom prst="straightConnector1">
+                <a:avLst/>
+              </a:prstGeom>
+              <a:ln w="38100">
+                <a:solidFill>
+                  <a:schemeClr val="tx2"/>
+                </a:solidFill>
+                <a:headEnd type="triangle"/>
+                <a:tailEnd type="none"/>
+              </a:ln>
+            </p:spPr>
+            <p:style>
+              <a:lnRef idx="1">
+                <a:schemeClr val="accent1"/>
+              </a:lnRef>
+              <a:fillRef idx="0">
+                <a:schemeClr val="accent1"/>
+              </a:fillRef>
+              <a:effectRef idx="0">
+                <a:schemeClr val="accent1"/>
+              </a:effectRef>
+              <a:fontRef idx="minor">
+                <a:schemeClr val="tx1"/>
+              </a:fontRef>
+            </p:style>
+          </p:cxnSp>
+          <p:sp>
+            <p:nvSpPr>
+              <p:cNvPr id="24" name="TextBox 23"/>
+              <p:cNvSpPr txBox="1"/>
+              <p:nvPr/>
+            </p:nvSpPr>
+            <p:spPr>
+              <a:xfrm>
+                <a:off x="5125151" y="4221154"/>
+                <a:ext cx="2286002" cy="553998"/>
+              </a:xfrm>
+              <a:prstGeom prst="rect">
+                <a:avLst/>
+              </a:prstGeom>
+              <a:noFill/>
+              <a:ln>
+                <a:noFill/>
+              </a:ln>
+            </p:spPr>
+            <p:txBody>
+              <a:bodyPr wrap="square" rtlCol="0">
+                <a:spAutoFit/>
+              </a:bodyPr>
+              <a:lstStyle/>
+              <a:p>
+                <a:pPr algn="ctr"/>
+                <a:r>
+                  <a:rPr lang="en-US" sz="1500" dirty="0"/>
+                  <a:t>Decrypt w/Server Private Key</a:t>
+                </a:r>
+              </a:p>
+            </p:txBody>
+          </p:sp>
+          <p:cxnSp>
+            <p:nvCxnSpPr>
+              <p:cNvPr id="30" name="Straight Arrow Connector 29"/>
+              <p:cNvCxnSpPr/>
+              <p:nvPr/>
+            </p:nvCxnSpPr>
+            <p:spPr>
+              <a:xfrm>
+                <a:off x="3930042" y="5260864"/>
+                <a:ext cx="1197451" cy="0"/>
+              </a:xfrm>
+              <a:prstGeom prst="straightConnector1">
+                <a:avLst/>
+              </a:prstGeom>
+              <a:ln w="38100">
+                <a:solidFill>
+                  <a:schemeClr val="accent6"/>
+                </a:solidFill>
+                <a:headEnd type="triangle"/>
+                <a:tailEnd type="triangle"/>
+              </a:ln>
+            </p:spPr>
+            <p:style>
+              <a:lnRef idx="1">
+                <a:schemeClr val="accent1"/>
+              </a:lnRef>
+              <a:fillRef idx="0">
+                <a:schemeClr val="accent1"/>
+              </a:fillRef>
+              <a:effectRef idx="0">
+                <a:schemeClr val="accent1"/>
+              </a:effectRef>
+              <a:fontRef idx="minor">
+                <a:schemeClr val="tx1"/>
+              </a:fontRef>
+            </p:style>
+          </p:cxnSp>
+        </p:grpSp>
         <p:sp>
           <p:nvSpPr>
-            <p:cNvPr id="3" name="TextBox 2"/>
+            <p:cNvPr id="19" name="TextBox 18">
+              <a:extLst>
+                <a:ext uri="{FF2B5EF4-FFF2-40B4-BE49-F238E27FC236}">
+                  <a16:creationId xmlns:a16="http://schemas.microsoft.com/office/drawing/2014/main" id="{CC9FCF87-F2D4-4039-A826-4C3260BD10F9}"/>
+                </a:ext>
+              </a:extLst>
+            </p:cNvPr>
             <p:cNvSpPr txBox="1"/>
             <p:nvPr/>
           </p:nvSpPr>
           <p:spPr>
             <a:xfrm>
-              <a:off x="1634421" y="953146"/>
-              <a:ext cx="2286000" cy="4572000"/>
-            </a:xfrm>
-            <a:prstGeom prst="rect">
-              <a:avLst/>
-            </a:prstGeom>
-            <a:noFill/>
-            <a:ln>
-              <a:solidFill>
-                <a:schemeClr val="tx1"/>
-              </a:solidFill>
-            </a:ln>
-          </p:spPr>
-          <p:txBody>
-            <a:bodyPr wrap="none" rtlCol="0">
-              <a:noAutofit/>
-            </a:bodyPr>
-            <a:lstStyle/>
-            <a:p>
-              <a:pPr algn="ctr"/>
-              <a:r>
-                <a:rPr lang="en-US" u="sng" dirty="0" smtClean="0"/>
-                <a:t>TCP Client</a:t>
-              </a:r>
-              <a:endParaRPr lang="en-US" u="sng" dirty="0"/>
-            </a:p>
-          </p:txBody>
-        </p:sp>
-        <p:sp>
-          <p:nvSpPr>
-            <p:cNvPr id="5" name="TextBox 4"/>
-            <p:cNvSpPr txBox="1"/>
-            <p:nvPr/>
-          </p:nvSpPr>
-          <p:spPr>
-            <a:xfrm>
-              <a:off x="5125153" y="953146"/>
-              <a:ext cx="2286000" cy="4572000"/>
-            </a:xfrm>
-            <a:prstGeom prst="rect">
-              <a:avLst/>
-            </a:prstGeom>
-            <a:noFill/>
-            <a:ln>
-              <a:solidFill>
-                <a:schemeClr val="tx1"/>
-              </a:solidFill>
-            </a:ln>
-          </p:spPr>
-          <p:txBody>
-            <a:bodyPr wrap="none" rtlCol="0">
-              <a:noAutofit/>
-            </a:bodyPr>
-            <a:lstStyle/>
-            <a:p>
-              <a:pPr algn="ctr"/>
-              <a:r>
-                <a:rPr lang="en-US" u="sng" dirty="0" smtClean="0"/>
-                <a:t>TCP Server</a:t>
-              </a:r>
-              <a:endParaRPr lang="en-US" u="sng" dirty="0"/>
-            </a:p>
-          </p:txBody>
-        </p:sp>
-        <p:sp>
-          <p:nvSpPr>
-            <p:cNvPr id="7" name="TextBox 6"/>
-            <p:cNvSpPr txBox="1"/>
-            <p:nvPr/>
-          </p:nvSpPr>
-          <p:spPr>
-            <a:xfrm>
-              <a:off x="1634421" y="1632489"/>
-              <a:ext cx="2274035" cy="323165"/>
+              <a:off x="1647334" y="5125974"/>
+              <a:ext cx="2452166" cy="323165"/>
             </a:xfrm>
             <a:prstGeom prst="rect">
               <a:avLst/>
@@ -15438,96 +15874,28 @@
             <a:p>
               <a:pPr algn="ctr"/>
               <a:r>
-                <a:rPr lang="en-US" sz="1500" smtClean="0"/>
-                <a:t>Send Hello</a:t>
+                <a:rPr lang="en-US" sz="1500" dirty="0"/>
+                <a:t>Encrypted Data Exchange</a:t>
               </a:r>
-              <a:endParaRPr lang="en-US" sz="1500" dirty="0"/>
             </a:p>
           </p:txBody>
         </p:sp>
-        <p:cxnSp>
-          <p:nvCxnSpPr>
-            <p:cNvPr id="9" name="Straight Arrow Connector 8"/>
-            <p:cNvCxnSpPr/>
-            <p:nvPr/>
-          </p:nvCxnSpPr>
-          <p:spPr>
-            <a:xfrm>
-              <a:off x="3918080" y="1817155"/>
-              <a:ext cx="1197451" cy="0"/>
-            </a:xfrm>
-            <a:prstGeom prst="straightConnector1">
-              <a:avLst/>
-            </a:prstGeom>
-            <a:ln w="38100">
-              <a:solidFill>
-                <a:srgbClr val="FF0000"/>
-              </a:solidFill>
-              <a:tailEnd type="triangle"/>
-            </a:ln>
-          </p:spPr>
-          <p:style>
-            <a:lnRef idx="1">
-              <a:schemeClr val="accent1"/>
-            </a:lnRef>
-            <a:fillRef idx="0">
-              <a:schemeClr val="accent1"/>
-            </a:fillRef>
-            <a:effectRef idx="0">
-              <a:schemeClr val="accent1"/>
-            </a:effectRef>
-            <a:fontRef idx="minor">
-              <a:schemeClr val="tx1"/>
-            </a:fontRef>
-          </p:style>
-        </p:cxnSp>
-        <p:cxnSp>
-          <p:nvCxnSpPr>
-            <p:cNvPr id="12" name="Straight Arrow Connector 11"/>
-            <p:cNvCxnSpPr/>
-            <p:nvPr/>
-          </p:nvCxnSpPr>
-          <p:spPr>
-            <a:xfrm>
-              <a:off x="3918079" y="2431568"/>
-              <a:ext cx="1197451" cy="0"/>
-            </a:xfrm>
-            <a:prstGeom prst="straightConnector1">
-              <a:avLst/>
-            </a:prstGeom>
-            <a:ln w="38100">
-              <a:solidFill>
-                <a:srgbClr val="FF0000"/>
-              </a:solidFill>
-              <a:headEnd type="triangle"/>
-              <a:tailEnd type="none"/>
-            </a:ln>
-          </p:spPr>
-          <p:style>
-            <a:lnRef idx="1">
-              <a:schemeClr val="accent1"/>
-            </a:lnRef>
-            <a:fillRef idx="0">
-              <a:schemeClr val="accent1"/>
-            </a:fillRef>
-            <a:effectRef idx="0">
-              <a:schemeClr val="accent1"/>
-            </a:effectRef>
-            <a:fontRef idx="minor">
-              <a:schemeClr val="tx1"/>
-            </a:fontRef>
-          </p:style>
-        </p:cxnSp>
         <p:sp>
           <p:nvSpPr>
-            <p:cNvPr id="13" name="TextBox 12"/>
+            <p:cNvPr id="20" name="TextBox 19">
+              <a:extLst>
+                <a:ext uri="{FF2B5EF4-FFF2-40B4-BE49-F238E27FC236}">
+                  <a16:creationId xmlns:a16="http://schemas.microsoft.com/office/drawing/2014/main" id="{3515CE19-FCFF-4E9F-A2DF-69A7A146D633}"/>
+                </a:ext>
+              </a:extLst>
+            </p:cNvPr>
             <p:cNvSpPr txBox="1"/>
             <p:nvPr/>
           </p:nvSpPr>
           <p:spPr>
             <a:xfrm>
-              <a:off x="5125153" y="2268899"/>
-              <a:ext cx="2295623" cy="323165"/>
+              <a:off x="5402470" y="5125974"/>
+              <a:ext cx="2467608" cy="323165"/>
             </a:xfrm>
             <a:prstGeom prst="rect">
               <a:avLst/>
@@ -15545,296 +15913,12 @@
             <a:p>
               <a:pPr algn="ctr"/>
               <a:r>
-                <a:rPr lang="en-US" sz="1500" dirty="0" smtClean="0"/>
-                <a:t>Send Public Key</a:t>
+                <a:rPr lang="en-US" sz="1500" dirty="0"/>
+                <a:t>Encrypted Data Exchange</a:t>
               </a:r>
-              <a:endParaRPr lang="en-US" sz="1500" dirty="0"/>
             </a:p>
           </p:txBody>
         </p:sp>
-        <p:sp>
-          <p:nvSpPr>
-            <p:cNvPr id="14" name="TextBox 13"/>
-            <p:cNvSpPr txBox="1"/>
-            <p:nvPr/>
-          </p:nvSpPr>
-          <p:spPr>
-            <a:xfrm>
-              <a:off x="1636151" y="2688754"/>
-              <a:ext cx="2281927" cy="323165"/>
-            </a:xfrm>
-            <a:prstGeom prst="rect">
-              <a:avLst/>
-            </a:prstGeom>
-            <a:noFill/>
-            <a:ln>
-              <a:noFill/>
-            </a:ln>
-          </p:spPr>
-          <p:txBody>
-            <a:bodyPr wrap="square" rtlCol="0">
-              <a:spAutoFit/>
-            </a:bodyPr>
-            <a:lstStyle/>
-            <a:p>
-              <a:pPr algn="ctr"/>
-              <a:r>
-                <a:rPr lang="en-US" sz="1500" dirty="0" smtClean="0"/>
-                <a:t>Create Symmetric Key</a:t>
-              </a:r>
-              <a:endParaRPr lang="en-US" sz="1500" dirty="0"/>
-            </a:p>
-          </p:txBody>
-        </p:sp>
-        <p:sp>
-          <p:nvSpPr>
-            <p:cNvPr id="15" name="TextBox 14"/>
-            <p:cNvSpPr txBox="1"/>
-            <p:nvPr/>
-          </p:nvSpPr>
-          <p:spPr>
-            <a:xfrm>
-              <a:off x="1634419" y="3473381"/>
-              <a:ext cx="2295623" cy="323165"/>
-            </a:xfrm>
-            <a:prstGeom prst="rect">
-              <a:avLst/>
-            </a:prstGeom>
-            <a:noFill/>
-            <a:ln>
-              <a:noFill/>
-            </a:ln>
-          </p:spPr>
-          <p:txBody>
-            <a:bodyPr wrap="square" rtlCol="0">
-              <a:spAutoFit/>
-            </a:bodyPr>
-            <a:lstStyle/>
-            <a:p>
-              <a:pPr algn="ctr"/>
-              <a:r>
-                <a:rPr lang="en-US" sz="1500" dirty="0" smtClean="0"/>
-                <a:t>Encrypt w/Server Pub Key</a:t>
-              </a:r>
-              <a:endParaRPr lang="en-US" sz="1500" dirty="0"/>
-            </a:p>
-          </p:txBody>
-        </p:sp>
-        <p:sp>
-          <p:nvSpPr>
-            <p:cNvPr id="17" name="TextBox 16"/>
-            <p:cNvSpPr txBox="1"/>
-            <p:nvPr/>
-          </p:nvSpPr>
-          <p:spPr>
-            <a:xfrm>
-              <a:off x="1698744" y="4224775"/>
-              <a:ext cx="2087832" cy="323165"/>
-            </a:xfrm>
-            <a:prstGeom prst="rect">
-              <a:avLst/>
-            </a:prstGeom>
-            <a:noFill/>
-            <a:ln>
-              <a:noFill/>
-            </a:ln>
-          </p:spPr>
-          <p:txBody>
-            <a:bodyPr wrap="square" rtlCol="0">
-              <a:spAutoFit/>
-            </a:bodyPr>
-            <a:lstStyle/>
-            <a:p>
-              <a:pPr algn="ctr"/>
-              <a:r>
-                <a:rPr lang="en-US" sz="1500" dirty="0" smtClean="0"/>
-                <a:t>Send Encrypted Key</a:t>
-              </a:r>
-              <a:endParaRPr lang="en-US" sz="1500" dirty="0"/>
-            </a:p>
-          </p:txBody>
-        </p:sp>
-        <p:cxnSp>
-          <p:nvCxnSpPr>
-            <p:cNvPr id="18" name="Straight Arrow Connector 17"/>
-            <p:cNvCxnSpPr/>
-            <p:nvPr/>
-          </p:nvCxnSpPr>
-          <p:spPr>
-            <a:xfrm>
-              <a:off x="3918078" y="4405820"/>
-              <a:ext cx="1197451" cy="0"/>
-            </a:xfrm>
-            <a:prstGeom prst="straightConnector1">
-              <a:avLst/>
-            </a:prstGeom>
-            <a:ln w="38100">
-              <a:solidFill>
-                <a:schemeClr val="accent6"/>
-              </a:solidFill>
-              <a:tailEnd type="triangle"/>
-            </a:ln>
-          </p:spPr>
-          <p:style>
-            <a:lnRef idx="1">
-              <a:schemeClr val="accent1"/>
-            </a:lnRef>
-            <a:fillRef idx="0">
-              <a:schemeClr val="accent1"/>
-            </a:fillRef>
-            <a:effectRef idx="0">
-              <a:schemeClr val="accent1"/>
-            </a:effectRef>
-            <a:fontRef idx="minor">
-              <a:schemeClr val="tx1"/>
-            </a:fontRef>
-          </p:style>
-        </p:cxnSp>
-        <p:cxnSp>
-          <p:nvCxnSpPr>
-            <p:cNvPr id="22" name="Straight Arrow Connector 21"/>
-            <p:cNvCxnSpPr/>
-            <p:nvPr/>
-          </p:nvCxnSpPr>
-          <p:spPr>
-            <a:xfrm flipH="1" flipV="1">
-              <a:off x="2765023" y="3031196"/>
-              <a:ext cx="865" cy="377849"/>
-            </a:xfrm>
-            <a:prstGeom prst="straightConnector1">
-              <a:avLst/>
-            </a:prstGeom>
-            <a:ln w="38100">
-              <a:solidFill>
-                <a:schemeClr val="tx2"/>
-              </a:solidFill>
-              <a:headEnd type="triangle"/>
-              <a:tailEnd type="none"/>
-            </a:ln>
-          </p:spPr>
-          <p:style>
-            <a:lnRef idx="1">
-              <a:schemeClr val="accent1"/>
-            </a:lnRef>
-            <a:fillRef idx="0">
-              <a:schemeClr val="accent1"/>
-            </a:fillRef>
-            <a:effectRef idx="0">
-              <a:schemeClr val="accent1"/>
-            </a:effectRef>
-            <a:fontRef idx="minor">
-              <a:schemeClr val="tx1"/>
-            </a:fontRef>
-          </p:style>
-        </p:cxnSp>
-        <p:cxnSp>
-          <p:nvCxnSpPr>
-            <p:cNvPr id="23" name="Straight Arrow Connector 22"/>
-            <p:cNvCxnSpPr/>
-            <p:nvPr/>
-          </p:nvCxnSpPr>
-          <p:spPr>
-            <a:xfrm flipH="1" flipV="1">
-              <a:off x="2741795" y="3864299"/>
-              <a:ext cx="865" cy="377849"/>
-            </a:xfrm>
-            <a:prstGeom prst="straightConnector1">
-              <a:avLst/>
-            </a:prstGeom>
-            <a:ln w="38100">
-              <a:solidFill>
-                <a:schemeClr val="tx2"/>
-              </a:solidFill>
-              <a:headEnd type="triangle"/>
-              <a:tailEnd type="none"/>
-            </a:ln>
-          </p:spPr>
-          <p:style>
-            <a:lnRef idx="1">
-              <a:schemeClr val="accent1"/>
-            </a:lnRef>
-            <a:fillRef idx="0">
-              <a:schemeClr val="accent1"/>
-            </a:fillRef>
-            <a:effectRef idx="0">
-              <a:schemeClr val="accent1"/>
-            </a:effectRef>
-            <a:fontRef idx="minor">
-              <a:schemeClr val="tx1"/>
-            </a:fontRef>
-          </p:style>
-        </p:cxnSp>
-        <p:sp>
-          <p:nvSpPr>
-            <p:cNvPr id="24" name="TextBox 23"/>
-            <p:cNvSpPr txBox="1"/>
-            <p:nvPr/>
-          </p:nvSpPr>
-          <p:spPr>
-            <a:xfrm>
-              <a:off x="5125151" y="4221154"/>
-              <a:ext cx="2286002" cy="323165"/>
-            </a:xfrm>
-            <a:prstGeom prst="rect">
-              <a:avLst/>
-            </a:prstGeom>
-            <a:noFill/>
-            <a:ln>
-              <a:noFill/>
-            </a:ln>
-          </p:spPr>
-          <p:txBody>
-            <a:bodyPr wrap="square" rtlCol="0">
-              <a:spAutoFit/>
-            </a:bodyPr>
-            <a:lstStyle/>
-            <a:p>
-              <a:pPr algn="ctr"/>
-              <a:r>
-                <a:rPr lang="en-US" sz="1500" dirty="0" smtClean="0"/>
-                <a:t>Decrypt w/Server Cert</a:t>
-              </a:r>
-              <a:endParaRPr lang="en-US" sz="1500" dirty="0"/>
-            </a:p>
-          </p:txBody>
-        </p:sp>
-        <p:cxnSp>
-          <p:nvCxnSpPr>
-            <p:cNvPr id="30" name="Straight Arrow Connector 29"/>
-            <p:cNvCxnSpPr/>
-            <p:nvPr/>
-          </p:nvCxnSpPr>
-          <p:spPr>
-            <a:xfrm>
-              <a:off x="3930042" y="5260864"/>
-              <a:ext cx="1197451" cy="0"/>
-            </a:xfrm>
-            <a:prstGeom prst="straightConnector1">
-              <a:avLst/>
-            </a:prstGeom>
-            <a:ln w="38100">
-              <a:solidFill>
-                <a:schemeClr val="accent6"/>
-              </a:solidFill>
-              <a:headEnd type="triangle"/>
-              <a:tailEnd type="triangle"/>
-            </a:ln>
-          </p:spPr>
-          <p:style>
-            <a:lnRef idx="1">
-              <a:schemeClr val="accent1"/>
-            </a:lnRef>
-            <a:fillRef idx="0">
-              <a:schemeClr val="accent1"/>
-            </a:fillRef>
-            <a:effectRef idx="0">
-              <a:schemeClr val="accent1"/>
-            </a:effectRef>
-            <a:fontRef idx="minor">
-              <a:schemeClr val="tx1"/>
-            </a:fontRef>
-          </p:style>
-        </p:cxnSp>
       </p:grpSp>
     </p:spTree>
     <p:extLst>
@@ -15846,13 +15930,6 @@
   <p:clrMapOvr>
     <a:masterClrMapping/>
   </p:clrMapOvr>
-  <p:timing>
-    <p:tnLst>
-      <p:par>
-        <p:cTn id="1" dur="indefinite" restart="never" nodeType="tmRoot"/>
-      </p:par>
-    </p:tnLst>
-  </p:timing>
 </p:sld>
 </file>
 
@@ -15875,16 +15952,22 @@
       </p:grpSpPr>
       <p:grpSp>
         <p:nvGrpSpPr>
-          <p:cNvPr id="2" name="Group 1"/>
+          <p:cNvPr id="22" name="Group 21">
+            <a:extLst>
+              <a:ext uri="{FF2B5EF4-FFF2-40B4-BE49-F238E27FC236}">
+                <a16:creationId xmlns:a16="http://schemas.microsoft.com/office/drawing/2014/main" id="{32D7F702-4C88-4EE2-9F57-CB430F0BA6F9}"/>
+              </a:ext>
+            </a:extLst>
+          </p:cNvPr>
           <p:cNvGrpSpPr/>
           <p:nvPr/>
         </p:nvGrpSpPr>
         <p:grpSpPr>
           <a:xfrm>
             <a:off x="1634419" y="953146"/>
-            <a:ext cx="5786357" cy="4572000"/>
+            <a:ext cx="6246046" cy="4572000"/>
             <a:chOff x="1634419" y="953146"/>
-            <a:chExt cx="5786357" cy="4572000"/>
+            <a:chExt cx="6246046" cy="4572000"/>
           </a:xfrm>
         </p:grpSpPr>
         <p:sp>
@@ -15896,7 +15979,7 @@
           <p:spPr>
             <a:xfrm>
               <a:off x="1634421" y="953146"/>
-              <a:ext cx="2286000" cy="4572000"/>
+              <a:ext cx="2467608" cy="4572000"/>
             </a:xfrm>
             <a:prstGeom prst="rect">
               <a:avLst/>
@@ -15916,10 +15999,9 @@
             <a:p>
               <a:pPr algn="ctr"/>
               <a:r>
-                <a:rPr lang="en-US" u="sng" dirty="0" smtClean="0"/>
+                <a:rPr lang="en-US" dirty="0"/>
                 <a:t>TCP Client</a:t>
               </a:r>
-              <a:endParaRPr lang="en-US" u="sng" dirty="0"/>
             </a:p>
           </p:txBody>
         </p:sp>
@@ -15931,8 +16013,8 @@
           </p:nvSpPr>
           <p:spPr>
             <a:xfrm>
-              <a:off x="5125153" y="953146"/>
-              <a:ext cx="2286000" cy="4572000"/>
+              <a:off x="5402469" y="953146"/>
+              <a:ext cx="2467608" cy="4572000"/>
             </a:xfrm>
             <a:prstGeom prst="rect">
               <a:avLst/>
@@ -15952,10 +16034,9 @@
             <a:p>
               <a:pPr algn="ctr"/>
               <a:r>
-                <a:rPr lang="en-US" u="sng" dirty="0" smtClean="0"/>
+                <a:rPr lang="en-US" dirty="0"/>
                 <a:t>TCP Server</a:t>
               </a:r>
-              <a:endParaRPr lang="en-US" u="sng" dirty="0"/>
             </a:p>
           </p:txBody>
         </p:sp>
@@ -15968,7 +16049,7 @@
           <p:spPr>
             <a:xfrm>
               <a:off x="1634421" y="1632489"/>
-              <a:ext cx="2274035" cy="323165"/>
+              <a:ext cx="2454693" cy="323165"/>
             </a:xfrm>
             <a:prstGeom prst="rect">
               <a:avLst/>
@@ -15986,7 +16067,7 @@
             <a:p>
               <a:pPr algn="ctr"/>
               <a:r>
-                <a:rPr lang="en-US" sz="1500" smtClean="0"/>
+                <a:rPr lang="en-US" sz="1500"/>
                 <a:t>Send Hello</a:t>
               </a:r>
               <a:endParaRPr lang="en-US" sz="1500" dirty="0"/>
@@ -16001,8 +16082,8 @@
           </p:nvCxnSpPr>
           <p:spPr>
             <a:xfrm>
-              <a:off x="3918080" y="1817155"/>
-              <a:ext cx="1197451" cy="0"/>
+              <a:off x="4099502" y="1817155"/>
+              <a:ext cx="1292581" cy="0"/>
             </a:xfrm>
             <a:prstGeom prst="straightConnector1">
               <a:avLst/>
@@ -16037,8 +16118,8 @@
           </p:nvCxnSpPr>
           <p:spPr>
             <a:xfrm>
-              <a:off x="3918079" y="2431568"/>
-              <a:ext cx="1197451" cy="0"/>
+              <a:off x="4099501" y="2431568"/>
+              <a:ext cx="1292581" cy="0"/>
             </a:xfrm>
             <a:prstGeom prst="straightConnector1">
               <a:avLst/>
@@ -16074,8 +16155,8 @@
           </p:nvSpPr>
           <p:spPr>
             <a:xfrm>
-              <a:off x="5125153" y="2268899"/>
-              <a:ext cx="2295623" cy="323165"/>
+              <a:off x="5402469" y="2268899"/>
+              <a:ext cx="2477996" cy="323165"/>
             </a:xfrm>
             <a:prstGeom prst="rect">
               <a:avLst/>
@@ -16093,10 +16174,9 @@
             <a:p>
               <a:pPr algn="ctr"/>
               <a:r>
-                <a:rPr lang="en-US" sz="1500" dirty="0" smtClean="0"/>
+                <a:rPr lang="en-US" sz="1500" dirty="0"/>
                 <a:t>Send X.509 Server Cert</a:t>
               </a:r>
-              <a:endParaRPr lang="en-US" sz="1500" dirty="0"/>
             </a:p>
           </p:txBody>
         </p:sp>
@@ -16108,8 +16188,8 @@
           </p:nvSpPr>
           <p:spPr>
             <a:xfrm>
-              <a:off x="1636151" y="3025642"/>
-              <a:ext cx="2281927" cy="323165"/>
+              <a:off x="1636289" y="3025642"/>
+              <a:ext cx="2463211" cy="323165"/>
             </a:xfrm>
             <a:prstGeom prst="rect">
               <a:avLst/>
@@ -16127,10 +16207,9 @@
             <a:p>
               <a:pPr algn="ctr"/>
               <a:r>
-                <a:rPr lang="en-US" sz="1500" dirty="0" smtClean="0"/>
+                <a:rPr lang="en-US" sz="1500" dirty="0"/>
                 <a:t>Create Symmetric Key</a:t>
               </a:r>
-              <a:endParaRPr lang="en-US" sz="1500" dirty="0"/>
             </a:p>
           </p:txBody>
         </p:sp>
@@ -16142,8 +16221,8 @@
           </p:nvSpPr>
           <p:spPr>
             <a:xfrm>
-              <a:off x="1634419" y="3810269"/>
-              <a:ext cx="2295623" cy="323165"/>
+              <a:off x="1634419" y="3710513"/>
+              <a:ext cx="2477996" cy="553998"/>
             </a:xfrm>
             <a:prstGeom prst="rect">
               <a:avLst/>
@@ -16161,10 +16240,16 @@
             <a:p>
               <a:pPr algn="ctr"/>
               <a:r>
-                <a:rPr lang="en-US" sz="1500" dirty="0" smtClean="0"/>
+                <a:rPr lang="en-US" sz="1500" dirty="0"/>
                 <a:t>Encrypt w/Server Pub Key</a:t>
               </a:r>
-              <a:endParaRPr lang="en-US" sz="1500" dirty="0"/>
+            </a:p>
+            <a:p>
+              <a:pPr algn="ctr"/>
+              <a:r>
+                <a:rPr lang="en-US" sz="1500" dirty="0"/>
+                <a:t>(from Server Cert)</a:t>
+              </a:r>
             </a:p>
           </p:txBody>
         </p:sp>
@@ -16176,8 +16261,8 @@
           </p:nvSpPr>
           <p:spPr>
             <a:xfrm>
-              <a:off x="1765924" y="2268899"/>
-              <a:ext cx="2020652" cy="323165"/>
+              <a:off x="1776371" y="2268899"/>
+              <a:ext cx="2181180" cy="323165"/>
             </a:xfrm>
             <a:prstGeom prst="rect">
               <a:avLst/>
@@ -16195,10 +16280,9 @@
             <a:p>
               <a:pPr algn="ctr"/>
               <a:r>
-                <a:rPr lang="en-US" sz="1500" dirty="0" smtClean="0"/>
+                <a:rPr lang="en-US" sz="1500" dirty="0"/>
                 <a:t>Verify X.509 Cert</a:t>
               </a:r>
-              <a:endParaRPr lang="en-US" sz="1500" dirty="0"/>
             </a:p>
           </p:txBody>
         </p:sp>
@@ -16210,8 +16294,8 @@
           </p:nvSpPr>
           <p:spPr>
             <a:xfrm>
-              <a:off x="1698744" y="4561663"/>
-              <a:ext cx="2087832" cy="323165"/>
+              <a:off x="1737106" y="4561663"/>
+              <a:ext cx="2253697" cy="323165"/>
             </a:xfrm>
             <a:prstGeom prst="rect">
               <a:avLst/>
@@ -16229,10 +16313,9 @@
             <a:p>
               <a:pPr algn="ctr"/>
               <a:r>
-                <a:rPr lang="en-US" sz="1500" dirty="0" smtClean="0"/>
+                <a:rPr lang="en-US" sz="1500" dirty="0"/>
                 <a:t>Send Encrypted Key</a:t>
               </a:r>
-              <a:endParaRPr lang="en-US" sz="1500" dirty="0"/>
             </a:p>
           </p:txBody>
         </p:sp>
@@ -16244,8 +16327,8 @@
           </p:nvCxnSpPr>
           <p:spPr>
             <a:xfrm>
-              <a:off x="3918078" y="4713829"/>
-              <a:ext cx="1197451" cy="0"/>
+              <a:off x="4099500" y="4713829"/>
+              <a:ext cx="1292581" cy="0"/>
             </a:xfrm>
             <a:prstGeom prst="straightConnector1">
               <a:avLst/>
@@ -16274,53 +16357,14 @@
         </p:cxnSp>
         <p:cxnSp>
           <p:nvCxnSpPr>
-            <p:cNvPr id="14" name="Straight Arrow Connector 13"/>
-            <p:cNvCxnSpPr>
-              <a:stCxn id="14" idx="0"/>
-            </p:cNvCxnSpPr>
-            <p:nvPr/>
-          </p:nvCxnSpPr>
-          <p:spPr>
-            <a:xfrm flipH="1" flipV="1">
-              <a:off x="2776251" y="2647794"/>
-              <a:ext cx="864" cy="377848"/>
-            </a:xfrm>
-            <a:prstGeom prst="straightConnector1">
-              <a:avLst/>
-            </a:prstGeom>
-            <a:ln w="38100">
-              <a:solidFill>
-                <a:schemeClr val="tx2"/>
-              </a:solidFill>
-              <a:headEnd type="triangle"/>
-              <a:tailEnd type="none"/>
-            </a:ln>
-          </p:spPr>
-          <p:style>
-            <a:lnRef idx="1">
-              <a:schemeClr val="accent1"/>
-            </a:lnRef>
-            <a:fillRef idx="0">
-              <a:schemeClr val="accent1"/>
-            </a:fillRef>
-            <a:effectRef idx="0">
-              <a:schemeClr val="accent1"/>
-            </a:effectRef>
-            <a:fontRef idx="minor">
-              <a:schemeClr val="tx1"/>
-            </a:fontRef>
-          </p:style>
-        </p:cxnSp>
-        <p:cxnSp>
-          <p:nvCxnSpPr>
             <p:cNvPr id="15" name="Straight Arrow Connector 14"/>
             <p:cNvCxnSpPr/>
             <p:nvPr/>
           </p:nvCxnSpPr>
           <p:spPr>
             <a:xfrm flipH="1" flipV="1">
-              <a:off x="2765023" y="3368084"/>
-              <a:ext cx="865" cy="377849"/>
+              <a:off x="2871468" y="3334832"/>
+              <a:ext cx="934" cy="377849"/>
             </a:xfrm>
             <a:prstGeom prst="straightConnector1">
               <a:avLst/>
@@ -16356,8 +16400,8 @@
           </p:nvCxnSpPr>
           <p:spPr>
             <a:xfrm flipH="1" flipV="1">
-              <a:off x="2741795" y="4201187"/>
-              <a:ext cx="865" cy="377849"/>
+              <a:off x="2871334" y="4226126"/>
+              <a:ext cx="934" cy="377849"/>
             </a:xfrm>
             <a:prstGeom prst="straightConnector1">
               <a:avLst/>
@@ -16393,8 +16437,8 @@
           </p:nvSpPr>
           <p:spPr>
             <a:xfrm>
-              <a:off x="5125151" y="4529163"/>
-              <a:ext cx="2286002" cy="323165"/>
+              <a:off x="5402467" y="4529163"/>
+              <a:ext cx="2467610" cy="323165"/>
             </a:xfrm>
             <a:prstGeom prst="rect">
               <a:avLst/>
@@ -16412,10 +16456,9 @@
             <a:p>
               <a:pPr algn="ctr"/>
               <a:r>
-                <a:rPr lang="en-US" sz="1500" dirty="0" smtClean="0"/>
-                <a:t>Decrypt w/Server Cert</a:t>
+                <a:rPr lang="en-US" sz="1500" dirty="0"/>
+                <a:t>Decrypt w/Server Private Key</a:t>
               </a:r>
-              <a:endParaRPr lang="en-US" sz="1500" dirty="0"/>
             </a:p>
           </p:txBody>
         </p:sp>
@@ -16427,8 +16470,8 @@
           </p:nvCxnSpPr>
           <p:spPr>
             <a:xfrm>
-              <a:off x="3930042" y="5260864"/>
-              <a:ext cx="1197451" cy="0"/>
+              <a:off x="4112415" y="5260864"/>
+              <a:ext cx="1292581" cy="0"/>
             </a:xfrm>
             <a:prstGeom prst="straightConnector1">
               <a:avLst/>
@@ -16456,6 +16499,84 @@
             </a:fontRef>
           </p:style>
         </p:cxnSp>
+        <p:sp>
+          <p:nvSpPr>
+            <p:cNvPr id="20" name="TextBox 19">
+              <a:extLst>
+                <a:ext uri="{FF2B5EF4-FFF2-40B4-BE49-F238E27FC236}">
+                  <a16:creationId xmlns:a16="http://schemas.microsoft.com/office/drawing/2014/main" id="{A998FC44-5325-4D9C-A345-381EA2311359}"/>
+                </a:ext>
+              </a:extLst>
+            </p:cNvPr>
+            <p:cNvSpPr txBox="1"/>
+            <p:nvPr/>
+          </p:nvSpPr>
+          <p:spPr>
+            <a:xfrm>
+              <a:off x="1647334" y="5125974"/>
+              <a:ext cx="2452166" cy="323165"/>
+            </a:xfrm>
+            <a:prstGeom prst="rect">
+              <a:avLst/>
+            </a:prstGeom>
+            <a:noFill/>
+            <a:ln>
+              <a:noFill/>
+            </a:ln>
+          </p:spPr>
+          <p:txBody>
+            <a:bodyPr wrap="square" rtlCol="0">
+              <a:spAutoFit/>
+            </a:bodyPr>
+            <a:lstStyle/>
+            <a:p>
+              <a:pPr algn="ctr"/>
+              <a:r>
+                <a:rPr lang="en-US" sz="1500" dirty="0"/>
+                <a:t>Encrypted Data Exchange</a:t>
+              </a:r>
+            </a:p>
+          </p:txBody>
+        </p:sp>
+        <p:sp>
+          <p:nvSpPr>
+            <p:cNvPr id="21" name="TextBox 20">
+              <a:extLst>
+                <a:ext uri="{FF2B5EF4-FFF2-40B4-BE49-F238E27FC236}">
+                  <a16:creationId xmlns:a16="http://schemas.microsoft.com/office/drawing/2014/main" id="{1E2F940D-02AC-435F-875C-ED9F77996A4B}"/>
+                </a:ext>
+              </a:extLst>
+            </p:cNvPr>
+            <p:cNvSpPr txBox="1"/>
+            <p:nvPr/>
+          </p:nvSpPr>
+          <p:spPr>
+            <a:xfrm>
+              <a:off x="5415771" y="5125974"/>
+              <a:ext cx="2452166" cy="323165"/>
+            </a:xfrm>
+            <a:prstGeom prst="rect">
+              <a:avLst/>
+            </a:prstGeom>
+            <a:noFill/>
+            <a:ln>
+              <a:noFill/>
+            </a:ln>
+          </p:spPr>
+          <p:txBody>
+            <a:bodyPr wrap="square" rtlCol="0">
+              <a:spAutoFit/>
+            </a:bodyPr>
+            <a:lstStyle/>
+            <a:p>
+              <a:pPr algn="ctr"/>
+              <a:r>
+                <a:rPr lang="en-US" sz="1500" dirty="0"/>
+                <a:t>Encrypted Data Exchange</a:t>
+              </a:r>
+            </a:p>
+          </p:txBody>
+        </p:sp>
       </p:grpSp>
     </p:spTree>
     <p:extLst>
@@ -16489,16 +16610,22 @@
       </p:grpSpPr>
       <p:grpSp>
         <p:nvGrpSpPr>
-          <p:cNvPr id="34" name="Group 33"/>
+          <p:cNvPr id="2" name="Group 1">
+            <a:extLst>
+              <a:ext uri="{FF2B5EF4-FFF2-40B4-BE49-F238E27FC236}">
+                <a16:creationId xmlns:a16="http://schemas.microsoft.com/office/drawing/2014/main" id="{0CA54D9B-4649-4139-BF33-3A405489CA68}"/>
+              </a:ext>
+            </a:extLst>
+          </p:cNvPr>
           <p:cNvGrpSpPr/>
           <p:nvPr/>
         </p:nvGrpSpPr>
         <p:grpSpPr>
           <a:xfrm>
             <a:off x="1634419" y="953146"/>
-            <a:ext cx="5799275" cy="4572000"/>
+            <a:ext cx="6229421" cy="4572000"/>
             <a:chOff x="1634419" y="953146"/>
-            <a:chExt cx="5799275" cy="4572000"/>
+            <a:chExt cx="6229421" cy="4572000"/>
           </a:xfrm>
         </p:grpSpPr>
         <p:sp>
@@ -16509,8 +16636,8 @@
           </p:nvSpPr>
           <p:spPr>
             <a:xfrm>
-              <a:off x="1639230" y="953146"/>
-              <a:ext cx="2286000" cy="4572000"/>
+              <a:off x="1639587" y="953146"/>
+              <a:ext cx="2455558" cy="4572000"/>
             </a:xfrm>
             <a:prstGeom prst="rect">
               <a:avLst/>
@@ -16530,10 +16657,9 @@
             <a:p>
               <a:pPr algn="ctr"/>
               <a:r>
-                <a:rPr lang="en-US" u="sng" dirty="0" smtClean="0"/>
+                <a:rPr lang="en-US" u="sng" dirty="0"/>
                 <a:t>TCP Client</a:t>
               </a:r>
-              <a:endParaRPr lang="en-US" u="sng" dirty="0"/>
             </a:p>
           </p:txBody>
         </p:sp>
@@ -16545,8 +16671,8 @@
           </p:nvSpPr>
           <p:spPr>
             <a:xfrm>
-              <a:off x="5125153" y="953146"/>
-              <a:ext cx="2286000" cy="4572000"/>
+              <a:off x="5384069" y="953146"/>
+              <a:ext cx="2455558" cy="4572000"/>
             </a:xfrm>
             <a:prstGeom prst="rect">
               <a:avLst/>
@@ -16566,10 +16692,9 @@
             <a:p>
               <a:pPr algn="ctr"/>
               <a:r>
-                <a:rPr lang="en-US" u="sng" dirty="0" smtClean="0"/>
+                <a:rPr lang="en-US" u="sng" dirty="0"/>
                 <a:t>TCP Server</a:t>
               </a:r>
-              <a:endParaRPr lang="en-US" u="sng" dirty="0"/>
             </a:p>
           </p:txBody>
         </p:sp>
@@ -16581,8 +16706,8 @@
           </p:nvSpPr>
           <p:spPr>
             <a:xfrm>
-              <a:off x="1645213" y="1407766"/>
-              <a:ext cx="2274035" cy="323165"/>
+              <a:off x="1646014" y="1407766"/>
+              <a:ext cx="2442706" cy="323165"/>
             </a:xfrm>
             <a:prstGeom prst="rect">
               <a:avLst/>
@@ -16600,7 +16725,7 @@
             <a:p>
               <a:pPr algn="ctr"/>
               <a:r>
-                <a:rPr lang="en-US" sz="1500" smtClean="0"/>
+                <a:rPr lang="en-US" sz="1500"/>
                 <a:t>Send Hello</a:t>
               </a:r>
               <a:endParaRPr lang="en-US" sz="1500" dirty="0"/>
@@ -16615,8 +16740,8 @@
           </p:nvCxnSpPr>
           <p:spPr>
             <a:xfrm>
-              <a:off x="3918080" y="1592432"/>
-              <a:ext cx="1197451" cy="0"/>
+              <a:off x="4087465" y="1592432"/>
+              <a:ext cx="1286269" cy="0"/>
             </a:xfrm>
             <a:prstGeom prst="straightConnector1">
               <a:avLst/>
@@ -16651,8 +16776,8 @@
           </p:nvCxnSpPr>
           <p:spPr>
             <a:xfrm>
-              <a:off x="3918079" y="1920129"/>
-              <a:ext cx="1197451" cy="0"/>
+              <a:off x="4087463" y="1920129"/>
+              <a:ext cx="1286269" cy="0"/>
             </a:xfrm>
             <a:prstGeom prst="straightConnector1">
               <a:avLst/>
@@ -16688,8 +16813,8 @@
           </p:nvSpPr>
           <p:spPr>
             <a:xfrm>
-              <a:off x="5125153" y="1757460"/>
-              <a:ext cx="2295623" cy="323165"/>
+              <a:off x="5384069" y="1757460"/>
+              <a:ext cx="2465895" cy="323165"/>
             </a:xfrm>
             <a:prstGeom prst="rect">
               <a:avLst/>
@@ -16707,23 +16832,22 @@
             <a:p>
               <a:pPr algn="ctr"/>
               <a:r>
-                <a:rPr lang="en-US" sz="1500" dirty="0" smtClean="0"/>
+                <a:rPr lang="en-US" sz="1500" dirty="0"/>
                 <a:t>Send X.509 Server Cert</a:t>
               </a:r>
-              <a:endParaRPr lang="en-US" sz="1500" dirty="0"/>
             </a:p>
           </p:txBody>
         </p:sp>
         <p:sp>
           <p:nvSpPr>
-            <p:cNvPr id="9" name="TextBox 8"/>
+            <p:cNvPr id="11" name="TextBox 10"/>
             <p:cNvSpPr txBox="1"/>
             <p:nvPr/>
           </p:nvSpPr>
           <p:spPr>
             <a:xfrm>
-              <a:off x="1641267" y="3719966"/>
-              <a:ext cx="2281927" cy="323165"/>
+              <a:off x="1642606" y="1759943"/>
+              <a:ext cx="2449519" cy="323165"/>
             </a:xfrm>
             <a:prstGeom prst="rect">
               <a:avLst/>
@@ -16741,120 +16865,9 @@
             <a:p>
               <a:pPr algn="ctr"/>
               <a:r>
-                <a:rPr lang="en-US" sz="1500" dirty="0" smtClean="0"/>
-                <a:t>Create Symmetric Key</a:t>
+                <a:rPr lang="en-US" sz="1500" dirty="0"/>
+                <a:t>Verify Server X.509 Cert</a:t>
               </a:r>
-              <a:endParaRPr lang="en-US" sz="1500" dirty="0"/>
-            </a:p>
-          </p:txBody>
-        </p:sp>
-        <p:sp>
-          <p:nvSpPr>
-            <p:cNvPr id="10" name="TextBox 9"/>
-            <p:cNvSpPr txBox="1"/>
-            <p:nvPr/>
-          </p:nvSpPr>
-          <p:spPr>
-            <a:xfrm>
-              <a:off x="1634419" y="4302462"/>
-              <a:ext cx="2295623" cy="323165"/>
-            </a:xfrm>
-            <a:prstGeom prst="rect">
-              <a:avLst/>
-            </a:prstGeom>
-            <a:noFill/>
-            <a:ln>
-              <a:noFill/>
-            </a:ln>
-          </p:spPr>
-          <p:txBody>
-            <a:bodyPr wrap="square" rtlCol="0">
-              <a:spAutoFit/>
-            </a:bodyPr>
-            <a:lstStyle/>
-            <a:p>
-              <a:pPr algn="ctr"/>
-              <a:r>
-                <a:rPr lang="en-US" sz="1500" dirty="0" smtClean="0"/>
-                <a:t>Encrypt w/Server Pub Key</a:t>
-              </a:r>
-              <a:endParaRPr lang="en-US" sz="1500" dirty="0"/>
-            </a:p>
-          </p:txBody>
-        </p:sp>
-        <p:sp>
-          <p:nvSpPr>
-            <p:cNvPr id="11" name="TextBox 10"/>
-            <p:cNvSpPr txBox="1"/>
-            <p:nvPr/>
-          </p:nvSpPr>
-          <p:spPr>
-            <a:xfrm>
-              <a:off x="1642041" y="3181421"/>
-              <a:ext cx="2280378" cy="323165"/>
-            </a:xfrm>
-            <a:prstGeom prst="rect">
-              <a:avLst/>
-            </a:prstGeom>
-            <a:noFill/>
-            <a:ln>
-              <a:noFill/>
-            </a:ln>
-          </p:spPr>
-          <p:txBody>
-            <a:bodyPr wrap="square" rtlCol="0">
-              <a:spAutoFit/>
-            </a:bodyPr>
-            <a:lstStyle/>
-            <a:p>
-              <a:pPr algn="ctr"/>
-              <a:r>
-                <a:rPr lang="en-US" sz="1500" dirty="0" smtClean="0"/>
-                <a:t>Verify </a:t>
-              </a:r>
-              <a:r>
-                <a:rPr lang="en-US" sz="1500" dirty="0" smtClean="0"/>
-                <a:t>Server X.509 </a:t>
-              </a:r>
-              <a:r>
-                <a:rPr lang="en-US" sz="1500" dirty="0" smtClean="0"/>
-                <a:t>Cert</a:t>
-              </a:r>
-              <a:endParaRPr lang="en-US" sz="1500" dirty="0"/>
-            </a:p>
-          </p:txBody>
-        </p:sp>
-        <p:sp>
-          <p:nvSpPr>
-            <p:cNvPr id="12" name="TextBox 11"/>
-            <p:cNvSpPr txBox="1"/>
-            <p:nvPr/>
-          </p:nvSpPr>
-          <p:spPr>
-            <a:xfrm>
-              <a:off x="1738314" y="4842103"/>
-              <a:ext cx="2087832" cy="323165"/>
-            </a:xfrm>
-            <a:prstGeom prst="rect">
-              <a:avLst/>
-            </a:prstGeom>
-            <a:noFill/>
-            <a:ln>
-              <a:noFill/>
-            </a:ln>
-          </p:spPr>
-          <p:txBody>
-            <a:bodyPr wrap="square" rtlCol="0">
-              <a:spAutoFit/>
-            </a:bodyPr>
-            <a:lstStyle/>
-            <a:p>
-              <a:pPr algn="ctr"/>
-              <a:r>
-                <a:rPr lang="en-US" sz="1500" dirty="0" smtClean="0"/>
-                <a:t>Send Encrypted Key</a:t>
-              </a:r>
-              <a:endParaRPr lang="en-US" sz="1500" dirty="0"/>
             </a:p>
           </p:txBody>
         </p:sp>
@@ -16866,8 +16879,8 @@
           </p:nvCxnSpPr>
           <p:spPr>
             <a:xfrm>
-              <a:off x="3947450" y="5003685"/>
-              <a:ext cx="1197451" cy="0"/>
+              <a:off x="4119013" y="4854052"/>
+              <a:ext cx="1286269" cy="0"/>
             </a:xfrm>
             <a:prstGeom prst="straightConnector1">
               <a:avLst/>
@@ -16902,8 +16915,8 @@
           </p:nvSpPr>
           <p:spPr>
             <a:xfrm>
-              <a:off x="5131487" y="4861381"/>
-              <a:ext cx="2286002" cy="323165"/>
+              <a:off x="5390873" y="4703440"/>
+              <a:ext cx="2455560" cy="553998"/>
             </a:xfrm>
             <a:prstGeom prst="rect">
               <a:avLst/>
@@ -16921,10 +16934,9 @@
             <a:p>
               <a:pPr algn="ctr"/>
               <a:r>
-                <a:rPr lang="en-US" sz="1500" dirty="0" smtClean="0"/>
-                <a:t>Decrypt w/Server Cert</a:t>
+                <a:rPr lang="en-US" sz="1500" dirty="0"/>
+                <a:t>Decrypt w/Server Private Key</a:t>
               </a:r>
-              <a:endParaRPr lang="en-US" sz="1500" dirty="0"/>
             </a:p>
           </p:txBody>
         </p:sp>
@@ -16936,8 +16948,8 @@
           </p:nvCxnSpPr>
           <p:spPr>
             <a:xfrm>
-              <a:off x="3930042" y="5357114"/>
-              <a:ext cx="1197451" cy="0"/>
+              <a:off x="4100314" y="5298923"/>
+              <a:ext cx="1286269" cy="0"/>
             </a:xfrm>
             <a:prstGeom prst="straightConnector1">
               <a:avLst/>
@@ -16973,8 +16985,8 @@
           </p:nvCxnSpPr>
           <p:spPr>
             <a:xfrm>
-              <a:off x="3930997" y="2347253"/>
-              <a:ext cx="1197451" cy="0"/>
+              <a:off x="4101340" y="2347253"/>
+              <a:ext cx="1286269" cy="0"/>
             </a:xfrm>
             <a:prstGeom prst="straightConnector1">
               <a:avLst/>
@@ -17010,8 +17022,8 @@
           </p:nvSpPr>
           <p:spPr>
             <a:xfrm>
-              <a:off x="5138071" y="2184584"/>
-              <a:ext cx="2295623" cy="323165"/>
+              <a:off x="5397945" y="2184584"/>
+              <a:ext cx="2465895" cy="323165"/>
             </a:xfrm>
             <a:prstGeom prst="rect">
               <a:avLst/>
@@ -17029,10 +17041,9 @@
             <a:p>
               <a:pPr algn="ctr"/>
               <a:r>
-                <a:rPr lang="en-US" sz="1500" dirty="0" smtClean="0"/>
+                <a:rPr lang="en-US" sz="1500" dirty="0"/>
                 <a:t>Request Client X.509 Cert</a:t>
               </a:r>
-              <a:endParaRPr lang="en-US" sz="1500" dirty="0"/>
             </a:p>
           </p:txBody>
         </p:sp>
@@ -17044,8 +17055,8 @@
           </p:nvSpPr>
           <p:spPr>
             <a:xfrm>
-              <a:off x="1642041" y="2563029"/>
-              <a:ext cx="2280378" cy="323165"/>
+              <a:off x="1642606" y="2563029"/>
+              <a:ext cx="2449519" cy="323165"/>
             </a:xfrm>
             <a:prstGeom prst="rect">
               <a:avLst/>
@@ -17063,14 +17074,9 @@
             <a:p>
               <a:pPr algn="ctr"/>
               <a:r>
-                <a:rPr lang="en-US" sz="1500" dirty="0" smtClean="0"/>
-                <a:t>Send </a:t>
+                <a:rPr lang="en-US" sz="1500" dirty="0"/>
+                <a:t>Send Client X.509 Cert</a:t>
               </a:r>
-              <a:r>
-                <a:rPr lang="en-US" sz="1500" dirty="0" smtClean="0"/>
-                <a:t>Client X.509 Cert</a:t>
-              </a:r>
-              <a:endParaRPr lang="en-US" sz="1500" dirty="0"/>
             </a:p>
           </p:txBody>
         </p:sp>
@@ -17082,8 +17088,8 @@
           </p:nvCxnSpPr>
           <p:spPr>
             <a:xfrm>
-              <a:off x="3938746" y="2728972"/>
-              <a:ext cx="1197451" cy="0"/>
+              <a:off x="4109663" y="2728972"/>
+              <a:ext cx="1286269" cy="0"/>
             </a:xfrm>
             <a:prstGeom prst="straightConnector1">
               <a:avLst/>
@@ -17118,8 +17124,8 @@
           </p:nvSpPr>
           <p:spPr>
             <a:xfrm>
-              <a:off x="5144901" y="2563029"/>
-              <a:ext cx="2266252" cy="323165"/>
+              <a:off x="5405282" y="2563029"/>
+              <a:ext cx="2434345" cy="323165"/>
             </a:xfrm>
             <a:prstGeom prst="rect">
               <a:avLst/>
@@ -17137,18 +17143,302 @@
             <a:p>
               <a:pPr algn="ctr"/>
               <a:r>
-                <a:rPr lang="en-US" sz="1500" dirty="0" smtClean="0"/>
+                <a:rPr lang="en-US" sz="1500" dirty="0"/>
                 <a:t>Verify </a:t>
               </a:r>
               <a:r>
-                <a:rPr lang="en-US" sz="1500" smtClean="0"/>
-                <a:t>X.509 </a:t>
-              </a:r>
-              <a:r>
-                <a:rPr lang="en-US" sz="1500" smtClean="0"/>
-                <a:t>Client Cert</a:t>
+                <a:rPr lang="en-US" sz="1500"/>
+                <a:t>X.509 Client Cert</a:t>
               </a:r>
               <a:endParaRPr lang="en-US" sz="1500" dirty="0"/>
+            </a:p>
+          </p:txBody>
+        </p:sp>
+        <p:sp>
+          <p:nvSpPr>
+            <p:cNvPr id="35" name="TextBox 34">
+              <a:extLst>
+                <a:ext uri="{FF2B5EF4-FFF2-40B4-BE49-F238E27FC236}">
+                  <a16:creationId xmlns:a16="http://schemas.microsoft.com/office/drawing/2014/main" id="{7E72F2BC-22BB-4B7F-89D0-333D30DB026F}"/>
+                </a:ext>
+              </a:extLst>
+            </p:cNvPr>
+            <p:cNvSpPr txBox="1"/>
+            <p:nvPr/>
+          </p:nvSpPr>
+          <p:spPr>
+            <a:xfrm>
+              <a:off x="1636289" y="3158639"/>
+              <a:ext cx="2463211" cy="323165"/>
+            </a:xfrm>
+            <a:prstGeom prst="rect">
+              <a:avLst/>
+            </a:prstGeom>
+            <a:noFill/>
+            <a:ln>
+              <a:noFill/>
+            </a:ln>
+          </p:spPr>
+          <p:txBody>
+            <a:bodyPr wrap="square" rtlCol="0">
+              <a:spAutoFit/>
+            </a:bodyPr>
+            <a:lstStyle/>
+            <a:p>
+              <a:pPr algn="ctr"/>
+              <a:r>
+                <a:rPr lang="en-US" sz="1500" dirty="0"/>
+                <a:t>Create Symmetric Key</a:t>
+              </a:r>
+            </a:p>
+          </p:txBody>
+        </p:sp>
+        <p:sp>
+          <p:nvSpPr>
+            <p:cNvPr id="36" name="TextBox 35">
+              <a:extLst>
+                <a:ext uri="{FF2B5EF4-FFF2-40B4-BE49-F238E27FC236}">
+                  <a16:creationId xmlns:a16="http://schemas.microsoft.com/office/drawing/2014/main" id="{1BC3F254-5703-4413-8F6B-98BDF6077316}"/>
+                </a:ext>
+              </a:extLst>
+            </p:cNvPr>
+            <p:cNvSpPr txBox="1"/>
+            <p:nvPr/>
+          </p:nvSpPr>
+          <p:spPr>
+            <a:xfrm>
+              <a:off x="1634419" y="3843510"/>
+              <a:ext cx="2477996" cy="553998"/>
+            </a:xfrm>
+            <a:prstGeom prst="rect">
+              <a:avLst/>
+            </a:prstGeom>
+            <a:noFill/>
+            <a:ln>
+              <a:noFill/>
+            </a:ln>
+          </p:spPr>
+          <p:txBody>
+            <a:bodyPr wrap="square" rtlCol="0">
+              <a:spAutoFit/>
+            </a:bodyPr>
+            <a:lstStyle/>
+            <a:p>
+              <a:pPr algn="ctr"/>
+              <a:r>
+                <a:rPr lang="en-US" sz="1500" dirty="0"/>
+                <a:t>Encrypt w/Server Pub Key</a:t>
+              </a:r>
+            </a:p>
+            <a:p>
+              <a:pPr algn="ctr"/>
+              <a:r>
+                <a:rPr lang="en-US" sz="1500" dirty="0"/>
+                <a:t>(from Server Cert)</a:t>
+              </a:r>
+            </a:p>
+          </p:txBody>
+        </p:sp>
+        <p:sp>
+          <p:nvSpPr>
+            <p:cNvPr id="37" name="TextBox 36">
+              <a:extLst>
+                <a:ext uri="{FF2B5EF4-FFF2-40B4-BE49-F238E27FC236}">
+                  <a16:creationId xmlns:a16="http://schemas.microsoft.com/office/drawing/2014/main" id="{85B0ECDB-D6B3-4252-A9E3-8975F33D8A5F}"/>
+                </a:ext>
+              </a:extLst>
+            </p:cNvPr>
+            <p:cNvSpPr txBox="1"/>
+            <p:nvPr/>
+          </p:nvSpPr>
+          <p:spPr>
+            <a:xfrm>
+              <a:off x="1737106" y="4694660"/>
+              <a:ext cx="2253697" cy="323165"/>
+            </a:xfrm>
+            <a:prstGeom prst="rect">
+              <a:avLst/>
+            </a:prstGeom>
+            <a:noFill/>
+            <a:ln>
+              <a:noFill/>
+            </a:ln>
+          </p:spPr>
+          <p:txBody>
+            <a:bodyPr wrap="square" rtlCol="0">
+              <a:spAutoFit/>
+            </a:bodyPr>
+            <a:lstStyle/>
+            <a:p>
+              <a:pPr algn="ctr"/>
+              <a:r>
+                <a:rPr lang="en-US" sz="1500" dirty="0"/>
+                <a:t>Send Encrypted Key</a:t>
+              </a:r>
+            </a:p>
+          </p:txBody>
+        </p:sp>
+        <p:cxnSp>
+          <p:nvCxnSpPr>
+            <p:cNvPr id="38" name="Straight Arrow Connector 37">
+              <a:extLst>
+                <a:ext uri="{FF2B5EF4-FFF2-40B4-BE49-F238E27FC236}">
+                  <a16:creationId xmlns:a16="http://schemas.microsoft.com/office/drawing/2014/main" id="{22218763-EAC3-4B89-AB24-FB413DB047B1}"/>
+                </a:ext>
+              </a:extLst>
+            </p:cNvPr>
+            <p:cNvCxnSpPr/>
+            <p:nvPr/>
+          </p:nvCxnSpPr>
+          <p:spPr>
+            <a:xfrm flipH="1" flipV="1">
+              <a:off x="2871468" y="3467829"/>
+              <a:ext cx="934" cy="377849"/>
+            </a:xfrm>
+            <a:prstGeom prst="straightConnector1">
+              <a:avLst/>
+            </a:prstGeom>
+            <a:ln w="38100">
+              <a:solidFill>
+                <a:schemeClr val="tx2"/>
+              </a:solidFill>
+              <a:headEnd type="triangle"/>
+              <a:tailEnd type="none"/>
+            </a:ln>
+          </p:spPr>
+          <p:style>
+            <a:lnRef idx="1">
+              <a:schemeClr val="accent1"/>
+            </a:lnRef>
+            <a:fillRef idx="0">
+              <a:schemeClr val="accent1"/>
+            </a:fillRef>
+            <a:effectRef idx="0">
+              <a:schemeClr val="accent1"/>
+            </a:effectRef>
+            <a:fontRef idx="minor">
+              <a:schemeClr val="tx1"/>
+            </a:fontRef>
+          </p:style>
+        </p:cxnSp>
+        <p:cxnSp>
+          <p:nvCxnSpPr>
+            <p:cNvPr id="39" name="Straight Arrow Connector 38">
+              <a:extLst>
+                <a:ext uri="{FF2B5EF4-FFF2-40B4-BE49-F238E27FC236}">
+                  <a16:creationId xmlns:a16="http://schemas.microsoft.com/office/drawing/2014/main" id="{6A8734FC-9F06-439B-A0B6-ECB46C05414F}"/>
+                </a:ext>
+              </a:extLst>
+            </p:cNvPr>
+            <p:cNvCxnSpPr/>
+            <p:nvPr/>
+          </p:nvCxnSpPr>
+          <p:spPr>
+            <a:xfrm flipH="1" flipV="1">
+              <a:off x="2871334" y="4359123"/>
+              <a:ext cx="934" cy="377849"/>
+            </a:xfrm>
+            <a:prstGeom prst="straightConnector1">
+              <a:avLst/>
+            </a:prstGeom>
+            <a:ln w="38100">
+              <a:solidFill>
+                <a:schemeClr val="tx2"/>
+              </a:solidFill>
+              <a:headEnd type="triangle"/>
+              <a:tailEnd type="none"/>
+            </a:ln>
+          </p:spPr>
+          <p:style>
+            <a:lnRef idx="1">
+              <a:schemeClr val="accent1"/>
+            </a:lnRef>
+            <a:fillRef idx="0">
+              <a:schemeClr val="accent1"/>
+            </a:fillRef>
+            <a:effectRef idx="0">
+              <a:schemeClr val="accent1"/>
+            </a:effectRef>
+            <a:fontRef idx="minor">
+              <a:schemeClr val="tx1"/>
+            </a:fontRef>
+          </p:style>
+        </p:cxnSp>
+        <p:sp>
+          <p:nvSpPr>
+            <p:cNvPr id="40" name="TextBox 39">
+              <a:extLst>
+                <a:ext uri="{FF2B5EF4-FFF2-40B4-BE49-F238E27FC236}">
+                  <a16:creationId xmlns:a16="http://schemas.microsoft.com/office/drawing/2014/main" id="{5F120430-1FA7-4874-ABCB-53CA8E819354}"/>
+                </a:ext>
+              </a:extLst>
+            </p:cNvPr>
+            <p:cNvSpPr txBox="1"/>
+            <p:nvPr/>
+          </p:nvSpPr>
+          <p:spPr>
+            <a:xfrm>
+              <a:off x="5393567" y="5142671"/>
+              <a:ext cx="2452166" cy="323165"/>
+            </a:xfrm>
+            <a:prstGeom prst="rect">
+              <a:avLst/>
+            </a:prstGeom>
+            <a:noFill/>
+            <a:ln>
+              <a:noFill/>
+            </a:ln>
+          </p:spPr>
+          <p:txBody>
+            <a:bodyPr wrap="square" rtlCol="0">
+              <a:spAutoFit/>
+            </a:bodyPr>
+            <a:lstStyle/>
+            <a:p>
+              <a:pPr algn="ctr"/>
+              <a:r>
+                <a:rPr lang="en-US" sz="1500" dirty="0"/>
+                <a:t>Encrypted Data Exchange</a:t>
+              </a:r>
+            </a:p>
+          </p:txBody>
+        </p:sp>
+        <p:sp>
+          <p:nvSpPr>
+            <p:cNvPr id="41" name="TextBox 40">
+              <a:extLst>
+                <a:ext uri="{FF2B5EF4-FFF2-40B4-BE49-F238E27FC236}">
+                  <a16:creationId xmlns:a16="http://schemas.microsoft.com/office/drawing/2014/main" id="{78F2DCC0-4987-4A46-936A-1FC37149CD85}"/>
+                </a:ext>
+              </a:extLst>
+            </p:cNvPr>
+            <p:cNvSpPr txBox="1"/>
+            <p:nvPr/>
+          </p:nvSpPr>
+          <p:spPr>
+            <a:xfrm>
+              <a:off x="1641793" y="5145370"/>
+              <a:ext cx="2452166" cy="323165"/>
+            </a:xfrm>
+            <a:prstGeom prst="rect">
+              <a:avLst/>
+            </a:prstGeom>
+            <a:noFill/>
+            <a:ln>
+              <a:noFill/>
+            </a:ln>
+          </p:spPr>
+          <p:txBody>
+            <a:bodyPr wrap="square" rtlCol="0">
+              <a:spAutoFit/>
+            </a:bodyPr>
+            <a:lstStyle/>
+            <a:p>
+              <a:pPr algn="ctr"/>
+              <a:r>
+                <a:rPr lang="en-US" sz="1500" dirty="0"/>
+                <a:t>Encrypted Data Exchange</a:t>
+              </a:r>
             </a:p>
           </p:txBody>
         </p:sp>

</xml_diff>

<commit_message>
intermediate update to template
</commit_message>
<xml_diff>
--- a/labmanual/misc/drawings.pptx
+++ b/labmanual/misc/drawings.pptx
@@ -5,7 +5,7 @@
     <p:sldMasterId id="2147483648" r:id="rId1"/>
   </p:sldMasterIdLst>
   <p:notesMasterIdLst>
-    <p:notesMasterId r:id="rId9"/>
+    <p:notesMasterId r:id="rId10"/>
   </p:notesMasterIdLst>
   <p:sldIdLst>
     <p:sldId id="256" r:id="rId2"/>
@@ -15,6 +15,7 @@
     <p:sldId id="259" r:id="rId6"/>
     <p:sldId id="260" r:id="rId7"/>
     <p:sldId id="262" r:id="rId8"/>
+    <p:sldId id="263" r:id="rId9"/>
   </p:sldIdLst>
   <p:sldSz cx="12192000" cy="6858000"/>
   <p:notesSz cx="6858000" cy="9144000"/>
@@ -207,7 +208,7 @@
           <a:p>
             <a:fld id="{90BA088C-6928-D148-ACA4-D877058B3EC1}" type="datetimeFigureOut">
               <a:rPr lang="en-US" smtClean="0"/>
-              <a:t>8/29/2017</a:t>
+              <a:t>9/1/17</a:t>
             </a:fld>
             <a:endParaRPr lang="en-US"/>
           </a:p>
@@ -603,7 +604,7 @@
           <a:p>
             <a:fld id="{02CF1C66-B1B6-1643-A1E5-DA5B6E4004A0}" type="datetimeFigureOut">
               <a:rPr lang="en-US" smtClean="0"/>
-              <a:t>8/29/2017</a:t>
+              <a:t>9/1/17</a:t>
             </a:fld>
             <a:endParaRPr lang="en-US"/>
           </a:p>
@@ -771,7 +772,7 @@
           <a:p>
             <a:fld id="{02CF1C66-B1B6-1643-A1E5-DA5B6E4004A0}" type="datetimeFigureOut">
               <a:rPr lang="en-US" smtClean="0"/>
-              <a:t>8/29/2017</a:t>
+              <a:t>9/1/17</a:t>
             </a:fld>
             <a:endParaRPr lang="en-US"/>
           </a:p>
@@ -949,7 +950,7 @@
           <a:p>
             <a:fld id="{02CF1C66-B1B6-1643-A1E5-DA5B6E4004A0}" type="datetimeFigureOut">
               <a:rPr lang="en-US" smtClean="0"/>
-              <a:t>8/29/2017</a:t>
+              <a:t>9/1/17</a:t>
             </a:fld>
             <a:endParaRPr lang="en-US"/>
           </a:p>
@@ -1117,7 +1118,7 @@
           <a:p>
             <a:fld id="{02CF1C66-B1B6-1643-A1E5-DA5B6E4004A0}" type="datetimeFigureOut">
               <a:rPr lang="en-US" smtClean="0"/>
-              <a:t>8/29/2017</a:t>
+              <a:t>9/1/17</a:t>
             </a:fld>
             <a:endParaRPr lang="en-US"/>
           </a:p>
@@ -1362,7 +1363,7 @@
           <a:p>
             <a:fld id="{02CF1C66-B1B6-1643-A1E5-DA5B6E4004A0}" type="datetimeFigureOut">
               <a:rPr lang="en-US" smtClean="0"/>
-              <a:t>8/29/2017</a:t>
+              <a:t>9/1/17</a:t>
             </a:fld>
             <a:endParaRPr lang="en-US"/>
           </a:p>
@@ -1591,7 +1592,7 @@
           <a:p>
             <a:fld id="{02CF1C66-B1B6-1643-A1E5-DA5B6E4004A0}" type="datetimeFigureOut">
               <a:rPr lang="en-US" smtClean="0"/>
-              <a:t>8/29/2017</a:t>
+              <a:t>9/1/17</a:t>
             </a:fld>
             <a:endParaRPr lang="en-US"/>
           </a:p>
@@ -1955,7 +1956,7 @@
           <a:p>
             <a:fld id="{02CF1C66-B1B6-1643-A1E5-DA5B6E4004A0}" type="datetimeFigureOut">
               <a:rPr lang="en-US" smtClean="0"/>
-              <a:t>8/29/2017</a:t>
+              <a:t>9/1/17</a:t>
             </a:fld>
             <a:endParaRPr lang="en-US"/>
           </a:p>
@@ -2072,7 +2073,7 @@
           <a:p>
             <a:fld id="{02CF1C66-B1B6-1643-A1E5-DA5B6E4004A0}" type="datetimeFigureOut">
               <a:rPr lang="en-US" smtClean="0"/>
-              <a:t>8/29/2017</a:t>
+              <a:t>9/1/17</a:t>
             </a:fld>
             <a:endParaRPr lang="en-US"/>
           </a:p>
@@ -2167,7 +2168,7 @@
           <a:p>
             <a:fld id="{02CF1C66-B1B6-1643-A1E5-DA5B6E4004A0}" type="datetimeFigureOut">
               <a:rPr lang="en-US" smtClean="0"/>
-              <a:t>8/29/2017</a:t>
+              <a:t>9/1/17</a:t>
             </a:fld>
             <a:endParaRPr lang="en-US"/>
           </a:p>
@@ -2442,7 +2443,7 @@
           <a:p>
             <a:fld id="{02CF1C66-B1B6-1643-A1E5-DA5B6E4004A0}" type="datetimeFigureOut">
               <a:rPr lang="en-US" smtClean="0"/>
-              <a:t>8/29/2017</a:t>
+              <a:t>9/1/17</a:t>
             </a:fld>
             <a:endParaRPr lang="en-US"/>
           </a:p>
@@ -2694,7 +2695,7 @@
           <a:p>
             <a:fld id="{02CF1C66-B1B6-1643-A1E5-DA5B6E4004A0}" type="datetimeFigureOut">
               <a:rPr lang="en-US" smtClean="0"/>
-              <a:t>8/29/2017</a:t>
+              <a:t>9/1/17</a:t>
             </a:fld>
             <a:endParaRPr lang="en-US"/>
           </a:p>
@@ -2905,7 +2906,7 @@
           <a:p>
             <a:fld id="{02CF1C66-B1B6-1643-A1E5-DA5B6E4004A0}" type="datetimeFigureOut">
               <a:rPr lang="en-US" smtClean="0"/>
-              <a:t>8/29/2017</a:t>
+              <a:t>9/1/17</a:t>
             </a:fld>
             <a:endParaRPr lang="en-US"/>
           </a:p>
@@ -8420,35 +8421,35 @@
                 <a:gridCol w="361780">
                   <a:extLst>
                     <a:ext uri="{9D8B030D-6E8A-4147-A177-3AD203B41FA5}">
-                      <a16:colId xmlns:a16="http://schemas.microsoft.com/office/drawing/2014/main" val="20000"/>
+                      <a16:colId xmlns:a16="http://schemas.microsoft.com/office/drawing/2014/main" xmlns="" val="20000"/>
                     </a:ext>
                   </a:extLst>
                 </a:gridCol>
                 <a:gridCol w="361780">
                   <a:extLst>
                     <a:ext uri="{9D8B030D-6E8A-4147-A177-3AD203B41FA5}">
-                      <a16:colId xmlns:a16="http://schemas.microsoft.com/office/drawing/2014/main" val="20001"/>
+                      <a16:colId xmlns:a16="http://schemas.microsoft.com/office/drawing/2014/main" xmlns="" val="20001"/>
                     </a:ext>
                   </a:extLst>
                 </a:gridCol>
                 <a:gridCol w="429406">
                   <a:extLst>
                     <a:ext uri="{9D8B030D-6E8A-4147-A177-3AD203B41FA5}">
-                      <a16:colId xmlns:a16="http://schemas.microsoft.com/office/drawing/2014/main" val="20002"/>
+                      <a16:colId xmlns:a16="http://schemas.microsoft.com/office/drawing/2014/main" xmlns="" val="20002"/>
                     </a:ext>
                   </a:extLst>
                 </a:gridCol>
                 <a:gridCol w="497721">
                   <a:extLst>
                     <a:ext uri="{9D8B030D-6E8A-4147-A177-3AD203B41FA5}">
-                      <a16:colId xmlns:a16="http://schemas.microsoft.com/office/drawing/2014/main" val="20003"/>
+                      <a16:colId xmlns:a16="http://schemas.microsoft.com/office/drawing/2014/main" xmlns="" val="20003"/>
                     </a:ext>
                   </a:extLst>
                 </a:gridCol>
                 <a:gridCol w="1717625">
                   <a:extLst>
                     <a:ext uri="{9D8B030D-6E8A-4147-A177-3AD203B41FA5}">
-                      <a16:colId xmlns:a16="http://schemas.microsoft.com/office/drawing/2014/main" val="20004"/>
+                      <a16:colId xmlns:a16="http://schemas.microsoft.com/office/drawing/2014/main" xmlns="" val="20004"/>
                     </a:ext>
                   </a:extLst>
                 </a:gridCol>
@@ -8681,7 +8682,7 @@
                 </a:tc>
                 <a:extLst>
                   <a:ext uri="{0D108BD9-81ED-4DB2-BD59-A6C34878D82A}">
-                    <a16:rowId xmlns:a16="http://schemas.microsoft.com/office/drawing/2014/main" val="10000"/>
+                    <a16:rowId xmlns:a16="http://schemas.microsoft.com/office/drawing/2014/main" xmlns="" val="10000"/>
                   </a:ext>
                 </a:extLst>
               </a:tr>
@@ -8976,7 +8977,7 @@
                 </a:tc>
                 <a:extLst>
                   <a:ext uri="{0D108BD9-81ED-4DB2-BD59-A6C34878D82A}">
-                    <a16:rowId xmlns:a16="http://schemas.microsoft.com/office/drawing/2014/main" val="10001"/>
+                    <a16:rowId xmlns:a16="http://schemas.microsoft.com/office/drawing/2014/main" xmlns="" val="10001"/>
                   </a:ext>
                 </a:extLst>
               </a:tr>
@@ -9254,7 +9255,7 @@
                 </a:tc>
                 <a:extLst>
                   <a:ext uri="{0D108BD9-81ED-4DB2-BD59-A6C34878D82A}">
-                    <a16:rowId xmlns:a16="http://schemas.microsoft.com/office/drawing/2014/main" val="10002"/>
+                    <a16:rowId xmlns:a16="http://schemas.microsoft.com/office/drawing/2014/main" xmlns="" val="10002"/>
                   </a:ext>
                 </a:extLst>
               </a:tr>
@@ -9535,7 +9536,7 @@
                 </a:tc>
                 <a:extLst>
                   <a:ext uri="{0D108BD9-81ED-4DB2-BD59-A6C34878D82A}">
-                    <a16:rowId xmlns:a16="http://schemas.microsoft.com/office/drawing/2014/main" val="10003"/>
+                    <a16:rowId xmlns:a16="http://schemas.microsoft.com/office/drawing/2014/main" xmlns="" val="10003"/>
                   </a:ext>
                 </a:extLst>
               </a:tr>
@@ -9816,7 +9817,7 @@
                 </a:tc>
                 <a:extLst>
                   <a:ext uri="{0D108BD9-81ED-4DB2-BD59-A6C34878D82A}">
-                    <a16:rowId xmlns:a16="http://schemas.microsoft.com/office/drawing/2014/main" val="10004"/>
+                    <a16:rowId xmlns:a16="http://schemas.microsoft.com/office/drawing/2014/main" xmlns="" val="10004"/>
                   </a:ext>
                 </a:extLst>
               </a:tr>
@@ -10097,7 +10098,7 @@
                 </a:tc>
                 <a:extLst>
                   <a:ext uri="{0D108BD9-81ED-4DB2-BD59-A6C34878D82A}">
-                    <a16:rowId xmlns:a16="http://schemas.microsoft.com/office/drawing/2014/main" val="10005"/>
+                    <a16:rowId xmlns:a16="http://schemas.microsoft.com/office/drawing/2014/main" xmlns="" val="10005"/>
                   </a:ext>
                 </a:extLst>
               </a:tr>
@@ -10378,7 +10379,7 @@
                 </a:tc>
                 <a:extLst>
                   <a:ext uri="{0D108BD9-81ED-4DB2-BD59-A6C34878D82A}">
-                    <a16:rowId xmlns:a16="http://schemas.microsoft.com/office/drawing/2014/main" val="10006"/>
+                    <a16:rowId xmlns:a16="http://schemas.microsoft.com/office/drawing/2014/main" xmlns="" val="10006"/>
                   </a:ext>
                 </a:extLst>
               </a:tr>
@@ -10771,35 +10772,35 @@
                 <a:gridCol w="361780">
                   <a:extLst>
                     <a:ext uri="{9D8B030D-6E8A-4147-A177-3AD203B41FA5}">
-                      <a16:colId xmlns:a16="http://schemas.microsoft.com/office/drawing/2014/main" val="20000"/>
+                      <a16:colId xmlns:a16="http://schemas.microsoft.com/office/drawing/2014/main" xmlns="" val="20000"/>
                     </a:ext>
                   </a:extLst>
                 </a:gridCol>
                 <a:gridCol w="361780">
                   <a:extLst>
                     <a:ext uri="{9D8B030D-6E8A-4147-A177-3AD203B41FA5}">
-                      <a16:colId xmlns:a16="http://schemas.microsoft.com/office/drawing/2014/main" val="20001"/>
+                      <a16:colId xmlns:a16="http://schemas.microsoft.com/office/drawing/2014/main" xmlns="" val="20001"/>
                     </a:ext>
                   </a:extLst>
                 </a:gridCol>
                 <a:gridCol w="429406">
                   <a:extLst>
                     <a:ext uri="{9D8B030D-6E8A-4147-A177-3AD203B41FA5}">
-                      <a16:colId xmlns:a16="http://schemas.microsoft.com/office/drawing/2014/main" val="20002"/>
+                      <a16:colId xmlns:a16="http://schemas.microsoft.com/office/drawing/2014/main" xmlns="" val="20002"/>
                     </a:ext>
                   </a:extLst>
                 </a:gridCol>
                 <a:gridCol w="497721">
                   <a:extLst>
                     <a:ext uri="{9D8B030D-6E8A-4147-A177-3AD203B41FA5}">
-                      <a16:colId xmlns:a16="http://schemas.microsoft.com/office/drawing/2014/main" val="20003"/>
+                      <a16:colId xmlns:a16="http://schemas.microsoft.com/office/drawing/2014/main" xmlns="" val="20003"/>
                     </a:ext>
                   </a:extLst>
                 </a:gridCol>
                 <a:gridCol w="1717625">
                   <a:extLst>
                     <a:ext uri="{9D8B030D-6E8A-4147-A177-3AD203B41FA5}">
-                      <a16:colId xmlns:a16="http://schemas.microsoft.com/office/drawing/2014/main" val="20004"/>
+                      <a16:colId xmlns:a16="http://schemas.microsoft.com/office/drawing/2014/main" xmlns="" val="20004"/>
                     </a:ext>
                   </a:extLst>
                 </a:gridCol>
@@ -11032,7 +11033,7 @@
                 </a:tc>
                 <a:extLst>
                   <a:ext uri="{0D108BD9-81ED-4DB2-BD59-A6C34878D82A}">
-                    <a16:rowId xmlns:a16="http://schemas.microsoft.com/office/drawing/2014/main" val="10000"/>
+                    <a16:rowId xmlns:a16="http://schemas.microsoft.com/office/drawing/2014/main" xmlns="" val="10000"/>
                   </a:ext>
                 </a:extLst>
               </a:tr>
@@ -11327,7 +11328,7 @@
                 </a:tc>
                 <a:extLst>
                   <a:ext uri="{0D108BD9-81ED-4DB2-BD59-A6C34878D82A}">
-                    <a16:rowId xmlns:a16="http://schemas.microsoft.com/office/drawing/2014/main" val="10001"/>
+                    <a16:rowId xmlns:a16="http://schemas.microsoft.com/office/drawing/2014/main" xmlns="" val="10001"/>
                   </a:ext>
                 </a:extLst>
               </a:tr>
@@ -11605,7 +11606,7 @@
                 </a:tc>
                 <a:extLst>
                   <a:ext uri="{0D108BD9-81ED-4DB2-BD59-A6C34878D82A}">
-                    <a16:rowId xmlns:a16="http://schemas.microsoft.com/office/drawing/2014/main" val="10002"/>
+                    <a16:rowId xmlns:a16="http://schemas.microsoft.com/office/drawing/2014/main" xmlns="" val="10002"/>
                   </a:ext>
                 </a:extLst>
               </a:tr>
@@ -11886,7 +11887,7 @@
                 </a:tc>
                 <a:extLst>
                   <a:ext uri="{0D108BD9-81ED-4DB2-BD59-A6C34878D82A}">
-                    <a16:rowId xmlns:a16="http://schemas.microsoft.com/office/drawing/2014/main" val="10003"/>
+                    <a16:rowId xmlns:a16="http://schemas.microsoft.com/office/drawing/2014/main" xmlns="" val="10003"/>
                   </a:ext>
                 </a:extLst>
               </a:tr>
@@ -12167,7 +12168,7 @@
                 </a:tc>
                 <a:extLst>
                   <a:ext uri="{0D108BD9-81ED-4DB2-BD59-A6C34878D82A}">
-                    <a16:rowId xmlns:a16="http://schemas.microsoft.com/office/drawing/2014/main" val="10004"/>
+                    <a16:rowId xmlns:a16="http://schemas.microsoft.com/office/drawing/2014/main" xmlns="" val="10004"/>
                   </a:ext>
                 </a:extLst>
               </a:tr>
@@ -12448,7 +12449,7 @@
                 </a:tc>
                 <a:extLst>
                   <a:ext uri="{0D108BD9-81ED-4DB2-BD59-A6C34878D82A}">
-                    <a16:rowId xmlns:a16="http://schemas.microsoft.com/office/drawing/2014/main" val="10005"/>
+                    <a16:rowId xmlns:a16="http://schemas.microsoft.com/office/drawing/2014/main" xmlns="" val="10005"/>
                   </a:ext>
                 </a:extLst>
               </a:tr>
@@ -12729,7 +12730,7 @@
                 </a:tc>
                 <a:extLst>
                   <a:ext uri="{0D108BD9-81ED-4DB2-BD59-A6C34878D82A}">
-                    <a16:rowId xmlns:a16="http://schemas.microsoft.com/office/drawing/2014/main" val="10006"/>
+                    <a16:rowId xmlns:a16="http://schemas.microsoft.com/office/drawing/2014/main" xmlns="" val="10006"/>
                   </a:ext>
                 </a:extLst>
               </a:tr>
@@ -14214,7 +14215,7 @@
           <p:cNvPr id="25" name="Group 24">
             <a:extLst>
               <a:ext uri="{FF2B5EF4-FFF2-40B4-BE49-F238E27FC236}">
-                <a16:creationId xmlns:a16="http://schemas.microsoft.com/office/drawing/2014/main" id="{3B2C51B9-EDD7-4240-B648-DD06A33A337B}"/>
+                <a16:creationId xmlns:a16="http://schemas.microsoft.com/office/drawing/2014/main" xmlns="" id="{3B2C51B9-EDD7-4240-B648-DD06A33A337B}"/>
               </a:ext>
             </a:extLst>
           </p:cNvPr>
@@ -15008,7 +15009,7 @@
             <p:cNvPr id="19" name="Oval 18">
               <a:extLst>
                 <a:ext uri="{FF2B5EF4-FFF2-40B4-BE49-F238E27FC236}">
-                  <a16:creationId xmlns:a16="http://schemas.microsoft.com/office/drawing/2014/main" id="{A104E178-9C80-4A33-A1B6-474FD8E9B6A5}"/>
+                  <a16:creationId xmlns:a16="http://schemas.microsoft.com/office/drawing/2014/main" xmlns="" id="{A104E178-9C80-4A33-A1B6-474FD8E9B6A5}"/>
                 </a:ext>
               </a:extLst>
             </p:cNvPr>
@@ -15061,7 +15062,7 @@
             <p:cNvPr id="41" name="Oval 40">
               <a:extLst>
                 <a:ext uri="{FF2B5EF4-FFF2-40B4-BE49-F238E27FC236}">
-                  <a16:creationId xmlns:a16="http://schemas.microsoft.com/office/drawing/2014/main" id="{92C24576-AA8C-4365-A2B7-C5B7C9D8A300}"/>
+                  <a16:creationId xmlns:a16="http://schemas.microsoft.com/office/drawing/2014/main" xmlns="" id="{92C24576-AA8C-4365-A2B7-C5B7C9D8A300}"/>
                 </a:ext>
               </a:extLst>
             </p:cNvPr>
@@ -15111,7 +15112,7 @@
             <p:cNvPr id="42" name="Straight Arrow Connector 41">
               <a:extLst>
                 <a:ext uri="{FF2B5EF4-FFF2-40B4-BE49-F238E27FC236}">
-                  <a16:creationId xmlns:a16="http://schemas.microsoft.com/office/drawing/2014/main" id="{C04B9279-B4F9-47E7-9E13-7A48FB835E60}"/>
+                  <a16:creationId xmlns:a16="http://schemas.microsoft.com/office/drawing/2014/main" xmlns="" id="{C04B9279-B4F9-47E7-9E13-7A48FB835E60}"/>
                 </a:ext>
               </a:extLst>
             </p:cNvPr>
@@ -15154,7 +15155,7 @@
             <p:cNvPr id="43" name="Oval 42">
               <a:extLst>
                 <a:ext uri="{FF2B5EF4-FFF2-40B4-BE49-F238E27FC236}">
-                  <a16:creationId xmlns:a16="http://schemas.microsoft.com/office/drawing/2014/main" id="{73949712-EC35-4B62-80BD-DB99766A6DDC}"/>
+                  <a16:creationId xmlns:a16="http://schemas.microsoft.com/office/drawing/2014/main" xmlns="" id="{73949712-EC35-4B62-80BD-DB99766A6DDC}"/>
                 </a:ext>
               </a:extLst>
             </p:cNvPr>
@@ -15203,7 +15204,7 @@
             <p:cNvPr id="44" name="Oval 43">
               <a:extLst>
                 <a:ext uri="{FF2B5EF4-FFF2-40B4-BE49-F238E27FC236}">
-                  <a16:creationId xmlns:a16="http://schemas.microsoft.com/office/drawing/2014/main" id="{ED91E7B2-95CF-446A-882A-D674C9A468AD}"/>
+                  <a16:creationId xmlns:a16="http://schemas.microsoft.com/office/drawing/2014/main" xmlns="" id="{ED91E7B2-95CF-446A-882A-D674C9A468AD}"/>
                 </a:ext>
               </a:extLst>
             </p:cNvPr>
@@ -15249,7 +15250,7 @@
             <p:cNvPr id="45" name="Straight Arrow Connector 44">
               <a:extLst>
                 <a:ext uri="{FF2B5EF4-FFF2-40B4-BE49-F238E27FC236}">
-                  <a16:creationId xmlns:a16="http://schemas.microsoft.com/office/drawing/2014/main" id="{7B2937D3-658E-461E-B536-44F292EA471D}"/>
+                  <a16:creationId xmlns:a16="http://schemas.microsoft.com/office/drawing/2014/main" xmlns="" id="{7B2937D3-658E-461E-B536-44F292EA471D}"/>
                 </a:ext>
               </a:extLst>
             </p:cNvPr>
@@ -15322,7 +15323,7 @@
           <p:cNvPr id="2" name="Group 1">
             <a:extLst>
               <a:ext uri="{FF2B5EF4-FFF2-40B4-BE49-F238E27FC236}">
-                <a16:creationId xmlns:a16="http://schemas.microsoft.com/office/drawing/2014/main" id="{1673A84B-0663-4F3A-B55F-412321873102}"/>
+                <a16:creationId xmlns:a16="http://schemas.microsoft.com/office/drawing/2014/main" xmlns="" id="{1673A84B-0663-4F3A-B55F-412321873102}"/>
               </a:ext>
             </a:extLst>
           </p:cNvPr>
@@ -15846,7 +15847,7 @@
             <p:cNvPr id="19" name="TextBox 18">
               <a:extLst>
                 <a:ext uri="{FF2B5EF4-FFF2-40B4-BE49-F238E27FC236}">
-                  <a16:creationId xmlns:a16="http://schemas.microsoft.com/office/drawing/2014/main" id="{CC9FCF87-F2D4-4039-A826-4C3260BD10F9}"/>
+                  <a16:creationId xmlns:a16="http://schemas.microsoft.com/office/drawing/2014/main" xmlns="" id="{CC9FCF87-F2D4-4039-A826-4C3260BD10F9}"/>
                 </a:ext>
               </a:extLst>
             </p:cNvPr>
@@ -15885,7 +15886,7 @@
             <p:cNvPr id="20" name="TextBox 19">
               <a:extLst>
                 <a:ext uri="{FF2B5EF4-FFF2-40B4-BE49-F238E27FC236}">
-                  <a16:creationId xmlns:a16="http://schemas.microsoft.com/office/drawing/2014/main" id="{3515CE19-FCFF-4E9F-A2DF-69A7A146D633}"/>
+                  <a16:creationId xmlns:a16="http://schemas.microsoft.com/office/drawing/2014/main" xmlns="" id="{3515CE19-FCFF-4E9F-A2DF-69A7A146D633}"/>
                 </a:ext>
               </a:extLst>
             </p:cNvPr>
@@ -15955,7 +15956,7 @@
           <p:cNvPr id="22" name="Group 21">
             <a:extLst>
               <a:ext uri="{FF2B5EF4-FFF2-40B4-BE49-F238E27FC236}">
-                <a16:creationId xmlns:a16="http://schemas.microsoft.com/office/drawing/2014/main" id="{32D7F702-4C88-4EE2-9F57-CB430F0BA6F9}"/>
+                <a16:creationId xmlns:a16="http://schemas.microsoft.com/office/drawing/2014/main" xmlns="" id="{32D7F702-4C88-4EE2-9F57-CB430F0BA6F9}"/>
               </a:ext>
             </a:extLst>
           </p:cNvPr>
@@ -16504,7 +16505,7 @@
             <p:cNvPr id="20" name="TextBox 19">
               <a:extLst>
                 <a:ext uri="{FF2B5EF4-FFF2-40B4-BE49-F238E27FC236}">
-                  <a16:creationId xmlns:a16="http://schemas.microsoft.com/office/drawing/2014/main" id="{A998FC44-5325-4D9C-A345-381EA2311359}"/>
+                  <a16:creationId xmlns:a16="http://schemas.microsoft.com/office/drawing/2014/main" xmlns="" id="{A998FC44-5325-4D9C-A345-381EA2311359}"/>
                 </a:ext>
               </a:extLst>
             </p:cNvPr>
@@ -16543,7 +16544,7 @@
             <p:cNvPr id="21" name="TextBox 20">
               <a:extLst>
                 <a:ext uri="{FF2B5EF4-FFF2-40B4-BE49-F238E27FC236}">
-                  <a16:creationId xmlns:a16="http://schemas.microsoft.com/office/drawing/2014/main" id="{1E2F940D-02AC-435F-875C-ED9F77996A4B}"/>
+                  <a16:creationId xmlns:a16="http://schemas.microsoft.com/office/drawing/2014/main" xmlns="" id="{1E2F940D-02AC-435F-875C-ED9F77996A4B}"/>
                 </a:ext>
               </a:extLst>
             </p:cNvPr>
@@ -16613,7 +16614,7 @@
           <p:cNvPr id="2" name="Group 1">
             <a:extLst>
               <a:ext uri="{FF2B5EF4-FFF2-40B4-BE49-F238E27FC236}">
-                <a16:creationId xmlns:a16="http://schemas.microsoft.com/office/drawing/2014/main" id="{0CA54D9B-4649-4139-BF33-3A405489CA68}"/>
+                <a16:creationId xmlns:a16="http://schemas.microsoft.com/office/drawing/2014/main" xmlns="" id="{0CA54D9B-4649-4139-BF33-3A405489CA68}"/>
               </a:ext>
             </a:extLst>
           </p:cNvPr>
@@ -17159,7 +17160,7 @@
             <p:cNvPr id="35" name="TextBox 34">
               <a:extLst>
                 <a:ext uri="{FF2B5EF4-FFF2-40B4-BE49-F238E27FC236}">
-                  <a16:creationId xmlns:a16="http://schemas.microsoft.com/office/drawing/2014/main" id="{7E72F2BC-22BB-4B7F-89D0-333D30DB026F}"/>
+                  <a16:creationId xmlns:a16="http://schemas.microsoft.com/office/drawing/2014/main" xmlns="" id="{7E72F2BC-22BB-4B7F-89D0-333D30DB026F}"/>
                 </a:ext>
               </a:extLst>
             </p:cNvPr>
@@ -17198,7 +17199,7 @@
             <p:cNvPr id="36" name="TextBox 35">
               <a:extLst>
                 <a:ext uri="{FF2B5EF4-FFF2-40B4-BE49-F238E27FC236}">
-                  <a16:creationId xmlns:a16="http://schemas.microsoft.com/office/drawing/2014/main" id="{1BC3F254-5703-4413-8F6B-98BDF6077316}"/>
+                  <a16:creationId xmlns:a16="http://schemas.microsoft.com/office/drawing/2014/main" xmlns="" id="{1BC3F254-5703-4413-8F6B-98BDF6077316}"/>
                 </a:ext>
               </a:extLst>
             </p:cNvPr>
@@ -17244,7 +17245,7 @@
             <p:cNvPr id="37" name="TextBox 36">
               <a:extLst>
                 <a:ext uri="{FF2B5EF4-FFF2-40B4-BE49-F238E27FC236}">
-                  <a16:creationId xmlns:a16="http://schemas.microsoft.com/office/drawing/2014/main" id="{85B0ECDB-D6B3-4252-A9E3-8975F33D8A5F}"/>
+                  <a16:creationId xmlns:a16="http://schemas.microsoft.com/office/drawing/2014/main" xmlns="" id="{85B0ECDB-D6B3-4252-A9E3-8975F33D8A5F}"/>
                 </a:ext>
               </a:extLst>
             </p:cNvPr>
@@ -17283,7 +17284,7 @@
             <p:cNvPr id="38" name="Straight Arrow Connector 37">
               <a:extLst>
                 <a:ext uri="{FF2B5EF4-FFF2-40B4-BE49-F238E27FC236}">
-                  <a16:creationId xmlns:a16="http://schemas.microsoft.com/office/drawing/2014/main" id="{22218763-EAC3-4B89-AB24-FB413DB047B1}"/>
+                  <a16:creationId xmlns:a16="http://schemas.microsoft.com/office/drawing/2014/main" xmlns="" id="{22218763-EAC3-4B89-AB24-FB413DB047B1}"/>
                 </a:ext>
               </a:extLst>
             </p:cNvPr>
@@ -17326,7 +17327,7 @@
             <p:cNvPr id="39" name="Straight Arrow Connector 38">
               <a:extLst>
                 <a:ext uri="{FF2B5EF4-FFF2-40B4-BE49-F238E27FC236}">
-                  <a16:creationId xmlns:a16="http://schemas.microsoft.com/office/drawing/2014/main" id="{6A8734FC-9F06-439B-A0B6-ECB46C05414F}"/>
+                  <a16:creationId xmlns:a16="http://schemas.microsoft.com/office/drawing/2014/main" xmlns="" id="{6A8734FC-9F06-439B-A0B6-ECB46C05414F}"/>
                 </a:ext>
               </a:extLst>
             </p:cNvPr>
@@ -17369,7 +17370,7 @@
             <p:cNvPr id="40" name="TextBox 39">
               <a:extLst>
                 <a:ext uri="{FF2B5EF4-FFF2-40B4-BE49-F238E27FC236}">
-                  <a16:creationId xmlns:a16="http://schemas.microsoft.com/office/drawing/2014/main" id="{5F120430-1FA7-4874-ABCB-53CA8E819354}"/>
+                  <a16:creationId xmlns:a16="http://schemas.microsoft.com/office/drawing/2014/main" xmlns="" id="{5F120430-1FA7-4874-ABCB-53CA8E819354}"/>
                 </a:ext>
               </a:extLst>
             </p:cNvPr>
@@ -17408,7 +17409,7 @@
             <p:cNvPr id="41" name="TextBox 40">
               <a:extLst>
                 <a:ext uri="{FF2B5EF4-FFF2-40B4-BE49-F238E27FC236}">
-                  <a16:creationId xmlns:a16="http://schemas.microsoft.com/office/drawing/2014/main" id="{78F2DCC0-4987-4A46-936A-1FC37149CD85}"/>
+                  <a16:creationId xmlns:a16="http://schemas.microsoft.com/office/drawing/2014/main" xmlns="" id="{78F2DCC0-4987-4A46-936A-1FC37149CD85}"/>
                 </a:ext>
               </a:extLst>
             </p:cNvPr>
@@ -17447,6 +17448,452 @@
     <p:extLst>
       <p:ext uri="{BB962C8B-B14F-4D97-AF65-F5344CB8AC3E}">
         <p14:creationId xmlns:p14="http://schemas.microsoft.com/office/powerpoint/2010/main" val="679978301"/>
+      </p:ext>
+    </p:extLst>
+  </p:cSld>
+  <p:clrMapOvr>
+    <a:masterClrMapping/>
+  </p:clrMapOvr>
+</p:sld>
+</file>
+
+<file path=ppt/slides/slide8.xml><?xml version="1.0" encoding="utf-8"?>
+<p:sld xmlns:a="http://schemas.openxmlformats.org/drawingml/2006/main" xmlns:r="http://schemas.openxmlformats.org/officeDocument/2006/relationships" xmlns:p="http://schemas.openxmlformats.org/presentationml/2006/main">
+  <p:cSld>
+    <p:spTree>
+      <p:nvGrpSpPr>
+        <p:cNvPr id="1" name=""/>
+        <p:cNvGrpSpPr/>
+        <p:nvPr/>
+      </p:nvGrpSpPr>
+      <p:grpSpPr>
+        <a:xfrm>
+          <a:off x="0" y="0"/>
+          <a:ext cx="0" cy="0"/>
+          <a:chOff x="0" y="0"/>
+          <a:chExt cx="0" cy="0"/>
+        </a:xfrm>
+      </p:grpSpPr>
+      <p:grpSp>
+        <p:nvGrpSpPr>
+          <p:cNvPr id="9" name="Group 8"/>
+          <p:cNvGrpSpPr/>
+          <p:nvPr/>
+        </p:nvGrpSpPr>
+        <p:grpSpPr>
+          <a:xfrm>
+            <a:off x="1636289" y="953146"/>
+            <a:ext cx="6227551" cy="2204392"/>
+            <a:chOff x="1636289" y="953146"/>
+            <a:chExt cx="6227551" cy="2204392"/>
+          </a:xfrm>
+        </p:grpSpPr>
+        <p:sp>
+          <p:nvSpPr>
+            <p:cNvPr id="3" name="TextBox 2"/>
+            <p:cNvSpPr txBox="1"/>
+            <p:nvPr/>
+          </p:nvSpPr>
+          <p:spPr>
+            <a:xfrm>
+              <a:off x="1639587" y="953146"/>
+              <a:ext cx="2455558" cy="2204392"/>
+            </a:xfrm>
+            <a:prstGeom prst="rect">
+              <a:avLst/>
+            </a:prstGeom>
+            <a:noFill/>
+            <a:ln>
+              <a:solidFill>
+                <a:schemeClr val="tx1"/>
+              </a:solidFill>
+            </a:ln>
+          </p:spPr>
+          <p:txBody>
+            <a:bodyPr wrap="none" rtlCol="0">
+              <a:noAutofit/>
+            </a:bodyPr>
+            <a:lstStyle/>
+            <a:p>
+              <a:pPr algn="ctr"/>
+              <a:r>
+                <a:rPr lang="en-US" u="sng" dirty="0" smtClean="0"/>
+                <a:t>HTTP Client</a:t>
+              </a:r>
+              <a:endParaRPr lang="en-US" u="sng" dirty="0"/>
+            </a:p>
+          </p:txBody>
+        </p:sp>
+        <p:sp>
+          <p:nvSpPr>
+            <p:cNvPr id="4" name="TextBox 3"/>
+            <p:cNvSpPr txBox="1"/>
+            <p:nvPr/>
+          </p:nvSpPr>
+          <p:spPr>
+            <a:xfrm>
+              <a:off x="5384069" y="953146"/>
+              <a:ext cx="2455558" cy="2204392"/>
+            </a:xfrm>
+            <a:prstGeom prst="rect">
+              <a:avLst/>
+            </a:prstGeom>
+            <a:noFill/>
+            <a:ln>
+              <a:solidFill>
+                <a:schemeClr val="tx1"/>
+              </a:solidFill>
+            </a:ln>
+          </p:spPr>
+          <p:txBody>
+            <a:bodyPr wrap="none" rtlCol="0">
+              <a:noAutofit/>
+            </a:bodyPr>
+            <a:lstStyle/>
+            <a:p>
+              <a:pPr algn="ctr"/>
+              <a:r>
+                <a:rPr lang="en-US" u="sng" dirty="0" smtClean="0"/>
+                <a:t>HTTP Server</a:t>
+              </a:r>
+              <a:endParaRPr lang="en-US" u="sng" dirty="0"/>
+            </a:p>
+          </p:txBody>
+        </p:sp>
+        <p:sp>
+          <p:nvSpPr>
+            <p:cNvPr id="5" name="TextBox 4"/>
+            <p:cNvSpPr txBox="1"/>
+            <p:nvPr/>
+          </p:nvSpPr>
+          <p:spPr>
+            <a:xfrm>
+              <a:off x="1646014" y="1407766"/>
+              <a:ext cx="2442706" cy="323165"/>
+            </a:xfrm>
+            <a:prstGeom prst="rect">
+              <a:avLst/>
+            </a:prstGeom>
+            <a:noFill/>
+            <a:ln>
+              <a:noFill/>
+            </a:ln>
+          </p:spPr>
+          <p:txBody>
+            <a:bodyPr wrap="square" rtlCol="0">
+              <a:spAutoFit/>
+            </a:bodyPr>
+            <a:lstStyle/>
+            <a:p>
+              <a:pPr algn="ctr"/>
+              <a:r>
+                <a:rPr lang="en-US" sz="1500" dirty="0" smtClean="0"/>
+                <a:t>Open TCP Connection</a:t>
+              </a:r>
+              <a:endParaRPr lang="en-US" sz="1500" dirty="0"/>
+            </a:p>
+          </p:txBody>
+        </p:sp>
+        <p:cxnSp>
+          <p:nvCxnSpPr>
+            <p:cNvPr id="6" name="Straight Arrow Connector 5"/>
+            <p:cNvCxnSpPr/>
+            <p:nvPr/>
+          </p:nvCxnSpPr>
+          <p:spPr>
+            <a:xfrm>
+              <a:off x="4087465" y="1592432"/>
+              <a:ext cx="1286269" cy="0"/>
+            </a:xfrm>
+            <a:prstGeom prst="straightConnector1">
+              <a:avLst/>
+            </a:prstGeom>
+            <a:ln w="38100">
+              <a:solidFill>
+                <a:srgbClr val="FF0000"/>
+              </a:solidFill>
+              <a:tailEnd type="triangle"/>
+            </a:ln>
+          </p:spPr>
+          <p:style>
+            <a:lnRef idx="1">
+              <a:schemeClr val="accent1"/>
+            </a:lnRef>
+            <a:fillRef idx="0">
+              <a:schemeClr val="accent1"/>
+            </a:fillRef>
+            <a:effectRef idx="0">
+              <a:schemeClr val="accent1"/>
+            </a:effectRef>
+            <a:fontRef idx="minor">
+              <a:schemeClr val="tx1"/>
+            </a:fontRef>
+          </p:style>
+        </p:cxnSp>
+        <p:cxnSp>
+          <p:nvCxnSpPr>
+            <p:cNvPr id="7" name="Straight Arrow Connector 6"/>
+            <p:cNvCxnSpPr/>
+            <p:nvPr/>
+          </p:nvCxnSpPr>
+          <p:spPr>
+            <a:xfrm>
+              <a:off x="4087463" y="1920129"/>
+              <a:ext cx="1286269" cy="0"/>
+            </a:xfrm>
+            <a:prstGeom prst="straightConnector1">
+              <a:avLst/>
+            </a:prstGeom>
+            <a:ln w="38100">
+              <a:solidFill>
+                <a:srgbClr val="FF0000"/>
+              </a:solidFill>
+              <a:headEnd type="none"/>
+              <a:tailEnd type="triangle"/>
+            </a:ln>
+          </p:spPr>
+          <p:style>
+            <a:lnRef idx="1">
+              <a:schemeClr val="accent1"/>
+            </a:lnRef>
+            <a:fillRef idx="0">
+              <a:schemeClr val="accent1"/>
+            </a:fillRef>
+            <a:effectRef idx="0">
+              <a:schemeClr val="accent1"/>
+            </a:effectRef>
+            <a:fontRef idx="minor">
+              <a:schemeClr val="tx1"/>
+            </a:fontRef>
+          </p:style>
+        </p:cxnSp>
+        <p:sp>
+          <p:nvSpPr>
+            <p:cNvPr id="11" name="TextBox 10"/>
+            <p:cNvSpPr txBox="1"/>
+            <p:nvPr/>
+          </p:nvSpPr>
+          <p:spPr>
+            <a:xfrm>
+              <a:off x="1642606" y="1759943"/>
+              <a:ext cx="2449519" cy="323165"/>
+            </a:xfrm>
+            <a:prstGeom prst="rect">
+              <a:avLst/>
+            </a:prstGeom>
+            <a:noFill/>
+            <a:ln>
+              <a:noFill/>
+            </a:ln>
+          </p:spPr>
+          <p:txBody>
+            <a:bodyPr wrap="square" rtlCol="0">
+              <a:spAutoFit/>
+            </a:bodyPr>
+            <a:lstStyle/>
+            <a:p>
+              <a:pPr algn="ctr"/>
+              <a:r>
+                <a:rPr lang="en-US" sz="1500" dirty="0" smtClean="0"/>
+                <a:t>Send HTTP Request</a:t>
+              </a:r>
+              <a:endParaRPr lang="en-US" sz="1500" dirty="0"/>
+            </a:p>
+          </p:txBody>
+        </p:sp>
+        <p:cxnSp>
+          <p:nvCxnSpPr>
+            <p:cNvPr id="19" name="Straight Arrow Connector 18"/>
+            <p:cNvCxnSpPr/>
+            <p:nvPr/>
+          </p:nvCxnSpPr>
+          <p:spPr>
+            <a:xfrm>
+              <a:off x="4101340" y="2347253"/>
+              <a:ext cx="1286269" cy="0"/>
+            </a:xfrm>
+            <a:prstGeom prst="straightConnector1">
+              <a:avLst/>
+            </a:prstGeom>
+            <a:ln w="38100">
+              <a:solidFill>
+                <a:srgbClr val="FF0000"/>
+              </a:solidFill>
+              <a:headEnd type="triangle"/>
+              <a:tailEnd type="none"/>
+            </a:ln>
+          </p:spPr>
+          <p:style>
+            <a:lnRef idx="1">
+              <a:schemeClr val="accent1"/>
+            </a:lnRef>
+            <a:fillRef idx="0">
+              <a:schemeClr val="accent1"/>
+            </a:fillRef>
+            <a:effectRef idx="0">
+              <a:schemeClr val="accent1"/>
+            </a:effectRef>
+            <a:fontRef idx="minor">
+              <a:schemeClr val="tx1"/>
+            </a:fontRef>
+          </p:style>
+        </p:cxnSp>
+        <p:sp>
+          <p:nvSpPr>
+            <p:cNvPr id="20" name="TextBox 19"/>
+            <p:cNvSpPr txBox="1"/>
+            <p:nvPr/>
+          </p:nvSpPr>
+          <p:spPr>
+            <a:xfrm>
+              <a:off x="5397945" y="2184584"/>
+              <a:ext cx="2465895" cy="323165"/>
+            </a:xfrm>
+            <a:prstGeom prst="rect">
+              <a:avLst/>
+            </a:prstGeom>
+            <a:noFill/>
+            <a:ln>
+              <a:noFill/>
+            </a:ln>
+          </p:spPr>
+          <p:txBody>
+            <a:bodyPr wrap="square" rtlCol="0">
+              <a:spAutoFit/>
+            </a:bodyPr>
+            <a:lstStyle/>
+            <a:p>
+              <a:pPr algn="ctr"/>
+              <a:r>
+                <a:rPr lang="en-US" sz="1500" dirty="0" smtClean="0"/>
+                <a:t>Send HTTP Response</a:t>
+              </a:r>
+              <a:endParaRPr lang="en-US" sz="1500" dirty="0"/>
+            </a:p>
+          </p:txBody>
+        </p:sp>
+        <p:cxnSp>
+          <p:nvCxnSpPr>
+            <p:cNvPr id="22" name="Straight Arrow Connector 21"/>
+            <p:cNvCxnSpPr/>
+            <p:nvPr/>
+          </p:nvCxnSpPr>
+          <p:spPr>
+            <a:xfrm>
+              <a:off x="4109663" y="2728972"/>
+              <a:ext cx="1286269" cy="0"/>
+            </a:xfrm>
+            <a:prstGeom prst="straightConnector1">
+              <a:avLst/>
+            </a:prstGeom>
+            <a:ln w="38100">
+              <a:solidFill>
+                <a:srgbClr val="FF0000"/>
+              </a:solidFill>
+              <a:headEnd type="triangle"/>
+              <a:tailEnd type="triangle"/>
+            </a:ln>
+          </p:spPr>
+          <p:style>
+            <a:lnRef idx="1">
+              <a:schemeClr val="accent1"/>
+            </a:lnRef>
+            <a:fillRef idx="0">
+              <a:schemeClr val="accent1"/>
+            </a:fillRef>
+            <a:effectRef idx="0">
+              <a:schemeClr val="accent1"/>
+            </a:effectRef>
+            <a:fontRef idx="minor">
+              <a:schemeClr val="tx1"/>
+            </a:fontRef>
+          </p:style>
+        </p:cxnSp>
+        <p:sp>
+          <p:nvSpPr>
+            <p:cNvPr id="35" name="TextBox 34">
+              <a:extLst>
+                <a:ext uri="{FF2B5EF4-FFF2-40B4-BE49-F238E27FC236}">
+                  <a16:creationId xmlns:a16="http://schemas.microsoft.com/office/drawing/2014/main" xmlns="" id="{7E72F2BC-22BB-4B7F-89D0-333D30DB026F}"/>
+                </a:ext>
+              </a:extLst>
+            </p:cNvPr>
+            <p:cNvSpPr txBox="1"/>
+            <p:nvPr/>
+          </p:nvSpPr>
+          <p:spPr>
+            <a:xfrm>
+              <a:off x="1636289" y="2601423"/>
+              <a:ext cx="2463211" cy="323165"/>
+            </a:xfrm>
+            <a:prstGeom prst="rect">
+              <a:avLst/>
+            </a:prstGeom>
+            <a:noFill/>
+            <a:ln>
+              <a:noFill/>
+            </a:ln>
+          </p:spPr>
+          <p:txBody>
+            <a:bodyPr wrap="square" rtlCol="0">
+              <a:spAutoFit/>
+            </a:bodyPr>
+            <a:lstStyle/>
+            <a:p>
+              <a:pPr algn="ctr"/>
+              <a:r>
+                <a:rPr lang="en-US" sz="1500" smtClean="0"/>
+                <a:t>Close Connection</a:t>
+              </a:r>
+              <a:endParaRPr lang="en-US" sz="1500" dirty="0"/>
+            </a:p>
+          </p:txBody>
+        </p:sp>
+        <p:sp>
+          <p:nvSpPr>
+            <p:cNvPr id="25" name="TextBox 24">
+              <a:extLst>
+                <a:ext uri="{FF2B5EF4-FFF2-40B4-BE49-F238E27FC236}">
+                  <a16:creationId xmlns:a16="http://schemas.microsoft.com/office/drawing/2014/main" xmlns="" id="{7E72F2BC-22BB-4B7F-89D0-333D30DB026F}"/>
+                </a:ext>
+              </a:extLst>
+            </p:cNvPr>
+            <p:cNvSpPr txBox="1"/>
+            <p:nvPr/>
+          </p:nvSpPr>
+          <p:spPr>
+            <a:xfrm>
+              <a:off x="5359856" y="2601422"/>
+              <a:ext cx="2463211" cy="323165"/>
+            </a:xfrm>
+            <a:prstGeom prst="rect">
+              <a:avLst/>
+            </a:prstGeom>
+            <a:noFill/>
+            <a:ln>
+              <a:noFill/>
+            </a:ln>
+          </p:spPr>
+          <p:txBody>
+            <a:bodyPr wrap="square" rtlCol="0">
+              <a:spAutoFit/>
+            </a:bodyPr>
+            <a:lstStyle/>
+            <a:p>
+              <a:pPr algn="ctr"/>
+              <a:r>
+                <a:rPr lang="en-US" sz="1500" smtClean="0"/>
+                <a:t>Close Connection</a:t>
+              </a:r>
+              <a:endParaRPr lang="en-US" sz="1500" dirty="0"/>
+            </a:p>
+          </p:txBody>
+        </p:sp>
+      </p:grpSp>
+    </p:spTree>
+    <p:extLst>
+      <p:ext uri="{BB962C8B-B14F-4D97-AF65-F5344CB8AC3E}">
+        <p14:creationId xmlns:p14="http://schemas.microsoft.com/office/powerpoint/2010/main" val="1849832911"/>
       </p:ext>
     </p:extLst>
   </p:cSld>

</xml_diff>